<commit_message>
worked on presentation and data analysis
</commit_message>
<xml_diff>
--- a/Presentation.pptx
+++ b/Presentation.pptx
@@ -9,9 +9,12 @@
     <p:sldId id="257" r:id="rId3"/>
     <p:sldId id="258" r:id="rId4"/>
     <p:sldId id="259" r:id="rId5"/>
-    <p:sldId id="260" r:id="rId6"/>
-    <p:sldId id="261" r:id="rId7"/>
-    <p:sldId id="262" r:id="rId8"/>
+    <p:sldId id="263" r:id="rId6"/>
+    <p:sldId id="264" r:id="rId7"/>
+    <p:sldId id="265" r:id="rId8"/>
+    <p:sldId id="260" r:id="rId9"/>
+    <p:sldId id="261" r:id="rId10"/>
+    <p:sldId id="262" r:id="rId11"/>
   </p:sldIdLst>
   <p:sldSz cx="12192000" cy="6858000"/>
   <p:notesSz cx="6858000" cy="9144000"/>
@@ -4137,6 +4140,131 @@
 </p:sld>
 </file>
 
+<file path=ppt/slides/slide10.xml><?xml version="1.0" encoding="utf-8"?>
+<p:sld xmlns:a="http://schemas.openxmlformats.org/drawingml/2006/main" xmlns:r="http://schemas.openxmlformats.org/officeDocument/2006/relationships" xmlns:p="http://schemas.openxmlformats.org/presentationml/2006/main">
+  <p:cSld>
+    <p:spTree>
+      <p:nvGrpSpPr>
+        <p:cNvPr id="1" name=""/>
+        <p:cNvGrpSpPr/>
+        <p:nvPr/>
+      </p:nvGrpSpPr>
+      <p:grpSpPr>
+        <a:xfrm>
+          <a:off x="0" y="0"/>
+          <a:ext cx="0" cy="0"/>
+          <a:chOff x="0" y="0"/>
+          <a:chExt cx="0" cy="0"/>
+        </a:xfrm>
+      </p:grpSpPr>
+      <p:sp>
+        <p:nvSpPr>
+          <p:cNvPr id="2" name="Title 1">
+            <a:extLst>
+              <a:ext uri="{FF2B5EF4-FFF2-40B4-BE49-F238E27FC236}">
+                <a16:creationId xmlns:a16="http://schemas.microsoft.com/office/drawing/2014/main" id="{00DF3A5E-1F79-4EEE-9577-F262AE1381A0}"/>
+              </a:ext>
+            </a:extLst>
+          </p:cNvPr>
+          <p:cNvSpPr>
+            <a:spLocks noGrp="1"/>
+          </p:cNvSpPr>
+          <p:nvPr>
+            <p:ph type="title"/>
+          </p:nvPr>
+        </p:nvSpPr>
+        <p:spPr/>
+        <p:txBody>
+          <a:bodyPr/>
+          <a:lstStyle/>
+          <a:p>
+            <a:r>
+              <a:rPr lang="en-US" dirty="0"/>
+              <a:t>Acknowledgements</a:t>
+            </a:r>
+          </a:p>
+        </p:txBody>
+      </p:sp>
+      <p:sp>
+        <p:nvSpPr>
+          <p:cNvPr id="3" name="Content Placeholder 2">
+            <a:extLst>
+              <a:ext uri="{FF2B5EF4-FFF2-40B4-BE49-F238E27FC236}">
+                <a16:creationId xmlns:a16="http://schemas.microsoft.com/office/drawing/2014/main" id="{170739A6-A97C-4340-BD59-02CCC55492BF}"/>
+              </a:ext>
+            </a:extLst>
+          </p:cNvPr>
+          <p:cNvSpPr>
+            <a:spLocks noGrp="1"/>
+          </p:cNvSpPr>
+          <p:nvPr>
+            <p:ph idx="1"/>
+          </p:nvPr>
+        </p:nvSpPr>
+        <p:spPr/>
+        <p:txBody>
+          <a:bodyPr/>
+          <a:lstStyle/>
+          <a:p>
+            <a:endParaRPr lang="en-US" dirty="0"/>
+          </a:p>
+          <a:p>
+            <a:r>
+              <a:rPr lang="en-US" dirty="0"/>
+              <a:t>Audible for not banning me.</a:t>
+            </a:r>
+          </a:p>
+          <a:p>
+            <a:endParaRPr lang="en-US" dirty="0"/>
+          </a:p>
+          <a:p>
+            <a:r>
+              <a:rPr lang="en-US" dirty="0" err="1"/>
+              <a:t>ScraperAPI</a:t>
+            </a:r>
+            <a:r>
+              <a:rPr lang="en-US" dirty="0"/>
+              <a:t> for help which I didn’t end up using in this project.</a:t>
+            </a:r>
+          </a:p>
+          <a:p>
+            <a:endParaRPr lang="en-US" dirty="0"/>
+          </a:p>
+          <a:p>
+            <a:r>
+              <a:rPr lang="en-US" dirty="0">
+                <a:hlinkClick r:id="rId2"/>
+              </a:rPr>
+              <a:t>Ed Robertson </a:t>
+            </a:r>
+            <a:r>
+              <a:rPr lang="en-US" dirty="0"/>
+              <a:t>&amp; </a:t>
+            </a:r>
+            <a:r>
+              <a:rPr lang="en-US" dirty="0" err="1"/>
+              <a:t>Unsplash</a:t>
+            </a:r>
+            <a:r>
+              <a:rPr lang="en-US" dirty="0"/>
+              <a:t> for the photo.</a:t>
+            </a:r>
+          </a:p>
+        </p:txBody>
+      </p:sp>
+    </p:spTree>
+    <p:extLst>
+      <p:ext uri="{BB962C8B-B14F-4D97-AF65-F5344CB8AC3E}">
+        <p14:creationId xmlns:p14="http://schemas.microsoft.com/office/powerpoint/2010/main" val="3808814931"/>
+      </p:ext>
+    </p:extLst>
+  </p:cSld>
+  <p:clrMapOvr>
+    <a:masterClrMapping/>
+  </p:clrMapOvr>
+</p:sld>
+</file>
+
 <file path=ppt/slides/slide2.xml><?xml version="1.0" encoding="utf-8"?>
 <p:sld xmlns:a="http://schemas.openxmlformats.org/drawingml/2006/main" xmlns:r="http://schemas.openxmlformats.org/officeDocument/2006/relationships" xmlns:p="http://schemas.openxmlformats.org/presentationml/2006/main">
   <p:cSld>
@@ -4203,7 +4331,14 @@
           <a:bodyPr/>
           <a:lstStyle/>
           <a:p>
-            <a:endParaRPr lang="en-US"/>
+            <a:r>
+              <a:rPr lang="en-US" dirty="0" err="1"/>
+              <a:t>Whats</a:t>
+            </a:r>
+            <a:r>
+              <a:rPr lang="en-US" dirty="0"/>
+              <a:t> up with Audible</a:t>
+            </a:r>
           </a:p>
         </p:txBody>
       </p:sp>
@@ -4258,35 +4393,890 @@
           <a:bodyPr/>
           <a:lstStyle/>
           <a:p>
-            <a:endParaRPr lang="en-US" dirty="0"/>
-          </a:p>
-        </p:txBody>
-      </p:sp>
-      <p:sp>
-        <p:nvSpPr>
-          <p:cNvPr id="3" name="Content Placeholder 2">
+            <a:r>
+              <a:rPr lang="en-US" dirty="0"/>
+              <a:t>Collected information</a:t>
+            </a:r>
+          </a:p>
+        </p:txBody>
+      </p:sp>
+      <p:graphicFrame>
+        <p:nvGraphicFramePr>
+          <p:cNvPr id="4" name="Table 4">
             <a:extLst>
               <a:ext uri="{FF2B5EF4-FFF2-40B4-BE49-F238E27FC236}">
-                <a16:creationId xmlns:a16="http://schemas.microsoft.com/office/drawing/2014/main" id="{EE328DC7-8DC1-4921-88BF-B2F487179DA6}"/>
+                <a16:creationId xmlns:a16="http://schemas.microsoft.com/office/drawing/2014/main" id="{2E0624B7-F2CA-4121-BE2B-9DE87C428E89}"/>
               </a:ext>
             </a:extLst>
           </p:cNvPr>
-          <p:cNvSpPr>
-            <a:spLocks noGrp="1"/>
-          </p:cNvSpPr>
+          <p:cNvGraphicFramePr>
+            <a:graphicFrameLocks noGrp="1"/>
+          </p:cNvGraphicFramePr>
           <p:nvPr>
             <p:ph idx="1"/>
-          </p:nvPr>
-        </p:nvSpPr>
-        <p:spPr/>
-        <p:txBody>
-          <a:bodyPr/>
-          <a:lstStyle/>
-          <a:p>
-            <a:endParaRPr lang="en-US"/>
-          </a:p>
-        </p:txBody>
-      </p:sp>
+            <p:extLst>
+              <p:ext uri="{D42A27DB-BD31-4B8C-83A1-F6EECF244321}">
+                <p14:modId xmlns:p14="http://schemas.microsoft.com/office/powerpoint/2010/main" val="2737114713"/>
+              </p:ext>
+            </p:extLst>
+          </p:nvPr>
+        </p:nvGraphicFramePr>
+        <p:xfrm>
+          <a:off x="1066800" y="1908175"/>
+          <a:ext cx="10058400" cy="2743200"/>
+        </p:xfrm>
+        <a:graphic>
+          <a:graphicData uri="http://schemas.openxmlformats.org/drawingml/2006/table">
+            <a:tbl>
+              <a:tblPr firstRow="1" bandRow="1">
+                <a:tableStyleId>{2D5ABB26-0587-4C30-8999-92F81FD0307C}</a:tableStyleId>
+              </a:tblPr>
+              <a:tblGrid>
+                <a:gridCol w="5029200">
+                  <a:extLst>
+                    <a:ext uri="{9D8B030D-6E8A-4147-A177-3AD203B41FA5}">
+                      <a16:colId xmlns:a16="http://schemas.microsoft.com/office/drawing/2014/main" val="3546304019"/>
+                    </a:ext>
+                  </a:extLst>
+                </a:gridCol>
+                <a:gridCol w="5029200">
+                  <a:extLst>
+                    <a:ext uri="{9D8B030D-6E8A-4147-A177-3AD203B41FA5}">
+                      <a16:colId xmlns:a16="http://schemas.microsoft.com/office/drawing/2014/main" val="2948520954"/>
+                    </a:ext>
+                  </a:extLst>
+                </a:gridCol>
+              </a:tblGrid>
+              <a:tr h="370840">
+                <a:tc>
+                  <a:txBody>
+                    <a:bodyPr/>
+                    <a:lstStyle/>
+                    <a:p>
+                      <a:r>
+                        <a:rPr lang="en-US" sz="2800" dirty="0"/>
+                        <a:t>Category Spider</a:t>
+                      </a:r>
+                    </a:p>
+                  </a:txBody>
+                  <a:tcPr>
+                    <a:lnL w="12700" cap="flat" cmpd="sng" algn="ctr">
+                      <a:solidFill>
+                        <a:schemeClr val="tx1"/>
+                      </a:solidFill>
+                      <a:prstDash val="solid"/>
+                      <a:round/>
+                      <a:headEnd type="none" w="med" len="med"/>
+                      <a:tailEnd type="none" w="med" len="med"/>
+                    </a:lnL>
+                    <a:lnR w="12700" cap="flat" cmpd="sng" algn="ctr">
+                      <a:solidFill>
+                        <a:schemeClr val="tx1"/>
+                      </a:solidFill>
+                      <a:prstDash val="solid"/>
+                      <a:round/>
+                      <a:headEnd type="none" w="med" len="med"/>
+                      <a:tailEnd type="none" w="med" len="med"/>
+                    </a:lnR>
+                    <a:lnT w="12700" cap="flat" cmpd="sng" algn="ctr">
+                      <a:solidFill>
+                        <a:schemeClr val="tx1"/>
+                      </a:solidFill>
+                      <a:prstDash val="solid"/>
+                      <a:round/>
+                      <a:headEnd type="none" w="med" len="med"/>
+                      <a:tailEnd type="none" w="med" len="med"/>
+                    </a:lnT>
+                    <a:lnB w="12700" cap="flat" cmpd="sng" algn="ctr">
+                      <a:solidFill>
+                        <a:schemeClr val="tx1"/>
+                      </a:solidFill>
+                      <a:prstDash val="solid"/>
+                      <a:round/>
+                      <a:headEnd type="none" w="med" len="med"/>
+                      <a:tailEnd type="none" w="med" len="med"/>
+                    </a:lnB>
+                  </a:tcPr>
+                </a:tc>
+                <a:tc>
+                  <a:txBody>
+                    <a:bodyPr/>
+                    <a:lstStyle/>
+                    <a:p>
+                      <a:r>
+                        <a:rPr lang="en-US" sz="2800" dirty="0"/>
+                        <a:t>Title Spider</a:t>
+                      </a:r>
+                    </a:p>
+                  </a:txBody>
+                  <a:tcPr>
+                    <a:lnL w="12700" cap="flat" cmpd="sng" algn="ctr">
+                      <a:solidFill>
+                        <a:schemeClr val="tx1"/>
+                      </a:solidFill>
+                      <a:prstDash val="solid"/>
+                      <a:round/>
+                      <a:headEnd type="none" w="med" len="med"/>
+                      <a:tailEnd type="none" w="med" len="med"/>
+                    </a:lnL>
+                    <a:lnR w="12700" cap="flat" cmpd="sng" algn="ctr">
+                      <a:solidFill>
+                        <a:schemeClr val="tx1"/>
+                      </a:solidFill>
+                      <a:prstDash val="solid"/>
+                      <a:round/>
+                      <a:headEnd type="none" w="med" len="med"/>
+                      <a:tailEnd type="none" w="med" len="med"/>
+                    </a:lnR>
+                    <a:lnT w="12700" cap="flat" cmpd="sng" algn="ctr">
+                      <a:solidFill>
+                        <a:schemeClr val="tx1"/>
+                      </a:solidFill>
+                      <a:prstDash val="solid"/>
+                      <a:round/>
+                      <a:headEnd type="none" w="med" len="med"/>
+                      <a:tailEnd type="none" w="med" len="med"/>
+                    </a:lnT>
+                    <a:lnB w="12700" cap="flat" cmpd="sng" algn="ctr">
+                      <a:solidFill>
+                        <a:schemeClr val="tx1"/>
+                      </a:solidFill>
+                      <a:prstDash val="solid"/>
+                      <a:round/>
+                      <a:headEnd type="none" w="med" len="med"/>
+                      <a:tailEnd type="none" w="med" len="med"/>
+                    </a:lnB>
+                  </a:tcPr>
+                </a:tc>
+                <a:extLst>
+                  <a:ext uri="{0D108BD9-81ED-4DB2-BD59-A6C34878D82A}">
+                    <a16:rowId xmlns:a16="http://schemas.microsoft.com/office/drawing/2014/main" val="3172508867"/>
+                  </a:ext>
+                </a:extLst>
+              </a:tr>
+              <a:tr h="370840">
+                <a:tc>
+                  <a:txBody>
+                    <a:bodyPr/>
+                    <a:lstStyle/>
+                    <a:p>
+                      <a:r>
+                        <a:rPr lang="en-US" dirty="0"/>
+                        <a:t>Name &amp; URL</a:t>
+                      </a:r>
+                    </a:p>
+                  </a:txBody>
+                  <a:tcPr>
+                    <a:lnL w="12700" cap="flat" cmpd="sng" algn="ctr">
+                      <a:solidFill>
+                        <a:schemeClr val="tx1"/>
+                      </a:solidFill>
+                      <a:prstDash val="solid"/>
+                      <a:round/>
+                      <a:headEnd type="none" w="med" len="med"/>
+                      <a:tailEnd type="none" w="med" len="med"/>
+                    </a:lnL>
+                    <a:lnR w="12700" cap="flat" cmpd="sng" algn="ctr">
+                      <a:solidFill>
+                        <a:schemeClr val="tx1"/>
+                      </a:solidFill>
+                      <a:prstDash val="solid"/>
+                      <a:round/>
+                      <a:headEnd type="none" w="med" len="med"/>
+                      <a:tailEnd type="none" w="med" len="med"/>
+                    </a:lnR>
+                    <a:lnT w="12700" cap="flat" cmpd="sng" algn="ctr">
+                      <a:solidFill>
+                        <a:schemeClr val="tx1"/>
+                      </a:solidFill>
+                      <a:prstDash val="solid"/>
+                      <a:round/>
+                      <a:headEnd type="none" w="med" len="med"/>
+                      <a:tailEnd type="none" w="med" len="med"/>
+                    </a:lnT>
+                  </a:tcPr>
+                </a:tc>
+                <a:tc>
+                  <a:txBody>
+                    <a:bodyPr/>
+                    <a:lstStyle/>
+                    <a:p>
+                      <a:r>
+                        <a:rPr lang="en-US" dirty="0"/>
+                        <a:t>Title &amp; Subtitle</a:t>
+                      </a:r>
+                    </a:p>
+                  </a:txBody>
+                  <a:tcPr>
+                    <a:lnL w="12700" cap="flat" cmpd="sng" algn="ctr">
+                      <a:solidFill>
+                        <a:schemeClr val="tx1"/>
+                      </a:solidFill>
+                      <a:prstDash val="solid"/>
+                      <a:round/>
+                      <a:headEnd type="none" w="med" len="med"/>
+                      <a:tailEnd type="none" w="med" len="med"/>
+                    </a:lnL>
+                    <a:lnR w="12700" cap="flat" cmpd="sng" algn="ctr">
+                      <a:solidFill>
+                        <a:schemeClr val="tx1"/>
+                      </a:solidFill>
+                      <a:prstDash val="solid"/>
+                      <a:round/>
+                      <a:headEnd type="none" w="med" len="med"/>
+                      <a:tailEnd type="none" w="med" len="med"/>
+                    </a:lnR>
+                    <a:lnT w="12700" cap="flat" cmpd="sng" algn="ctr">
+                      <a:solidFill>
+                        <a:schemeClr val="tx1"/>
+                      </a:solidFill>
+                      <a:prstDash val="solid"/>
+                      <a:round/>
+                      <a:headEnd type="none" w="med" len="med"/>
+                      <a:tailEnd type="none" w="med" len="med"/>
+                    </a:lnT>
+                  </a:tcPr>
+                </a:tc>
+                <a:extLst>
+                  <a:ext uri="{0D108BD9-81ED-4DB2-BD59-A6C34878D82A}">
+                    <a16:rowId xmlns:a16="http://schemas.microsoft.com/office/drawing/2014/main" val="2383498637"/>
+                  </a:ext>
+                </a:extLst>
+              </a:tr>
+              <a:tr h="370840">
+                <a:tc>
+                  <a:txBody>
+                    <a:bodyPr/>
+                    <a:lstStyle/>
+                    <a:p>
+                      <a:r>
+                        <a:rPr lang="en-US" dirty="0"/>
+                        <a:t>Number of Titles</a:t>
+                      </a:r>
+                    </a:p>
+                  </a:txBody>
+                  <a:tcPr>
+                    <a:lnL w="12700" cap="flat" cmpd="sng" algn="ctr">
+                      <a:solidFill>
+                        <a:schemeClr val="tx1"/>
+                      </a:solidFill>
+                      <a:prstDash val="solid"/>
+                      <a:round/>
+                      <a:headEnd type="none" w="med" len="med"/>
+                      <a:tailEnd type="none" w="med" len="med"/>
+                    </a:lnL>
+                    <a:lnR w="12700" cap="flat" cmpd="sng" algn="ctr">
+                      <a:solidFill>
+                        <a:schemeClr val="tx1"/>
+                      </a:solidFill>
+                      <a:prstDash val="solid"/>
+                      <a:round/>
+                      <a:headEnd type="none" w="med" len="med"/>
+                      <a:tailEnd type="none" w="med" len="med"/>
+                    </a:lnR>
+                  </a:tcPr>
+                </a:tc>
+                <a:tc>
+                  <a:txBody>
+                    <a:bodyPr/>
+                    <a:lstStyle/>
+                    <a:p>
+                      <a:r>
+                        <a:rPr lang="en-US" dirty="0"/>
+                        <a:t>Author, Narrator, Language</a:t>
+                      </a:r>
+                    </a:p>
+                  </a:txBody>
+                  <a:tcPr>
+                    <a:lnL w="12700" cap="flat" cmpd="sng" algn="ctr">
+                      <a:solidFill>
+                        <a:schemeClr val="tx1"/>
+                      </a:solidFill>
+                      <a:prstDash val="solid"/>
+                      <a:round/>
+                      <a:headEnd type="none" w="med" len="med"/>
+                      <a:tailEnd type="none" w="med" len="med"/>
+                    </a:lnL>
+                    <a:lnR w="12700" cap="flat" cmpd="sng" algn="ctr">
+                      <a:solidFill>
+                        <a:schemeClr val="tx1"/>
+                      </a:solidFill>
+                      <a:prstDash val="solid"/>
+                      <a:round/>
+                      <a:headEnd type="none" w="med" len="med"/>
+                      <a:tailEnd type="none" w="med" len="med"/>
+                    </a:lnR>
+                  </a:tcPr>
+                </a:tc>
+                <a:extLst>
+                  <a:ext uri="{0D108BD9-81ED-4DB2-BD59-A6C34878D82A}">
+                    <a16:rowId xmlns:a16="http://schemas.microsoft.com/office/drawing/2014/main" val="965882516"/>
+                  </a:ext>
+                </a:extLst>
+              </a:tr>
+              <a:tr h="370840">
+                <a:tc>
+                  <a:txBody>
+                    <a:bodyPr/>
+                    <a:lstStyle/>
+                    <a:p>
+                      <a:r>
+                        <a:rPr lang="en-US" dirty="0"/>
+                        <a:t>Super-category: Name &amp; URL</a:t>
+                      </a:r>
+                    </a:p>
+                  </a:txBody>
+                  <a:tcPr>
+                    <a:lnL w="12700" cap="flat" cmpd="sng" algn="ctr">
+                      <a:solidFill>
+                        <a:schemeClr val="tx1"/>
+                      </a:solidFill>
+                      <a:prstDash val="solid"/>
+                      <a:round/>
+                      <a:headEnd type="none" w="med" len="med"/>
+                      <a:tailEnd type="none" w="med" len="med"/>
+                    </a:lnL>
+                    <a:lnR w="12700" cap="flat" cmpd="sng" algn="ctr">
+                      <a:solidFill>
+                        <a:schemeClr val="tx1"/>
+                      </a:solidFill>
+                      <a:prstDash val="solid"/>
+                      <a:round/>
+                      <a:headEnd type="none" w="med" len="med"/>
+                      <a:tailEnd type="none" w="med" len="med"/>
+                    </a:lnR>
+                  </a:tcPr>
+                </a:tc>
+                <a:tc>
+                  <a:txBody>
+                    <a:bodyPr/>
+                    <a:lstStyle/>
+                    <a:p>
+                      <a:r>
+                        <a:rPr lang="en-US" dirty="0"/>
+                        <a:t>Stars &amp; Number of Ratings</a:t>
+                      </a:r>
+                    </a:p>
+                  </a:txBody>
+                  <a:tcPr>
+                    <a:lnL w="12700" cap="flat" cmpd="sng" algn="ctr">
+                      <a:solidFill>
+                        <a:schemeClr val="tx1"/>
+                      </a:solidFill>
+                      <a:prstDash val="solid"/>
+                      <a:round/>
+                      <a:headEnd type="none" w="med" len="med"/>
+                      <a:tailEnd type="none" w="med" len="med"/>
+                    </a:lnL>
+                    <a:lnR w="12700" cap="flat" cmpd="sng" algn="ctr">
+                      <a:solidFill>
+                        <a:schemeClr val="tx1"/>
+                      </a:solidFill>
+                      <a:prstDash val="solid"/>
+                      <a:round/>
+                      <a:headEnd type="none" w="med" len="med"/>
+                      <a:tailEnd type="none" w="med" len="med"/>
+                    </a:lnR>
+                  </a:tcPr>
+                </a:tc>
+                <a:extLst>
+                  <a:ext uri="{0D108BD9-81ED-4DB2-BD59-A6C34878D82A}">
+                    <a16:rowId xmlns:a16="http://schemas.microsoft.com/office/drawing/2014/main" val="3645175027"/>
+                  </a:ext>
+                </a:extLst>
+              </a:tr>
+              <a:tr h="370840">
+                <a:tc>
+                  <a:txBody>
+                    <a:bodyPr/>
+                    <a:lstStyle/>
+                    <a:p>
+                      <a:r>
+                        <a:rPr lang="en-US" dirty="0"/>
+                        <a:t>Flag for bottom category</a:t>
+                      </a:r>
+                    </a:p>
+                  </a:txBody>
+                  <a:tcPr>
+                    <a:lnL w="12700" cap="flat" cmpd="sng" algn="ctr">
+                      <a:solidFill>
+                        <a:schemeClr val="tx1"/>
+                      </a:solidFill>
+                      <a:prstDash val="solid"/>
+                      <a:round/>
+                      <a:headEnd type="none" w="med" len="med"/>
+                      <a:tailEnd type="none" w="med" len="med"/>
+                    </a:lnL>
+                    <a:lnR w="12700" cap="flat" cmpd="sng" algn="ctr">
+                      <a:solidFill>
+                        <a:schemeClr val="tx1"/>
+                      </a:solidFill>
+                      <a:prstDash val="solid"/>
+                      <a:round/>
+                      <a:headEnd type="none" w="med" len="med"/>
+                      <a:tailEnd type="none" w="med" len="med"/>
+                    </a:lnR>
+                  </a:tcPr>
+                </a:tc>
+                <a:tc>
+                  <a:txBody>
+                    <a:bodyPr/>
+                    <a:lstStyle/>
+                    <a:p>
+                      <a:r>
+                        <a:rPr lang="en-US" dirty="0"/>
+                        <a:t>Book Length &amp; Release Date</a:t>
+                      </a:r>
+                    </a:p>
+                  </a:txBody>
+                  <a:tcPr>
+                    <a:lnL w="12700" cap="flat" cmpd="sng" algn="ctr">
+                      <a:solidFill>
+                        <a:schemeClr val="tx1"/>
+                      </a:solidFill>
+                      <a:prstDash val="solid"/>
+                      <a:round/>
+                      <a:headEnd type="none" w="med" len="med"/>
+                      <a:tailEnd type="none" w="med" len="med"/>
+                    </a:lnL>
+                    <a:lnR w="12700" cap="flat" cmpd="sng" algn="ctr">
+                      <a:solidFill>
+                        <a:schemeClr val="tx1"/>
+                      </a:solidFill>
+                      <a:prstDash val="solid"/>
+                      <a:round/>
+                      <a:headEnd type="none" w="med" len="med"/>
+                      <a:tailEnd type="none" w="med" len="med"/>
+                    </a:lnR>
+                  </a:tcPr>
+                </a:tc>
+                <a:extLst>
+                  <a:ext uri="{0D108BD9-81ED-4DB2-BD59-A6C34878D82A}">
+                    <a16:rowId xmlns:a16="http://schemas.microsoft.com/office/drawing/2014/main" val="4141642034"/>
+                  </a:ext>
+                </a:extLst>
+              </a:tr>
+              <a:tr h="370840">
+                <a:tc>
+                  <a:txBody>
+                    <a:bodyPr/>
+                    <a:lstStyle/>
+                    <a:p>
+                      <a:endParaRPr lang="en-US"/>
+                    </a:p>
+                  </a:txBody>
+                  <a:tcPr>
+                    <a:lnL w="12700" cap="flat" cmpd="sng" algn="ctr">
+                      <a:solidFill>
+                        <a:schemeClr val="tx1"/>
+                      </a:solidFill>
+                      <a:prstDash val="solid"/>
+                      <a:round/>
+                      <a:headEnd type="none" w="med" len="med"/>
+                      <a:tailEnd type="none" w="med" len="med"/>
+                    </a:lnL>
+                    <a:lnR w="12700" cap="flat" cmpd="sng" algn="ctr">
+                      <a:solidFill>
+                        <a:schemeClr val="tx1"/>
+                      </a:solidFill>
+                      <a:prstDash val="solid"/>
+                      <a:round/>
+                      <a:headEnd type="none" w="med" len="med"/>
+                      <a:tailEnd type="none" w="med" len="med"/>
+                    </a:lnR>
+                  </a:tcPr>
+                </a:tc>
+                <a:tc>
+                  <a:txBody>
+                    <a:bodyPr/>
+                    <a:lstStyle/>
+                    <a:p>
+                      <a:pPr marL="0" marR="0" lvl="0" indent="0" algn="l" defTabSz="914400" rtl="0" eaLnBrk="1" fontAlgn="auto" latinLnBrk="0" hangingPunct="1">
+                        <a:lnSpc>
+                          <a:spcPct val="100000"/>
+                        </a:lnSpc>
+                        <a:spcBef>
+                          <a:spcPts val="0"/>
+                        </a:spcBef>
+                        <a:spcAft>
+                          <a:spcPts val="0"/>
+                        </a:spcAft>
+                        <a:buClrTx/>
+                        <a:buSzTx/>
+                        <a:buFontTx/>
+                        <a:buNone/>
+                        <a:tabLst/>
+                        <a:defRPr/>
+                      </a:pPr>
+                      <a:r>
+                        <a:rPr lang="en-US" dirty="0"/>
+                        <a:t>Category name</a:t>
+                      </a:r>
+                    </a:p>
+                  </a:txBody>
+                  <a:tcPr>
+                    <a:lnL w="12700" cap="flat" cmpd="sng" algn="ctr">
+                      <a:solidFill>
+                        <a:schemeClr val="tx1"/>
+                      </a:solidFill>
+                      <a:prstDash val="solid"/>
+                      <a:round/>
+                      <a:headEnd type="none" w="med" len="med"/>
+                      <a:tailEnd type="none" w="med" len="med"/>
+                    </a:lnL>
+                    <a:lnR w="12700" cap="flat" cmpd="sng" algn="ctr">
+                      <a:solidFill>
+                        <a:schemeClr val="tx1"/>
+                      </a:solidFill>
+                      <a:prstDash val="solid"/>
+                      <a:round/>
+                      <a:headEnd type="none" w="med" len="med"/>
+                      <a:tailEnd type="none" w="med" len="med"/>
+                    </a:lnR>
+                  </a:tcPr>
+                </a:tc>
+                <a:extLst>
+                  <a:ext uri="{0D108BD9-81ED-4DB2-BD59-A6C34878D82A}">
+                    <a16:rowId xmlns:a16="http://schemas.microsoft.com/office/drawing/2014/main" val="2436925662"/>
+                  </a:ext>
+                </a:extLst>
+              </a:tr>
+              <a:tr h="370840">
+                <a:tc>
+                  <a:txBody>
+                    <a:bodyPr/>
+                    <a:lstStyle/>
+                    <a:p>
+                      <a:endParaRPr lang="en-US"/>
+                    </a:p>
+                  </a:txBody>
+                  <a:tcPr>
+                    <a:lnL w="12700" cap="flat" cmpd="sng" algn="ctr">
+                      <a:solidFill>
+                        <a:schemeClr val="tx1"/>
+                      </a:solidFill>
+                      <a:prstDash val="solid"/>
+                      <a:round/>
+                      <a:headEnd type="none" w="med" len="med"/>
+                      <a:tailEnd type="none" w="med" len="med"/>
+                    </a:lnL>
+                    <a:lnR w="12700" cap="flat" cmpd="sng" algn="ctr">
+                      <a:solidFill>
+                        <a:schemeClr val="tx1"/>
+                      </a:solidFill>
+                      <a:prstDash val="solid"/>
+                      <a:round/>
+                      <a:headEnd type="none" w="med" len="med"/>
+                      <a:tailEnd type="none" w="med" len="med"/>
+                    </a:lnR>
+                    <a:lnB w="12700" cap="flat" cmpd="sng" algn="ctr">
+                      <a:solidFill>
+                        <a:schemeClr val="tx1"/>
+                      </a:solidFill>
+                      <a:prstDash val="solid"/>
+                      <a:round/>
+                      <a:headEnd type="none" w="med" len="med"/>
+                      <a:tailEnd type="none" w="med" len="med"/>
+                    </a:lnB>
+                  </a:tcPr>
+                </a:tc>
+                <a:tc>
+                  <a:txBody>
+                    <a:bodyPr/>
+                    <a:lstStyle/>
+                    <a:p>
+                      <a:r>
+                        <a:rPr lang="en-US" dirty="0"/>
+                        <a:t>Flag for Podcasts</a:t>
+                      </a:r>
+                    </a:p>
+                  </a:txBody>
+                  <a:tcPr>
+                    <a:lnL w="12700" cap="flat" cmpd="sng" algn="ctr">
+                      <a:solidFill>
+                        <a:schemeClr val="tx1"/>
+                      </a:solidFill>
+                      <a:prstDash val="solid"/>
+                      <a:round/>
+                      <a:headEnd type="none" w="med" len="med"/>
+                      <a:tailEnd type="none" w="med" len="med"/>
+                    </a:lnL>
+                    <a:lnR w="12700" cap="flat" cmpd="sng" algn="ctr">
+                      <a:solidFill>
+                        <a:schemeClr val="tx1"/>
+                      </a:solidFill>
+                      <a:prstDash val="solid"/>
+                      <a:round/>
+                      <a:headEnd type="none" w="med" len="med"/>
+                      <a:tailEnd type="none" w="med" len="med"/>
+                    </a:lnR>
+                    <a:lnB w="12700" cap="flat" cmpd="sng" algn="ctr">
+                      <a:solidFill>
+                        <a:schemeClr val="tx1"/>
+                      </a:solidFill>
+                      <a:prstDash val="solid"/>
+                      <a:round/>
+                      <a:headEnd type="none" w="med" len="med"/>
+                      <a:tailEnd type="none" w="med" len="med"/>
+                    </a:lnB>
+                  </a:tcPr>
+                </a:tc>
+                <a:extLst>
+                  <a:ext uri="{0D108BD9-81ED-4DB2-BD59-A6C34878D82A}">
+                    <a16:rowId xmlns:a16="http://schemas.microsoft.com/office/drawing/2014/main" val="4075066826"/>
+                  </a:ext>
+                </a:extLst>
+              </a:tr>
+            </a:tbl>
+          </a:graphicData>
+        </a:graphic>
+      </p:graphicFrame>
+      <p:sp>
+        <p:nvSpPr>
+          <p:cNvPr id="5" name="Rectangle: Rounded Corners 4">
+            <a:extLst>
+              <a:ext uri="{FF2B5EF4-FFF2-40B4-BE49-F238E27FC236}">
+                <a16:creationId xmlns:a16="http://schemas.microsoft.com/office/drawing/2014/main" id="{249C3C62-32B3-4BBA-BC41-E6F536FFFE9C}"/>
+              </a:ext>
+            </a:extLst>
+          </p:cNvPr>
+          <p:cNvSpPr/>
+          <p:nvPr/>
+        </p:nvSpPr>
+        <p:spPr>
+          <a:xfrm>
+            <a:off x="1496854" y="4972050"/>
+            <a:ext cx="2309177" cy="914400"/>
+          </a:xfrm>
+          <a:prstGeom prst="roundRect">
+            <a:avLst/>
+          </a:prstGeom>
+          <a:ln w="28575">
+            <a:solidFill>
+              <a:schemeClr val="tx1"/>
+            </a:solidFill>
+          </a:ln>
+        </p:spPr>
+        <p:style>
+          <a:lnRef idx="2">
+            <a:schemeClr val="accent6"/>
+          </a:lnRef>
+          <a:fillRef idx="1">
+            <a:schemeClr val="lt1"/>
+          </a:fillRef>
+          <a:effectRef idx="0">
+            <a:schemeClr val="accent6"/>
+          </a:effectRef>
+          <a:fontRef idx="minor">
+            <a:schemeClr val="dk1"/>
+          </a:fontRef>
+        </p:style>
+        <p:txBody>
+          <a:bodyPr rtlCol="0" anchor="ctr"/>
+          <a:lstStyle/>
+          <a:p>
+            <a:pPr algn="ctr"/>
+            <a:r>
+              <a:rPr lang="en-US" dirty="0">
+                <a:solidFill>
+                  <a:schemeClr val="tx1"/>
+                </a:solidFill>
+              </a:rPr>
+              <a:t>Scrape Category Structure &amp; Information</a:t>
+            </a:r>
+          </a:p>
+        </p:txBody>
+      </p:sp>
+      <p:sp>
+        <p:nvSpPr>
+          <p:cNvPr id="6" name="Rectangle: Rounded Corners 5">
+            <a:extLst>
+              <a:ext uri="{FF2B5EF4-FFF2-40B4-BE49-F238E27FC236}">
+                <a16:creationId xmlns:a16="http://schemas.microsoft.com/office/drawing/2014/main" id="{360544A7-6B9F-4C16-BB6D-4987005EAFE1}"/>
+              </a:ext>
+            </a:extLst>
+          </p:cNvPr>
+          <p:cNvSpPr/>
+          <p:nvPr/>
+        </p:nvSpPr>
+        <p:spPr>
+          <a:xfrm>
+            <a:off x="4925854" y="4972050"/>
+            <a:ext cx="2309177" cy="914400"/>
+          </a:xfrm>
+          <a:prstGeom prst="roundRect">
+            <a:avLst/>
+          </a:prstGeom>
+          <a:ln w="28575">
+            <a:solidFill>
+              <a:schemeClr val="tx1"/>
+            </a:solidFill>
+          </a:ln>
+        </p:spPr>
+        <p:style>
+          <a:lnRef idx="2">
+            <a:schemeClr val="accent6"/>
+          </a:lnRef>
+          <a:fillRef idx="1">
+            <a:schemeClr val="lt1"/>
+          </a:fillRef>
+          <a:effectRef idx="0">
+            <a:schemeClr val="accent6"/>
+          </a:effectRef>
+          <a:fontRef idx="minor">
+            <a:schemeClr val="dk1"/>
+          </a:fontRef>
+        </p:style>
+        <p:txBody>
+          <a:bodyPr rtlCol="0" anchor="ctr"/>
+          <a:lstStyle/>
+          <a:p>
+            <a:pPr algn="ctr"/>
+            <a:r>
+              <a:rPr lang="en-US" dirty="0">
+                <a:solidFill>
+                  <a:schemeClr val="tx1"/>
+                </a:solidFill>
+              </a:rPr>
+              <a:t>Link to Category Best Sellers</a:t>
+            </a:r>
+          </a:p>
+        </p:txBody>
+      </p:sp>
+      <p:sp>
+        <p:nvSpPr>
+          <p:cNvPr id="7" name="Rectangle: Rounded Corners 6">
+            <a:extLst>
+              <a:ext uri="{FF2B5EF4-FFF2-40B4-BE49-F238E27FC236}">
+                <a16:creationId xmlns:a16="http://schemas.microsoft.com/office/drawing/2014/main" id="{BCC1126B-0CA1-4E0F-A8D1-C6E9714413FA}"/>
+              </a:ext>
+            </a:extLst>
+          </p:cNvPr>
+          <p:cNvSpPr/>
+          <p:nvPr/>
+        </p:nvSpPr>
+        <p:spPr>
+          <a:xfrm>
+            <a:off x="8354854" y="4972050"/>
+            <a:ext cx="2309177" cy="914400"/>
+          </a:xfrm>
+          <a:prstGeom prst="roundRect">
+            <a:avLst/>
+          </a:prstGeom>
+          <a:ln w="28575">
+            <a:solidFill>
+              <a:schemeClr val="tx1"/>
+            </a:solidFill>
+          </a:ln>
+        </p:spPr>
+        <p:style>
+          <a:lnRef idx="2">
+            <a:schemeClr val="accent6"/>
+          </a:lnRef>
+          <a:fillRef idx="1">
+            <a:schemeClr val="lt1"/>
+          </a:fillRef>
+          <a:effectRef idx="0">
+            <a:schemeClr val="accent6"/>
+          </a:effectRef>
+          <a:fontRef idx="minor">
+            <a:schemeClr val="dk1"/>
+          </a:fontRef>
+        </p:style>
+        <p:txBody>
+          <a:bodyPr rtlCol="0" anchor="ctr"/>
+          <a:lstStyle/>
+          <a:p>
+            <a:pPr algn="ctr"/>
+            <a:r>
+              <a:rPr lang="en-US" dirty="0">
+                <a:solidFill>
+                  <a:schemeClr val="tx1"/>
+                </a:solidFill>
+              </a:rPr>
+              <a:t>Scrape Title Information from Results Page</a:t>
+            </a:r>
+          </a:p>
+        </p:txBody>
+      </p:sp>
+      <p:cxnSp>
+        <p:nvCxnSpPr>
+          <p:cNvPr id="9" name="Straight Arrow Connector 8">
+            <a:extLst>
+              <a:ext uri="{FF2B5EF4-FFF2-40B4-BE49-F238E27FC236}">
+                <a16:creationId xmlns:a16="http://schemas.microsoft.com/office/drawing/2014/main" id="{6FE12409-4B1B-4AFC-8795-79DB7BC79CD9}"/>
+              </a:ext>
+            </a:extLst>
+          </p:cNvPr>
+          <p:cNvCxnSpPr/>
+          <p:nvPr/>
+        </p:nvCxnSpPr>
+        <p:spPr>
+          <a:xfrm>
+            <a:off x="3977640" y="5429250"/>
+            <a:ext cx="800100" cy="0"/>
+          </a:xfrm>
+          <a:prstGeom prst="straightConnector1">
+            <a:avLst/>
+          </a:prstGeom>
+          <a:ln w="38100">
+            <a:tailEnd type="triangle"/>
+          </a:ln>
+        </p:spPr>
+        <p:style>
+          <a:lnRef idx="1">
+            <a:schemeClr val="accent1"/>
+          </a:lnRef>
+          <a:fillRef idx="0">
+            <a:schemeClr val="accent1"/>
+          </a:fillRef>
+          <a:effectRef idx="0">
+            <a:schemeClr val="accent1"/>
+          </a:effectRef>
+          <a:fontRef idx="minor">
+            <a:schemeClr val="tx1"/>
+          </a:fontRef>
+        </p:style>
+      </p:cxnSp>
+      <p:cxnSp>
+        <p:nvCxnSpPr>
+          <p:cNvPr id="10" name="Straight Arrow Connector 9">
+            <a:extLst>
+              <a:ext uri="{FF2B5EF4-FFF2-40B4-BE49-F238E27FC236}">
+                <a16:creationId xmlns:a16="http://schemas.microsoft.com/office/drawing/2014/main" id="{1075A49C-5F1E-4515-8085-3D3DDE106313}"/>
+              </a:ext>
+            </a:extLst>
+          </p:cNvPr>
+          <p:cNvCxnSpPr/>
+          <p:nvPr/>
+        </p:nvCxnSpPr>
+        <p:spPr>
+          <a:xfrm>
+            <a:off x="7399020" y="5429250"/>
+            <a:ext cx="800100" cy="0"/>
+          </a:xfrm>
+          <a:prstGeom prst="straightConnector1">
+            <a:avLst/>
+          </a:prstGeom>
+          <a:ln w="38100">
+            <a:tailEnd type="triangle"/>
+          </a:ln>
+        </p:spPr>
+        <p:style>
+          <a:lnRef idx="1">
+            <a:schemeClr val="accent1"/>
+          </a:lnRef>
+          <a:fillRef idx="0">
+            <a:schemeClr val="accent1"/>
+          </a:fillRef>
+          <a:effectRef idx="0">
+            <a:schemeClr val="accent1"/>
+          </a:effectRef>
+          <a:fontRef idx="minor">
+            <a:schemeClr val="tx1"/>
+          </a:fontRef>
+        </p:style>
+      </p:cxnSp>
     </p:spTree>
     <p:extLst>
       <p:ext uri="{BB962C8B-B14F-4D97-AF65-F5344CB8AC3E}">
@@ -4338,7 +5328,10 @@
           <a:bodyPr/>
           <a:lstStyle/>
           <a:p>
-            <a:endParaRPr lang="en-US"/>
+            <a:r>
+              <a:rPr lang="en-US" dirty="0"/>
+              <a:t>Book Categories</a:t>
+            </a:r>
           </a:p>
         </p:txBody>
       </p:sp>
@@ -4402,7 +5395,7 @@
           <p:cNvPr id="2" name="Title 1">
             <a:extLst>
               <a:ext uri="{FF2B5EF4-FFF2-40B4-BE49-F238E27FC236}">
-                <a16:creationId xmlns:a16="http://schemas.microsoft.com/office/drawing/2014/main" id="{7C04B0B4-6287-4307-9B26-94B6842BFA16}"/>
+                <a16:creationId xmlns:a16="http://schemas.microsoft.com/office/drawing/2014/main" id="{D702522F-EF60-40EB-A014-0415DF24B51B}"/>
               </a:ext>
             </a:extLst>
           </p:cNvPr>
@@ -4420,7 +5413,7 @@
           <a:p>
             <a:r>
               <a:rPr lang="en-US" dirty="0"/>
-              <a:t>Conclusions</a:t>
+              <a:t>Network diagram</a:t>
             </a:r>
           </a:p>
         </p:txBody>
@@ -4430,7 +5423,7 @@
           <p:cNvPr id="3" name="Content Placeholder 2">
             <a:extLst>
               <a:ext uri="{FF2B5EF4-FFF2-40B4-BE49-F238E27FC236}">
-                <a16:creationId xmlns:a16="http://schemas.microsoft.com/office/drawing/2014/main" id="{EC0D24B7-95BA-4E37-85D1-A6340AD334CF}"/>
+                <a16:creationId xmlns:a16="http://schemas.microsoft.com/office/drawing/2014/main" id="{7C05DE40-337E-46AD-B4D9-FEF5B56377F6}"/>
               </a:ext>
             </a:extLst>
           </p:cNvPr>
@@ -4453,7 +5446,7 @@
     </p:spTree>
     <p:extLst>
       <p:ext uri="{BB962C8B-B14F-4D97-AF65-F5344CB8AC3E}">
-        <p14:creationId xmlns:p14="http://schemas.microsoft.com/office/powerpoint/2010/main" val="1242177686"/>
+        <p14:creationId xmlns:p14="http://schemas.microsoft.com/office/powerpoint/2010/main" val="1775495912"/>
       </p:ext>
     </p:extLst>
   </p:cSld>
@@ -4485,7 +5478,7 @@
           <p:cNvPr id="2" name="Title 1">
             <a:extLst>
               <a:ext uri="{FF2B5EF4-FFF2-40B4-BE49-F238E27FC236}">
-                <a16:creationId xmlns:a16="http://schemas.microsoft.com/office/drawing/2014/main" id="{902EBB08-D194-4BFE-A14C-D6D9496A4381}"/>
+                <a16:creationId xmlns:a16="http://schemas.microsoft.com/office/drawing/2014/main" id="{DDF1A02C-3113-4E1E-AADF-5C9300810730}"/>
               </a:ext>
             </a:extLst>
           </p:cNvPr>
@@ -4503,7 +5496,7 @@
           <a:p>
             <a:r>
               <a:rPr lang="en-US" dirty="0"/>
-              <a:t>Future Work</a:t>
+              <a:t>Correlations</a:t>
             </a:r>
           </a:p>
         </p:txBody>
@@ -4513,7 +5506,7 @@
           <p:cNvPr id="3" name="Content Placeholder 2">
             <a:extLst>
               <a:ext uri="{FF2B5EF4-FFF2-40B4-BE49-F238E27FC236}">
-                <a16:creationId xmlns:a16="http://schemas.microsoft.com/office/drawing/2014/main" id="{575E0344-172A-44A7-9EDF-4632688E7728}"/>
+                <a16:creationId xmlns:a16="http://schemas.microsoft.com/office/drawing/2014/main" id="{C0AE8BE8-6AF6-4841-98F8-281C088CA3A4}"/>
               </a:ext>
             </a:extLst>
           </p:cNvPr>
@@ -4529,70 +5522,14 @@
           <a:bodyPr/>
           <a:lstStyle/>
           <a:p>
-            <a:r>
-              <a:rPr lang="en-US" dirty="0"/>
-              <a:t>Attempted to scrape Amazon books</a:t>
-            </a:r>
-          </a:p>
-          <a:p>
-            <a:r>
-              <a:rPr lang="en-US" dirty="0"/>
-              <a:t>- Amazon displays a CAPTCHA page after ~500 site visits </a:t>
-            </a:r>
-          </a:p>
-          <a:p>
-            <a:r>
-              <a:rPr lang="en-US" dirty="0"/>
-              <a:t>- Page will be returned for several hours before </a:t>
-            </a:r>
-          </a:p>
-          <a:p>
-            <a:r>
-              <a:rPr lang="en-US" dirty="0"/>
-              <a:t>- Using proxy service (</a:t>
-            </a:r>
-            <a:r>
-              <a:rPr lang="en-US" dirty="0" err="1"/>
-              <a:t>ScraperAPI</a:t>
-            </a:r>
-            <a:r>
-              <a:rPr lang="en-US" dirty="0"/>
-              <a:t>) avoided bans but required payment.</a:t>
-            </a:r>
-          </a:p>
-          <a:p>
-            <a:endParaRPr lang="en-US" dirty="0"/>
-          </a:p>
-          <a:p>
-            <a:r>
-              <a:rPr lang="en-US" dirty="0"/>
-              <a:t>BookShop.org</a:t>
-            </a:r>
-          </a:p>
-          <a:p>
-            <a:r>
-              <a:rPr lang="en-US" dirty="0"/>
-              <a:t>- A new online book shop which shares income with local books stores.</a:t>
-            </a:r>
-          </a:p>
-          <a:p>
-            <a:r>
-              <a:rPr lang="en-US" dirty="0"/>
-              <a:t>- Similar data to Amazon but less reviews.</a:t>
-            </a:r>
-          </a:p>
-          <a:p>
-            <a:r>
-              <a:rPr lang="en-US" dirty="0"/>
-              <a:t>- Slightly elevated prices compared to Amazon.</a:t>
-            </a:r>
+            <a:endParaRPr lang="en-US"/>
           </a:p>
         </p:txBody>
       </p:sp>
     </p:spTree>
     <p:extLst>
       <p:ext uri="{BB962C8B-B14F-4D97-AF65-F5344CB8AC3E}">
-        <p14:creationId xmlns:p14="http://schemas.microsoft.com/office/powerpoint/2010/main" val="2222744620"/>
+        <p14:creationId xmlns:p14="http://schemas.microsoft.com/office/powerpoint/2010/main" val="3995667682"/>
       </p:ext>
     </p:extLst>
   </p:cSld>
@@ -4624,7 +5561,7 @@
           <p:cNvPr id="2" name="Title 1">
             <a:extLst>
               <a:ext uri="{FF2B5EF4-FFF2-40B4-BE49-F238E27FC236}">
-                <a16:creationId xmlns:a16="http://schemas.microsoft.com/office/drawing/2014/main" id="{00DF3A5E-1F79-4EEE-9577-F262AE1381A0}"/>
+                <a16:creationId xmlns:a16="http://schemas.microsoft.com/office/drawing/2014/main" id="{37011FF3-5E9B-4667-BBA3-BB9DD8969BBA}"/>
               </a:ext>
             </a:extLst>
           </p:cNvPr>
@@ -4642,7 +5579,7 @@
           <a:p>
             <a:r>
               <a:rPr lang="en-US" dirty="0"/>
-              <a:t>Acknowledgements</a:t>
+              <a:t>Timeseries</a:t>
             </a:r>
           </a:p>
         </p:txBody>
@@ -4652,7 +5589,7 @@
           <p:cNvPr id="3" name="Content Placeholder 2">
             <a:extLst>
               <a:ext uri="{FF2B5EF4-FFF2-40B4-BE49-F238E27FC236}">
-                <a16:creationId xmlns:a16="http://schemas.microsoft.com/office/drawing/2014/main" id="{170739A6-A97C-4340-BD59-02CCC55492BF}"/>
+                <a16:creationId xmlns:a16="http://schemas.microsoft.com/office/drawing/2014/main" id="{BEC3BD65-DE64-436E-BBCF-EE7212139200}"/>
               </a:ext>
             </a:extLst>
           </p:cNvPr>
@@ -4668,56 +5605,253 @@
           <a:bodyPr/>
           <a:lstStyle/>
           <a:p>
-            <a:endParaRPr lang="en-US" dirty="0"/>
-          </a:p>
-          <a:p>
-            <a:r>
-              <a:rPr lang="en-US" dirty="0"/>
-              <a:t>Audible for not banning me.</a:t>
-            </a:r>
-          </a:p>
-          <a:p>
-            <a:endParaRPr lang="en-US" dirty="0"/>
-          </a:p>
-          <a:p>
-            <a:r>
-              <a:rPr lang="en-US" dirty="0" err="1"/>
-              <a:t>ScraperAPI</a:t>
-            </a:r>
-            <a:r>
-              <a:rPr lang="en-US" dirty="0"/>
-              <a:t> for help which I didn’t end up using in this project.</a:t>
-            </a:r>
-          </a:p>
-          <a:p>
-            <a:endParaRPr lang="en-US" dirty="0"/>
-          </a:p>
-          <a:p>
-            <a:r>
-              <a:rPr lang="en-US" dirty="0">
-                <a:hlinkClick r:id="rId2"/>
-              </a:rPr>
-              <a:t>Ed Robertson </a:t>
-            </a:r>
-            <a:r>
-              <a:rPr lang="en-US" dirty="0"/>
-              <a:t>&amp; </a:t>
-            </a:r>
-            <a:r>
-              <a:rPr lang="en-US" dirty="0" err="1"/>
-              <a:t>Unsplash</a:t>
-            </a:r>
-            <a:r>
-              <a:rPr lang="en-US" dirty="0"/>
-              <a:t> for the photo.</a:t>
-            </a:r>
+            <a:endParaRPr lang="en-US"/>
           </a:p>
         </p:txBody>
       </p:sp>
     </p:spTree>
     <p:extLst>
       <p:ext uri="{BB962C8B-B14F-4D97-AF65-F5344CB8AC3E}">
-        <p14:creationId xmlns:p14="http://schemas.microsoft.com/office/powerpoint/2010/main" val="3808814931"/>
+        <p14:creationId xmlns:p14="http://schemas.microsoft.com/office/powerpoint/2010/main" val="111741514"/>
+      </p:ext>
+    </p:extLst>
+  </p:cSld>
+  <p:clrMapOvr>
+    <a:masterClrMapping/>
+  </p:clrMapOvr>
+</p:sld>
+</file>
+
+<file path=ppt/slides/slide8.xml><?xml version="1.0" encoding="utf-8"?>
+<p:sld xmlns:a="http://schemas.openxmlformats.org/drawingml/2006/main" xmlns:r="http://schemas.openxmlformats.org/officeDocument/2006/relationships" xmlns:p="http://schemas.openxmlformats.org/presentationml/2006/main">
+  <p:cSld>
+    <p:spTree>
+      <p:nvGrpSpPr>
+        <p:cNvPr id="1" name=""/>
+        <p:cNvGrpSpPr/>
+        <p:nvPr/>
+      </p:nvGrpSpPr>
+      <p:grpSpPr>
+        <a:xfrm>
+          <a:off x="0" y="0"/>
+          <a:ext cx="0" cy="0"/>
+          <a:chOff x="0" y="0"/>
+          <a:chExt cx="0" cy="0"/>
+        </a:xfrm>
+      </p:grpSpPr>
+      <p:sp>
+        <p:nvSpPr>
+          <p:cNvPr id="2" name="Title 1">
+            <a:extLst>
+              <a:ext uri="{FF2B5EF4-FFF2-40B4-BE49-F238E27FC236}">
+                <a16:creationId xmlns:a16="http://schemas.microsoft.com/office/drawing/2014/main" id="{7C04B0B4-6287-4307-9B26-94B6842BFA16}"/>
+              </a:ext>
+            </a:extLst>
+          </p:cNvPr>
+          <p:cNvSpPr>
+            <a:spLocks noGrp="1"/>
+          </p:cNvSpPr>
+          <p:nvPr>
+            <p:ph type="title"/>
+          </p:nvPr>
+        </p:nvSpPr>
+        <p:spPr/>
+        <p:txBody>
+          <a:bodyPr/>
+          <a:lstStyle/>
+          <a:p>
+            <a:r>
+              <a:rPr lang="en-US" dirty="0"/>
+              <a:t>Conclusions</a:t>
+            </a:r>
+          </a:p>
+        </p:txBody>
+      </p:sp>
+      <p:sp>
+        <p:nvSpPr>
+          <p:cNvPr id="3" name="Content Placeholder 2">
+            <a:extLst>
+              <a:ext uri="{FF2B5EF4-FFF2-40B4-BE49-F238E27FC236}">
+                <a16:creationId xmlns:a16="http://schemas.microsoft.com/office/drawing/2014/main" id="{EC0D24B7-95BA-4E37-85D1-A6340AD334CF}"/>
+              </a:ext>
+            </a:extLst>
+          </p:cNvPr>
+          <p:cNvSpPr>
+            <a:spLocks noGrp="1"/>
+          </p:cNvSpPr>
+          <p:nvPr>
+            <p:ph idx="1"/>
+          </p:nvPr>
+        </p:nvSpPr>
+        <p:spPr/>
+        <p:txBody>
+          <a:bodyPr/>
+          <a:lstStyle/>
+          <a:p>
+            <a:endParaRPr lang="en-US"/>
+          </a:p>
+        </p:txBody>
+      </p:sp>
+    </p:spTree>
+    <p:extLst>
+      <p:ext uri="{BB962C8B-B14F-4D97-AF65-F5344CB8AC3E}">
+        <p14:creationId xmlns:p14="http://schemas.microsoft.com/office/powerpoint/2010/main" val="1242177686"/>
+      </p:ext>
+    </p:extLst>
+  </p:cSld>
+  <p:clrMapOvr>
+    <a:masterClrMapping/>
+  </p:clrMapOvr>
+</p:sld>
+</file>
+
+<file path=ppt/slides/slide9.xml><?xml version="1.0" encoding="utf-8"?>
+<p:sld xmlns:a="http://schemas.openxmlformats.org/drawingml/2006/main" xmlns:r="http://schemas.openxmlformats.org/officeDocument/2006/relationships" xmlns:p="http://schemas.openxmlformats.org/presentationml/2006/main">
+  <p:cSld>
+    <p:spTree>
+      <p:nvGrpSpPr>
+        <p:cNvPr id="1" name=""/>
+        <p:cNvGrpSpPr/>
+        <p:nvPr/>
+      </p:nvGrpSpPr>
+      <p:grpSpPr>
+        <a:xfrm>
+          <a:off x="0" y="0"/>
+          <a:ext cx="0" cy="0"/>
+          <a:chOff x="0" y="0"/>
+          <a:chExt cx="0" cy="0"/>
+        </a:xfrm>
+      </p:grpSpPr>
+      <p:sp>
+        <p:nvSpPr>
+          <p:cNvPr id="2" name="Title 1">
+            <a:extLst>
+              <a:ext uri="{FF2B5EF4-FFF2-40B4-BE49-F238E27FC236}">
+                <a16:creationId xmlns:a16="http://schemas.microsoft.com/office/drawing/2014/main" id="{902EBB08-D194-4BFE-A14C-D6D9496A4381}"/>
+              </a:ext>
+            </a:extLst>
+          </p:cNvPr>
+          <p:cNvSpPr>
+            <a:spLocks noGrp="1"/>
+          </p:cNvSpPr>
+          <p:nvPr>
+            <p:ph type="title"/>
+          </p:nvPr>
+        </p:nvSpPr>
+        <p:spPr/>
+        <p:txBody>
+          <a:bodyPr/>
+          <a:lstStyle/>
+          <a:p>
+            <a:r>
+              <a:rPr lang="en-US" dirty="0"/>
+              <a:t>Future Work</a:t>
+            </a:r>
+          </a:p>
+        </p:txBody>
+      </p:sp>
+      <p:sp>
+        <p:nvSpPr>
+          <p:cNvPr id="3" name="Content Placeholder 2">
+            <a:extLst>
+              <a:ext uri="{FF2B5EF4-FFF2-40B4-BE49-F238E27FC236}">
+                <a16:creationId xmlns:a16="http://schemas.microsoft.com/office/drawing/2014/main" id="{575E0344-172A-44A7-9EDF-4632688E7728}"/>
+              </a:ext>
+            </a:extLst>
+          </p:cNvPr>
+          <p:cNvSpPr>
+            <a:spLocks noGrp="1"/>
+          </p:cNvSpPr>
+          <p:nvPr>
+            <p:ph idx="1"/>
+          </p:nvPr>
+        </p:nvSpPr>
+        <p:spPr/>
+        <p:txBody>
+          <a:bodyPr>
+            <a:normAutofit fontScale="70000" lnSpcReduction="20000"/>
+          </a:bodyPr>
+          <a:lstStyle/>
+          <a:p>
+            <a:r>
+              <a:rPr lang="en-US" dirty="0"/>
+              <a:t>Audible data collection could be expanded by fine grain review data.</a:t>
+            </a:r>
+          </a:p>
+          <a:p>
+            <a:r>
+              <a:rPr lang="en-US" dirty="0"/>
+              <a:t>Audible might have dynamic categories. Number of titles increased and decreased across categories. </a:t>
+            </a:r>
+          </a:p>
+          <a:p>
+            <a:endParaRPr lang="en-US" dirty="0"/>
+          </a:p>
+          <a:p>
+            <a:r>
+              <a:rPr lang="en-US" dirty="0"/>
+              <a:t>Attempted to scrape Amazon books</a:t>
+            </a:r>
+          </a:p>
+          <a:p>
+            <a:r>
+              <a:rPr lang="en-US" dirty="0"/>
+              <a:t>- Amazon displays a CAPTCHA page after ~500 site visits </a:t>
+            </a:r>
+          </a:p>
+          <a:p>
+            <a:r>
+              <a:rPr lang="en-US" dirty="0"/>
+              <a:t>- Page will be returned for several hours before </a:t>
+            </a:r>
+          </a:p>
+          <a:p>
+            <a:r>
+              <a:rPr lang="en-US" dirty="0"/>
+              <a:t>- Using proxy service (</a:t>
+            </a:r>
+            <a:r>
+              <a:rPr lang="en-US" dirty="0" err="1"/>
+              <a:t>ScraperAPI</a:t>
+            </a:r>
+            <a:r>
+              <a:rPr lang="en-US" dirty="0"/>
+              <a:t>) avoided bans but required payment.</a:t>
+            </a:r>
+          </a:p>
+          <a:p>
+            <a:endParaRPr lang="en-US" dirty="0"/>
+          </a:p>
+          <a:p>
+            <a:r>
+              <a:rPr lang="en-US" dirty="0"/>
+              <a:t>BookShop.org</a:t>
+            </a:r>
+          </a:p>
+          <a:p>
+            <a:r>
+              <a:rPr lang="en-US" dirty="0"/>
+              <a:t>- A new online book shop which shares income with local books stores.</a:t>
+            </a:r>
+          </a:p>
+          <a:p>
+            <a:r>
+              <a:rPr lang="en-US" dirty="0"/>
+              <a:t>- Similar data to Amazon but less reviews.</a:t>
+            </a:r>
+          </a:p>
+          <a:p>
+            <a:r>
+              <a:rPr lang="en-US" dirty="0"/>
+              <a:t>- Slightly elevated prices compared to Amazon.</a:t>
+            </a:r>
+          </a:p>
+        </p:txBody>
+      </p:sp>
+    </p:spTree>
+    <p:extLst>
+      <p:ext uri="{BB962C8B-B14F-4D97-AF65-F5344CB8AC3E}">
+        <p14:creationId xmlns:p14="http://schemas.microsoft.com/office/powerpoint/2010/main" val="2222744620"/>
       </p:ext>
     </p:extLst>
   </p:cSld>

</xml_diff>

<commit_message>
working on presentation, folder for pictures
</commit_message>
<xml_diff>
--- a/Presentation.pptx
+++ b/Presentation.pptx
@@ -8,13 +8,17 @@
     <p:sldId id="256" r:id="rId2"/>
     <p:sldId id="257" r:id="rId3"/>
     <p:sldId id="258" r:id="rId4"/>
-    <p:sldId id="259" r:id="rId5"/>
-    <p:sldId id="263" r:id="rId6"/>
-    <p:sldId id="264" r:id="rId7"/>
-    <p:sldId id="265" r:id="rId8"/>
-    <p:sldId id="260" r:id="rId9"/>
-    <p:sldId id="261" r:id="rId10"/>
-    <p:sldId id="262" r:id="rId11"/>
+    <p:sldId id="269" r:id="rId5"/>
+    <p:sldId id="270" r:id="rId6"/>
+    <p:sldId id="259" r:id="rId7"/>
+    <p:sldId id="272" r:id="rId8"/>
+    <p:sldId id="271" r:id="rId9"/>
+    <p:sldId id="263" r:id="rId10"/>
+    <p:sldId id="264" r:id="rId11"/>
+    <p:sldId id="265" r:id="rId12"/>
+    <p:sldId id="260" r:id="rId13"/>
+    <p:sldId id="261" r:id="rId14"/>
+    <p:sldId id="262" r:id="rId15"/>
   </p:sldIdLst>
   <p:sldSz cx="12192000" cy="6858000"/>
   <p:notesSz cx="6858000" cy="9144000"/>
@@ -347,7 +351,7 @@
           <a:p>
             <a:fld id="{39BB3832-C1DF-4199-80C5-191220E93956}" type="datetimeFigureOut">
               <a:rPr lang="en-US" smtClean="0"/>
-              <a:t>5/21/2021</a:t>
+              <a:t>5/23/2021</a:t>
             </a:fld>
             <a:endParaRPr lang="en-US"/>
           </a:p>
@@ -555,7 +559,7 @@
           <a:p>
             <a:fld id="{39BB3832-C1DF-4199-80C5-191220E93956}" type="datetimeFigureOut">
               <a:rPr lang="en-US" smtClean="0"/>
-              <a:t>5/21/2021</a:t>
+              <a:t>5/23/2021</a:t>
             </a:fld>
             <a:endParaRPr lang="en-US"/>
           </a:p>
@@ -811,7 +815,7 @@
           <a:p>
             <a:fld id="{39BB3832-C1DF-4199-80C5-191220E93956}" type="datetimeFigureOut">
               <a:rPr lang="en-US" smtClean="0"/>
-              <a:t>5/21/2021</a:t>
+              <a:t>5/23/2021</a:t>
             </a:fld>
             <a:endParaRPr lang="en-US"/>
           </a:p>
@@ -985,7 +989,7 @@
           <a:p>
             <a:fld id="{39BB3832-C1DF-4199-80C5-191220E93956}" type="datetimeFigureOut">
               <a:rPr lang="en-US" smtClean="0"/>
-              <a:t>5/21/2021</a:t>
+              <a:t>5/23/2021</a:t>
             </a:fld>
             <a:endParaRPr lang="en-US"/>
           </a:p>
@@ -1328,7 +1332,7 @@
           <a:p>
             <a:fld id="{39BB3832-C1DF-4199-80C5-191220E93956}" type="datetimeFigureOut">
               <a:rPr lang="en-US" smtClean="0"/>
-              <a:t>5/21/2021</a:t>
+              <a:t>5/23/2021</a:t>
             </a:fld>
             <a:endParaRPr lang="en-US"/>
           </a:p>
@@ -1603,7 +1607,7 @@
           <a:p>
             <a:fld id="{39BB3832-C1DF-4199-80C5-191220E93956}" type="datetimeFigureOut">
               <a:rPr lang="en-US" smtClean="0"/>
-              <a:t>5/21/2021</a:t>
+              <a:t>5/23/2021</a:t>
             </a:fld>
             <a:endParaRPr lang="en-US"/>
           </a:p>
@@ -1982,7 +1986,7 @@
           <a:p>
             <a:fld id="{39BB3832-C1DF-4199-80C5-191220E93956}" type="datetimeFigureOut">
               <a:rPr lang="en-US" smtClean="0"/>
-              <a:t>5/21/2021</a:t>
+              <a:t>5/23/2021</a:t>
             </a:fld>
             <a:endParaRPr lang="en-US"/>
           </a:p>
@@ -2100,7 +2104,7 @@
           <a:p>
             <a:fld id="{39BB3832-C1DF-4199-80C5-191220E93956}" type="datetimeFigureOut">
               <a:rPr lang="en-US" smtClean="0"/>
-              <a:t>5/21/2021</a:t>
+              <a:t>5/23/2021</a:t>
             </a:fld>
             <a:endParaRPr lang="en-US"/>
           </a:p>
@@ -2271,7 +2275,7 @@
           <a:p>
             <a:fld id="{39BB3832-C1DF-4199-80C5-191220E93956}" type="datetimeFigureOut">
               <a:rPr lang="en-US" smtClean="0"/>
-              <a:t>5/21/2021</a:t>
+              <a:t>5/23/2021</a:t>
             </a:fld>
             <a:endParaRPr lang="en-US"/>
           </a:p>
@@ -2625,7 +2629,7 @@
           <a:p>
             <a:fld id="{39BB3832-C1DF-4199-80C5-191220E93956}" type="datetimeFigureOut">
               <a:rPr lang="en-US" smtClean="0"/>
-              <a:t>5/21/2021</a:t>
+              <a:t>5/23/2021</a:t>
             </a:fld>
             <a:endParaRPr lang="en-US"/>
           </a:p>
@@ -3007,7 +3011,7 @@
           <a:p>
             <a:fld id="{39BB3832-C1DF-4199-80C5-191220E93956}" type="datetimeFigureOut">
               <a:rPr lang="en-US" smtClean="0"/>
-              <a:t>5/21/2021</a:t>
+              <a:t>5/23/2021</a:t>
             </a:fld>
             <a:endParaRPr lang="en-US"/>
           </a:p>
@@ -3294,7 +3298,7 @@
           <a:p>
             <a:fld id="{39BB3832-C1DF-4199-80C5-191220E93956}" type="datetimeFigureOut">
               <a:rPr lang="en-US" smtClean="0"/>
-              <a:t>5/21/2021</a:t>
+              <a:t>5/23/2021</a:t>
             </a:fld>
             <a:endParaRPr lang="en-US"/>
           </a:p>
@@ -4162,6 +4166,411 @@
           <p:cNvPr id="2" name="Title 1">
             <a:extLst>
               <a:ext uri="{FF2B5EF4-FFF2-40B4-BE49-F238E27FC236}">
+                <a16:creationId xmlns:a16="http://schemas.microsoft.com/office/drawing/2014/main" id="{DDF1A02C-3113-4E1E-AADF-5C9300810730}"/>
+              </a:ext>
+            </a:extLst>
+          </p:cNvPr>
+          <p:cNvSpPr>
+            <a:spLocks noGrp="1"/>
+          </p:cNvSpPr>
+          <p:nvPr>
+            <p:ph type="title"/>
+          </p:nvPr>
+        </p:nvSpPr>
+        <p:spPr/>
+        <p:txBody>
+          <a:bodyPr/>
+          <a:lstStyle/>
+          <a:p>
+            <a:r>
+              <a:rPr lang="en-US" dirty="0"/>
+              <a:t>Correlations</a:t>
+            </a:r>
+          </a:p>
+        </p:txBody>
+      </p:sp>
+      <p:sp>
+        <p:nvSpPr>
+          <p:cNvPr id="3" name="Content Placeholder 2">
+            <a:extLst>
+              <a:ext uri="{FF2B5EF4-FFF2-40B4-BE49-F238E27FC236}">
+                <a16:creationId xmlns:a16="http://schemas.microsoft.com/office/drawing/2014/main" id="{C0AE8BE8-6AF6-4841-98F8-281C088CA3A4}"/>
+              </a:ext>
+            </a:extLst>
+          </p:cNvPr>
+          <p:cNvSpPr>
+            <a:spLocks noGrp="1"/>
+          </p:cNvSpPr>
+          <p:nvPr>
+            <p:ph idx="1"/>
+          </p:nvPr>
+        </p:nvSpPr>
+        <p:spPr/>
+        <p:txBody>
+          <a:bodyPr/>
+          <a:lstStyle/>
+          <a:p>
+            <a:endParaRPr lang="en-US"/>
+          </a:p>
+        </p:txBody>
+      </p:sp>
+    </p:spTree>
+    <p:extLst>
+      <p:ext uri="{BB962C8B-B14F-4D97-AF65-F5344CB8AC3E}">
+        <p14:creationId xmlns:p14="http://schemas.microsoft.com/office/powerpoint/2010/main" val="3995667682"/>
+      </p:ext>
+    </p:extLst>
+  </p:cSld>
+  <p:clrMapOvr>
+    <a:masterClrMapping/>
+  </p:clrMapOvr>
+</p:sld>
+</file>
+
+<file path=ppt/slides/slide11.xml><?xml version="1.0" encoding="utf-8"?>
+<p:sld xmlns:a="http://schemas.openxmlformats.org/drawingml/2006/main" xmlns:r="http://schemas.openxmlformats.org/officeDocument/2006/relationships" xmlns:p="http://schemas.openxmlformats.org/presentationml/2006/main">
+  <p:cSld>
+    <p:spTree>
+      <p:nvGrpSpPr>
+        <p:cNvPr id="1" name=""/>
+        <p:cNvGrpSpPr/>
+        <p:nvPr/>
+      </p:nvGrpSpPr>
+      <p:grpSpPr>
+        <a:xfrm>
+          <a:off x="0" y="0"/>
+          <a:ext cx="0" cy="0"/>
+          <a:chOff x="0" y="0"/>
+          <a:chExt cx="0" cy="0"/>
+        </a:xfrm>
+      </p:grpSpPr>
+      <p:sp>
+        <p:nvSpPr>
+          <p:cNvPr id="2" name="Title 1">
+            <a:extLst>
+              <a:ext uri="{FF2B5EF4-FFF2-40B4-BE49-F238E27FC236}">
+                <a16:creationId xmlns:a16="http://schemas.microsoft.com/office/drawing/2014/main" id="{37011FF3-5E9B-4667-BBA3-BB9DD8969BBA}"/>
+              </a:ext>
+            </a:extLst>
+          </p:cNvPr>
+          <p:cNvSpPr>
+            <a:spLocks noGrp="1"/>
+          </p:cNvSpPr>
+          <p:nvPr>
+            <p:ph type="title"/>
+          </p:nvPr>
+        </p:nvSpPr>
+        <p:spPr/>
+        <p:txBody>
+          <a:bodyPr/>
+          <a:lstStyle/>
+          <a:p>
+            <a:r>
+              <a:rPr lang="en-US" dirty="0"/>
+              <a:t>Timeseries</a:t>
+            </a:r>
+          </a:p>
+        </p:txBody>
+      </p:sp>
+      <p:sp>
+        <p:nvSpPr>
+          <p:cNvPr id="3" name="Content Placeholder 2">
+            <a:extLst>
+              <a:ext uri="{FF2B5EF4-FFF2-40B4-BE49-F238E27FC236}">
+                <a16:creationId xmlns:a16="http://schemas.microsoft.com/office/drawing/2014/main" id="{BEC3BD65-DE64-436E-BBCF-EE7212139200}"/>
+              </a:ext>
+            </a:extLst>
+          </p:cNvPr>
+          <p:cNvSpPr>
+            <a:spLocks noGrp="1"/>
+          </p:cNvSpPr>
+          <p:nvPr>
+            <p:ph idx="1"/>
+          </p:nvPr>
+        </p:nvSpPr>
+        <p:spPr/>
+        <p:txBody>
+          <a:bodyPr/>
+          <a:lstStyle/>
+          <a:p>
+            <a:endParaRPr lang="en-US"/>
+          </a:p>
+        </p:txBody>
+      </p:sp>
+    </p:spTree>
+    <p:extLst>
+      <p:ext uri="{BB962C8B-B14F-4D97-AF65-F5344CB8AC3E}">
+        <p14:creationId xmlns:p14="http://schemas.microsoft.com/office/powerpoint/2010/main" val="111741514"/>
+      </p:ext>
+    </p:extLst>
+  </p:cSld>
+  <p:clrMapOvr>
+    <a:masterClrMapping/>
+  </p:clrMapOvr>
+</p:sld>
+</file>
+
+<file path=ppt/slides/slide12.xml><?xml version="1.0" encoding="utf-8"?>
+<p:sld xmlns:a="http://schemas.openxmlformats.org/drawingml/2006/main" xmlns:r="http://schemas.openxmlformats.org/officeDocument/2006/relationships" xmlns:p="http://schemas.openxmlformats.org/presentationml/2006/main">
+  <p:cSld>
+    <p:spTree>
+      <p:nvGrpSpPr>
+        <p:cNvPr id="1" name=""/>
+        <p:cNvGrpSpPr/>
+        <p:nvPr/>
+      </p:nvGrpSpPr>
+      <p:grpSpPr>
+        <a:xfrm>
+          <a:off x="0" y="0"/>
+          <a:ext cx="0" cy="0"/>
+          <a:chOff x="0" y="0"/>
+          <a:chExt cx="0" cy="0"/>
+        </a:xfrm>
+      </p:grpSpPr>
+      <p:sp>
+        <p:nvSpPr>
+          <p:cNvPr id="2" name="Title 1">
+            <a:extLst>
+              <a:ext uri="{FF2B5EF4-FFF2-40B4-BE49-F238E27FC236}">
+                <a16:creationId xmlns:a16="http://schemas.microsoft.com/office/drawing/2014/main" id="{7C04B0B4-6287-4307-9B26-94B6842BFA16}"/>
+              </a:ext>
+            </a:extLst>
+          </p:cNvPr>
+          <p:cNvSpPr>
+            <a:spLocks noGrp="1"/>
+          </p:cNvSpPr>
+          <p:nvPr>
+            <p:ph type="title"/>
+          </p:nvPr>
+        </p:nvSpPr>
+        <p:spPr/>
+        <p:txBody>
+          <a:bodyPr/>
+          <a:lstStyle/>
+          <a:p>
+            <a:r>
+              <a:rPr lang="en-US" dirty="0"/>
+              <a:t>Conclusions</a:t>
+            </a:r>
+          </a:p>
+        </p:txBody>
+      </p:sp>
+      <p:sp>
+        <p:nvSpPr>
+          <p:cNvPr id="3" name="Content Placeholder 2">
+            <a:extLst>
+              <a:ext uri="{FF2B5EF4-FFF2-40B4-BE49-F238E27FC236}">
+                <a16:creationId xmlns:a16="http://schemas.microsoft.com/office/drawing/2014/main" id="{EC0D24B7-95BA-4E37-85D1-A6340AD334CF}"/>
+              </a:ext>
+            </a:extLst>
+          </p:cNvPr>
+          <p:cNvSpPr>
+            <a:spLocks noGrp="1"/>
+          </p:cNvSpPr>
+          <p:nvPr>
+            <p:ph idx="1"/>
+          </p:nvPr>
+        </p:nvSpPr>
+        <p:spPr/>
+        <p:txBody>
+          <a:bodyPr/>
+          <a:lstStyle/>
+          <a:p>
+            <a:endParaRPr lang="en-US"/>
+          </a:p>
+        </p:txBody>
+      </p:sp>
+    </p:spTree>
+    <p:extLst>
+      <p:ext uri="{BB962C8B-B14F-4D97-AF65-F5344CB8AC3E}">
+        <p14:creationId xmlns:p14="http://schemas.microsoft.com/office/powerpoint/2010/main" val="1242177686"/>
+      </p:ext>
+    </p:extLst>
+  </p:cSld>
+  <p:clrMapOvr>
+    <a:masterClrMapping/>
+  </p:clrMapOvr>
+</p:sld>
+</file>
+
+<file path=ppt/slides/slide13.xml><?xml version="1.0" encoding="utf-8"?>
+<p:sld xmlns:a="http://schemas.openxmlformats.org/drawingml/2006/main" xmlns:r="http://schemas.openxmlformats.org/officeDocument/2006/relationships" xmlns:p="http://schemas.openxmlformats.org/presentationml/2006/main">
+  <p:cSld>
+    <p:spTree>
+      <p:nvGrpSpPr>
+        <p:cNvPr id="1" name=""/>
+        <p:cNvGrpSpPr/>
+        <p:nvPr/>
+      </p:nvGrpSpPr>
+      <p:grpSpPr>
+        <a:xfrm>
+          <a:off x="0" y="0"/>
+          <a:ext cx="0" cy="0"/>
+          <a:chOff x="0" y="0"/>
+          <a:chExt cx="0" cy="0"/>
+        </a:xfrm>
+      </p:grpSpPr>
+      <p:sp>
+        <p:nvSpPr>
+          <p:cNvPr id="2" name="Title 1">
+            <a:extLst>
+              <a:ext uri="{FF2B5EF4-FFF2-40B4-BE49-F238E27FC236}">
+                <a16:creationId xmlns:a16="http://schemas.microsoft.com/office/drawing/2014/main" id="{902EBB08-D194-4BFE-A14C-D6D9496A4381}"/>
+              </a:ext>
+            </a:extLst>
+          </p:cNvPr>
+          <p:cNvSpPr>
+            <a:spLocks noGrp="1"/>
+          </p:cNvSpPr>
+          <p:nvPr>
+            <p:ph type="title"/>
+          </p:nvPr>
+        </p:nvSpPr>
+        <p:spPr/>
+        <p:txBody>
+          <a:bodyPr/>
+          <a:lstStyle/>
+          <a:p>
+            <a:r>
+              <a:rPr lang="en-US" dirty="0"/>
+              <a:t>Future Work</a:t>
+            </a:r>
+          </a:p>
+        </p:txBody>
+      </p:sp>
+      <p:sp>
+        <p:nvSpPr>
+          <p:cNvPr id="3" name="Content Placeholder 2">
+            <a:extLst>
+              <a:ext uri="{FF2B5EF4-FFF2-40B4-BE49-F238E27FC236}">
+                <a16:creationId xmlns:a16="http://schemas.microsoft.com/office/drawing/2014/main" id="{575E0344-172A-44A7-9EDF-4632688E7728}"/>
+              </a:ext>
+            </a:extLst>
+          </p:cNvPr>
+          <p:cNvSpPr>
+            <a:spLocks noGrp="1"/>
+          </p:cNvSpPr>
+          <p:nvPr>
+            <p:ph idx="1"/>
+          </p:nvPr>
+        </p:nvSpPr>
+        <p:spPr/>
+        <p:txBody>
+          <a:bodyPr>
+            <a:normAutofit fontScale="70000" lnSpcReduction="20000"/>
+          </a:bodyPr>
+          <a:lstStyle/>
+          <a:p>
+            <a:r>
+              <a:rPr lang="en-US" dirty="0"/>
+              <a:t>Audible data collection could be expanded by fine grain review data.</a:t>
+            </a:r>
+          </a:p>
+          <a:p>
+            <a:r>
+              <a:rPr lang="en-US" dirty="0"/>
+              <a:t>Audible might have dynamic categories. Number of titles increased and decreased across categories. </a:t>
+            </a:r>
+          </a:p>
+          <a:p>
+            <a:endParaRPr lang="en-US" dirty="0"/>
+          </a:p>
+          <a:p>
+            <a:r>
+              <a:rPr lang="en-US" dirty="0"/>
+              <a:t>Attempted to scrape Amazon books</a:t>
+            </a:r>
+          </a:p>
+          <a:p>
+            <a:r>
+              <a:rPr lang="en-US" dirty="0"/>
+              <a:t>- Amazon displays a CAPTCHA page after ~500 site visits </a:t>
+            </a:r>
+          </a:p>
+          <a:p>
+            <a:r>
+              <a:rPr lang="en-US" dirty="0"/>
+              <a:t>- Page will be returned for several hours before </a:t>
+            </a:r>
+          </a:p>
+          <a:p>
+            <a:r>
+              <a:rPr lang="en-US" dirty="0"/>
+              <a:t>- Using proxy service (</a:t>
+            </a:r>
+            <a:r>
+              <a:rPr lang="en-US" dirty="0" err="1"/>
+              <a:t>ScraperAPI</a:t>
+            </a:r>
+            <a:r>
+              <a:rPr lang="en-US" dirty="0"/>
+              <a:t>) avoided bans but required payment.</a:t>
+            </a:r>
+          </a:p>
+          <a:p>
+            <a:endParaRPr lang="en-US" dirty="0"/>
+          </a:p>
+          <a:p>
+            <a:r>
+              <a:rPr lang="en-US" dirty="0"/>
+              <a:t>BookShop.org</a:t>
+            </a:r>
+          </a:p>
+          <a:p>
+            <a:r>
+              <a:rPr lang="en-US" dirty="0"/>
+              <a:t>- A new online book shop which shares income with local books stores.</a:t>
+            </a:r>
+          </a:p>
+          <a:p>
+            <a:r>
+              <a:rPr lang="en-US" dirty="0"/>
+              <a:t>- Similar data to Amazon but less reviews.</a:t>
+            </a:r>
+          </a:p>
+          <a:p>
+            <a:r>
+              <a:rPr lang="en-US" dirty="0"/>
+              <a:t>- Slightly elevated prices compared to Amazon.</a:t>
+            </a:r>
+          </a:p>
+        </p:txBody>
+      </p:sp>
+    </p:spTree>
+    <p:extLst>
+      <p:ext uri="{BB962C8B-B14F-4D97-AF65-F5344CB8AC3E}">
+        <p14:creationId xmlns:p14="http://schemas.microsoft.com/office/powerpoint/2010/main" val="2222744620"/>
+      </p:ext>
+    </p:extLst>
+  </p:cSld>
+  <p:clrMapOvr>
+    <a:masterClrMapping/>
+  </p:clrMapOvr>
+</p:sld>
+</file>
+
+<file path=ppt/slides/slide14.xml><?xml version="1.0" encoding="utf-8"?>
+<p:sld xmlns:a="http://schemas.openxmlformats.org/drawingml/2006/main" xmlns:r="http://schemas.openxmlformats.org/officeDocument/2006/relationships" xmlns:p="http://schemas.openxmlformats.org/presentationml/2006/main">
+  <p:cSld>
+    <p:spTree>
+      <p:nvGrpSpPr>
+        <p:cNvPr id="1" name=""/>
+        <p:cNvGrpSpPr/>
+        <p:nvPr/>
+      </p:nvGrpSpPr>
+      <p:grpSpPr>
+        <a:xfrm>
+          <a:off x="0" y="0"/>
+          <a:ext cx="0" cy="0"/>
+          <a:chOff x="0" y="0"/>
+          <a:chExt cx="0" cy="0"/>
+        </a:xfrm>
+      </p:grpSpPr>
+      <p:sp>
+        <p:nvSpPr>
+          <p:cNvPr id="2" name="Title 1">
+            <a:extLst>
+              <a:ext uri="{FF2B5EF4-FFF2-40B4-BE49-F238E27FC236}">
                 <a16:creationId xmlns:a16="http://schemas.microsoft.com/office/drawing/2014/main" id="{00DF3A5E-1F79-4EEE-9577-F262AE1381A0}"/>
               </a:ext>
             </a:extLst>
@@ -4388,7 +4797,12 @@
             <p:ph type="title"/>
           </p:nvPr>
         </p:nvSpPr>
-        <p:spPr/>
+        <p:spPr>
+          <a:xfrm>
+            <a:off x="1097280" y="867266"/>
+            <a:ext cx="10058400" cy="870094"/>
+          </a:xfrm>
+        </p:spPr>
         <p:txBody>
           <a:bodyPr/>
           <a:lstStyle/>
@@ -5031,252 +5445,273 @@
           </a:graphicData>
         </a:graphic>
       </p:graphicFrame>
-      <p:sp>
-        <p:nvSpPr>
-          <p:cNvPr id="5" name="Rectangle: Rounded Corners 4">
+      <p:grpSp>
+        <p:nvGrpSpPr>
+          <p:cNvPr id="3" name="Group 2">
             <a:extLst>
               <a:ext uri="{FF2B5EF4-FFF2-40B4-BE49-F238E27FC236}">
-                <a16:creationId xmlns:a16="http://schemas.microsoft.com/office/drawing/2014/main" id="{249C3C62-32B3-4BBA-BC41-E6F536FFFE9C}"/>
+                <a16:creationId xmlns:a16="http://schemas.microsoft.com/office/drawing/2014/main" id="{36F267CD-5FC8-4CF9-A3B3-F99CA2B3C9B8}"/>
               </a:ext>
             </a:extLst>
           </p:cNvPr>
-          <p:cNvSpPr/>
+          <p:cNvGrpSpPr/>
           <p:nvPr/>
-        </p:nvSpPr>
-        <p:spPr>
+        </p:nvGrpSpPr>
+        <p:grpSpPr>
           <a:xfrm>
             <a:off x="1496854" y="4972050"/>
-            <a:ext cx="2309177" cy="914400"/>
+            <a:ext cx="9167177" cy="914400"/>
+            <a:chOff x="1496854" y="4972050"/>
+            <a:chExt cx="9167177" cy="914400"/>
           </a:xfrm>
-          <a:prstGeom prst="roundRect">
-            <a:avLst/>
-          </a:prstGeom>
-          <a:ln w="28575">
-            <a:solidFill>
+        </p:grpSpPr>
+        <p:sp>
+          <p:nvSpPr>
+            <p:cNvPr id="5" name="Rectangle: Rounded Corners 4">
+              <a:extLst>
+                <a:ext uri="{FF2B5EF4-FFF2-40B4-BE49-F238E27FC236}">
+                  <a16:creationId xmlns:a16="http://schemas.microsoft.com/office/drawing/2014/main" id="{249C3C62-32B3-4BBA-BC41-E6F536FFFE9C}"/>
+                </a:ext>
+              </a:extLst>
+            </p:cNvPr>
+            <p:cNvSpPr/>
+            <p:nvPr/>
+          </p:nvSpPr>
+          <p:spPr>
+            <a:xfrm>
+              <a:off x="1496854" y="4972050"/>
+              <a:ext cx="2309177" cy="914400"/>
+            </a:xfrm>
+            <a:prstGeom prst="roundRect">
+              <a:avLst/>
+            </a:prstGeom>
+            <a:ln w="28575">
+              <a:solidFill>
+                <a:schemeClr val="tx1"/>
+              </a:solidFill>
+            </a:ln>
+          </p:spPr>
+          <p:style>
+            <a:lnRef idx="2">
+              <a:schemeClr val="accent6"/>
+            </a:lnRef>
+            <a:fillRef idx="1">
+              <a:schemeClr val="lt1"/>
+            </a:fillRef>
+            <a:effectRef idx="0">
+              <a:schemeClr val="accent6"/>
+            </a:effectRef>
+            <a:fontRef idx="minor">
+              <a:schemeClr val="dk1"/>
+            </a:fontRef>
+          </p:style>
+          <p:txBody>
+            <a:bodyPr rtlCol="0" anchor="ctr"/>
+            <a:lstStyle/>
+            <a:p>
+              <a:pPr algn="ctr"/>
+              <a:r>
+                <a:rPr lang="en-US" dirty="0">
+                  <a:solidFill>
+                    <a:schemeClr val="tx1"/>
+                  </a:solidFill>
+                </a:rPr>
+                <a:t>Scrape Category Structure &amp; Information</a:t>
+              </a:r>
+            </a:p>
+          </p:txBody>
+        </p:sp>
+        <p:sp>
+          <p:nvSpPr>
+            <p:cNvPr id="6" name="Rectangle: Rounded Corners 5">
+              <a:extLst>
+                <a:ext uri="{FF2B5EF4-FFF2-40B4-BE49-F238E27FC236}">
+                  <a16:creationId xmlns:a16="http://schemas.microsoft.com/office/drawing/2014/main" id="{360544A7-6B9F-4C16-BB6D-4987005EAFE1}"/>
+                </a:ext>
+              </a:extLst>
+            </p:cNvPr>
+            <p:cNvSpPr/>
+            <p:nvPr/>
+          </p:nvSpPr>
+          <p:spPr>
+            <a:xfrm>
+              <a:off x="4925854" y="4972050"/>
+              <a:ext cx="2309177" cy="914400"/>
+            </a:xfrm>
+            <a:prstGeom prst="roundRect">
+              <a:avLst/>
+            </a:prstGeom>
+            <a:ln w="28575">
+              <a:solidFill>
+                <a:schemeClr val="tx1"/>
+              </a:solidFill>
+            </a:ln>
+          </p:spPr>
+          <p:style>
+            <a:lnRef idx="2">
+              <a:schemeClr val="accent6"/>
+            </a:lnRef>
+            <a:fillRef idx="1">
+              <a:schemeClr val="lt1"/>
+            </a:fillRef>
+            <a:effectRef idx="0">
+              <a:schemeClr val="accent6"/>
+            </a:effectRef>
+            <a:fontRef idx="minor">
+              <a:schemeClr val="dk1"/>
+            </a:fontRef>
+          </p:style>
+          <p:txBody>
+            <a:bodyPr rtlCol="0" anchor="ctr"/>
+            <a:lstStyle/>
+            <a:p>
+              <a:pPr algn="ctr"/>
+              <a:r>
+                <a:rPr lang="en-US" dirty="0">
+                  <a:solidFill>
+                    <a:schemeClr val="tx1"/>
+                  </a:solidFill>
+                </a:rPr>
+                <a:t>Link to Category Best Sellers</a:t>
+              </a:r>
+            </a:p>
+          </p:txBody>
+        </p:sp>
+        <p:sp>
+          <p:nvSpPr>
+            <p:cNvPr id="7" name="Rectangle: Rounded Corners 6">
+              <a:extLst>
+                <a:ext uri="{FF2B5EF4-FFF2-40B4-BE49-F238E27FC236}">
+                  <a16:creationId xmlns:a16="http://schemas.microsoft.com/office/drawing/2014/main" id="{BCC1126B-0CA1-4E0F-A8D1-C6E9714413FA}"/>
+                </a:ext>
+              </a:extLst>
+            </p:cNvPr>
+            <p:cNvSpPr/>
+            <p:nvPr/>
+          </p:nvSpPr>
+          <p:spPr>
+            <a:xfrm>
+              <a:off x="8354854" y="4972050"/>
+              <a:ext cx="2309177" cy="914400"/>
+            </a:xfrm>
+            <a:prstGeom prst="roundRect">
+              <a:avLst/>
+            </a:prstGeom>
+            <a:ln w="28575">
+              <a:solidFill>
+                <a:schemeClr val="tx1"/>
+              </a:solidFill>
+            </a:ln>
+          </p:spPr>
+          <p:style>
+            <a:lnRef idx="2">
+              <a:schemeClr val="accent6"/>
+            </a:lnRef>
+            <a:fillRef idx="1">
+              <a:schemeClr val="lt1"/>
+            </a:fillRef>
+            <a:effectRef idx="0">
+              <a:schemeClr val="accent6"/>
+            </a:effectRef>
+            <a:fontRef idx="minor">
+              <a:schemeClr val="dk1"/>
+            </a:fontRef>
+          </p:style>
+          <p:txBody>
+            <a:bodyPr rtlCol="0" anchor="ctr"/>
+            <a:lstStyle/>
+            <a:p>
+              <a:pPr algn="ctr"/>
+              <a:r>
+                <a:rPr lang="en-US" dirty="0">
+                  <a:solidFill>
+                    <a:schemeClr val="tx1"/>
+                  </a:solidFill>
+                </a:rPr>
+                <a:t>Scrape Title Information from Results Page</a:t>
+              </a:r>
+            </a:p>
+          </p:txBody>
+        </p:sp>
+        <p:cxnSp>
+          <p:nvCxnSpPr>
+            <p:cNvPr id="9" name="Straight Arrow Connector 8">
+              <a:extLst>
+                <a:ext uri="{FF2B5EF4-FFF2-40B4-BE49-F238E27FC236}">
+                  <a16:creationId xmlns:a16="http://schemas.microsoft.com/office/drawing/2014/main" id="{6FE12409-4B1B-4AFC-8795-79DB7BC79CD9}"/>
+                </a:ext>
+              </a:extLst>
+            </p:cNvPr>
+            <p:cNvCxnSpPr/>
+            <p:nvPr/>
+          </p:nvCxnSpPr>
+          <p:spPr>
+            <a:xfrm>
+              <a:off x="3977640" y="5429250"/>
+              <a:ext cx="800100" cy="0"/>
+            </a:xfrm>
+            <a:prstGeom prst="straightConnector1">
+              <a:avLst/>
+            </a:prstGeom>
+            <a:ln w="38100">
+              <a:tailEnd type="triangle"/>
+            </a:ln>
+          </p:spPr>
+          <p:style>
+            <a:lnRef idx="1">
+              <a:schemeClr val="accent1"/>
+            </a:lnRef>
+            <a:fillRef idx="0">
+              <a:schemeClr val="accent1"/>
+            </a:fillRef>
+            <a:effectRef idx="0">
+              <a:schemeClr val="accent1"/>
+            </a:effectRef>
+            <a:fontRef idx="minor">
               <a:schemeClr val="tx1"/>
-            </a:solidFill>
-          </a:ln>
-        </p:spPr>
-        <p:style>
-          <a:lnRef idx="2">
-            <a:schemeClr val="accent6"/>
-          </a:lnRef>
-          <a:fillRef idx="1">
-            <a:schemeClr val="lt1"/>
-          </a:fillRef>
-          <a:effectRef idx="0">
-            <a:schemeClr val="accent6"/>
-          </a:effectRef>
-          <a:fontRef idx="minor">
-            <a:schemeClr val="dk1"/>
-          </a:fontRef>
-        </p:style>
-        <p:txBody>
-          <a:bodyPr rtlCol="0" anchor="ctr"/>
-          <a:lstStyle/>
-          <a:p>
-            <a:pPr algn="ctr"/>
-            <a:r>
-              <a:rPr lang="en-US" dirty="0">
-                <a:solidFill>
-                  <a:schemeClr val="tx1"/>
-                </a:solidFill>
-              </a:rPr>
-              <a:t>Scrape Category Structure &amp; Information</a:t>
-            </a:r>
-          </a:p>
-        </p:txBody>
-      </p:sp>
-      <p:sp>
-        <p:nvSpPr>
-          <p:cNvPr id="6" name="Rectangle: Rounded Corners 5">
-            <a:extLst>
-              <a:ext uri="{FF2B5EF4-FFF2-40B4-BE49-F238E27FC236}">
-                <a16:creationId xmlns:a16="http://schemas.microsoft.com/office/drawing/2014/main" id="{360544A7-6B9F-4C16-BB6D-4987005EAFE1}"/>
-              </a:ext>
-            </a:extLst>
-          </p:cNvPr>
-          <p:cNvSpPr/>
-          <p:nvPr/>
-        </p:nvSpPr>
-        <p:spPr>
-          <a:xfrm>
-            <a:off x="4925854" y="4972050"/>
-            <a:ext cx="2309177" cy="914400"/>
-          </a:xfrm>
-          <a:prstGeom prst="roundRect">
-            <a:avLst/>
-          </a:prstGeom>
-          <a:ln w="28575">
-            <a:solidFill>
+            </a:fontRef>
+          </p:style>
+        </p:cxnSp>
+        <p:cxnSp>
+          <p:nvCxnSpPr>
+            <p:cNvPr id="10" name="Straight Arrow Connector 9">
+              <a:extLst>
+                <a:ext uri="{FF2B5EF4-FFF2-40B4-BE49-F238E27FC236}">
+                  <a16:creationId xmlns:a16="http://schemas.microsoft.com/office/drawing/2014/main" id="{1075A49C-5F1E-4515-8085-3D3DDE106313}"/>
+                </a:ext>
+              </a:extLst>
+            </p:cNvPr>
+            <p:cNvCxnSpPr/>
+            <p:nvPr/>
+          </p:nvCxnSpPr>
+          <p:spPr>
+            <a:xfrm>
+              <a:off x="7399020" y="5429250"/>
+              <a:ext cx="800100" cy="0"/>
+            </a:xfrm>
+            <a:prstGeom prst="straightConnector1">
+              <a:avLst/>
+            </a:prstGeom>
+            <a:ln w="38100">
+              <a:tailEnd type="triangle"/>
+            </a:ln>
+          </p:spPr>
+          <p:style>
+            <a:lnRef idx="1">
+              <a:schemeClr val="accent1"/>
+            </a:lnRef>
+            <a:fillRef idx="0">
+              <a:schemeClr val="accent1"/>
+            </a:fillRef>
+            <a:effectRef idx="0">
+              <a:schemeClr val="accent1"/>
+            </a:effectRef>
+            <a:fontRef idx="minor">
               <a:schemeClr val="tx1"/>
-            </a:solidFill>
-          </a:ln>
-        </p:spPr>
-        <p:style>
-          <a:lnRef idx="2">
-            <a:schemeClr val="accent6"/>
-          </a:lnRef>
-          <a:fillRef idx="1">
-            <a:schemeClr val="lt1"/>
-          </a:fillRef>
-          <a:effectRef idx="0">
-            <a:schemeClr val="accent6"/>
-          </a:effectRef>
-          <a:fontRef idx="minor">
-            <a:schemeClr val="dk1"/>
-          </a:fontRef>
-        </p:style>
-        <p:txBody>
-          <a:bodyPr rtlCol="0" anchor="ctr"/>
-          <a:lstStyle/>
-          <a:p>
-            <a:pPr algn="ctr"/>
-            <a:r>
-              <a:rPr lang="en-US" dirty="0">
-                <a:solidFill>
-                  <a:schemeClr val="tx1"/>
-                </a:solidFill>
-              </a:rPr>
-              <a:t>Link to Category Best Sellers</a:t>
-            </a:r>
-          </a:p>
-        </p:txBody>
-      </p:sp>
-      <p:sp>
-        <p:nvSpPr>
-          <p:cNvPr id="7" name="Rectangle: Rounded Corners 6">
-            <a:extLst>
-              <a:ext uri="{FF2B5EF4-FFF2-40B4-BE49-F238E27FC236}">
-                <a16:creationId xmlns:a16="http://schemas.microsoft.com/office/drawing/2014/main" id="{BCC1126B-0CA1-4E0F-A8D1-C6E9714413FA}"/>
-              </a:ext>
-            </a:extLst>
-          </p:cNvPr>
-          <p:cNvSpPr/>
-          <p:nvPr/>
-        </p:nvSpPr>
-        <p:spPr>
-          <a:xfrm>
-            <a:off x="8354854" y="4972050"/>
-            <a:ext cx="2309177" cy="914400"/>
-          </a:xfrm>
-          <a:prstGeom prst="roundRect">
-            <a:avLst/>
-          </a:prstGeom>
-          <a:ln w="28575">
-            <a:solidFill>
-              <a:schemeClr val="tx1"/>
-            </a:solidFill>
-          </a:ln>
-        </p:spPr>
-        <p:style>
-          <a:lnRef idx="2">
-            <a:schemeClr val="accent6"/>
-          </a:lnRef>
-          <a:fillRef idx="1">
-            <a:schemeClr val="lt1"/>
-          </a:fillRef>
-          <a:effectRef idx="0">
-            <a:schemeClr val="accent6"/>
-          </a:effectRef>
-          <a:fontRef idx="minor">
-            <a:schemeClr val="dk1"/>
-          </a:fontRef>
-        </p:style>
-        <p:txBody>
-          <a:bodyPr rtlCol="0" anchor="ctr"/>
-          <a:lstStyle/>
-          <a:p>
-            <a:pPr algn="ctr"/>
-            <a:r>
-              <a:rPr lang="en-US" dirty="0">
-                <a:solidFill>
-                  <a:schemeClr val="tx1"/>
-                </a:solidFill>
-              </a:rPr>
-              <a:t>Scrape Title Information from Results Page</a:t>
-            </a:r>
-          </a:p>
-        </p:txBody>
-      </p:sp>
-      <p:cxnSp>
-        <p:nvCxnSpPr>
-          <p:cNvPr id="9" name="Straight Arrow Connector 8">
-            <a:extLst>
-              <a:ext uri="{FF2B5EF4-FFF2-40B4-BE49-F238E27FC236}">
-                <a16:creationId xmlns:a16="http://schemas.microsoft.com/office/drawing/2014/main" id="{6FE12409-4B1B-4AFC-8795-79DB7BC79CD9}"/>
-              </a:ext>
-            </a:extLst>
-          </p:cNvPr>
-          <p:cNvCxnSpPr/>
-          <p:nvPr/>
-        </p:nvCxnSpPr>
-        <p:spPr>
-          <a:xfrm>
-            <a:off x="3977640" y="5429250"/>
-            <a:ext cx="800100" cy="0"/>
-          </a:xfrm>
-          <a:prstGeom prst="straightConnector1">
-            <a:avLst/>
-          </a:prstGeom>
-          <a:ln w="38100">
-            <a:tailEnd type="triangle"/>
-          </a:ln>
-        </p:spPr>
-        <p:style>
-          <a:lnRef idx="1">
-            <a:schemeClr val="accent1"/>
-          </a:lnRef>
-          <a:fillRef idx="0">
-            <a:schemeClr val="accent1"/>
-          </a:fillRef>
-          <a:effectRef idx="0">
-            <a:schemeClr val="accent1"/>
-          </a:effectRef>
-          <a:fontRef idx="minor">
-            <a:schemeClr val="tx1"/>
-          </a:fontRef>
-        </p:style>
-      </p:cxnSp>
-      <p:cxnSp>
-        <p:nvCxnSpPr>
-          <p:cNvPr id="10" name="Straight Arrow Connector 9">
-            <a:extLst>
-              <a:ext uri="{FF2B5EF4-FFF2-40B4-BE49-F238E27FC236}">
-                <a16:creationId xmlns:a16="http://schemas.microsoft.com/office/drawing/2014/main" id="{1075A49C-5F1E-4515-8085-3D3DDE106313}"/>
-              </a:ext>
-            </a:extLst>
-          </p:cNvPr>
-          <p:cNvCxnSpPr/>
-          <p:nvPr/>
-        </p:nvCxnSpPr>
-        <p:spPr>
-          <a:xfrm>
-            <a:off x="7399020" y="5429250"/>
-            <a:ext cx="800100" cy="0"/>
-          </a:xfrm>
-          <a:prstGeom prst="straightConnector1">
-            <a:avLst/>
-          </a:prstGeom>
-          <a:ln w="38100">
-            <a:tailEnd type="triangle"/>
-          </a:ln>
-        </p:spPr>
-        <p:style>
-          <a:lnRef idx="1">
-            <a:schemeClr val="accent1"/>
-          </a:lnRef>
-          <a:fillRef idx="0">
-            <a:schemeClr val="accent1"/>
-          </a:fillRef>
-          <a:effectRef idx="0">
-            <a:schemeClr val="accent1"/>
-          </a:effectRef>
-          <a:fontRef idx="minor">
-            <a:schemeClr val="tx1"/>
-          </a:fontRef>
-        </p:style>
-      </p:cxnSp>
+            </a:fontRef>
+          </p:style>
+        </p:cxnSp>
+      </p:grpSp>
     </p:spTree>
     <p:extLst>
       <p:ext uri="{BB962C8B-B14F-4D97-AF65-F5344CB8AC3E}">
@@ -5307,63 +5742,993 @@
           <a:chExt cx="0" cy="0"/>
         </a:xfrm>
       </p:grpSpPr>
-      <p:sp>
-        <p:nvSpPr>
-          <p:cNvPr id="2" name="Title 1">
+      <p:grpSp>
+        <p:nvGrpSpPr>
+          <p:cNvPr id="11" name="Group 10">
             <a:extLst>
               <a:ext uri="{FF2B5EF4-FFF2-40B4-BE49-F238E27FC236}">
-                <a16:creationId xmlns:a16="http://schemas.microsoft.com/office/drawing/2014/main" id="{8AB1FFBA-C49C-4D27-9F5C-8C91B59FBE93}"/>
+                <a16:creationId xmlns:a16="http://schemas.microsoft.com/office/drawing/2014/main" id="{8CC48630-97FC-4489-8EDF-6E71B0C41DF8}"/>
               </a:ext>
             </a:extLst>
           </p:cNvPr>
-          <p:cNvSpPr>
-            <a:spLocks noGrp="1"/>
-          </p:cNvSpPr>
-          <p:nvPr>
-            <p:ph type="title"/>
-          </p:nvPr>
-        </p:nvSpPr>
-        <p:spPr/>
-        <p:txBody>
-          <a:bodyPr/>
-          <a:lstStyle/>
-          <a:p>
-            <a:r>
-              <a:rPr lang="en-US" dirty="0"/>
-              <a:t>Book Categories</a:t>
-            </a:r>
-          </a:p>
-        </p:txBody>
-      </p:sp>
-      <p:sp>
-        <p:nvSpPr>
-          <p:cNvPr id="3" name="Content Placeholder 2">
+          <p:cNvGrpSpPr/>
+          <p:nvPr/>
+        </p:nvGrpSpPr>
+        <p:grpSpPr>
+          <a:xfrm>
+            <a:off x="1512409" y="5318317"/>
+            <a:ext cx="9167177" cy="914400"/>
+            <a:chOff x="1496854" y="4972050"/>
+            <a:chExt cx="9167177" cy="914400"/>
+          </a:xfrm>
+        </p:grpSpPr>
+        <p:sp>
+          <p:nvSpPr>
+            <p:cNvPr id="12" name="Rectangle: Rounded Corners 11">
+              <a:extLst>
+                <a:ext uri="{FF2B5EF4-FFF2-40B4-BE49-F238E27FC236}">
+                  <a16:creationId xmlns:a16="http://schemas.microsoft.com/office/drawing/2014/main" id="{4073E28B-5EF7-4800-844A-1FD7DCC9103E}"/>
+                </a:ext>
+              </a:extLst>
+            </p:cNvPr>
+            <p:cNvSpPr/>
+            <p:nvPr/>
+          </p:nvSpPr>
+          <p:spPr>
+            <a:xfrm>
+              <a:off x="1496854" y="4972050"/>
+              <a:ext cx="2309177" cy="914400"/>
+            </a:xfrm>
+            <a:prstGeom prst="roundRect">
+              <a:avLst/>
+            </a:prstGeom>
+            <a:solidFill>
+              <a:schemeClr val="accent1">
+                <a:lumMod val="40000"/>
+                <a:lumOff val="60000"/>
+              </a:schemeClr>
+            </a:solidFill>
+            <a:ln w="28575">
+              <a:solidFill>
+                <a:schemeClr val="tx1"/>
+              </a:solidFill>
+            </a:ln>
+          </p:spPr>
+          <p:style>
+            <a:lnRef idx="2">
+              <a:schemeClr val="accent6"/>
+            </a:lnRef>
+            <a:fillRef idx="1">
+              <a:schemeClr val="lt1"/>
+            </a:fillRef>
+            <a:effectRef idx="0">
+              <a:schemeClr val="accent6"/>
+            </a:effectRef>
+            <a:fontRef idx="minor">
+              <a:schemeClr val="dk1"/>
+            </a:fontRef>
+          </p:style>
+          <p:txBody>
+            <a:bodyPr rtlCol="0" anchor="ctr"/>
+            <a:lstStyle/>
+            <a:p>
+              <a:pPr algn="ctr"/>
+              <a:r>
+                <a:rPr lang="en-US" dirty="0">
+                  <a:solidFill>
+                    <a:schemeClr val="tx1"/>
+                  </a:solidFill>
+                </a:rPr>
+                <a:t>Scrape Category Structure &amp; Information</a:t>
+              </a:r>
+            </a:p>
+          </p:txBody>
+        </p:sp>
+        <p:sp>
+          <p:nvSpPr>
+            <p:cNvPr id="13" name="Rectangle: Rounded Corners 12">
+              <a:extLst>
+                <a:ext uri="{FF2B5EF4-FFF2-40B4-BE49-F238E27FC236}">
+                  <a16:creationId xmlns:a16="http://schemas.microsoft.com/office/drawing/2014/main" id="{A74813B4-D640-40CD-812B-43F34EF3691F}"/>
+                </a:ext>
+              </a:extLst>
+            </p:cNvPr>
+            <p:cNvSpPr/>
+            <p:nvPr/>
+          </p:nvSpPr>
+          <p:spPr>
+            <a:xfrm>
+              <a:off x="4925854" y="4972050"/>
+              <a:ext cx="2309177" cy="914400"/>
+            </a:xfrm>
+            <a:prstGeom prst="roundRect">
+              <a:avLst/>
+            </a:prstGeom>
+            <a:ln w="28575">
+              <a:solidFill>
+                <a:schemeClr val="tx1"/>
+              </a:solidFill>
+            </a:ln>
+          </p:spPr>
+          <p:style>
+            <a:lnRef idx="2">
+              <a:schemeClr val="accent6"/>
+            </a:lnRef>
+            <a:fillRef idx="1">
+              <a:schemeClr val="lt1"/>
+            </a:fillRef>
+            <a:effectRef idx="0">
+              <a:schemeClr val="accent6"/>
+            </a:effectRef>
+            <a:fontRef idx="minor">
+              <a:schemeClr val="dk1"/>
+            </a:fontRef>
+          </p:style>
+          <p:txBody>
+            <a:bodyPr rtlCol="0" anchor="ctr"/>
+            <a:lstStyle/>
+            <a:p>
+              <a:pPr algn="ctr"/>
+              <a:r>
+                <a:rPr lang="en-US" dirty="0">
+                  <a:solidFill>
+                    <a:schemeClr val="tx1"/>
+                  </a:solidFill>
+                </a:rPr>
+                <a:t>Link to Category Best Sellers</a:t>
+              </a:r>
+            </a:p>
+          </p:txBody>
+        </p:sp>
+        <p:sp>
+          <p:nvSpPr>
+            <p:cNvPr id="14" name="Rectangle: Rounded Corners 13">
+              <a:extLst>
+                <a:ext uri="{FF2B5EF4-FFF2-40B4-BE49-F238E27FC236}">
+                  <a16:creationId xmlns:a16="http://schemas.microsoft.com/office/drawing/2014/main" id="{66063B6E-7846-4EC9-A22A-946545CBE53D}"/>
+                </a:ext>
+              </a:extLst>
+            </p:cNvPr>
+            <p:cNvSpPr/>
+            <p:nvPr/>
+          </p:nvSpPr>
+          <p:spPr>
+            <a:xfrm>
+              <a:off x="8354854" y="4972050"/>
+              <a:ext cx="2309177" cy="914400"/>
+            </a:xfrm>
+            <a:prstGeom prst="roundRect">
+              <a:avLst/>
+            </a:prstGeom>
+            <a:ln w="28575">
+              <a:solidFill>
+                <a:schemeClr val="tx1"/>
+              </a:solidFill>
+            </a:ln>
+          </p:spPr>
+          <p:style>
+            <a:lnRef idx="2">
+              <a:schemeClr val="accent6"/>
+            </a:lnRef>
+            <a:fillRef idx="1">
+              <a:schemeClr val="lt1"/>
+            </a:fillRef>
+            <a:effectRef idx="0">
+              <a:schemeClr val="accent6"/>
+            </a:effectRef>
+            <a:fontRef idx="minor">
+              <a:schemeClr val="dk1"/>
+            </a:fontRef>
+          </p:style>
+          <p:txBody>
+            <a:bodyPr rtlCol="0" anchor="ctr"/>
+            <a:lstStyle/>
+            <a:p>
+              <a:pPr algn="ctr"/>
+              <a:r>
+                <a:rPr lang="en-US" dirty="0">
+                  <a:solidFill>
+                    <a:schemeClr val="tx1"/>
+                  </a:solidFill>
+                </a:rPr>
+                <a:t>Scrape Title Information from Results Page</a:t>
+              </a:r>
+            </a:p>
+          </p:txBody>
+        </p:sp>
+        <p:cxnSp>
+          <p:nvCxnSpPr>
+            <p:cNvPr id="15" name="Straight Arrow Connector 14">
+              <a:extLst>
+                <a:ext uri="{FF2B5EF4-FFF2-40B4-BE49-F238E27FC236}">
+                  <a16:creationId xmlns:a16="http://schemas.microsoft.com/office/drawing/2014/main" id="{FECAAED9-FD12-4F19-B143-49FB0D118BA9}"/>
+                </a:ext>
+              </a:extLst>
+            </p:cNvPr>
+            <p:cNvCxnSpPr/>
+            <p:nvPr/>
+          </p:nvCxnSpPr>
+          <p:spPr>
+            <a:xfrm>
+              <a:off x="3977640" y="5429250"/>
+              <a:ext cx="800100" cy="0"/>
+            </a:xfrm>
+            <a:prstGeom prst="straightConnector1">
+              <a:avLst/>
+            </a:prstGeom>
+            <a:ln w="38100">
+              <a:tailEnd type="triangle"/>
+            </a:ln>
+          </p:spPr>
+          <p:style>
+            <a:lnRef idx="1">
+              <a:schemeClr val="accent1"/>
+            </a:lnRef>
+            <a:fillRef idx="0">
+              <a:schemeClr val="accent1"/>
+            </a:fillRef>
+            <a:effectRef idx="0">
+              <a:schemeClr val="accent1"/>
+            </a:effectRef>
+            <a:fontRef idx="minor">
+              <a:schemeClr val="tx1"/>
+            </a:fontRef>
+          </p:style>
+        </p:cxnSp>
+        <p:cxnSp>
+          <p:nvCxnSpPr>
+            <p:cNvPr id="16" name="Straight Arrow Connector 15">
+              <a:extLst>
+                <a:ext uri="{FF2B5EF4-FFF2-40B4-BE49-F238E27FC236}">
+                  <a16:creationId xmlns:a16="http://schemas.microsoft.com/office/drawing/2014/main" id="{2A422A58-5219-4912-A931-B3BD6478D2F6}"/>
+                </a:ext>
+              </a:extLst>
+            </p:cNvPr>
+            <p:cNvCxnSpPr/>
+            <p:nvPr/>
+          </p:nvCxnSpPr>
+          <p:spPr>
+            <a:xfrm>
+              <a:off x="7399020" y="5429250"/>
+              <a:ext cx="800100" cy="0"/>
+            </a:xfrm>
+            <a:prstGeom prst="straightConnector1">
+              <a:avLst/>
+            </a:prstGeom>
+            <a:ln w="38100">
+              <a:tailEnd type="triangle"/>
+            </a:ln>
+          </p:spPr>
+          <p:style>
+            <a:lnRef idx="1">
+              <a:schemeClr val="accent1"/>
+            </a:lnRef>
+            <a:fillRef idx="0">
+              <a:schemeClr val="accent1"/>
+            </a:fillRef>
+            <a:effectRef idx="0">
+              <a:schemeClr val="accent1"/>
+            </a:effectRef>
+            <a:fontRef idx="minor">
+              <a:schemeClr val="tx1"/>
+            </a:fontRef>
+          </p:style>
+        </p:cxnSp>
+      </p:grpSp>
+      <p:sp>
+        <p:nvSpPr>
+          <p:cNvPr id="17" name="Title 1">
             <a:extLst>
               <a:ext uri="{FF2B5EF4-FFF2-40B4-BE49-F238E27FC236}">
-                <a16:creationId xmlns:a16="http://schemas.microsoft.com/office/drawing/2014/main" id="{8D86033D-4D9C-4396-811C-4067550230D8}"/>
+                <a16:creationId xmlns:a16="http://schemas.microsoft.com/office/drawing/2014/main" id="{8B38A4B4-E8A2-4D2A-B21B-70986B5AA081}"/>
               </a:ext>
             </a:extLst>
           </p:cNvPr>
-          <p:cNvSpPr>
-            <a:spLocks noGrp="1"/>
+          <p:cNvSpPr txBox="1">
+            <a:spLocks/>
           </p:cNvSpPr>
-          <p:nvPr>
-            <p:ph idx="1"/>
-          </p:nvPr>
-        </p:nvSpPr>
-        <p:spPr/>
+          <p:nvPr/>
+        </p:nvSpPr>
+        <p:spPr>
+          <a:xfrm>
+            <a:off x="1066798" y="209982"/>
+            <a:ext cx="10058400" cy="870094"/>
+          </a:xfrm>
+          <a:prstGeom prst="rect">
+            <a:avLst/>
+          </a:prstGeom>
+        </p:spPr>
         <p:txBody>
           <a:bodyPr/>
-          <a:lstStyle/>
-          <a:p>
-            <a:endParaRPr lang="en-US"/>
-          </a:p>
-        </p:txBody>
-      </p:sp>
+          <a:lstStyle>
+            <a:lvl1pPr algn="l" defTabSz="914400" rtl="0" eaLnBrk="1" latinLnBrk="0" hangingPunct="1">
+              <a:lnSpc>
+                <a:spcPct val="85000"/>
+              </a:lnSpc>
+              <a:spcBef>
+                <a:spcPct val="0"/>
+              </a:spcBef>
+              <a:buNone/>
+              <a:defRPr sz="4800" kern="1200" spc="-50" baseline="0">
+                <a:solidFill>
+                  <a:schemeClr val="tx1">
+                    <a:lumMod val="75000"/>
+                    <a:lumOff val="25000"/>
+                  </a:schemeClr>
+                </a:solidFill>
+                <a:latin typeface="+mj-lt"/>
+                <a:ea typeface="+mj-ea"/>
+                <a:cs typeface="+mj-cs"/>
+              </a:defRPr>
+            </a:lvl1pPr>
+          </a:lstStyle>
+          <a:p>
+            <a:r>
+              <a:rPr lang="en-US" dirty="0"/>
+              <a:t>Category Scraping</a:t>
+            </a:r>
+          </a:p>
+        </p:txBody>
+      </p:sp>
+      <p:grpSp>
+        <p:nvGrpSpPr>
+          <p:cNvPr id="33" name="Group 32">
+            <a:extLst>
+              <a:ext uri="{FF2B5EF4-FFF2-40B4-BE49-F238E27FC236}">
+                <a16:creationId xmlns:a16="http://schemas.microsoft.com/office/drawing/2014/main" id="{8BBA4590-ED44-48CC-9320-F124083AD2C1}"/>
+              </a:ext>
+            </a:extLst>
+          </p:cNvPr>
+          <p:cNvGrpSpPr/>
+          <p:nvPr/>
+        </p:nvGrpSpPr>
+        <p:grpSpPr>
+          <a:xfrm>
+            <a:off x="999007" y="1080076"/>
+            <a:ext cx="10193979" cy="3828313"/>
+            <a:chOff x="769995" y="1126552"/>
+            <a:chExt cx="10193979" cy="3828313"/>
+          </a:xfrm>
+        </p:grpSpPr>
+        <p:grpSp>
+          <p:nvGrpSpPr>
+            <p:cNvPr id="2" name="Group 1">
+              <a:extLst>
+                <a:ext uri="{FF2B5EF4-FFF2-40B4-BE49-F238E27FC236}">
+                  <a16:creationId xmlns:a16="http://schemas.microsoft.com/office/drawing/2014/main" id="{9C411BF5-939F-474A-BAC4-A6F112711A53}"/>
+                </a:ext>
+              </a:extLst>
+            </p:cNvPr>
+            <p:cNvGrpSpPr/>
+            <p:nvPr/>
+          </p:nvGrpSpPr>
+          <p:grpSpPr>
+            <a:xfrm>
+              <a:off x="2622302" y="1126552"/>
+              <a:ext cx="5578244" cy="3828313"/>
+              <a:chOff x="5525587" y="1845734"/>
+              <a:chExt cx="6304259" cy="4326572"/>
+            </a:xfrm>
+          </p:grpSpPr>
+          <p:pic>
+            <p:nvPicPr>
+              <p:cNvPr id="3" name="Picture 2">
+                <a:extLst>
+                  <a:ext uri="{FF2B5EF4-FFF2-40B4-BE49-F238E27FC236}">
+                    <a16:creationId xmlns:a16="http://schemas.microsoft.com/office/drawing/2014/main" id="{1D36275D-0651-4B6D-9BFE-B689044026F6}"/>
+                  </a:ext>
+                </a:extLst>
+              </p:cNvPr>
+              <p:cNvPicPr>
+                <a:picLocks noChangeAspect="1"/>
+              </p:cNvPicPr>
+              <p:nvPr/>
+            </p:nvPicPr>
+            <p:blipFill>
+              <a:blip r:embed="rId2"/>
+              <a:stretch>
+                <a:fillRect/>
+              </a:stretch>
+            </p:blipFill>
+            <p:spPr>
+              <a:xfrm>
+                <a:off x="5525587" y="1845734"/>
+                <a:ext cx="6304259" cy="4326572"/>
+              </a:xfrm>
+              <a:prstGeom prst="rect">
+                <a:avLst/>
+              </a:prstGeom>
+              <a:ln>
+                <a:solidFill>
+                  <a:schemeClr val="tx1"/>
+                </a:solidFill>
+              </a:ln>
+            </p:spPr>
+          </p:pic>
+          <p:sp>
+            <p:nvSpPr>
+              <p:cNvPr id="4" name="Rectangle 3">
+                <a:extLst>
+                  <a:ext uri="{FF2B5EF4-FFF2-40B4-BE49-F238E27FC236}">
+                    <a16:creationId xmlns:a16="http://schemas.microsoft.com/office/drawing/2014/main" id="{2BB748CD-5434-46C6-85AD-A3676CB20789}"/>
+                  </a:ext>
+                </a:extLst>
+              </p:cNvPr>
+              <p:cNvSpPr/>
+              <p:nvPr/>
+            </p:nvSpPr>
+            <p:spPr>
+              <a:xfrm>
+                <a:off x="5613640" y="2615716"/>
+                <a:ext cx="776703" cy="163095"/>
+              </a:xfrm>
+              <a:prstGeom prst="rect">
+                <a:avLst/>
+              </a:prstGeom>
+              <a:noFill/>
+            </p:spPr>
+            <p:style>
+              <a:lnRef idx="2">
+                <a:schemeClr val="accent1">
+                  <a:shade val="50000"/>
+                </a:schemeClr>
+              </a:lnRef>
+              <a:fillRef idx="1">
+                <a:schemeClr val="accent1"/>
+              </a:fillRef>
+              <a:effectRef idx="0">
+                <a:schemeClr val="accent1"/>
+              </a:effectRef>
+              <a:fontRef idx="minor">
+                <a:schemeClr val="lt1"/>
+              </a:fontRef>
+            </p:style>
+            <p:txBody>
+              <a:bodyPr rtlCol="0" anchor="ctr"/>
+              <a:lstStyle/>
+              <a:p>
+                <a:pPr algn="ctr"/>
+                <a:endParaRPr lang="en-US"/>
+              </a:p>
+            </p:txBody>
+          </p:sp>
+          <p:sp>
+            <p:nvSpPr>
+              <p:cNvPr id="5" name="Rectangle 4">
+                <a:extLst>
+                  <a:ext uri="{FF2B5EF4-FFF2-40B4-BE49-F238E27FC236}">
+                    <a16:creationId xmlns:a16="http://schemas.microsoft.com/office/drawing/2014/main" id="{882F50FE-4F19-4E86-913E-76D74812EE1E}"/>
+                  </a:ext>
+                </a:extLst>
+              </p:cNvPr>
+              <p:cNvSpPr/>
+              <p:nvPr/>
+            </p:nvSpPr>
+            <p:spPr>
+              <a:xfrm>
+                <a:off x="5613641" y="2778811"/>
+                <a:ext cx="603010" cy="163095"/>
+              </a:xfrm>
+              <a:prstGeom prst="rect">
+                <a:avLst/>
+              </a:prstGeom>
+              <a:noFill/>
+            </p:spPr>
+            <p:style>
+              <a:lnRef idx="2">
+                <a:schemeClr val="accent1">
+                  <a:shade val="50000"/>
+                </a:schemeClr>
+              </a:lnRef>
+              <a:fillRef idx="1">
+                <a:schemeClr val="accent1"/>
+              </a:fillRef>
+              <a:effectRef idx="0">
+                <a:schemeClr val="accent1"/>
+              </a:effectRef>
+              <a:fontRef idx="minor">
+                <a:schemeClr val="lt1"/>
+              </a:fontRef>
+            </p:style>
+            <p:txBody>
+              <a:bodyPr rtlCol="0" anchor="ctr"/>
+              <a:lstStyle/>
+              <a:p>
+                <a:pPr algn="ctr"/>
+                <a:endParaRPr lang="en-US"/>
+              </a:p>
+            </p:txBody>
+          </p:sp>
+          <p:sp>
+            <p:nvSpPr>
+              <p:cNvPr id="6" name="Rectangle 5">
+                <a:extLst>
+                  <a:ext uri="{FF2B5EF4-FFF2-40B4-BE49-F238E27FC236}">
+                    <a16:creationId xmlns:a16="http://schemas.microsoft.com/office/drawing/2014/main" id="{429FC1EA-A8D1-40E0-8843-CFF05AEFF43A}"/>
+                  </a:ext>
+                </a:extLst>
+              </p:cNvPr>
+              <p:cNvSpPr/>
+              <p:nvPr/>
+            </p:nvSpPr>
+            <p:spPr>
+              <a:xfrm>
+                <a:off x="5613640" y="2941906"/>
+                <a:ext cx="415685" cy="137844"/>
+              </a:xfrm>
+              <a:prstGeom prst="rect">
+                <a:avLst/>
+              </a:prstGeom>
+              <a:noFill/>
+            </p:spPr>
+            <p:style>
+              <a:lnRef idx="2">
+                <a:schemeClr val="accent1">
+                  <a:shade val="50000"/>
+                </a:schemeClr>
+              </a:lnRef>
+              <a:fillRef idx="1">
+                <a:schemeClr val="accent1"/>
+              </a:fillRef>
+              <a:effectRef idx="0">
+                <a:schemeClr val="accent1"/>
+              </a:effectRef>
+              <a:fontRef idx="minor">
+                <a:schemeClr val="lt1"/>
+              </a:fontRef>
+            </p:style>
+            <p:txBody>
+              <a:bodyPr rtlCol="0" anchor="ctr"/>
+              <a:lstStyle/>
+              <a:p>
+                <a:pPr algn="ctr"/>
+                <a:endParaRPr lang="en-US"/>
+              </a:p>
+            </p:txBody>
+          </p:sp>
+          <p:sp>
+            <p:nvSpPr>
+              <p:cNvPr id="7" name="Rectangle 6">
+                <a:extLst>
+                  <a:ext uri="{FF2B5EF4-FFF2-40B4-BE49-F238E27FC236}">
+                    <a16:creationId xmlns:a16="http://schemas.microsoft.com/office/drawing/2014/main" id="{8144BCD2-3297-46F1-92E3-06FD87E7C510}"/>
+                  </a:ext>
+                </a:extLst>
+              </p:cNvPr>
+              <p:cNvSpPr/>
+              <p:nvPr/>
+            </p:nvSpPr>
+            <p:spPr>
+              <a:xfrm>
+                <a:off x="5563773" y="3154263"/>
+                <a:ext cx="6152520" cy="1122315"/>
+              </a:xfrm>
+              <a:prstGeom prst="rect">
+                <a:avLst/>
+              </a:prstGeom>
+              <a:noFill/>
+            </p:spPr>
+            <p:style>
+              <a:lnRef idx="2">
+                <a:schemeClr val="accent1">
+                  <a:shade val="50000"/>
+                </a:schemeClr>
+              </a:lnRef>
+              <a:fillRef idx="1">
+                <a:schemeClr val="accent1"/>
+              </a:fillRef>
+              <a:effectRef idx="0">
+                <a:schemeClr val="accent1"/>
+              </a:effectRef>
+              <a:fontRef idx="minor">
+                <a:schemeClr val="lt1"/>
+              </a:fontRef>
+            </p:style>
+            <p:txBody>
+              <a:bodyPr rtlCol="0" anchor="ctr"/>
+              <a:lstStyle/>
+              <a:p>
+                <a:pPr algn="ctr"/>
+                <a:endParaRPr lang="en-US"/>
+              </a:p>
+            </p:txBody>
+          </p:sp>
+          <p:sp>
+            <p:nvSpPr>
+              <p:cNvPr id="8" name="Rectangle 7">
+                <a:extLst>
+                  <a:ext uri="{FF2B5EF4-FFF2-40B4-BE49-F238E27FC236}">
+                    <a16:creationId xmlns:a16="http://schemas.microsoft.com/office/drawing/2014/main" id="{621BC9F9-9E5F-4709-8539-3A1E9CFD7462}"/>
+                  </a:ext>
+                </a:extLst>
+              </p:cNvPr>
+              <p:cNvSpPr/>
+              <p:nvPr/>
+            </p:nvSpPr>
+            <p:spPr>
+              <a:xfrm>
+                <a:off x="7160456" y="3602104"/>
+                <a:ext cx="534572" cy="182106"/>
+              </a:xfrm>
+              <a:prstGeom prst="rect">
+                <a:avLst/>
+              </a:prstGeom>
+              <a:noFill/>
+            </p:spPr>
+            <p:style>
+              <a:lnRef idx="2">
+                <a:schemeClr val="accent1">
+                  <a:shade val="50000"/>
+                </a:schemeClr>
+              </a:lnRef>
+              <a:fillRef idx="1">
+                <a:schemeClr val="accent1"/>
+              </a:fillRef>
+              <a:effectRef idx="0">
+                <a:schemeClr val="accent1"/>
+              </a:effectRef>
+              <a:fontRef idx="minor">
+                <a:schemeClr val="lt1"/>
+              </a:fontRef>
+            </p:style>
+            <p:txBody>
+              <a:bodyPr rtlCol="0" anchor="ctr"/>
+              <a:lstStyle/>
+              <a:p>
+                <a:pPr algn="ctr"/>
+                <a:endParaRPr lang="en-US"/>
+              </a:p>
+            </p:txBody>
+          </p:sp>
+          <p:sp>
+            <p:nvSpPr>
+              <p:cNvPr id="9" name="Rectangle 8">
+                <a:extLst>
+                  <a:ext uri="{FF2B5EF4-FFF2-40B4-BE49-F238E27FC236}">
+                    <a16:creationId xmlns:a16="http://schemas.microsoft.com/office/drawing/2014/main" id="{F2591FC2-0DFF-44CB-91AE-6B879B783E18}"/>
+                  </a:ext>
+                </a:extLst>
+              </p:cNvPr>
+              <p:cNvSpPr/>
+              <p:nvPr/>
+            </p:nvSpPr>
+            <p:spPr>
+              <a:xfrm>
+                <a:off x="11027989" y="2585567"/>
+                <a:ext cx="776703" cy="182106"/>
+              </a:xfrm>
+              <a:prstGeom prst="rect">
+                <a:avLst/>
+              </a:prstGeom>
+              <a:noFill/>
+            </p:spPr>
+            <p:style>
+              <a:lnRef idx="2">
+                <a:schemeClr val="accent1">
+                  <a:shade val="50000"/>
+                </a:schemeClr>
+              </a:lnRef>
+              <a:fillRef idx="1">
+                <a:schemeClr val="accent1"/>
+              </a:fillRef>
+              <a:effectRef idx="0">
+                <a:schemeClr val="accent1"/>
+              </a:effectRef>
+              <a:fontRef idx="minor">
+                <a:schemeClr val="lt1"/>
+              </a:fontRef>
+            </p:style>
+            <p:txBody>
+              <a:bodyPr rtlCol="0" anchor="ctr"/>
+              <a:lstStyle/>
+              <a:p>
+                <a:pPr algn="ctr"/>
+                <a:endParaRPr lang="en-US"/>
+              </a:p>
+            </p:txBody>
+          </p:sp>
+          <p:sp>
+            <p:nvSpPr>
+              <p:cNvPr id="10" name="Rectangle 9">
+                <a:extLst>
+                  <a:ext uri="{FF2B5EF4-FFF2-40B4-BE49-F238E27FC236}">
+                    <a16:creationId xmlns:a16="http://schemas.microsoft.com/office/drawing/2014/main" id="{F94114CA-9656-491A-A997-7ABA53BDEDB2}"/>
+                  </a:ext>
+                </a:extLst>
+              </p:cNvPr>
+              <p:cNvSpPr/>
+              <p:nvPr/>
+            </p:nvSpPr>
+            <p:spPr>
+              <a:xfrm>
+                <a:off x="11380763" y="4385979"/>
+                <a:ext cx="423928" cy="182106"/>
+              </a:xfrm>
+              <a:prstGeom prst="rect">
+                <a:avLst/>
+              </a:prstGeom>
+              <a:noFill/>
+            </p:spPr>
+            <p:style>
+              <a:lnRef idx="2">
+                <a:schemeClr val="accent1">
+                  <a:shade val="50000"/>
+                </a:schemeClr>
+              </a:lnRef>
+              <a:fillRef idx="1">
+                <a:schemeClr val="accent1"/>
+              </a:fillRef>
+              <a:effectRef idx="0">
+                <a:schemeClr val="accent1"/>
+              </a:effectRef>
+              <a:fontRef idx="minor">
+                <a:schemeClr val="lt1"/>
+              </a:fontRef>
+            </p:style>
+            <p:txBody>
+              <a:bodyPr rtlCol="0" anchor="ctr"/>
+              <a:lstStyle/>
+              <a:p>
+                <a:pPr algn="ctr"/>
+                <a:endParaRPr lang="en-US"/>
+              </a:p>
+            </p:txBody>
+          </p:sp>
+        </p:grpSp>
+        <p:sp>
+          <p:nvSpPr>
+            <p:cNvPr id="20" name="TextBox 19">
+              <a:extLst>
+                <a:ext uri="{FF2B5EF4-FFF2-40B4-BE49-F238E27FC236}">
+                  <a16:creationId xmlns:a16="http://schemas.microsoft.com/office/drawing/2014/main" id="{E0C55CE7-20EA-45A6-8012-FAA5540B6E91}"/>
+                </a:ext>
+              </a:extLst>
+            </p:cNvPr>
+            <p:cNvSpPr txBox="1"/>
+            <p:nvPr/>
+          </p:nvSpPr>
+          <p:spPr>
+            <a:xfrm>
+              <a:off x="802760" y="1418881"/>
+              <a:ext cx="1687578" cy="369332"/>
+            </a:xfrm>
+            <a:prstGeom prst="rect">
+              <a:avLst/>
+            </a:prstGeom>
+            <a:noFill/>
+          </p:spPr>
+          <p:txBody>
+            <a:bodyPr wrap="none" rtlCol="0">
+              <a:spAutoFit/>
+            </a:bodyPr>
+            <a:lstStyle/>
+            <a:p>
+              <a:r>
+                <a:rPr lang="en-US" dirty="0"/>
+                <a:t>Parent Category</a:t>
+              </a:r>
+            </a:p>
+          </p:txBody>
+        </p:sp>
+        <p:sp>
+          <p:nvSpPr>
+            <p:cNvPr id="21" name="TextBox 20">
+              <a:extLst>
+                <a:ext uri="{FF2B5EF4-FFF2-40B4-BE49-F238E27FC236}">
+                  <a16:creationId xmlns:a16="http://schemas.microsoft.com/office/drawing/2014/main" id="{F9AF87FF-84DE-43E9-BA8E-040A0B683863}"/>
+                </a:ext>
+              </a:extLst>
+            </p:cNvPr>
+            <p:cNvSpPr txBox="1"/>
+            <p:nvPr/>
+          </p:nvSpPr>
+          <p:spPr>
+            <a:xfrm>
+              <a:off x="856814" y="1911820"/>
+              <a:ext cx="1633524" cy="369332"/>
+            </a:xfrm>
+            <a:prstGeom prst="rect">
+              <a:avLst/>
+            </a:prstGeom>
+            <a:noFill/>
+          </p:spPr>
+          <p:txBody>
+            <a:bodyPr wrap="none" rtlCol="0">
+              <a:spAutoFit/>
+            </a:bodyPr>
+            <a:lstStyle/>
+            <a:p>
+              <a:r>
+                <a:rPr lang="en-US" dirty="0"/>
+                <a:t>Category Name</a:t>
+              </a:r>
+            </a:p>
+          </p:txBody>
+        </p:sp>
+        <p:sp>
+          <p:nvSpPr>
+            <p:cNvPr id="22" name="TextBox 21">
+              <a:extLst>
+                <a:ext uri="{FF2B5EF4-FFF2-40B4-BE49-F238E27FC236}">
+                  <a16:creationId xmlns:a16="http://schemas.microsoft.com/office/drawing/2014/main" id="{1B09D96E-44C7-41D9-9C06-4E8EE7A1A318}"/>
+                </a:ext>
+              </a:extLst>
+            </p:cNvPr>
+            <p:cNvSpPr txBox="1"/>
+            <p:nvPr/>
+          </p:nvSpPr>
+          <p:spPr>
+            <a:xfrm>
+              <a:off x="769995" y="2308869"/>
+              <a:ext cx="1720343" cy="369332"/>
+            </a:xfrm>
+            <a:prstGeom prst="rect">
+              <a:avLst/>
+            </a:prstGeom>
+            <a:noFill/>
+          </p:spPr>
+          <p:txBody>
+            <a:bodyPr wrap="none" rtlCol="0">
+              <a:spAutoFit/>
+            </a:bodyPr>
+            <a:lstStyle/>
+            <a:p>
+              <a:r>
+                <a:rPr lang="en-US" dirty="0"/>
+                <a:t>Number of titles</a:t>
+              </a:r>
+            </a:p>
+          </p:txBody>
+        </p:sp>
+        <p:sp>
+          <p:nvSpPr>
+            <p:cNvPr id="24" name="TextBox 23">
+              <a:extLst>
+                <a:ext uri="{FF2B5EF4-FFF2-40B4-BE49-F238E27FC236}">
+                  <a16:creationId xmlns:a16="http://schemas.microsoft.com/office/drawing/2014/main" id="{79F23417-5319-4370-97B3-E6F055053E48}"/>
+                </a:ext>
+              </a:extLst>
+            </p:cNvPr>
+            <p:cNvSpPr txBox="1"/>
+            <p:nvPr/>
+          </p:nvSpPr>
+          <p:spPr>
+            <a:xfrm>
+              <a:off x="8328799" y="2390485"/>
+              <a:ext cx="1593898" cy="369332"/>
+            </a:xfrm>
+            <a:prstGeom prst="rect">
+              <a:avLst/>
+            </a:prstGeom>
+            <a:noFill/>
+          </p:spPr>
+          <p:txBody>
+            <a:bodyPr wrap="none" rtlCol="0">
+              <a:spAutoFit/>
+            </a:bodyPr>
+            <a:lstStyle/>
+            <a:p>
+              <a:r>
+                <a:rPr lang="en-US" dirty="0"/>
+                <a:t>Sub-Categories</a:t>
+              </a:r>
+            </a:p>
+          </p:txBody>
+        </p:sp>
+        <p:sp>
+          <p:nvSpPr>
+            <p:cNvPr id="25" name="TextBox 24">
+              <a:extLst>
+                <a:ext uri="{FF2B5EF4-FFF2-40B4-BE49-F238E27FC236}">
+                  <a16:creationId xmlns:a16="http://schemas.microsoft.com/office/drawing/2014/main" id="{C9764DFC-9E7D-4FCB-9A72-D132DB439D70}"/>
+                </a:ext>
+              </a:extLst>
+            </p:cNvPr>
+            <p:cNvSpPr txBox="1"/>
+            <p:nvPr/>
+          </p:nvSpPr>
+          <p:spPr>
+            <a:xfrm>
+              <a:off x="8328799" y="3350860"/>
+              <a:ext cx="1775166" cy="369332"/>
+            </a:xfrm>
+            <a:prstGeom prst="rect">
+              <a:avLst/>
+            </a:prstGeom>
+            <a:noFill/>
+          </p:spPr>
+          <p:txBody>
+            <a:bodyPr wrap="none" rtlCol="0">
+              <a:spAutoFit/>
+            </a:bodyPr>
+            <a:lstStyle/>
+            <a:p>
+              <a:r>
+                <a:rPr lang="en-US" dirty="0"/>
+                <a:t>Results Page URL</a:t>
+              </a:r>
+            </a:p>
+          </p:txBody>
+        </p:sp>
+        <p:sp>
+          <p:nvSpPr>
+            <p:cNvPr id="26" name="TextBox 25">
+              <a:extLst>
+                <a:ext uri="{FF2B5EF4-FFF2-40B4-BE49-F238E27FC236}">
+                  <a16:creationId xmlns:a16="http://schemas.microsoft.com/office/drawing/2014/main" id="{B234E834-22D1-498E-8652-66F2BF917452}"/>
+                </a:ext>
+              </a:extLst>
+            </p:cNvPr>
+            <p:cNvSpPr txBox="1"/>
+            <p:nvPr/>
+          </p:nvSpPr>
+          <p:spPr>
+            <a:xfrm>
+              <a:off x="8509263" y="2678201"/>
+              <a:ext cx="2454711" cy="369332"/>
+            </a:xfrm>
+            <a:prstGeom prst="rect">
+              <a:avLst/>
+            </a:prstGeom>
+            <a:noFill/>
+          </p:spPr>
+          <p:txBody>
+            <a:bodyPr wrap="none" rtlCol="0">
+              <a:spAutoFit/>
+            </a:bodyPr>
+            <a:lstStyle/>
+            <a:p>
+              <a:r>
+                <a:rPr lang="en-US" b="1" dirty="0"/>
+                <a:t>Bold</a:t>
+              </a:r>
+              <a:r>
+                <a:rPr lang="en-US" dirty="0"/>
+                <a:t>: No Sub-Categories</a:t>
+              </a:r>
+            </a:p>
+          </p:txBody>
+        </p:sp>
+        <p:sp>
+          <p:nvSpPr>
+            <p:cNvPr id="27" name="TextBox 26">
+              <a:extLst>
+                <a:ext uri="{FF2B5EF4-FFF2-40B4-BE49-F238E27FC236}">
+                  <a16:creationId xmlns:a16="http://schemas.microsoft.com/office/drawing/2014/main" id="{688CB7EF-33FD-49F4-A8B4-E939EDF69265}"/>
+                </a:ext>
+              </a:extLst>
+            </p:cNvPr>
+            <p:cNvSpPr txBox="1"/>
+            <p:nvPr/>
+          </p:nvSpPr>
+          <p:spPr>
+            <a:xfrm>
+              <a:off x="8328799" y="1628224"/>
+              <a:ext cx="2153475" cy="369332"/>
+            </a:xfrm>
+            <a:prstGeom prst="rect">
+              <a:avLst/>
+            </a:prstGeom>
+            <a:noFill/>
+          </p:spPr>
+          <p:txBody>
+            <a:bodyPr wrap="none" rtlCol="0">
+              <a:spAutoFit/>
+            </a:bodyPr>
+            <a:lstStyle/>
+            <a:p>
+              <a:r>
+                <a:rPr lang="en-US" dirty="0"/>
+                <a:t>Alt: Results Page URL</a:t>
+              </a:r>
+            </a:p>
+          </p:txBody>
+        </p:sp>
+      </p:grpSp>
     </p:spTree>
     <p:extLst>
       <p:ext uri="{BB962C8B-B14F-4D97-AF65-F5344CB8AC3E}">
-        <p14:creationId xmlns:p14="http://schemas.microsoft.com/office/powerpoint/2010/main" val="2889578137"/>
+        <p14:creationId xmlns:p14="http://schemas.microsoft.com/office/powerpoint/2010/main" val="3158605333"/>
       </p:ext>
     </p:extLst>
   </p:cSld>
@@ -5390,63 +6755,1059 @@
           <a:chExt cx="0" cy="0"/>
         </a:xfrm>
       </p:grpSpPr>
-      <p:sp>
-        <p:nvSpPr>
-          <p:cNvPr id="2" name="Title 1">
+      <p:grpSp>
+        <p:nvGrpSpPr>
+          <p:cNvPr id="15" name="Group 14">
             <a:extLst>
               <a:ext uri="{FF2B5EF4-FFF2-40B4-BE49-F238E27FC236}">
-                <a16:creationId xmlns:a16="http://schemas.microsoft.com/office/drawing/2014/main" id="{D702522F-EF60-40EB-A014-0415DF24B51B}"/>
+                <a16:creationId xmlns:a16="http://schemas.microsoft.com/office/drawing/2014/main" id="{AEDB8260-A731-4F7A-BAF2-1721BA4318D6}"/>
               </a:ext>
             </a:extLst>
           </p:cNvPr>
-          <p:cNvSpPr>
-            <a:spLocks noGrp="1"/>
-          </p:cNvSpPr>
-          <p:nvPr>
-            <p:ph type="title"/>
-          </p:nvPr>
-        </p:nvSpPr>
-        <p:spPr/>
-        <p:txBody>
-          <a:bodyPr/>
-          <a:lstStyle/>
-          <a:p>
-            <a:r>
-              <a:rPr lang="en-US" dirty="0"/>
-              <a:t>Network diagram</a:t>
-            </a:r>
-          </a:p>
-        </p:txBody>
-      </p:sp>
-      <p:sp>
-        <p:nvSpPr>
-          <p:cNvPr id="3" name="Content Placeholder 2">
+          <p:cNvGrpSpPr/>
+          <p:nvPr/>
+        </p:nvGrpSpPr>
+        <p:grpSpPr>
+          <a:xfrm>
+            <a:off x="1512409" y="5318317"/>
+            <a:ext cx="9167177" cy="914400"/>
+            <a:chOff x="1496854" y="4972050"/>
+            <a:chExt cx="9167177" cy="914400"/>
+          </a:xfrm>
+        </p:grpSpPr>
+        <p:sp>
+          <p:nvSpPr>
+            <p:cNvPr id="16" name="Rectangle: Rounded Corners 15">
+              <a:extLst>
+                <a:ext uri="{FF2B5EF4-FFF2-40B4-BE49-F238E27FC236}">
+                  <a16:creationId xmlns:a16="http://schemas.microsoft.com/office/drawing/2014/main" id="{DD93FCE5-8A99-42AF-95C3-452C27AE453A}"/>
+                </a:ext>
+              </a:extLst>
+            </p:cNvPr>
+            <p:cNvSpPr/>
+            <p:nvPr/>
+          </p:nvSpPr>
+          <p:spPr>
+            <a:xfrm>
+              <a:off x="1496854" y="4972050"/>
+              <a:ext cx="2309177" cy="914400"/>
+            </a:xfrm>
+            <a:prstGeom prst="roundRect">
+              <a:avLst/>
+            </a:prstGeom>
+            <a:solidFill>
+              <a:schemeClr val="bg1"/>
+            </a:solidFill>
+            <a:ln w="28575">
+              <a:solidFill>
+                <a:schemeClr val="tx1"/>
+              </a:solidFill>
+            </a:ln>
+          </p:spPr>
+          <p:style>
+            <a:lnRef idx="2">
+              <a:schemeClr val="accent6"/>
+            </a:lnRef>
+            <a:fillRef idx="1">
+              <a:schemeClr val="lt1"/>
+            </a:fillRef>
+            <a:effectRef idx="0">
+              <a:schemeClr val="accent6"/>
+            </a:effectRef>
+            <a:fontRef idx="minor">
+              <a:schemeClr val="dk1"/>
+            </a:fontRef>
+          </p:style>
+          <p:txBody>
+            <a:bodyPr rtlCol="0" anchor="ctr"/>
+            <a:lstStyle/>
+            <a:p>
+              <a:pPr algn="ctr"/>
+              <a:r>
+                <a:rPr lang="en-US" dirty="0">
+                  <a:solidFill>
+                    <a:schemeClr val="tx1"/>
+                  </a:solidFill>
+                </a:rPr>
+                <a:t>Scrape Category Structure &amp; Information</a:t>
+              </a:r>
+            </a:p>
+          </p:txBody>
+        </p:sp>
+        <p:sp>
+          <p:nvSpPr>
+            <p:cNvPr id="17" name="Rectangle: Rounded Corners 16">
+              <a:extLst>
+                <a:ext uri="{FF2B5EF4-FFF2-40B4-BE49-F238E27FC236}">
+                  <a16:creationId xmlns:a16="http://schemas.microsoft.com/office/drawing/2014/main" id="{63B27278-50FE-4791-9772-42BDF38D3FC3}"/>
+                </a:ext>
+              </a:extLst>
+            </p:cNvPr>
+            <p:cNvSpPr/>
+            <p:nvPr/>
+          </p:nvSpPr>
+          <p:spPr>
+            <a:xfrm>
+              <a:off x="4925854" y="4972050"/>
+              <a:ext cx="2309177" cy="914400"/>
+            </a:xfrm>
+            <a:prstGeom prst="roundRect">
+              <a:avLst/>
+            </a:prstGeom>
+            <a:ln w="28575">
+              <a:solidFill>
+                <a:schemeClr val="tx1"/>
+              </a:solidFill>
+            </a:ln>
+          </p:spPr>
+          <p:style>
+            <a:lnRef idx="2">
+              <a:schemeClr val="accent6"/>
+            </a:lnRef>
+            <a:fillRef idx="1">
+              <a:schemeClr val="lt1"/>
+            </a:fillRef>
+            <a:effectRef idx="0">
+              <a:schemeClr val="accent6"/>
+            </a:effectRef>
+            <a:fontRef idx="minor">
+              <a:schemeClr val="dk1"/>
+            </a:fontRef>
+          </p:style>
+          <p:txBody>
+            <a:bodyPr rtlCol="0" anchor="ctr"/>
+            <a:lstStyle/>
+            <a:p>
+              <a:pPr algn="ctr"/>
+              <a:r>
+                <a:rPr lang="en-US" dirty="0">
+                  <a:solidFill>
+                    <a:schemeClr val="tx1"/>
+                  </a:solidFill>
+                </a:rPr>
+                <a:t>Link to Category Best Sellers</a:t>
+              </a:r>
+            </a:p>
+          </p:txBody>
+        </p:sp>
+        <p:sp>
+          <p:nvSpPr>
+            <p:cNvPr id="18" name="Rectangle: Rounded Corners 17">
+              <a:extLst>
+                <a:ext uri="{FF2B5EF4-FFF2-40B4-BE49-F238E27FC236}">
+                  <a16:creationId xmlns:a16="http://schemas.microsoft.com/office/drawing/2014/main" id="{31D87C5D-5B14-48BF-8E61-415499C59BC6}"/>
+                </a:ext>
+              </a:extLst>
+            </p:cNvPr>
+            <p:cNvSpPr/>
+            <p:nvPr/>
+          </p:nvSpPr>
+          <p:spPr>
+            <a:xfrm>
+              <a:off x="8354854" y="4972050"/>
+              <a:ext cx="2309177" cy="914400"/>
+            </a:xfrm>
+            <a:prstGeom prst="roundRect">
+              <a:avLst/>
+            </a:prstGeom>
+            <a:solidFill>
+              <a:schemeClr val="accent1">
+                <a:lumMod val="40000"/>
+                <a:lumOff val="60000"/>
+              </a:schemeClr>
+            </a:solidFill>
+            <a:ln w="28575">
+              <a:solidFill>
+                <a:schemeClr val="tx1"/>
+              </a:solidFill>
+            </a:ln>
+          </p:spPr>
+          <p:style>
+            <a:lnRef idx="2">
+              <a:schemeClr val="accent6"/>
+            </a:lnRef>
+            <a:fillRef idx="1">
+              <a:schemeClr val="lt1"/>
+            </a:fillRef>
+            <a:effectRef idx="0">
+              <a:schemeClr val="accent6"/>
+            </a:effectRef>
+            <a:fontRef idx="minor">
+              <a:schemeClr val="dk1"/>
+            </a:fontRef>
+          </p:style>
+          <p:txBody>
+            <a:bodyPr rtlCol="0" anchor="ctr"/>
+            <a:lstStyle/>
+            <a:p>
+              <a:pPr algn="ctr"/>
+              <a:r>
+                <a:rPr lang="en-US" dirty="0">
+                  <a:solidFill>
+                    <a:schemeClr val="tx1"/>
+                  </a:solidFill>
+                </a:rPr>
+                <a:t>Scrape Title Information from Results Page</a:t>
+              </a:r>
+            </a:p>
+          </p:txBody>
+        </p:sp>
+        <p:cxnSp>
+          <p:nvCxnSpPr>
+            <p:cNvPr id="19" name="Straight Arrow Connector 18">
+              <a:extLst>
+                <a:ext uri="{FF2B5EF4-FFF2-40B4-BE49-F238E27FC236}">
+                  <a16:creationId xmlns:a16="http://schemas.microsoft.com/office/drawing/2014/main" id="{D783DDBB-17B8-400A-94B0-2E6C58C1FB3F}"/>
+                </a:ext>
+              </a:extLst>
+            </p:cNvPr>
+            <p:cNvCxnSpPr/>
+            <p:nvPr/>
+          </p:nvCxnSpPr>
+          <p:spPr>
+            <a:xfrm>
+              <a:off x="3977640" y="5429250"/>
+              <a:ext cx="800100" cy="0"/>
+            </a:xfrm>
+            <a:prstGeom prst="straightConnector1">
+              <a:avLst/>
+            </a:prstGeom>
+            <a:ln w="38100">
+              <a:tailEnd type="triangle"/>
+            </a:ln>
+          </p:spPr>
+          <p:style>
+            <a:lnRef idx="1">
+              <a:schemeClr val="accent1"/>
+            </a:lnRef>
+            <a:fillRef idx="0">
+              <a:schemeClr val="accent1"/>
+            </a:fillRef>
+            <a:effectRef idx="0">
+              <a:schemeClr val="accent1"/>
+            </a:effectRef>
+            <a:fontRef idx="minor">
+              <a:schemeClr val="tx1"/>
+            </a:fontRef>
+          </p:style>
+        </p:cxnSp>
+        <p:cxnSp>
+          <p:nvCxnSpPr>
+            <p:cNvPr id="20" name="Straight Arrow Connector 19">
+              <a:extLst>
+                <a:ext uri="{FF2B5EF4-FFF2-40B4-BE49-F238E27FC236}">
+                  <a16:creationId xmlns:a16="http://schemas.microsoft.com/office/drawing/2014/main" id="{942A04D2-2452-40BB-A54B-2DA38F3F0F72}"/>
+                </a:ext>
+              </a:extLst>
+            </p:cNvPr>
+            <p:cNvCxnSpPr/>
+            <p:nvPr/>
+          </p:nvCxnSpPr>
+          <p:spPr>
+            <a:xfrm>
+              <a:off x="7399020" y="5429250"/>
+              <a:ext cx="800100" cy="0"/>
+            </a:xfrm>
+            <a:prstGeom prst="straightConnector1">
+              <a:avLst/>
+            </a:prstGeom>
+            <a:ln w="38100">
+              <a:tailEnd type="triangle"/>
+            </a:ln>
+          </p:spPr>
+          <p:style>
+            <a:lnRef idx="1">
+              <a:schemeClr val="accent1"/>
+            </a:lnRef>
+            <a:fillRef idx="0">
+              <a:schemeClr val="accent1"/>
+            </a:fillRef>
+            <a:effectRef idx="0">
+              <a:schemeClr val="accent1"/>
+            </a:effectRef>
+            <a:fontRef idx="minor">
+              <a:schemeClr val="tx1"/>
+            </a:fontRef>
+          </p:style>
+        </p:cxnSp>
+      </p:grpSp>
+      <p:grpSp>
+        <p:nvGrpSpPr>
+          <p:cNvPr id="25" name="Group 24">
             <a:extLst>
               <a:ext uri="{FF2B5EF4-FFF2-40B4-BE49-F238E27FC236}">
-                <a16:creationId xmlns:a16="http://schemas.microsoft.com/office/drawing/2014/main" id="{7C05DE40-337E-46AD-B4D9-FEF5B56377F6}"/>
+                <a16:creationId xmlns:a16="http://schemas.microsoft.com/office/drawing/2014/main" id="{FE8D6D06-C876-46BA-9B3D-3D31AD7641F3}"/>
               </a:ext>
             </a:extLst>
           </p:cNvPr>
-          <p:cNvSpPr>
-            <a:spLocks noGrp="1"/>
+          <p:cNvGrpSpPr/>
+          <p:nvPr/>
+        </p:nvGrpSpPr>
+        <p:grpSpPr>
+          <a:xfrm>
+            <a:off x="1339088" y="1254290"/>
+            <a:ext cx="9513818" cy="3730352"/>
+            <a:chOff x="1589801" y="1244863"/>
+            <a:chExt cx="9513818" cy="3730352"/>
+          </a:xfrm>
+        </p:grpSpPr>
+        <p:grpSp>
+          <p:nvGrpSpPr>
+            <p:cNvPr id="2" name="Group 1">
+              <a:extLst>
+                <a:ext uri="{FF2B5EF4-FFF2-40B4-BE49-F238E27FC236}">
+                  <a16:creationId xmlns:a16="http://schemas.microsoft.com/office/drawing/2014/main" id="{984E7906-4D02-43BE-82AB-A1FF36C9C7F1}"/>
+                </a:ext>
+              </a:extLst>
+            </p:cNvPr>
+            <p:cNvGrpSpPr/>
+            <p:nvPr/>
+          </p:nvGrpSpPr>
+          <p:grpSpPr>
+            <a:xfrm>
+              <a:off x="3358273" y="1244863"/>
+              <a:ext cx="5475453" cy="3730352"/>
+              <a:chOff x="4842764" y="1664579"/>
+              <a:chExt cx="6630042" cy="4516958"/>
+            </a:xfrm>
+          </p:grpSpPr>
+          <p:pic>
+            <p:nvPicPr>
+              <p:cNvPr id="3" name="Picture 2">
+                <a:extLst>
+                  <a:ext uri="{FF2B5EF4-FFF2-40B4-BE49-F238E27FC236}">
+                    <a16:creationId xmlns:a16="http://schemas.microsoft.com/office/drawing/2014/main" id="{0F432547-FE03-434A-A9EE-D43D29EC5B10}"/>
+                  </a:ext>
+                </a:extLst>
+              </p:cNvPr>
+              <p:cNvPicPr>
+                <a:picLocks noChangeAspect="1"/>
+              </p:cNvPicPr>
+              <p:nvPr/>
+            </p:nvPicPr>
+            <p:blipFill>
+              <a:blip r:embed="rId2"/>
+              <a:stretch>
+                <a:fillRect/>
+              </a:stretch>
+            </p:blipFill>
+            <p:spPr>
+              <a:xfrm>
+                <a:off x="4842764" y="1664579"/>
+                <a:ext cx="6630042" cy="4516958"/>
+              </a:xfrm>
+              <a:prstGeom prst="rect">
+                <a:avLst/>
+              </a:prstGeom>
+              <a:ln>
+                <a:solidFill>
+                  <a:schemeClr val="tx1"/>
+                </a:solidFill>
+              </a:ln>
+            </p:spPr>
+          </p:pic>
+          <p:sp>
+            <p:nvSpPr>
+              <p:cNvPr id="4" name="Rectangle 3">
+                <a:extLst>
+                  <a:ext uri="{FF2B5EF4-FFF2-40B4-BE49-F238E27FC236}">
+                    <a16:creationId xmlns:a16="http://schemas.microsoft.com/office/drawing/2014/main" id="{72814BC7-C8F0-47C1-B2B7-9F2FEC5E58D9}"/>
+                  </a:ext>
+                </a:extLst>
+              </p:cNvPr>
+              <p:cNvSpPr/>
+              <p:nvPr/>
+            </p:nvSpPr>
+            <p:spPr>
+              <a:xfrm>
+                <a:off x="7900479" y="2935610"/>
+                <a:ext cx="1141127" cy="348133"/>
+              </a:xfrm>
+              <a:prstGeom prst="rect">
+                <a:avLst/>
+              </a:prstGeom>
+              <a:noFill/>
+            </p:spPr>
+            <p:style>
+              <a:lnRef idx="2">
+                <a:schemeClr val="accent1">
+                  <a:shade val="50000"/>
+                </a:schemeClr>
+              </a:lnRef>
+              <a:fillRef idx="1">
+                <a:schemeClr val="accent1"/>
+              </a:fillRef>
+              <a:effectRef idx="0">
+                <a:schemeClr val="accent1"/>
+              </a:effectRef>
+              <a:fontRef idx="minor">
+                <a:schemeClr val="lt1"/>
+              </a:fontRef>
+            </p:style>
+            <p:txBody>
+              <a:bodyPr rtlCol="0" anchor="ctr"/>
+              <a:lstStyle/>
+              <a:p>
+                <a:pPr algn="ctr"/>
+                <a:endParaRPr lang="en-US" dirty="0"/>
+              </a:p>
+            </p:txBody>
+          </p:sp>
+          <p:sp>
+            <p:nvSpPr>
+              <p:cNvPr id="5" name="Rectangle 4">
+                <a:extLst>
+                  <a:ext uri="{FF2B5EF4-FFF2-40B4-BE49-F238E27FC236}">
+                    <a16:creationId xmlns:a16="http://schemas.microsoft.com/office/drawing/2014/main" id="{2037482C-DCFB-4B14-96DB-C22DDC5DB08B}"/>
+                  </a:ext>
+                </a:extLst>
+              </p:cNvPr>
+              <p:cNvSpPr/>
+              <p:nvPr/>
+            </p:nvSpPr>
+            <p:spPr>
+              <a:xfrm>
+                <a:off x="4842765" y="2299817"/>
+                <a:ext cx="1937864" cy="348133"/>
+              </a:xfrm>
+              <a:prstGeom prst="rect">
+                <a:avLst/>
+              </a:prstGeom>
+              <a:noFill/>
+            </p:spPr>
+            <p:style>
+              <a:lnRef idx="2">
+                <a:schemeClr val="accent1">
+                  <a:shade val="50000"/>
+                </a:schemeClr>
+              </a:lnRef>
+              <a:fillRef idx="1">
+                <a:schemeClr val="accent1"/>
+              </a:fillRef>
+              <a:effectRef idx="0">
+                <a:schemeClr val="accent1"/>
+              </a:effectRef>
+              <a:fontRef idx="minor">
+                <a:schemeClr val="lt1"/>
+              </a:fontRef>
+            </p:style>
+            <p:txBody>
+              <a:bodyPr rtlCol="0" anchor="ctr"/>
+              <a:lstStyle/>
+              <a:p>
+                <a:pPr algn="ctr"/>
+                <a:endParaRPr lang="en-US" dirty="0"/>
+              </a:p>
+            </p:txBody>
+          </p:sp>
+          <p:sp>
+            <p:nvSpPr>
+              <p:cNvPr id="6" name="Rectangle 5">
+                <a:extLst>
+                  <a:ext uri="{FF2B5EF4-FFF2-40B4-BE49-F238E27FC236}">
+                    <a16:creationId xmlns:a16="http://schemas.microsoft.com/office/drawing/2014/main" id="{DF38759D-637A-4413-91FA-750DB3B8618E}"/>
+                  </a:ext>
+                </a:extLst>
+              </p:cNvPr>
+              <p:cNvSpPr/>
+              <p:nvPr/>
+            </p:nvSpPr>
+            <p:spPr>
+              <a:xfrm>
+                <a:off x="7902863" y="3281362"/>
+                <a:ext cx="1548320" cy="145257"/>
+              </a:xfrm>
+              <a:prstGeom prst="rect">
+                <a:avLst/>
+              </a:prstGeom>
+              <a:noFill/>
+            </p:spPr>
+            <p:style>
+              <a:lnRef idx="2">
+                <a:schemeClr val="accent1">
+                  <a:shade val="50000"/>
+                </a:schemeClr>
+              </a:lnRef>
+              <a:fillRef idx="1">
+                <a:schemeClr val="accent1"/>
+              </a:fillRef>
+              <a:effectRef idx="0">
+                <a:schemeClr val="accent1"/>
+              </a:effectRef>
+              <a:fontRef idx="minor">
+                <a:schemeClr val="lt1"/>
+              </a:fontRef>
+            </p:style>
+            <p:txBody>
+              <a:bodyPr rtlCol="0" anchor="ctr"/>
+              <a:lstStyle/>
+              <a:p>
+                <a:pPr algn="ctr"/>
+                <a:endParaRPr lang="en-US" dirty="0"/>
+              </a:p>
+            </p:txBody>
+          </p:sp>
+          <p:sp>
+            <p:nvSpPr>
+              <p:cNvPr id="7" name="Rectangle 6">
+                <a:extLst>
+                  <a:ext uri="{FF2B5EF4-FFF2-40B4-BE49-F238E27FC236}">
+                    <a16:creationId xmlns:a16="http://schemas.microsoft.com/office/drawing/2014/main" id="{8DB0EEE6-2326-41A9-A523-0CDADFDB151D}"/>
+                  </a:ext>
+                </a:extLst>
+              </p:cNvPr>
+              <p:cNvSpPr/>
+              <p:nvPr/>
+            </p:nvSpPr>
+            <p:spPr>
+              <a:xfrm>
+                <a:off x="7902863" y="3426620"/>
+                <a:ext cx="655350" cy="108374"/>
+              </a:xfrm>
+              <a:prstGeom prst="rect">
+                <a:avLst/>
+              </a:prstGeom>
+              <a:noFill/>
+            </p:spPr>
+            <p:style>
+              <a:lnRef idx="2">
+                <a:schemeClr val="accent1">
+                  <a:shade val="50000"/>
+                </a:schemeClr>
+              </a:lnRef>
+              <a:fillRef idx="1">
+                <a:schemeClr val="accent1"/>
+              </a:fillRef>
+              <a:effectRef idx="0">
+                <a:schemeClr val="accent1"/>
+              </a:effectRef>
+              <a:fontRef idx="minor">
+                <a:schemeClr val="lt1"/>
+              </a:fontRef>
+            </p:style>
+            <p:txBody>
+              <a:bodyPr rtlCol="0" anchor="ctr"/>
+              <a:lstStyle/>
+              <a:p>
+                <a:pPr algn="ctr"/>
+                <a:endParaRPr lang="en-US" dirty="0"/>
+              </a:p>
+            </p:txBody>
+          </p:sp>
+          <p:sp>
+            <p:nvSpPr>
+              <p:cNvPr id="8" name="Rectangle 7">
+                <a:extLst>
+                  <a:ext uri="{FF2B5EF4-FFF2-40B4-BE49-F238E27FC236}">
+                    <a16:creationId xmlns:a16="http://schemas.microsoft.com/office/drawing/2014/main" id="{7618A7D0-2112-48C6-90E5-865E35EA53FE}"/>
+                  </a:ext>
+                </a:extLst>
+              </p:cNvPr>
+              <p:cNvSpPr/>
+              <p:nvPr/>
+            </p:nvSpPr>
+            <p:spPr>
+              <a:xfrm>
+                <a:off x="7900479" y="3538816"/>
+                <a:ext cx="979202" cy="123548"/>
+              </a:xfrm>
+              <a:prstGeom prst="rect">
+                <a:avLst/>
+              </a:prstGeom>
+              <a:noFill/>
+            </p:spPr>
+            <p:style>
+              <a:lnRef idx="2">
+                <a:schemeClr val="accent1">
+                  <a:shade val="50000"/>
+                </a:schemeClr>
+              </a:lnRef>
+              <a:fillRef idx="1">
+                <a:schemeClr val="accent1"/>
+              </a:fillRef>
+              <a:effectRef idx="0">
+                <a:schemeClr val="accent1"/>
+              </a:effectRef>
+              <a:fontRef idx="minor">
+                <a:schemeClr val="lt1"/>
+              </a:fontRef>
+            </p:style>
+            <p:txBody>
+              <a:bodyPr rtlCol="0" anchor="ctr"/>
+              <a:lstStyle/>
+              <a:p>
+                <a:pPr algn="ctr"/>
+                <a:endParaRPr lang="en-US" dirty="0"/>
+              </a:p>
+            </p:txBody>
+          </p:sp>
+          <p:sp>
+            <p:nvSpPr>
+              <p:cNvPr id="9" name="Rectangle 8">
+                <a:extLst>
+                  <a:ext uri="{FF2B5EF4-FFF2-40B4-BE49-F238E27FC236}">
+                    <a16:creationId xmlns:a16="http://schemas.microsoft.com/office/drawing/2014/main" id="{5CB81F15-1EE8-4B7C-A3E0-9319A349535F}"/>
+                  </a:ext>
+                </a:extLst>
+              </p:cNvPr>
+              <p:cNvSpPr/>
+              <p:nvPr/>
+            </p:nvSpPr>
+            <p:spPr>
+              <a:xfrm>
+                <a:off x="7900479" y="3660261"/>
+                <a:ext cx="1029209" cy="123548"/>
+              </a:xfrm>
+              <a:prstGeom prst="rect">
+                <a:avLst/>
+              </a:prstGeom>
+              <a:noFill/>
+            </p:spPr>
+            <p:style>
+              <a:lnRef idx="2">
+                <a:schemeClr val="accent1">
+                  <a:shade val="50000"/>
+                </a:schemeClr>
+              </a:lnRef>
+              <a:fillRef idx="1">
+                <a:schemeClr val="accent1"/>
+              </a:fillRef>
+              <a:effectRef idx="0">
+                <a:schemeClr val="accent1"/>
+              </a:effectRef>
+              <a:fontRef idx="minor">
+                <a:schemeClr val="lt1"/>
+              </a:fontRef>
+            </p:style>
+            <p:txBody>
+              <a:bodyPr rtlCol="0" anchor="ctr"/>
+              <a:lstStyle/>
+              <a:p>
+                <a:pPr algn="ctr"/>
+                <a:endParaRPr lang="en-US" dirty="0"/>
+              </a:p>
+            </p:txBody>
+          </p:sp>
+          <p:sp>
+            <p:nvSpPr>
+              <p:cNvPr id="10" name="Rectangle 9">
+                <a:extLst>
+                  <a:ext uri="{FF2B5EF4-FFF2-40B4-BE49-F238E27FC236}">
+                    <a16:creationId xmlns:a16="http://schemas.microsoft.com/office/drawing/2014/main" id="{7BD33580-4A7E-439C-91FE-6D6297589118}"/>
+                  </a:ext>
+                </a:extLst>
+              </p:cNvPr>
+              <p:cNvSpPr/>
+              <p:nvPr/>
+            </p:nvSpPr>
+            <p:spPr>
+              <a:xfrm>
+                <a:off x="7898096" y="3793889"/>
+                <a:ext cx="962535" cy="123548"/>
+              </a:xfrm>
+              <a:prstGeom prst="rect">
+                <a:avLst/>
+              </a:prstGeom>
+              <a:noFill/>
+            </p:spPr>
+            <p:style>
+              <a:lnRef idx="2">
+                <a:schemeClr val="accent1">
+                  <a:shade val="50000"/>
+                </a:schemeClr>
+              </a:lnRef>
+              <a:fillRef idx="1">
+                <a:schemeClr val="accent1"/>
+              </a:fillRef>
+              <a:effectRef idx="0">
+                <a:schemeClr val="accent1"/>
+              </a:effectRef>
+              <a:fontRef idx="minor">
+                <a:schemeClr val="lt1"/>
+              </a:fontRef>
+            </p:style>
+            <p:txBody>
+              <a:bodyPr rtlCol="0" anchor="ctr"/>
+              <a:lstStyle/>
+              <a:p>
+                <a:pPr algn="ctr"/>
+                <a:endParaRPr lang="en-US" dirty="0"/>
+              </a:p>
+            </p:txBody>
+          </p:sp>
+          <p:sp>
+            <p:nvSpPr>
+              <p:cNvPr id="11" name="Rectangle 10">
+                <a:extLst>
+                  <a:ext uri="{FF2B5EF4-FFF2-40B4-BE49-F238E27FC236}">
+                    <a16:creationId xmlns:a16="http://schemas.microsoft.com/office/drawing/2014/main" id="{F484C1D0-9469-4826-8F47-0AA2B89FE8C5}"/>
+                  </a:ext>
+                </a:extLst>
+              </p:cNvPr>
+              <p:cNvSpPr/>
+              <p:nvPr/>
+            </p:nvSpPr>
+            <p:spPr>
+              <a:xfrm>
+                <a:off x="7900479" y="3927517"/>
+                <a:ext cx="762509" cy="123548"/>
+              </a:xfrm>
+              <a:prstGeom prst="rect">
+                <a:avLst/>
+              </a:prstGeom>
+              <a:noFill/>
+            </p:spPr>
+            <p:style>
+              <a:lnRef idx="2">
+                <a:schemeClr val="accent1">
+                  <a:shade val="50000"/>
+                </a:schemeClr>
+              </a:lnRef>
+              <a:fillRef idx="1">
+                <a:schemeClr val="accent1"/>
+              </a:fillRef>
+              <a:effectRef idx="0">
+                <a:schemeClr val="accent1"/>
+              </a:effectRef>
+              <a:fontRef idx="minor">
+                <a:schemeClr val="lt1"/>
+              </a:fontRef>
+            </p:style>
+            <p:txBody>
+              <a:bodyPr rtlCol="0" anchor="ctr"/>
+              <a:lstStyle/>
+              <a:p>
+                <a:pPr algn="ctr"/>
+                <a:endParaRPr lang="en-US" dirty="0"/>
+              </a:p>
+            </p:txBody>
+          </p:sp>
+          <p:sp>
+            <p:nvSpPr>
+              <p:cNvPr id="12" name="Rectangle 11">
+                <a:extLst>
+                  <a:ext uri="{FF2B5EF4-FFF2-40B4-BE49-F238E27FC236}">
+                    <a16:creationId xmlns:a16="http://schemas.microsoft.com/office/drawing/2014/main" id="{5A186BCD-5355-4FE0-BD9B-B59FDC1BCF06}"/>
+                  </a:ext>
+                </a:extLst>
+              </p:cNvPr>
+              <p:cNvSpPr/>
+              <p:nvPr/>
+            </p:nvSpPr>
+            <p:spPr>
+              <a:xfrm>
+                <a:off x="7900479" y="4051065"/>
+                <a:ext cx="657734" cy="123548"/>
+              </a:xfrm>
+              <a:prstGeom prst="rect">
+                <a:avLst/>
+              </a:prstGeom>
+              <a:noFill/>
+            </p:spPr>
+            <p:style>
+              <a:lnRef idx="2">
+                <a:schemeClr val="accent1">
+                  <a:shade val="50000"/>
+                </a:schemeClr>
+              </a:lnRef>
+              <a:fillRef idx="1">
+                <a:schemeClr val="accent1"/>
+              </a:fillRef>
+              <a:effectRef idx="0">
+                <a:schemeClr val="accent1"/>
+              </a:effectRef>
+              <a:fontRef idx="minor">
+                <a:schemeClr val="lt1"/>
+              </a:fontRef>
+            </p:style>
+            <p:txBody>
+              <a:bodyPr rtlCol="0" anchor="ctr"/>
+              <a:lstStyle/>
+              <a:p>
+                <a:pPr algn="ctr"/>
+                <a:endParaRPr lang="en-US" dirty="0"/>
+              </a:p>
+            </p:txBody>
+          </p:sp>
+          <p:sp>
+            <p:nvSpPr>
+              <p:cNvPr id="13" name="Rectangle 12">
+                <a:extLst>
+                  <a:ext uri="{FF2B5EF4-FFF2-40B4-BE49-F238E27FC236}">
+                    <a16:creationId xmlns:a16="http://schemas.microsoft.com/office/drawing/2014/main" id="{6FED8FF3-D6D4-4C89-9206-732509B62D28}"/>
+                  </a:ext>
+                </a:extLst>
+              </p:cNvPr>
+              <p:cNvSpPr/>
+              <p:nvPr/>
+            </p:nvSpPr>
+            <p:spPr>
+              <a:xfrm>
+                <a:off x="8558213" y="4054283"/>
+                <a:ext cx="447675" cy="123548"/>
+              </a:xfrm>
+              <a:prstGeom prst="rect">
+                <a:avLst/>
+              </a:prstGeom>
+              <a:noFill/>
+            </p:spPr>
+            <p:style>
+              <a:lnRef idx="2">
+                <a:schemeClr val="accent1">
+                  <a:shade val="50000"/>
+                </a:schemeClr>
+              </a:lnRef>
+              <a:fillRef idx="1">
+                <a:schemeClr val="accent1"/>
+              </a:fillRef>
+              <a:effectRef idx="0">
+                <a:schemeClr val="accent1"/>
+              </a:effectRef>
+              <a:fontRef idx="minor">
+                <a:schemeClr val="lt1"/>
+              </a:fontRef>
+            </p:style>
+            <p:txBody>
+              <a:bodyPr rtlCol="0" anchor="ctr"/>
+              <a:lstStyle/>
+              <a:p>
+                <a:pPr algn="ctr"/>
+                <a:endParaRPr lang="en-US" dirty="0"/>
+              </a:p>
+            </p:txBody>
+          </p:sp>
+          <p:sp>
+            <p:nvSpPr>
+              <p:cNvPr id="14" name="Rectangle 13">
+                <a:extLst>
+                  <a:ext uri="{FF2B5EF4-FFF2-40B4-BE49-F238E27FC236}">
+                    <a16:creationId xmlns:a16="http://schemas.microsoft.com/office/drawing/2014/main" id="{07653F9F-FDE2-4143-B0F5-4EC45F367ADA}"/>
+                  </a:ext>
+                </a:extLst>
+              </p:cNvPr>
+              <p:cNvSpPr/>
+              <p:nvPr/>
+            </p:nvSpPr>
+            <p:spPr>
+              <a:xfrm>
+                <a:off x="9834450" y="2961248"/>
+                <a:ext cx="983605" cy="228673"/>
+              </a:xfrm>
+              <a:prstGeom prst="rect">
+                <a:avLst/>
+              </a:prstGeom>
+              <a:noFill/>
+            </p:spPr>
+            <p:style>
+              <a:lnRef idx="2">
+                <a:schemeClr val="accent1">
+                  <a:shade val="50000"/>
+                </a:schemeClr>
+              </a:lnRef>
+              <a:fillRef idx="1">
+                <a:schemeClr val="accent1"/>
+              </a:fillRef>
+              <a:effectRef idx="0">
+                <a:schemeClr val="accent1"/>
+              </a:effectRef>
+              <a:fontRef idx="minor">
+                <a:schemeClr val="lt1"/>
+              </a:fontRef>
+            </p:style>
+            <p:txBody>
+              <a:bodyPr rtlCol="0" anchor="ctr"/>
+              <a:lstStyle/>
+              <a:p>
+                <a:pPr algn="ctr"/>
+                <a:endParaRPr lang="en-US" dirty="0"/>
+              </a:p>
+            </p:txBody>
+          </p:sp>
+        </p:grpSp>
+        <p:sp>
+          <p:nvSpPr>
+            <p:cNvPr id="21" name="TextBox 20">
+              <a:extLst>
+                <a:ext uri="{FF2B5EF4-FFF2-40B4-BE49-F238E27FC236}">
+                  <a16:creationId xmlns:a16="http://schemas.microsoft.com/office/drawing/2014/main" id="{2BB8D012-04E8-4A7C-BEDA-711480BA165D}"/>
+                </a:ext>
+              </a:extLst>
+            </p:cNvPr>
+            <p:cNvSpPr txBox="1"/>
+            <p:nvPr/>
+          </p:nvSpPr>
+          <p:spPr>
+            <a:xfrm>
+              <a:off x="1589801" y="1687652"/>
+              <a:ext cx="1633524" cy="369332"/>
+            </a:xfrm>
+            <a:prstGeom prst="rect">
+              <a:avLst/>
+            </a:prstGeom>
+            <a:noFill/>
+          </p:spPr>
+          <p:txBody>
+            <a:bodyPr wrap="none" rtlCol="0">
+              <a:spAutoFit/>
+            </a:bodyPr>
+            <a:lstStyle/>
+            <a:p>
+              <a:r>
+                <a:rPr lang="en-US" dirty="0"/>
+                <a:t>Category Name</a:t>
+              </a:r>
+            </a:p>
+          </p:txBody>
+        </p:sp>
+        <p:sp>
+          <p:nvSpPr>
+            <p:cNvPr id="23" name="TextBox 22">
+              <a:extLst>
+                <a:ext uri="{FF2B5EF4-FFF2-40B4-BE49-F238E27FC236}">
+                  <a16:creationId xmlns:a16="http://schemas.microsoft.com/office/drawing/2014/main" id="{46CE510C-1FAB-424D-BDFE-CB49BFF285F7}"/>
+                </a:ext>
+              </a:extLst>
+            </p:cNvPr>
+            <p:cNvSpPr txBox="1"/>
+            <p:nvPr/>
+          </p:nvSpPr>
+          <p:spPr>
+            <a:xfrm>
+              <a:off x="8947772" y="1572203"/>
+              <a:ext cx="2155847" cy="2862322"/>
+            </a:xfrm>
+            <a:prstGeom prst="rect">
+              <a:avLst/>
+            </a:prstGeom>
+            <a:noFill/>
+          </p:spPr>
+          <p:txBody>
+            <a:bodyPr wrap="none" rtlCol="0">
+              <a:spAutoFit/>
+            </a:bodyPr>
+            <a:lstStyle/>
+            <a:p>
+              <a:r>
+                <a:rPr lang="en-US" dirty="0"/>
+                <a:t>Title Information:</a:t>
+              </a:r>
+            </a:p>
+            <a:p>
+              <a:r>
+                <a:rPr lang="en-US" dirty="0"/>
+                <a:t>	Title</a:t>
+              </a:r>
+            </a:p>
+            <a:p>
+              <a:r>
+                <a:rPr lang="en-US" dirty="0"/>
+                <a:t>	Subtitle</a:t>
+              </a:r>
+            </a:p>
+            <a:p>
+              <a:r>
+                <a:rPr lang="en-US" dirty="0"/>
+                <a:t>	Author</a:t>
+              </a:r>
+            </a:p>
+            <a:p>
+              <a:r>
+                <a:rPr lang="en-US" dirty="0"/>
+                <a:t>	Narrator</a:t>
+              </a:r>
+            </a:p>
+            <a:p>
+              <a:r>
+                <a:rPr lang="en-US" dirty="0"/>
+                <a:t>	Length</a:t>
+              </a:r>
+            </a:p>
+            <a:p>
+              <a:r>
+                <a:rPr lang="en-US" dirty="0"/>
+                <a:t>	Language</a:t>
+              </a:r>
+            </a:p>
+            <a:p>
+              <a:r>
+                <a:rPr lang="en-US" dirty="0"/>
+                <a:t>	Start Rating</a:t>
+              </a:r>
+            </a:p>
+            <a:p>
+              <a:r>
+                <a:rPr lang="en-US" dirty="0"/>
+                <a:t>	Number Ratings</a:t>
+              </a:r>
+            </a:p>
+            <a:p>
+              <a:r>
+                <a:rPr lang="en-US" dirty="0"/>
+                <a:t>	Price</a:t>
+              </a:r>
+            </a:p>
+          </p:txBody>
+        </p:sp>
+      </p:grpSp>
+      <p:sp>
+        <p:nvSpPr>
+          <p:cNvPr id="24" name="Title 1">
+            <a:extLst>
+              <a:ext uri="{FF2B5EF4-FFF2-40B4-BE49-F238E27FC236}">
+                <a16:creationId xmlns:a16="http://schemas.microsoft.com/office/drawing/2014/main" id="{D0B97BAB-7DC2-4CF0-9AAF-AF70829BB727}"/>
+              </a:ext>
+            </a:extLst>
+          </p:cNvPr>
+          <p:cNvSpPr txBox="1">
+            <a:spLocks/>
           </p:cNvSpPr>
-          <p:nvPr>
-            <p:ph idx="1"/>
-          </p:nvPr>
-        </p:nvSpPr>
-        <p:spPr/>
+          <p:nvPr/>
+        </p:nvSpPr>
+        <p:spPr>
+          <a:xfrm>
+            <a:off x="1066798" y="209982"/>
+            <a:ext cx="10058400" cy="870094"/>
+          </a:xfrm>
+          <a:prstGeom prst="rect">
+            <a:avLst/>
+          </a:prstGeom>
+        </p:spPr>
         <p:txBody>
           <a:bodyPr/>
-          <a:lstStyle/>
-          <a:p>
-            <a:endParaRPr lang="en-US"/>
+          <a:lstStyle>
+            <a:lvl1pPr algn="l" defTabSz="914400" rtl="0" eaLnBrk="1" latinLnBrk="0" hangingPunct="1">
+              <a:lnSpc>
+                <a:spcPct val="85000"/>
+              </a:lnSpc>
+              <a:spcBef>
+                <a:spcPct val="0"/>
+              </a:spcBef>
+              <a:buNone/>
+              <a:defRPr sz="4800" kern="1200" spc="-50" baseline="0">
+                <a:solidFill>
+                  <a:schemeClr val="tx1">
+                    <a:lumMod val="75000"/>
+                    <a:lumOff val="25000"/>
+                  </a:schemeClr>
+                </a:solidFill>
+                <a:latin typeface="+mj-lt"/>
+                <a:ea typeface="+mj-ea"/>
+                <a:cs typeface="+mj-cs"/>
+              </a:defRPr>
+            </a:lvl1pPr>
+          </a:lstStyle>
+          <a:p>
+            <a:r>
+              <a:rPr lang="en-US" dirty="0"/>
+              <a:t>Title Scraping</a:t>
+            </a:r>
           </a:p>
         </p:txBody>
       </p:sp>
     </p:spTree>
     <p:extLst>
       <p:ext uri="{BB962C8B-B14F-4D97-AF65-F5344CB8AC3E}">
-        <p14:creationId xmlns:p14="http://schemas.microsoft.com/office/powerpoint/2010/main" val="1775495912"/>
+        <p14:creationId xmlns:p14="http://schemas.microsoft.com/office/powerpoint/2010/main" val="2647319182"/>
       </p:ext>
     </p:extLst>
   </p:cSld>
@@ -5478,7 +7839,7 @@
           <p:cNvPr id="2" name="Title 1">
             <a:extLst>
               <a:ext uri="{FF2B5EF4-FFF2-40B4-BE49-F238E27FC236}">
-                <a16:creationId xmlns:a16="http://schemas.microsoft.com/office/drawing/2014/main" id="{DDF1A02C-3113-4E1E-AADF-5C9300810730}"/>
+                <a16:creationId xmlns:a16="http://schemas.microsoft.com/office/drawing/2014/main" id="{8AB1FFBA-C49C-4D27-9F5C-8C91B59FBE93}"/>
               </a:ext>
             </a:extLst>
           </p:cNvPr>
@@ -5496,40 +7857,166 @@
           <a:p>
             <a:r>
               <a:rPr lang="en-US" dirty="0"/>
-              <a:t>Correlations</a:t>
-            </a:r>
-          </a:p>
-        </p:txBody>
-      </p:sp>
-      <p:sp>
-        <p:nvSpPr>
-          <p:cNvPr id="3" name="Content Placeholder 2">
+              <a:t>Book Categories</a:t>
+            </a:r>
+          </a:p>
+        </p:txBody>
+      </p:sp>
+      <p:pic>
+        <p:nvPicPr>
+          <p:cNvPr id="13" name="Content Placeholder 12" descr="Shape, square&#10;&#10;Description automatically generated">
             <a:extLst>
               <a:ext uri="{FF2B5EF4-FFF2-40B4-BE49-F238E27FC236}">
-                <a16:creationId xmlns:a16="http://schemas.microsoft.com/office/drawing/2014/main" id="{C0AE8BE8-6AF6-4841-98F8-281C088CA3A4}"/>
+                <a16:creationId xmlns:a16="http://schemas.microsoft.com/office/drawing/2014/main" id="{6C56C88D-1072-4C2D-BB2E-81FC6E8177C4}"/>
               </a:ext>
             </a:extLst>
           </p:cNvPr>
-          <p:cNvSpPr>
-            <a:spLocks noGrp="1"/>
-          </p:cNvSpPr>
+          <p:cNvPicPr>
+            <a:picLocks noGrp="1" noChangeAspect="1"/>
+          </p:cNvPicPr>
           <p:nvPr>
             <p:ph idx="1"/>
           </p:nvPr>
-        </p:nvSpPr>
-        <p:spPr/>
-        <p:txBody>
-          <a:bodyPr/>
+        </p:nvPicPr>
+        <p:blipFill>
+          <a:blip r:embed="rId2">
+            <a:extLst>
+              <a:ext uri="{28A0092B-C50C-407E-A947-70E740481C1C}">
+                <a14:useLocalDpi xmlns:a14="http://schemas.microsoft.com/office/drawing/2010/main" val="0"/>
+              </a:ext>
+            </a:extLst>
+          </a:blip>
+          <a:stretch>
+            <a:fillRect/>
+          </a:stretch>
+        </p:blipFill>
+        <p:spPr>
+          <a:xfrm>
+            <a:off x="1097280" y="1783667"/>
+            <a:ext cx="4534817" cy="4534817"/>
+          </a:xfrm>
+        </p:spPr>
+      </p:pic>
+      <p:sp>
+        <p:nvSpPr>
+          <p:cNvPr id="16" name="Left Brace 15">
+            <a:extLst>
+              <a:ext uri="{FF2B5EF4-FFF2-40B4-BE49-F238E27FC236}">
+                <a16:creationId xmlns:a16="http://schemas.microsoft.com/office/drawing/2014/main" id="{8CDCAC04-95D5-4439-ADA0-F8E5250381FC}"/>
+              </a:ext>
+            </a:extLst>
+          </p:cNvPr>
+          <p:cNvSpPr/>
+          <p:nvPr/>
+        </p:nvSpPr>
+        <p:spPr>
+          <a:xfrm rot="5400000">
+            <a:off x="3939009" y="4124944"/>
+            <a:ext cx="185931" cy="2380949"/>
+          </a:xfrm>
+          <a:prstGeom prst="leftBrace">
+            <a:avLst/>
+          </a:prstGeom>
+          <a:ln w="19050"/>
+        </p:spPr>
+        <p:style>
+          <a:lnRef idx="1">
+            <a:schemeClr val="accent1"/>
+          </a:lnRef>
+          <a:fillRef idx="0">
+            <a:schemeClr val="accent1"/>
+          </a:fillRef>
+          <a:effectRef idx="0">
+            <a:schemeClr val="accent1"/>
+          </a:effectRef>
+          <a:fontRef idx="minor">
+            <a:schemeClr val="tx1"/>
+          </a:fontRef>
+        </p:style>
+        <p:txBody>
+          <a:bodyPr rtlCol="0" anchor="ctr"/>
           <a:lstStyle/>
           <a:p>
+            <a:pPr algn="ctr"/>
             <a:endParaRPr lang="en-US"/>
           </a:p>
         </p:txBody>
       </p:sp>
+      <p:sp>
+        <p:nvSpPr>
+          <p:cNvPr id="17" name="TextBox 16">
+            <a:extLst>
+              <a:ext uri="{FF2B5EF4-FFF2-40B4-BE49-F238E27FC236}">
+                <a16:creationId xmlns:a16="http://schemas.microsoft.com/office/drawing/2014/main" id="{B123436B-D07E-423D-AFF2-A611B65B3BE2}"/>
+              </a:ext>
+            </a:extLst>
+          </p:cNvPr>
+          <p:cNvSpPr txBox="1"/>
+          <p:nvPr/>
+        </p:nvSpPr>
+        <p:spPr>
+          <a:xfrm>
+            <a:off x="3187512" y="4914676"/>
+            <a:ext cx="1688924" cy="307777"/>
+          </a:xfrm>
+          <a:prstGeom prst="rect">
+            <a:avLst/>
+          </a:prstGeom>
+          <a:noFill/>
+        </p:spPr>
+        <p:txBody>
+          <a:bodyPr wrap="none" rtlCol="0">
+            <a:spAutoFit/>
+          </a:bodyPr>
+          <a:lstStyle/>
+          <a:p>
+            <a:r>
+              <a:rPr lang="en-US" sz="1400" dirty="0"/>
+              <a:t>Top-Level Categories</a:t>
+            </a:r>
+          </a:p>
+        </p:txBody>
+      </p:sp>
+      <p:pic>
+        <p:nvPicPr>
+          <p:cNvPr id="19" name="Picture 18" descr="Chart, histogram&#10;&#10;Description automatically generated">
+            <a:extLst>
+              <a:ext uri="{FF2B5EF4-FFF2-40B4-BE49-F238E27FC236}">
+                <a16:creationId xmlns:a16="http://schemas.microsoft.com/office/drawing/2014/main" id="{74D7A5D7-724C-42B3-BFF1-A19206E61F3C}"/>
+              </a:ext>
+            </a:extLst>
+          </p:cNvPr>
+          <p:cNvPicPr>
+            <a:picLocks noChangeAspect="1"/>
+          </p:cNvPicPr>
+          <p:nvPr/>
+        </p:nvPicPr>
+        <p:blipFill>
+          <a:blip r:embed="rId3">
+            <a:extLst>
+              <a:ext uri="{28A0092B-C50C-407E-A947-70E740481C1C}">
+                <a14:useLocalDpi xmlns:a14="http://schemas.microsoft.com/office/drawing/2010/main" val="0"/>
+              </a:ext>
+            </a:extLst>
+          </a:blip>
+          <a:stretch>
+            <a:fillRect/>
+          </a:stretch>
+        </p:blipFill>
+        <p:spPr>
+          <a:xfrm>
+            <a:off x="6255368" y="1830802"/>
+            <a:ext cx="4534818" cy="4414531"/>
+          </a:xfrm>
+          <a:prstGeom prst="rect">
+            <a:avLst/>
+          </a:prstGeom>
+        </p:spPr>
+      </p:pic>
     </p:spTree>
     <p:extLst>
       <p:ext uri="{BB962C8B-B14F-4D97-AF65-F5344CB8AC3E}">
-        <p14:creationId xmlns:p14="http://schemas.microsoft.com/office/powerpoint/2010/main" val="3995667682"/>
+        <p14:creationId xmlns:p14="http://schemas.microsoft.com/office/powerpoint/2010/main" val="2889578137"/>
       </p:ext>
     </p:extLst>
   </p:cSld>
@@ -5556,63 +8043,217 @@
           <a:chExt cx="0" cy="0"/>
         </a:xfrm>
       </p:grpSpPr>
-      <p:sp>
-        <p:nvSpPr>
-          <p:cNvPr id="2" name="Title 1">
+      <p:pic>
+        <p:nvPicPr>
+          <p:cNvPr id="2" name="Content Placeholder 12" descr="Shape, square&#10;&#10;Description automatically generated">
             <a:extLst>
               <a:ext uri="{FF2B5EF4-FFF2-40B4-BE49-F238E27FC236}">
-                <a16:creationId xmlns:a16="http://schemas.microsoft.com/office/drawing/2014/main" id="{37011FF3-5E9B-4667-BBA3-BB9DD8969BBA}"/>
+                <a16:creationId xmlns:a16="http://schemas.microsoft.com/office/drawing/2014/main" id="{05F950B4-F982-415D-859E-184022B6F602}"/>
               </a:ext>
             </a:extLst>
           </p:cNvPr>
-          <p:cNvSpPr>
-            <a:spLocks noGrp="1"/>
-          </p:cNvSpPr>
-          <p:nvPr>
-            <p:ph type="title"/>
-          </p:nvPr>
-        </p:nvSpPr>
-        <p:spPr/>
-        <p:txBody>
-          <a:bodyPr/>
-          <a:lstStyle/>
-          <a:p>
-            <a:r>
-              <a:rPr lang="en-US" dirty="0"/>
-              <a:t>Timeseries</a:t>
-            </a:r>
-          </a:p>
-        </p:txBody>
-      </p:sp>
-      <p:sp>
-        <p:nvSpPr>
-          <p:cNvPr id="3" name="Content Placeholder 2">
+          <p:cNvPicPr>
+            <a:picLocks noChangeAspect="1"/>
+          </p:cNvPicPr>
+          <p:nvPr/>
+        </p:nvPicPr>
+        <p:blipFill>
+          <a:blip r:embed="rId2">
+            <a:extLst>
+              <a:ext uri="{28A0092B-C50C-407E-A947-70E740481C1C}">
+                <a14:useLocalDpi xmlns:a14="http://schemas.microsoft.com/office/drawing/2010/main" val="0"/>
+              </a:ext>
+            </a:extLst>
+          </a:blip>
+          <a:stretch>
+            <a:fillRect/>
+          </a:stretch>
+        </p:blipFill>
+        <p:spPr>
+          <a:xfrm>
+            <a:off x="600536" y="1212664"/>
+            <a:ext cx="5134102" cy="5134102"/>
+          </a:xfrm>
+          <a:prstGeom prst="rect">
+            <a:avLst/>
+          </a:prstGeom>
+        </p:spPr>
+      </p:pic>
+      <p:sp>
+        <p:nvSpPr>
+          <p:cNvPr id="3" name="Left Brace 2">
             <a:extLst>
               <a:ext uri="{FF2B5EF4-FFF2-40B4-BE49-F238E27FC236}">
-                <a16:creationId xmlns:a16="http://schemas.microsoft.com/office/drawing/2014/main" id="{BEC3BD65-DE64-436E-BBCF-EE7212139200}"/>
+                <a16:creationId xmlns:a16="http://schemas.microsoft.com/office/drawing/2014/main" id="{2B5F841B-6CDB-4794-A6FC-B4BCC9F895B8}"/>
               </a:ext>
             </a:extLst>
           </p:cNvPr>
-          <p:cNvSpPr>
-            <a:spLocks noGrp="1"/>
+          <p:cNvSpPr/>
+          <p:nvPr/>
+        </p:nvSpPr>
+        <p:spPr>
+          <a:xfrm rot="5400000">
+            <a:off x="3871940" y="3983617"/>
+            <a:ext cx="210502" cy="2695596"/>
+          </a:xfrm>
+          <a:prstGeom prst="leftBrace">
+            <a:avLst/>
+          </a:prstGeom>
+          <a:ln w="19050"/>
+        </p:spPr>
+        <p:style>
+          <a:lnRef idx="1">
+            <a:schemeClr val="accent1"/>
+          </a:lnRef>
+          <a:fillRef idx="0">
+            <a:schemeClr val="accent1"/>
+          </a:fillRef>
+          <a:effectRef idx="0">
+            <a:schemeClr val="accent1"/>
+          </a:effectRef>
+          <a:fontRef idx="minor">
+            <a:schemeClr val="tx1"/>
+          </a:fontRef>
+        </p:style>
+        <p:txBody>
+          <a:bodyPr rtlCol="0" anchor="ctr"/>
+          <a:lstStyle/>
+          <a:p>
+            <a:pPr algn="ctr"/>
+            <a:endParaRPr lang="en-US"/>
+          </a:p>
+        </p:txBody>
+      </p:sp>
+      <p:sp>
+        <p:nvSpPr>
+          <p:cNvPr id="4" name="TextBox 3">
+            <a:extLst>
+              <a:ext uri="{FF2B5EF4-FFF2-40B4-BE49-F238E27FC236}">
+                <a16:creationId xmlns:a16="http://schemas.microsoft.com/office/drawing/2014/main" id="{60A7586A-69F8-4219-A04F-93E29B774C5B}"/>
+              </a:ext>
+            </a:extLst>
+          </p:cNvPr>
+          <p:cNvSpPr txBox="1"/>
+          <p:nvPr/>
+        </p:nvSpPr>
+        <p:spPr>
+          <a:xfrm>
+            <a:off x="3066857" y="4902285"/>
+            <a:ext cx="1912119" cy="307777"/>
+          </a:xfrm>
+          <a:prstGeom prst="rect">
+            <a:avLst/>
+          </a:prstGeom>
+          <a:noFill/>
+        </p:spPr>
+        <p:txBody>
+          <a:bodyPr wrap="square" rtlCol="0">
+            <a:spAutoFit/>
+          </a:bodyPr>
+          <a:lstStyle/>
+          <a:p>
+            <a:r>
+              <a:rPr lang="en-US" sz="1400" dirty="0"/>
+              <a:t>Top-Level Categories</a:t>
+            </a:r>
+          </a:p>
+        </p:txBody>
+      </p:sp>
+      <p:pic>
+        <p:nvPicPr>
+          <p:cNvPr id="5" name="Picture 4" descr="Chart, histogram&#10;&#10;Description automatically generated">
+            <a:extLst>
+              <a:ext uri="{FF2B5EF4-FFF2-40B4-BE49-F238E27FC236}">
+                <a16:creationId xmlns:a16="http://schemas.microsoft.com/office/drawing/2014/main" id="{478FE251-5EC5-4920-A3FE-E1C997AB1C46}"/>
+              </a:ext>
+            </a:extLst>
+          </p:cNvPr>
+          <p:cNvPicPr>
+            <a:picLocks noChangeAspect="1"/>
+          </p:cNvPicPr>
+          <p:nvPr/>
+        </p:nvPicPr>
+        <p:blipFill>
+          <a:blip r:embed="rId3">
+            <a:extLst>
+              <a:ext uri="{28A0092B-C50C-407E-A947-70E740481C1C}">
+                <a14:useLocalDpi xmlns:a14="http://schemas.microsoft.com/office/drawing/2010/main" val="0"/>
+              </a:ext>
+            </a:extLst>
+          </a:blip>
+          <a:stretch>
+            <a:fillRect/>
+          </a:stretch>
+        </p:blipFill>
+        <p:spPr>
+          <a:xfrm>
+            <a:off x="6457364" y="1280755"/>
+            <a:ext cx="5134103" cy="4997920"/>
+          </a:xfrm>
+          <a:prstGeom prst="rect">
+            <a:avLst/>
+          </a:prstGeom>
+        </p:spPr>
+      </p:pic>
+      <p:sp>
+        <p:nvSpPr>
+          <p:cNvPr id="6" name="Title 1">
+            <a:extLst>
+              <a:ext uri="{FF2B5EF4-FFF2-40B4-BE49-F238E27FC236}">
+                <a16:creationId xmlns:a16="http://schemas.microsoft.com/office/drawing/2014/main" id="{6FD61A1A-D6F6-434B-96EE-082FD5821625}"/>
+              </a:ext>
+            </a:extLst>
+          </p:cNvPr>
+          <p:cNvSpPr txBox="1">
+            <a:spLocks/>
           </p:cNvSpPr>
-          <p:nvPr>
-            <p:ph idx="1"/>
-          </p:nvPr>
-        </p:nvSpPr>
-        <p:spPr/>
+          <p:nvPr/>
+        </p:nvSpPr>
+        <p:spPr>
+          <a:xfrm>
+            <a:off x="1097280" y="286604"/>
+            <a:ext cx="10058400" cy="712638"/>
+          </a:xfrm>
+          <a:prstGeom prst="rect">
+            <a:avLst/>
+          </a:prstGeom>
+        </p:spPr>
         <p:txBody>
           <a:bodyPr/>
-          <a:lstStyle/>
-          <a:p>
-            <a:endParaRPr lang="en-US"/>
+          <a:lstStyle>
+            <a:lvl1pPr algn="l" defTabSz="914400" rtl="0" eaLnBrk="1" latinLnBrk="0" hangingPunct="1">
+              <a:lnSpc>
+                <a:spcPct val="85000"/>
+              </a:lnSpc>
+              <a:spcBef>
+                <a:spcPct val="0"/>
+              </a:spcBef>
+              <a:buNone/>
+              <a:defRPr sz="4800" kern="1200" spc="-50" baseline="0">
+                <a:solidFill>
+                  <a:schemeClr val="tx1">
+                    <a:lumMod val="75000"/>
+                    <a:lumOff val="25000"/>
+                  </a:schemeClr>
+                </a:solidFill>
+                <a:latin typeface="+mj-lt"/>
+                <a:ea typeface="+mj-ea"/>
+                <a:cs typeface="+mj-cs"/>
+              </a:defRPr>
+            </a:lvl1pPr>
+          </a:lstStyle>
+          <a:p>
+            <a:r>
+              <a:rPr lang="en-US" dirty="0"/>
+              <a:t>Book Categories</a:t>
+            </a:r>
           </a:p>
         </p:txBody>
       </p:sp>
     </p:spTree>
     <p:extLst>
       <p:ext uri="{BB962C8B-B14F-4D97-AF65-F5344CB8AC3E}">
-        <p14:creationId xmlns:p14="http://schemas.microsoft.com/office/powerpoint/2010/main" val="111741514"/>
+        <p14:creationId xmlns:p14="http://schemas.microsoft.com/office/powerpoint/2010/main" val="2166900309"/>
       </p:ext>
     </p:extLst>
   </p:cSld>
@@ -5644,7 +8285,7 @@
           <p:cNvPr id="2" name="Title 1">
             <a:extLst>
               <a:ext uri="{FF2B5EF4-FFF2-40B4-BE49-F238E27FC236}">
-                <a16:creationId xmlns:a16="http://schemas.microsoft.com/office/drawing/2014/main" id="{7C04B0B4-6287-4307-9B26-94B6842BFA16}"/>
+                <a16:creationId xmlns:a16="http://schemas.microsoft.com/office/drawing/2014/main" id="{41DAA7FD-AF58-4737-A693-EB90A026BFD5}"/>
               </a:ext>
             </a:extLst>
           </p:cNvPr>
@@ -5660,10 +8301,7 @@
           <a:bodyPr/>
           <a:lstStyle/>
           <a:p>
-            <a:r>
-              <a:rPr lang="en-US" dirty="0"/>
-              <a:t>Conclusions</a:t>
-            </a:r>
+            <a:endParaRPr lang="en-US"/>
           </a:p>
         </p:txBody>
       </p:sp>
@@ -5672,7 +8310,7 @@
           <p:cNvPr id="3" name="Content Placeholder 2">
             <a:extLst>
               <a:ext uri="{FF2B5EF4-FFF2-40B4-BE49-F238E27FC236}">
-                <a16:creationId xmlns:a16="http://schemas.microsoft.com/office/drawing/2014/main" id="{EC0D24B7-95BA-4E37-85D1-A6340AD334CF}"/>
+                <a16:creationId xmlns:a16="http://schemas.microsoft.com/office/drawing/2014/main" id="{AED730E3-0416-4D99-BEC3-1A01DF3DB157}"/>
               </a:ext>
             </a:extLst>
           </p:cNvPr>
@@ -5695,7 +8333,7 @@
     </p:spTree>
     <p:extLst>
       <p:ext uri="{BB962C8B-B14F-4D97-AF65-F5344CB8AC3E}">
-        <p14:creationId xmlns:p14="http://schemas.microsoft.com/office/powerpoint/2010/main" val="1242177686"/>
+        <p14:creationId xmlns:p14="http://schemas.microsoft.com/office/powerpoint/2010/main" val="3943919594"/>
       </p:ext>
     </p:extLst>
   </p:cSld>
@@ -5727,7 +8365,7 @@
           <p:cNvPr id="2" name="Title 1">
             <a:extLst>
               <a:ext uri="{FF2B5EF4-FFF2-40B4-BE49-F238E27FC236}">
-                <a16:creationId xmlns:a16="http://schemas.microsoft.com/office/drawing/2014/main" id="{902EBB08-D194-4BFE-A14C-D6D9496A4381}"/>
+                <a16:creationId xmlns:a16="http://schemas.microsoft.com/office/drawing/2014/main" id="{D702522F-EF60-40EB-A014-0415DF24B51B}"/>
               </a:ext>
             </a:extLst>
           </p:cNvPr>
@@ -5745,7 +8383,7 @@
           <a:p>
             <a:r>
               <a:rPr lang="en-US" dirty="0"/>
-              <a:t>Future Work</a:t>
+              <a:t>Network diagram</a:t>
             </a:r>
           </a:p>
         </p:txBody>
@@ -5755,7 +8393,7 @@
           <p:cNvPr id="3" name="Content Placeholder 2">
             <a:extLst>
               <a:ext uri="{FF2B5EF4-FFF2-40B4-BE49-F238E27FC236}">
-                <a16:creationId xmlns:a16="http://schemas.microsoft.com/office/drawing/2014/main" id="{575E0344-172A-44A7-9EDF-4632688E7728}"/>
+                <a16:creationId xmlns:a16="http://schemas.microsoft.com/office/drawing/2014/main" id="{7C05DE40-337E-46AD-B4D9-FEF5B56377F6}"/>
               </a:ext>
             </a:extLst>
           </p:cNvPr>
@@ -5768,90 +8406,17 @@
         </p:nvSpPr>
         <p:spPr/>
         <p:txBody>
-          <a:bodyPr>
-            <a:normAutofit fontScale="70000" lnSpcReduction="20000"/>
-          </a:bodyPr>
+          <a:bodyPr/>
           <a:lstStyle/>
           <a:p>
-            <a:r>
-              <a:rPr lang="en-US" dirty="0"/>
-              <a:t>Audible data collection could be expanded by fine grain review data.</a:t>
-            </a:r>
-          </a:p>
-          <a:p>
-            <a:r>
-              <a:rPr lang="en-US" dirty="0"/>
-              <a:t>Audible might have dynamic categories. Number of titles increased and decreased across categories. </a:t>
-            </a:r>
-          </a:p>
-          <a:p>
-            <a:endParaRPr lang="en-US" dirty="0"/>
-          </a:p>
-          <a:p>
-            <a:r>
-              <a:rPr lang="en-US" dirty="0"/>
-              <a:t>Attempted to scrape Amazon books</a:t>
-            </a:r>
-          </a:p>
-          <a:p>
-            <a:r>
-              <a:rPr lang="en-US" dirty="0"/>
-              <a:t>- Amazon displays a CAPTCHA page after ~500 site visits </a:t>
-            </a:r>
-          </a:p>
-          <a:p>
-            <a:r>
-              <a:rPr lang="en-US" dirty="0"/>
-              <a:t>- Page will be returned for several hours before </a:t>
-            </a:r>
-          </a:p>
-          <a:p>
-            <a:r>
-              <a:rPr lang="en-US" dirty="0"/>
-              <a:t>- Using proxy service (</a:t>
-            </a:r>
-            <a:r>
-              <a:rPr lang="en-US" dirty="0" err="1"/>
-              <a:t>ScraperAPI</a:t>
-            </a:r>
-            <a:r>
-              <a:rPr lang="en-US" dirty="0"/>
-              <a:t>) avoided bans but required payment.</a:t>
-            </a:r>
-          </a:p>
-          <a:p>
-            <a:endParaRPr lang="en-US" dirty="0"/>
-          </a:p>
-          <a:p>
-            <a:r>
-              <a:rPr lang="en-US" dirty="0"/>
-              <a:t>BookShop.org</a:t>
-            </a:r>
-          </a:p>
-          <a:p>
-            <a:r>
-              <a:rPr lang="en-US" dirty="0"/>
-              <a:t>- A new online book shop which shares income with local books stores.</a:t>
-            </a:r>
-          </a:p>
-          <a:p>
-            <a:r>
-              <a:rPr lang="en-US" dirty="0"/>
-              <a:t>- Similar data to Amazon but less reviews.</a:t>
-            </a:r>
-          </a:p>
-          <a:p>
-            <a:r>
-              <a:rPr lang="en-US" dirty="0"/>
-              <a:t>- Slightly elevated prices compared to Amazon.</a:t>
-            </a:r>
+            <a:endParaRPr lang="en-US"/>
           </a:p>
         </p:txBody>
       </p:sp>
     </p:spTree>
     <p:extLst>
       <p:ext uri="{BB962C8B-B14F-4D97-AF65-F5344CB8AC3E}">
-        <p14:creationId xmlns:p14="http://schemas.microsoft.com/office/powerpoint/2010/main" val="2222744620"/>
+        <p14:creationId xmlns:p14="http://schemas.microsoft.com/office/powerpoint/2010/main" val="1775495912"/>
       </p:ext>
     </p:extLst>
   </p:cSld>

</xml_diff>

<commit_message>
continuing data analysis and presentation
</commit_message>
<xml_diff>
--- a/Presentation.pptx
+++ b/Presentation.pptx
@@ -6,19 +6,21 @@
   </p:sldMasterIdLst>
   <p:sldIdLst>
     <p:sldId id="256" r:id="rId2"/>
-    <p:sldId id="257" r:id="rId3"/>
-    <p:sldId id="258" r:id="rId4"/>
-    <p:sldId id="269" r:id="rId5"/>
-    <p:sldId id="270" r:id="rId6"/>
-    <p:sldId id="259" r:id="rId7"/>
-    <p:sldId id="272" r:id="rId8"/>
-    <p:sldId id="271" r:id="rId9"/>
-    <p:sldId id="263" r:id="rId10"/>
-    <p:sldId id="264" r:id="rId11"/>
-    <p:sldId id="265" r:id="rId12"/>
-    <p:sldId id="260" r:id="rId13"/>
-    <p:sldId id="261" r:id="rId14"/>
-    <p:sldId id="262" r:id="rId15"/>
+    <p:sldId id="275" r:id="rId3"/>
+    <p:sldId id="269" r:id="rId4"/>
+    <p:sldId id="272" r:id="rId5"/>
+    <p:sldId id="281" r:id="rId6"/>
+    <p:sldId id="278" r:id="rId7"/>
+    <p:sldId id="276" r:id="rId8"/>
+    <p:sldId id="277" r:id="rId9"/>
+    <p:sldId id="270" r:id="rId10"/>
+    <p:sldId id="279" r:id="rId11"/>
+    <p:sldId id="280" r:id="rId12"/>
+    <p:sldId id="263" r:id="rId13"/>
+    <p:sldId id="265" r:id="rId14"/>
+    <p:sldId id="260" r:id="rId15"/>
+    <p:sldId id="261" r:id="rId16"/>
+    <p:sldId id="262" r:id="rId17"/>
   </p:sldIdLst>
   <p:sldSz cx="12192000" cy="6858000"/>
   <p:notesSz cx="6858000" cy="9144000"/>
@@ -351,7 +353,7 @@
           <a:p>
             <a:fld id="{39BB3832-C1DF-4199-80C5-191220E93956}" type="datetimeFigureOut">
               <a:rPr lang="en-US" smtClean="0"/>
-              <a:t>5/23/2021</a:t>
+              <a:t>5/24/2021</a:t>
             </a:fld>
             <a:endParaRPr lang="en-US"/>
           </a:p>
@@ -559,7 +561,7 @@
           <a:p>
             <a:fld id="{39BB3832-C1DF-4199-80C5-191220E93956}" type="datetimeFigureOut">
               <a:rPr lang="en-US" smtClean="0"/>
-              <a:t>5/23/2021</a:t>
+              <a:t>5/24/2021</a:t>
             </a:fld>
             <a:endParaRPr lang="en-US"/>
           </a:p>
@@ -815,7 +817,7 @@
           <a:p>
             <a:fld id="{39BB3832-C1DF-4199-80C5-191220E93956}" type="datetimeFigureOut">
               <a:rPr lang="en-US" smtClean="0"/>
-              <a:t>5/23/2021</a:t>
+              <a:t>5/24/2021</a:t>
             </a:fld>
             <a:endParaRPr lang="en-US"/>
           </a:p>
@@ -989,7 +991,7 @@
           <a:p>
             <a:fld id="{39BB3832-C1DF-4199-80C5-191220E93956}" type="datetimeFigureOut">
               <a:rPr lang="en-US" smtClean="0"/>
-              <a:t>5/23/2021</a:t>
+              <a:t>5/24/2021</a:t>
             </a:fld>
             <a:endParaRPr lang="en-US"/>
           </a:p>
@@ -1332,7 +1334,7 @@
           <a:p>
             <a:fld id="{39BB3832-C1DF-4199-80C5-191220E93956}" type="datetimeFigureOut">
               <a:rPr lang="en-US" smtClean="0"/>
-              <a:t>5/23/2021</a:t>
+              <a:t>5/24/2021</a:t>
             </a:fld>
             <a:endParaRPr lang="en-US"/>
           </a:p>
@@ -1607,7 +1609,7 @@
           <a:p>
             <a:fld id="{39BB3832-C1DF-4199-80C5-191220E93956}" type="datetimeFigureOut">
               <a:rPr lang="en-US" smtClean="0"/>
-              <a:t>5/23/2021</a:t>
+              <a:t>5/24/2021</a:t>
             </a:fld>
             <a:endParaRPr lang="en-US"/>
           </a:p>
@@ -1986,7 +1988,7 @@
           <a:p>
             <a:fld id="{39BB3832-C1DF-4199-80C5-191220E93956}" type="datetimeFigureOut">
               <a:rPr lang="en-US" smtClean="0"/>
-              <a:t>5/23/2021</a:t>
+              <a:t>5/24/2021</a:t>
             </a:fld>
             <a:endParaRPr lang="en-US"/>
           </a:p>
@@ -2104,7 +2106,7 @@
           <a:p>
             <a:fld id="{39BB3832-C1DF-4199-80C5-191220E93956}" type="datetimeFigureOut">
               <a:rPr lang="en-US" smtClean="0"/>
-              <a:t>5/23/2021</a:t>
+              <a:t>5/24/2021</a:t>
             </a:fld>
             <a:endParaRPr lang="en-US"/>
           </a:p>
@@ -2275,7 +2277,7 @@
           <a:p>
             <a:fld id="{39BB3832-C1DF-4199-80C5-191220E93956}" type="datetimeFigureOut">
               <a:rPr lang="en-US" smtClean="0"/>
-              <a:t>5/23/2021</a:t>
+              <a:t>5/24/2021</a:t>
             </a:fld>
             <a:endParaRPr lang="en-US"/>
           </a:p>
@@ -2629,7 +2631,7 @@
           <a:p>
             <a:fld id="{39BB3832-C1DF-4199-80C5-191220E93956}" type="datetimeFigureOut">
               <a:rPr lang="en-US" smtClean="0"/>
-              <a:t>5/23/2021</a:t>
+              <a:t>5/24/2021</a:t>
             </a:fld>
             <a:endParaRPr lang="en-US"/>
           </a:p>
@@ -3011,7 +3013,7 @@
           <a:p>
             <a:fld id="{39BB3832-C1DF-4199-80C5-191220E93956}" type="datetimeFigureOut">
               <a:rPr lang="en-US" smtClean="0"/>
-              <a:t>5/23/2021</a:t>
+              <a:t>5/24/2021</a:t>
             </a:fld>
             <a:endParaRPr lang="en-US"/>
           </a:p>
@@ -3298,7 +3300,7 @@
           <a:p>
             <a:fld id="{39BB3832-C1DF-4199-80C5-191220E93956}" type="datetimeFigureOut">
               <a:rPr lang="en-US" smtClean="0"/>
-              <a:t>5/23/2021</a:t>
+              <a:t>5/24/2021</a:t>
             </a:fld>
             <a:endParaRPr lang="en-US"/>
           </a:p>
@@ -4161,63 +4163,250 @@
           <a:chExt cx="0" cy="0"/>
         </a:xfrm>
       </p:grpSpPr>
-      <p:sp>
-        <p:nvSpPr>
-          <p:cNvPr id="2" name="Title 1">
+      <p:grpSp>
+        <p:nvGrpSpPr>
+          <p:cNvPr id="4" name="Group 3">
             <a:extLst>
               <a:ext uri="{FF2B5EF4-FFF2-40B4-BE49-F238E27FC236}">
-                <a16:creationId xmlns:a16="http://schemas.microsoft.com/office/drawing/2014/main" id="{DDF1A02C-3113-4E1E-AADF-5C9300810730}"/>
+                <a16:creationId xmlns:a16="http://schemas.microsoft.com/office/drawing/2014/main" id="{794FFCAA-D045-46C2-BF26-C6AFC06B90C2}"/>
               </a:ext>
             </a:extLst>
           </p:cNvPr>
-          <p:cNvSpPr>
-            <a:spLocks noGrp="1"/>
-          </p:cNvSpPr>
-          <p:nvPr>
-            <p:ph type="title"/>
-          </p:nvPr>
-        </p:nvSpPr>
-        <p:spPr/>
-        <p:txBody>
-          <a:bodyPr/>
-          <a:lstStyle/>
-          <a:p>
-            <a:r>
-              <a:rPr lang="en-US" dirty="0"/>
-              <a:t>Correlations</a:t>
-            </a:r>
-          </a:p>
-        </p:txBody>
-      </p:sp>
-      <p:sp>
-        <p:nvSpPr>
-          <p:cNvPr id="3" name="Content Placeholder 2">
+          <p:cNvGrpSpPr/>
+          <p:nvPr/>
+        </p:nvGrpSpPr>
+        <p:grpSpPr>
+          <a:xfrm>
+            <a:off x="1066798" y="209982"/>
+            <a:ext cx="10058400" cy="870094"/>
+            <a:chOff x="1066798" y="209982"/>
+            <a:chExt cx="10058400" cy="870094"/>
+          </a:xfrm>
+        </p:grpSpPr>
+        <p:sp>
+          <p:nvSpPr>
+            <p:cNvPr id="2" name="Title 1">
+              <a:extLst>
+                <a:ext uri="{FF2B5EF4-FFF2-40B4-BE49-F238E27FC236}">
+                  <a16:creationId xmlns:a16="http://schemas.microsoft.com/office/drawing/2014/main" id="{B898D37B-FC34-487E-97CA-D605BE85E50F}"/>
+                </a:ext>
+              </a:extLst>
+            </p:cNvPr>
+            <p:cNvSpPr txBox="1">
+              <a:spLocks/>
+            </p:cNvSpPr>
+            <p:nvPr/>
+          </p:nvSpPr>
+          <p:spPr>
+            <a:xfrm>
+              <a:off x="1066798" y="209982"/>
+              <a:ext cx="10058400" cy="870094"/>
+            </a:xfrm>
+            <a:prstGeom prst="rect">
+              <a:avLst/>
+            </a:prstGeom>
+          </p:spPr>
+          <p:txBody>
+            <a:bodyPr/>
+            <a:lstStyle>
+              <a:lvl1pPr algn="l" defTabSz="914400" rtl="0" eaLnBrk="1" latinLnBrk="0" hangingPunct="1">
+                <a:lnSpc>
+                  <a:spcPct val="85000"/>
+                </a:lnSpc>
+                <a:spcBef>
+                  <a:spcPct val="0"/>
+                </a:spcBef>
+                <a:buNone/>
+                <a:defRPr sz="4800" kern="1200" spc="-50" baseline="0">
+                  <a:solidFill>
+                    <a:schemeClr val="tx1">
+                      <a:lumMod val="75000"/>
+                      <a:lumOff val="25000"/>
+                    </a:schemeClr>
+                  </a:solidFill>
+                  <a:latin typeface="+mj-lt"/>
+                  <a:ea typeface="+mj-ea"/>
+                  <a:cs typeface="+mj-cs"/>
+                </a:defRPr>
+              </a:lvl1pPr>
+            </a:lstStyle>
+            <a:p>
+              <a:r>
+                <a:rPr lang="en-US" dirty="0"/>
+                <a:t>Collected Titles</a:t>
+              </a:r>
+            </a:p>
+          </p:txBody>
+        </p:sp>
+        <p:cxnSp>
+          <p:nvCxnSpPr>
+            <p:cNvPr id="3" name="Straight Connector 2">
+              <a:extLst>
+                <a:ext uri="{FF2B5EF4-FFF2-40B4-BE49-F238E27FC236}">
+                  <a16:creationId xmlns:a16="http://schemas.microsoft.com/office/drawing/2014/main" id="{96E0E1CA-7566-4D27-8472-A7A41DCA9897}"/>
+                </a:ext>
+              </a:extLst>
+            </p:cNvPr>
+            <p:cNvCxnSpPr>
+              <a:cxnSpLocks/>
+            </p:cNvCxnSpPr>
+            <p:nvPr/>
+          </p:nvCxnSpPr>
+          <p:spPr>
+            <a:xfrm>
+              <a:off x="1111306" y="995320"/>
+              <a:ext cx="9969388" cy="0"/>
+            </a:xfrm>
+            <a:prstGeom prst="line">
+              <a:avLst/>
+            </a:prstGeom>
+            <a:ln w="3175"/>
+          </p:spPr>
+          <p:style>
+            <a:lnRef idx="1">
+              <a:schemeClr val="dk1"/>
+            </a:lnRef>
+            <a:fillRef idx="0">
+              <a:schemeClr val="dk1"/>
+            </a:fillRef>
+            <a:effectRef idx="0">
+              <a:schemeClr val="dk1"/>
+            </a:effectRef>
+            <a:fontRef idx="minor">
+              <a:schemeClr val="tx1"/>
+            </a:fontRef>
+          </p:style>
+        </p:cxnSp>
+      </p:grpSp>
+      <p:pic>
+        <p:nvPicPr>
+          <p:cNvPr id="6" name="Picture 5" descr="Shape, square&#10;&#10;Description automatically generated">
             <a:extLst>
               <a:ext uri="{FF2B5EF4-FFF2-40B4-BE49-F238E27FC236}">
-                <a16:creationId xmlns:a16="http://schemas.microsoft.com/office/drawing/2014/main" id="{C0AE8BE8-6AF6-4841-98F8-281C088CA3A4}"/>
+                <a16:creationId xmlns:a16="http://schemas.microsoft.com/office/drawing/2014/main" id="{1D8409B1-BF7C-4735-8703-A1A0D1D218B9}"/>
               </a:ext>
             </a:extLst>
           </p:cNvPr>
-          <p:cNvSpPr>
-            <a:spLocks noGrp="1"/>
-          </p:cNvSpPr>
-          <p:nvPr>
-            <p:ph idx="1"/>
-          </p:nvPr>
-        </p:nvSpPr>
-        <p:spPr/>
+          <p:cNvPicPr>
+            <a:picLocks noChangeAspect="1"/>
+          </p:cNvPicPr>
+          <p:nvPr/>
+        </p:nvPicPr>
+        <p:blipFill>
+          <a:blip r:embed="rId2">
+            <a:extLst>
+              <a:ext uri="{28A0092B-C50C-407E-A947-70E740481C1C}">
+                <a14:useLocalDpi xmlns:a14="http://schemas.microsoft.com/office/drawing/2010/main" val="0"/>
+              </a:ext>
+            </a:extLst>
+          </a:blip>
+          <a:stretch>
+            <a:fillRect/>
+          </a:stretch>
+        </p:blipFill>
+        <p:spPr>
+          <a:xfrm>
+            <a:off x="4994745" y="1503934"/>
+            <a:ext cx="6695252" cy="4463502"/>
+          </a:xfrm>
+          <a:prstGeom prst="rect">
+            <a:avLst/>
+          </a:prstGeom>
+        </p:spPr>
+      </p:pic>
+      <p:sp>
+        <p:nvSpPr>
+          <p:cNvPr id="7" name="TextBox 6">
+            <a:extLst>
+              <a:ext uri="{FF2B5EF4-FFF2-40B4-BE49-F238E27FC236}">
+                <a16:creationId xmlns:a16="http://schemas.microsoft.com/office/drawing/2014/main" id="{7AEF4CDD-583C-41BA-B527-BF6692ED5404}"/>
+              </a:ext>
+            </a:extLst>
+          </p:cNvPr>
+          <p:cNvSpPr txBox="1"/>
+          <p:nvPr/>
+        </p:nvSpPr>
+        <p:spPr>
+          <a:xfrm>
+            <a:off x="1066798" y="1780659"/>
+            <a:ext cx="3737420" cy="3693319"/>
+          </a:xfrm>
+          <a:prstGeom prst="rect">
+            <a:avLst/>
+          </a:prstGeom>
+          <a:noFill/>
+        </p:spPr>
         <p:txBody>
-          <a:bodyPr/>
+          <a:bodyPr wrap="square" rtlCol="0">
+            <a:spAutoFit/>
+          </a:bodyPr>
           <a:lstStyle/>
           <a:p>
-            <a:endParaRPr lang="en-US"/>
+            <a:r>
+              <a:rPr lang="en-US" dirty="0"/>
+              <a:t>Over </a:t>
+            </a:r>
+            <a:r>
+              <a:rPr lang="en-US" u="sng" dirty="0"/>
+              <a:t>622,065</a:t>
+            </a:r>
+            <a:r>
+              <a:rPr lang="en-US" dirty="0"/>
+              <a:t> titles were scraped across all categories.</a:t>
+            </a:r>
+          </a:p>
+          <a:p>
+            <a:endParaRPr lang="en-US" dirty="0"/>
+          </a:p>
+          <a:p>
+            <a:r>
+              <a:rPr lang="en-US" dirty="0"/>
+              <a:t>Due to the layouts of the categories, many titles are present in more than one category, leading to duplicates in our data.</a:t>
+            </a:r>
+          </a:p>
+          <a:p>
+            <a:endParaRPr lang="en-US" dirty="0"/>
+          </a:p>
+          <a:p>
+            <a:r>
+              <a:rPr lang="en-US" dirty="0"/>
+              <a:t>After cleaning, </a:t>
+            </a:r>
+            <a:r>
+              <a:rPr lang="en-US" u="sng" dirty="0"/>
+              <a:t>279,241</a:t>
+            </a:r>
+            <a:r>
+              <a:rPr lang="en-US" dirty="0"/>
+              <a:t> unique audiobooks were found.</a:t>
+            </a:r>
+          </a:p>
+          <a:p>
+            <a:endParaRPr lang="en-US" dirty="0"/>
+          </a:p>
+          <a:p>
+            <a:r>
+              <a:rPr lang="en-US" dirty="0"/>
+              <a:t>As well as </a:t>
+            </a:r>
+            <a:r>
+              <a:rPr lang="en-US" u="sng" dirty="0"/>
+              <a:t>6,959</a:t>
+            </a:r>
+            <a:r>
+              <a:rPr lang="en-US" dirty="0"/>
+              <a:t> podcasts.</a:t>
+            </a:r>
+          </a:p>
+          <a:p>
+            <a:endParaRPr lang="en-US" dirty="0"/>
           </a:p>
         </p:txBody>
       </p:sp>
     </p:spTree>
     <p:extLst>
       <p:ext uri="{BB962C8B-B14F-4D97-AF65-F5344CB8AC3E}">
-        <p14:creationId xmlns:p14="http://schemas.microsoft.com/office/powerpoint/2010/main" val="3995667682"/>
+        <p14:creationId xmlns:p14="http://schemas.microsoft.com/office/powerpoint/2010/main" val="2967321171"/>
       </p:ext>
     </p:extLst>
   </p:cSld>
@@ -4244,63 +4433,125 @@
           <a:chExt cx="0" cy="0"/>
         </a:xfrm>
       </p:grpSpPr>
-      <p:sp>
-        <p:nvSpPr>
-          <p:cNvPr id="2" name="Title 1">
+      <p:grpSp>
+        <p:nvGrpSpPr>
+          <p:cNvPr id="4" name="Group 3">
             <a:extLst>
               <a:ext uri="{FF2B5EF4-FFF2-40B4-BE49-F238E27FC236}">
-                <a16:creationId xmlns:a16="http://schemas.microsoft.com/office/drawing/2014/main" id="{37011FF3-5E9B-4667-BBA3-BB9DD8969BBA}"/>
+                <a16:creationId xmlns:a16="http://schemas.microsoft.com/office/drawing/2014/main" id="{794FFCAA-D045-46C2-BF26-C6AFC06B90C2}"/>
               </a:ext>
             </a:extLst>
           </p:cNvPr>
-          <p:cNvSpPr>
-            <a:spLocks noGrp="1"/>
-          </p:cNvSpPr>
-          <p:nvPr>
-            <p:ph type="title"/>
-          </p:nvPr>
-        </p:nvSpPr>
-        <p:spPr/>
-        <p:txBody>
-          <a:bodyPr/>
-          <a:lstStyle/>
-          <a:p>
-            <a:r>
-              <a:rPr lang="en-US" dirty="0"/>
-              <a:t>Timeseries</a:t>
-            </a:r>
-          </a:p>
-        </p:txBody>
-      </p:sp>
-      <p:sp>
-        <p:nvSpPr>
-          <p:cNvPr id="3" name="Content Placeholder 2">
-            <a:extLst>
-              <a:ext uri="{FF2B5EF4-FFF2-40B4-BE49-F238E27FC236}">
-                <a16:creationId xmlns:a16="http://schemas.microsoft.com/office/drawing/2014/main" id="{BEC3BD65-DE64-436E-BBCF-EE7212139200}"/>
-              </a:ext>
-            </a:extLst>
-          </p:cNvPr>
-          <p:cNvSpPr>
-            <a:spLocks noGrp="1"/>
-          </p:cNvSpPr>
-          <p:nvPr>
-            <p:ph idx="1"/>
-          </p:nvPr>
-        </p:nvSpPr>
-        <p:spPr/>
-        <p:txBody>
-          <a:bodyPr/>
-          <a:lstStyle/>
-          <a:p>
-            <a:endParaRPr lang="en-US"/>
-          </a:p>
-        </p:txBody>
-      </p:sp>
+          <p:cNvGrpSpPr/>
+          <p:nvPr/>
+        </p:nvGrpSpPr>
+        <p:grpSpPr>
+          <a:xfrm>
+            <a:off x="1066798" y="209982"/>
+            <a:ext cx="10058400" cy="870094"/>
+            <a:chOff x="1066798" y="209982"/>
+            <a:chExt cx="10058400" cy="870094"/>
+          </a:xfrm>
+        </p:grpSpPr>
+        <p:sp>
+          <p:nvSpPr>
+            <p:cNvPr id="2" name="Title 1">
+              <a:extLst>
+                <a:ext uri="{FF2B5EF4-FFF2-40B4-BE49-F238E27FC236}">
+                  <a16:creationId xmlns:a16="http://schemas.microsoft.com/office/drawing/2014/main" id="{B898D37B-FC34-487E-97CA-D605BE85E50F}"/>
+                </a:ext>
+              </a:extLst>
+            </p:cNvPr>
+            <p:cNvSpPr txBox="1">
+              <a:spLocks/>
+            </p:cNvSpPr>
+            <p:nvPr/>
+          </p:nvSpPr>
+          <p:spPr>
+            <a:xfrm>
+              <a:off x="1066798" y="209982"/>
+              <a:ext cx="10058400" cy="870094"/>
+            </a:xfrm>
+            <a:prstGeom prst="rect">
+              <a:avLst/>
+            </a:prstGeom>
+          </p:spPr>
+          <p:txBody>
+            <a:bodyPr/>
+            <a:lstStyle>
+              <a:lvl1pPr algn="l" defTabSz="914400" rtl="0" eaLnBrk="1" latinLnBrk="0" hangingPunct="1">
+                <a:lnSpc>
+                  <a:spcPct val="85000"/>
+                </a:lnSpc>
+                <a:spcBef>
+                  <a:spcPct val="0"/>
+                </a:spcBef>
+                <a:buNone/>
+                <a:defRPr sz="4800" kern="1200" spc="-50" baseline="0">
+                  <a:solidFill>
+                    <a:schemeClr val="tx1">
+                      <a:lumMod val="75000"/>
+                      <a:lumOff val="25000"/>
+                    </a:schemeClr>
+                  </a:solidFill>
+                  <a:latin typeface="+mj-lt"/>
+                  <a:ea typeface="+mj-ea"/>
+                  <a:cs typeface="+mj-cs"/>
+                </a:defRPr>
+              </a:lvl1pPr>
+            </a:lstStyle>
+            <a:p>
+              <a:r>
+                <a:rPr lang="en-US" dirty="0"/>
+                <a:t>Template</a:t>
+              </a:r>
+            </a:p>
+          </p:txBody>
+        </p:sp>
+        <p:cxnSp>
+          <p:nvCxnSpPr>
+            <p:cNvPr id="3" name="Straight Connector 2">
+              <a:extLst>
+                <a:ext uri="{FF2B5EF4-FFF2-40B4-BE49-F238E27FC236}">
+                  <a16:creationId xmlns:a16="http://schemas.microsoft.com/office/drawing/2014/main" id="{96E0E1CA-7566-4D27-8472-A7A41DCA9897}"/>
+                </a:ext>
+              </a:extLst>
+            </p:cNvPr>
+            <p:cNvCxnSpPr>
+              <a:cxnSpLocks/>
+            </p:cNvCxnSpPr>
+            <p:nvPr/>
+          </p:nvCxnSpPr>
+          <p:spPr>
+            <a:xfrm>
+              <a:off x="1111306" y="995320"/>
+              <a:ext cx="9969388" cy="0"/>
+            </a:xfrm>
+            <a:prstGeom prst="line">
+              <a:avLst/>
+            </a:prstGeom>
+            <a:ln w="3175"/>
+          </p:spPr>
+          <p:style>
+            <a:lnRef idx="1">
+              <a:schemeClr val="dk1"/>
+            </a:lnRef>
+            <a:fillRef idx="0">
+              <a:schemeClr val="dk1"/>
+            </a:fillRef>
+            <a:effectRef idx="0">
+              <a:schemeClr val="dk1"/>
+            </a:effectRef>
+            <a:fontRef idx="minor">
+              <a:schemeClr val="tx1"/>
+            </a:fontRef>
+          </p:style>
+        </p:cxnSp>
+      </p:grpSp>
     </p:spTree>
     <p:extLst>
       <p:ext uri="{BB962C8B-B14F-4D97-AF65-F5344CB8AC3E}">
-        <p14:creationId xmlns:p14="http://schemas.microsoft.com/office/powerpoint/2010/main" val="111741514"/>
+        <p14:creationId xmlns:p14="http://schemas.microsoft.com/office/powerpoint/2010/main" val="3706210134"/>
       </p:ext>
     </p:extLst>
   </p:cSld>
@@ -4332,7 +4583,7 @@
           <p:cNvPr id="2" name="Title 1">
             <a:extLst>
               <a:ext uri="{FF2B5EF4-FFF2-40B4-BE49-F238E27FC236}">
-                <a16:creationId xmlns:a16="http://schemas.microsoft.com/office/drawing/2014/main" id="{7C04B0B4-6287-4307-9B26-94B6842BFA16}"/>
+                <a16:creationId xmlns:a16="http://schemas.microsoft.com/office/drawing/2014/main" id="{D702522F-EF60-40EB-A014-0415DF24B51B}"/>
               </a:ext>
             </a:extLst>
           </p:cNvPr>
@@ -4350,7 +4601,7 @@
           <a:p>
             <a:r>
               <a:rPr lang="en-US" dirty="0"/>
-              <a:t>Conclusions</a:t>
+              <a:t>Network diagram</a:t>
             </a:r>
           </a:p>
         </p:txBody>
@@ -4360,7 +4611,7 @@
           <p:cNvPr id="3" name="Content Placeholder 2">
             <a:extLst>
               <a:ext uri="{FF2B5EF4-FFF2-40B4-BE49-F238E27FC236}">
-                <a16:creationId xmlns:a16="http://schemas.microsoft.com/office/drawing/2014/main" id="{EC0D24B7-95BA-4E37-85D1-A6340AD334CF}"/>
+                <a16:creationId xmlns:a16="http://schemas.microsoft.com/office/drawing/2014/main" id="{7C05DE40-337E-46AD-B4D9-FEF5B56377F6}"/>
               </a:ext>
             </a:extLst>
           </p:cNvPr>
@@ -4383,7 +4634,7 @@
     </p:spTree>
     <p:extLst>
       <p:ext uri="{BB962C8B-B14F-4D97-AF65-F5344CB8AC3E}">
-        <p14:creationId xmlns:p14="http://schemas.microsoft.com/office/powerpoint/2010/main" val="1242177686"/>
+        <p14:creationId xmlns:p14="http://schemas.microsoft.com/office/powerpoint/2010/main" val="1775495912"/>
       </p:ext>
     </p:extLst>
   </p:cSld>
@@ -4415,6 +4666,172 @@
           <p:cNvPr id="2" name="Title 1">
             <a:extLst>
               <a:ext uri="{FF2B5EF4-FFF2-40B4-BE49-F238E27FC236}">
+                <a16:creationId xmlns:a16="http://schemas.microsoft.com/office/drawing/2014/main" id="{37011FF3-5E9B-4667-BBA3-BB9DD8969BBA}"/>
+              </a:ext>
+            </a:extLst>
+          </p:cNvPr>
+          <p:cNvSpPr>
+            <a:spLocks noGrp="1"/>
+          </p:cNvSpPr>
+          <p:nvPr>
+            <p:ph type="title"/>
+          </p:nvPr>
+        </p:nvSpPr>
+        <p:spPr/>
+        <p:txBody>
+          <a:bodyPr/>
+          <a:lstStyle/>
+          <a:p>
+            <a:r>
+              <a:rPr lang="en-US" dirty="0"/>
+              <a:t>Timeseries</a:t>
+            </a:r>
+          </a:p>
+        </p:txBody>
+      </p:sp>
+      <p:sp>
+        <p:nvSpPr>
+          <p:cNvPr id="3" name="Content Placeholder 2">
+            <a:extLst>
+              <a:ext uri="{FF2B5EF4-FFF2-40B4-BE49-F238E27FC236}">
+                <a16:creationId xmlns:a16="http://schemas.microsoft.com/office/drawing/2014/main" id="{BEC3BD65-DE64-436E-BBCF-EE7212139200}"/>
+              </a:ext>
+            </a:extLst>
+          </p:cNvPr>
+          <p:cNvSpPr>
+            <a:spLocks noGrp="1"/>
+          </p:cNvSpPr>
+          <p:nvPr>
+            <p:ph idx="1"/>
+          </p:nvPr>
+        </p:nvSpPr>
+        <p:spPr/>
+        <p:txBody>
+          <a:bodyPr/>
+          <a:lstStyle/>
+          <a:p>
+            <a:endParaRPr lang="en-US"/>
+          </a:p>
+        </p:txBody>
+      </p:sp>
+    </p:spTree>
+    <p:extLst>
+      <p:ext uri="{BB962C8B-B14F-4D97-AF65-F5344CB8AC3E}">
+        <p14:creationId xmlns:p14="http://schemas.microsoft.com/office/powerpoint/2010/main" val="111741514"/>
+      </p:ext>
+    </p:extLst>
+  </p:cSld>
+  <p:clrMapOvr>
+    <a:masterClrMapping/>
+  </p:clrMapOvr>
+</p:sld>
+</file>
+
+<file path=ppt/slides/slide14.xml><?xml version="1.0" encoding="utf-8"?>
+<p:sld xmlns:a="http://schemas.openxmlformats.org/drawingml/2006/main" xmlns:r="http://schemas.openxmlformats.org/officeDocument/2006/relationships" xmlns:p="http://schemas.openxmlformats.org/presentationml/2006/main">
+  <p:cSld>
+    <p:spTree>
+      <p:nvGrpSpPr>
+        <p:cNvPr id="1" name=""/>
+        <p:cNvGrpSpPr/>
+        <p:nvPr/>
+      </p:nvGrpSpPr>
+      <p:grpSpPr>
+        <a:xfrm>
+          <a:off x="0" y="0"/>
+          <a:ext cx="0" cy="0"/>
+          <a:chOff x="0" y="0"/>
+          <a:chExt cx="0" cy="0"/>
+        </a:xfrm>
+      </p:grpSpPr>
+      <p:sp>
+        <p:nvSpPr>
+          <p:cNvPr id="2" name="Title 1">
+            <a:extLst>
+              <a:ext uri="{FF2B5EF4-FFF2-40B4-BE49-F238E27FC236}">
+                <a16:creationId xmlns:a16="http://schemas.microsoft.com/office/drawing/2014/main" id="{7C04B0B4-6287-4307-9B26-94B6842BFA16}"/>
+              </a:ext>
+            </a:extLst>
+          </p:cNvPr>
+          <p:cNvSpPr>
+            <a:spLocks noGrp="1"/>
+          </p:cNvSpPr>
+          <p:nvPr>
+            <p:ph type="title"/>
+          </p:nvPr>
+        </p:nvSpPr>
+        <p:spPr/>
+        <p:txBody>
+          <a:bodyPr/>
+          <a:lstStyle/>
+          <a:p>
+            <a:r>
+              <a:rPr lang="en-US" dirty="0"/>
+              <a:t>Conclusions</a:t>
+            </a:r>
+          </a:p>
+        </p:txBody>
+      </p:sp>
+      <p:sp>
+        <p:nvSpPr>
+          <p:cNvPr id="3" name="Content Placeholder 2">
+            <a:extLst>
+              <a:ext uri="{FF2B5EF4-FFF2-40B4-BE49-F238E27FC236}">
+                <a16:creationId xmlns:a16="http://schemas.microsoft.com/office/drawing/2014/main" id="{EC0D24B7-95BA-4E37-85D1-A6340AD334CF}"/>
+              </a:ext>
+            </a:extLst>
+          </p:cNvPr>
+          <p:cNvSpPr>
+            <a:spLocks noGrp="1"/>
+          </p:cNvSpPr>
+          <p:nvPr>
+            <p:ph idx="1"/>
+          </p:nvPr>
+        </p:nvSpPr>
+        <p:spPr/>
+        <p:txBody>
+          <a:bodyPr/>
+          <a:lstStyle/>
+          <a:p>
+            <a:endParaRPr lang="en-US"/>
+          </a:p>
+        </p:txBody>
+      </p:sp>
+    </p:spTree>
+    <p:extLst>
+      <p:ext uri="{BB962C8B-B14F-4D97-AF65-F5344CB8AC3E}">
+        <p14:creationId xmlns:p14="http://schemas.microsoft.com/office/powerpoint/2010/main" val="1242177686"/>
+      </p:ext>
+    </p:extLst>
+  </p:cSld>
+  <p:clrMapOvr>
+    <a:masterClrMapping/>
+  </p:clrMapOvr>
+</p:sld>
+</file>
+
+<file path=ppt/slides/slide15.xml><?xml version="1.0" encoding="utf-8"?>
+<p:sld xmlns:a="http://schemas.openxmlformats.org/drawingml/2006/main" xmlns:r="http://schemas.openxmlformats.org/officeDocument/2006/relationships" xmlns:p="http://schemas.openxmlformats.org/presentationml/2006/main">
+  <p:cSld>
+    <p:spTree>
+      <p:nvGrpSpPr>
+        <p:cNvPr id="1" name=""/>
+        <p:cNvGrpSpPr/>
+        <p:nvPr/>
+      </p:nvGrpSpPr>
+      <p:grpSpPr>
+        <a:xfrm>
+          <a:off x="0" y="0"/>
+          <a:ext cx="0" cy="0"/>
+          <a:chOff x="0" y="0"/>
+          <a:chExt cx="0" cy="0"/>
+        </a:xfrm>
+      </p:grpSpPr>
+      <p:sp>
+        <p:nvSpPr>
+          <p:cNvPr id="2" name="Title 1">
+            <a:extLst>
+              <a:ext uri="{FF2B5EF4-FFF2-40B4-BE49-F238E27FC236}">
                 <a16:creationId xmlns:a16="http://schemas.microsoft.com/office/drawing/2014/main" id="{902EBB08-D194-4BFE-A14C-D6D9496A4381}"/>
               </a:ext>
             </a:extLst>
@@ -4457,13 +4874,19 @@
         <p:spPr/>
         <p:txBody>
           <a:bodyPr>
-            <a:normAutofit fontScale="70000" lnSpcReduction="20000"/>
+            <a:normAutofit fontScale="55000" lnSpcReduction="20000"/>
           </a:bodyPr>
           <a:lstStyle/>
           <a:p>
             <a:r>
               <a:rPr lang="en-US" dirty="0"/>
               <a:t>Audible data collection could be expanded by fine grain review data.</a:t>
+            </a:r>
+          </a:p>
+          <a:p>
+            <a:r>
+              <a:rPr lang="en-US" dirty="0"/>
+              <a:t>Capture plus vs premium plus titles?</a:t>
             </a:r>
           </a:p>
           <a:p>
@@ -4549,7 +4972,7 @@
 </p:sld>
 </file>
 
-<file path=ppt/slides/slide14.xml><?xml version="1.0" encoding="utf-8"?>
+<file path=ppt/slides/slide16.xml><?xml version="1.0" encoding="utf-8"?>
 <p:sld xmlns:a="http://schemas.openxmlformats.org/drawingml/2006/main" xmlns:r="http://schemas.openxmlformats.org/officeDocument/2006/relationships" xmlns:p="http://schemas.openxmlformats.org/presentationml/2006/main">
   <p:cSld>
     <p:spTree>
@@ -4691,70 +5114,199 @@
           <a:chExt cx="0" cy="0"/>
         </a:xfrm>
       </p:grpSpPr>
-      <p:sp>
-        <p:nvSpPr>
-          <p:cNvPr id="2" name="Title 1">
+      <p:grpSp>
+        <p:nvGrpSpPr>
+          <p:cNvPr id="4" name="Group 3">
             <a:extLst>
               <a:ext uri="{FF2B5EF4-FFF2-40B4-BE49-F238E27FC236}">
-                <a16:creationId xmlns:a16="http://schemas.microsoft.com/office/drawing/2014/main" id="{3E31BA65-E42F-4C1B-A214-A0F38ADE75C2}"/>
+                <a16:creationId xmlns:a16="http://schemas.microsoft.com/office/drawing/2014/main" id="{794FFCAA-D045-46C2-BF26-C6AFC06B90C2}"/>
               </a:ext>
             </a:extLst>
           </p:cNvPr>
-          <p:cNvSpPr>
-            <a:spLocks noGrp="1"/>
-          </p:cNvSpPr>
-          <p:nvPr>
-            <p:ph type="title"/>
-          </p:nvPr>
-        </p:nvSpPr>
-        <p:spPr/>
-        <p:txBody>
-          <a:bodyPr/>
-          <a:lstStyle/>
-          <a:p>
-            <a:r>
-              <a:rPr lang="en-US" dirty="0"/>
-              <a:t>Background</a:t>
-            </a:r>
-          </a:p>
-        </p:txBody>
-      </p:sp>
-      <p:sp>
-        <p:nvSpPr>
-          <p:cNvPr id="3" name="Content Placeholder 2">
+          <p:cNvGrpSpPr/>
+          <p:nvPr/>
+        </p:nvGrpSpPr>
+        <p:grpSpPr>
+          <a:xfrm>
+            <a:off x="1066798" y="209982"/>
+            <a:ext cx="10058400" cy="870094"/>
+            <a:chOff x="1066798" y="209982"/>
+            <a:chExt cx="10058400" cy="870094"/>
+          </a:xfrm>
+        </p:grpSpPr>
+        <p:sp>
+          <p:nvSpPr>
+            <p:cNvPr id="2" name="Title 1">
+              <a:extLst>
+                <a:ext uri="{FF2B5EF4-FFF2-40B4-BE49-F238E27FC236}">
+                  <a16:creationId xmlns:a16="http://schemas.microsoft.com/office/drawing/2014/main" id="{B898D37B-FC34-487E-97CA-D605BE85E50F}"/>
+                </a:ext>
+              </a:extLst>
+            </p:cNvPr>
+            <p:cNvSpPr txBox="1">
+              <a:spLocks/>
+            </p:cNvSpPr>
+            <p:nvPr/>
+          </p:nvSpPr>
+          <p:spPr>
+            <a:xfrm>
+              <a:off x="1066798" y="209982"/>
+              <a:ext cx="10058400" cy="870094"/>
+            </a:xfrm>
+            <a:prstGeom prst="rect">
+              <a:avLst/>
+            </a:prstGeom>
+          </p:spPr>
+          <p:txBody>
+            <a:bodyPr/>
+            <a:lstStyle>
+              <a:lvl1pPr algn="l" defTabSz="914400" rtl="0" eaLnBrk="1" latinLnBrk="0" hangingPunct="1">
+                <a:lnSpc>
+                  <a:spcPct val="85000"/>
+                </a:lnSpc>
+                <a:spcBef>
+                  <a:spcPct val="0"/>
+                </a:spcBef>
+                <a:buNone/>
+                <a:defRPr sz="4800" kern="1200" spc="-50" baseline="0">
+                  <a:solidFill>
+                    <a:schemeClr val="tx1">
+                      <a:lumMod val="75000"/>
+                      <a:lumOff val="25000"/>
+                    </a:schemeClr>
+                  </a:solidFill>
+                  <a:latin typeface="+mj-lt"/>
+                  <a:ea typeface="+mj-ea"/>
+                  <a:cs typeface="+mj-cs"/>
+                </a:defRPr>
+              </a:lvl1pPr>
+            </a:lstStyle>
+            <a:p>
+              <a:r>
+                <a:rPr lang="en-US" dirty="0"/>
+                <a:t>Background</a:t>
+              </a:r>
+            </a:p>
+          </p:txBody>
+        </p:sp>
+        <p:cxnSp>
+          <p:nvCxnSpPr>
+            <p:cNvPr id="3" name="Straight Connector 2">
+              <a:extLst>
+                <a:ext uri="{FF2B5EF4-FFF2-40B4-BE49-F238E27FC236}">
+                  <a16:creationId xmlns:a16="http://schemas.microsoft.com/office/drawing/2014/main" id="{96E0E1CA-7566-4D27-8472-A7A41DCA9897}"/>
+                </a:ext>
+              </a:extLst>
+            </p:cNvPr>
+            <p:cNvCxnSpPr>
+              <a:cxnSpLocks/>
+            </p:cNvCxnSpPr>
+            <p:nvPr/>
+          </p:nvCxnSpPr>
+          <p:spPr>
+            <a:xfrm>
+              <a:off x="1111306" y="995320"/>
+              <a:ext cx="9969388" cy="0"/>
+            </a:xfrm>
+            <a:prstGeom prst="line">
+              <a:avLst/>
+            </a:prstGeom>
+            <a:ln w="3175"/>
+          </p:spPr>
+          <p:style>
+            <a:lnRef idx="1">
+              <a:schemeClr val="dk1"/>
+            </a:lnRef>
+            <a:fillRef idx="0">
+              <a:schemeClr val="dk1"/>
+            </a:fillRef>
+            <a:effectRef idx="0">
+              <a:schemeClr val="dk1"/>
+            </a:effectRef>
+            <a:fontRef idx="minor">
+              <a:schemeClr val="tx1"/>
+            </a:fontRef>
+          </p:style>
+        </p:cxnSp>
+      </p:grpSp>
+      <p:sp>
+        <p:nvSpPr>
+          <p:cNvPr id="7" name="TextBox 6">
             <a:extLst>
               <a:ext uri="{FF2B5EF4-FFF2-40B4-BE49-F238E27FC236}">
-                <a16:creationId xmlns:a16="http://schemas.microsoft.com/office/drawing/2014/main" id="{3D3E2F78-D181-4AE2-8A69-13AF9CAC714D}"/>
+                <a16:creationId xmlns:a16="http://schemas.microsoft.com/office/drawing/2014/main" id="{5BE7034B-18AD-4E08-A767-2F249A983784}"/>
               </a:ext>
             </a:extLst>
           </p:cNvPr>
-          <p:cNvSpPr>
-            <a:spLocks noGrp="1"/>
-          </p:cNvSpPr>
-          <p:nvPr>
-            <p:ph idx="1"/>
-          </p:nvPr>
-        </p:nvSpPr>
-        <p:spPr/>
+          <p:cNvSpPr txBox="1"/>
+          <p:nvPr/>
+        </p:nvSpPr>
+        <p:spPr>
+          <a:xfrm>
+            <a:off x="1111306" y="1521303"/>
+            <a:ext cx="9969388" cy="2862322"/>
+          </a:xfrm>
+          <a:prstGeom prst="rect">
+            <a:avLst/>
+          </a:prstGeom>
+          <a:noFill/>
+        </p:spPr>
         <p:txBody>
-          <a:bodyPr/>
+          <a:bodyPr wrap="square" rtlCol="0">
+            <a:spAutoFit/>
+          </a:bodyPr>
           <a:lstStyle/>
           <a:p>
             <a:r>
-              <a:rPr lang="en-US" dirty="0" err="1"/>
-              <a:t>Whats</a:t>
-            </a:r>
-            <a:r>
               <a:rPr lang="en-US" dirty="0"/>
-              <a:t> up with Audible</a:t>
-            </a:r>
+              <a:t>Audible is a publisher and distributor of audiobooks and podcasts.</a:t>
+            </a:r>
+          </a:p>
+          <a:p>
+            <a:endParaRPr lang="en-US" dirty="0"/>
+          </a:p>
+          <a:p>
+            <a:r>
+              <a:rPr lang="en-US" dirty="0"/>
+              <a:t>The company was founded in 1995 and acquired by Amazon in 2008.</a:t>
+            </a:r>
+          </a:p>
+          <a:p>
+            <a:endParaRPr lang="en-US" dirty="0"/>
+          </a:p>
+          <a:p>
+            <a:r>
+              <a:rPr lang="en-US" dirty="0"/>
+              <a:t>Audible reports 200,000 audio programs and over a billion hours listened a year.</a:t>
+            </a:r>
+          </a:p>
+          <a:p>
+            <a:endParaRPr lang="en-US" dirty="0"/>
+          </a:p>
+          <a:p>
+            <a:r>
+              <a:rPr lang="en-US" dirty="0"/>
+              <a:t>Currently Audible provides two pricing tiers at $7.95 and $14.95 per month.</a:t>
+            </a:r>
+          </a:p>
+          <a:p>
+            <a:endParaRPr lang="en-US" dirty="0"/>
+          </a:p>
+          <a:p>
+            <a:r>
+              <a:rPr lang="en-US" dirty="0"/>
+              <a:t>Both tiers provide a monthly credit which can be exchanged for a book. </a:t>
+            </a:r>
+          </a:p>
+          <a:p>
+            <a:endParaRPr lang="en-US" dirty="0"/>
           </a:p>
         </p:txBody>
       </p:sp>
     </p:spTree>
     <p:extLst>
       <p:ext uri="{BB962C8B-B14F-4D97-AF65-F5344CB8AC3E}">
-        <p14:creationId xmlns:p14="http://schemas.microsoft.com/office/powerpoint/2010/main" val="1735488565"/>
+        <p14:creationId xmlns:p14="http://schemas.microsoft.com/office/powerpoint/2010/main" val="3818557035"/>
       </p:ext>
     </p:extLst>
   </p:cSld>
@@ -4765,967 +5317,6 @@
 </file>
 
 <file path=ppt/slides/slide3.xml><?xml version="1.0" encoding="utf-8"?>
-<p:sld xmlns:a="http://schemas.openxmlformats.org/drawingml/2006/main" xmlns:r="http://schemas.openxmlformats.org/officeDocument/2006/relationships" xmlns:p="http://schemas.openxmlformats.org/presentationml/2006/main">
-  <p:cSld>
-    <p:spTree>
-      <p:nvGrpSpPr>
-        <p:cNvPr id="1" name=""/>
-        <p:cNvGrpSpPr/>
-        <p:nvPr/>
-      </p:nvGrpSpPr>
-      <p:grpSpPr>
-        <a:xfrm>
-          <a:off x="0" y="0"/>
-          <a:ext cx="0" cy="0"/>
-          <a:chOff x="0" y="0"/>
-          <a:chExt cx="0" cy="0"/>
-        </a:xfrm>
-      </p:grpSpPr>
-      <p:sp>
-        <p:nvSpPr>
-          <p:cNvPr id="2" name="Title 1">
-            <a:extLst>
-              <a:ext uri="{FF2B5EF4-FFF2-40B4-BE49-F238E27FC236}">
-                <a16:creationId xmlns:a16="http://schemas.microsoft.com/office/drawing/2014/main" id="{A86F10B3-032A-4502-AC7C-AB4A39C9D08C}"/>
-              </a:ext>
-            </a:extLst>
-          </p:cNvPr>
-          <p:cNvSpPr>
-            <a:spLocks noGrp="1"/>
-          </p:cNvSpPr>
-          <p:nvPr>
-            <p:ph type="title"/>
-          </p:nvPr>
-        </p:nvSpPr>
-        <p:spPr>
-          <a:xfrm>
-            <a:off x="1097280" y="867266"/>
-            <a:ext cx="10058400" cy="870094"/>
-          </a:xfrm>
-        </p:spPr>
-        <p:txBody>
-          <a:bodyPr/>
-          <a:lstStyle/>
-          <a:p>
-            <a:r>
-              <a:rPr lang="en-US" dirty="0"/>
-              <a:t>Collected information</a:t>
-            </a:r>
-          </a:p>
-        </p:txBody>
-      </p:sp>
-      <p:graphicFrame>
-        <p:nvGraphicFramePr>
-          <p:cNvPr id="4" name="Table 4">
-            <a:extLst>
-              <a:ext uri="{FF2B5EF4-FFF2-40B4-BE49-F238E27FC236}">
-                <a16:creationId xmlns:a16="http://schemas.microsoft.com/office/drawing/2014/main" id="{2E0624B7-F2CA-4121-BE2B-9DE87C428E89}"/>
-              </a:ext>
-            </a:extLst>
-          </p:cNvPr>
-          <p:cNvGraphicFramePr>
-            <a:graphicFrameLocks noGrp="1"/>
-          </p:cNvGraphicFramePr>
-          <p:nvPr>
-            <p:ph idx="1"/>
-            <p:extLst>
-              <p:ext uri="{D42A27DB-BD31-4B8C-83A1-F6EECF244321}">
-                <p14:modId xmlns:p14="http://schemas.microsoft.com/office/powerpoint/2010/main" val="2737114713"/>
-              </p:ext>
-            </p:extLst>
-          </p:nvPr>
-        </p:nvGraphicFramePr>
-        <p:xfrm>
-          <a:off x="1066800" y="1908175"/>
-          <a:ext cx="10058400" cy="2743200"/>
-        </p:xfrm>
-        <a:graphic>
-          <a:graphicData uri="http://schemas.openxmlformats.org/drawingml/2006/table">
-            <a:tbl>
-              <a:tblPr firstRow="1" bandRow="1">
-                <a:tableStyleId>{2D5ABB26-0587-4C30-8999-92F81FD0307C}</a:tableStyleId>
-              </a:tblPr>
-              <a:tblGrid>
-                <a:gridCol w="5029200">
-                  <a:extLst>
-                    <a:ext uri="{9D8B030D-6E8A-4147-A177-3AD203B41FA5}">
-                      <a16:colId xmlns:a16="http://schemas.microsoft.com/office/drawing/2014/main" val="3546304019"/>
-                    </a:ext>
-                  </a:extLst>
-                </a:gridCol>
-                <a:gridCol w="5029200">
-                  <a:extLst>
-                    <a:ext uri="{9D8B030D-6E8A-4147-A177-3AD203B41FA5}">
-                      <a16:colId xmlns:a16="http://schemas.microsoft.com/office/drawing/2014/main" val="2948520954"/>
-                    </a:ext>
-                  </a:extLst>
-                </a:gridCol>
-              </a:tblGrid>
-              <a:tr h="370840">
-                <a:tc>
-                  <a:txBody>
-                    <a:bodyPr/>
-                    <a:lstStyle/>
-                    <a:p>
-                      <a:r>
-                        <a:rPr lang="en-US" sz="2800" dirty="0"/>
-                        <a:t>Category Spider</a:t>
-                      </a:r>
-                    </a:p>
-                  </a:txBody>
-                  <a:tcPr>
-                    <a:lnL w="12700" cap="flat" cmpd="sng" algn="ctr">
-                      <a:solidFill>
-                        <a:schemeClr val="tx1"/>
-                      </a:solidFill>
-                      <a:prstDash val="solid"/>
-                      <a:round/>
-                      <a:headEnd type="none" w="med" len="med"/>
-                      <a:tailEnd type="none" w="med" len="med"/>
-                    </a:lnL>
-                    <a:lnR w="12700" cap="flat" cmpd="sng" algn="ctr">
-                      <a:solidFill>
-                        <a:schemeClr val="tx1"/>
-                      </a:solidFill>
-                      <a:prstDash val="solid"/>
-                      <a:round/>
-                      <a:headEnd type="none" w="med" len="med"/>
-                      <a:tailEnd type="none" w="med" len="med"/>
-                    </a:lnR>
-                    <a:lnT w="12700" cap="flat" cmpd="sng" algn="ctr">
-                      <a:solidFill>
-                        <a:schemeClr val="tx1"/>
-                      </a:solidFill>
-                      <a:prstDash val="solid"/>
-                      <a:round/>
-                      <a:headEnd type="none" w="med" len="med"/>
-                      <a:tailEnd type="none" w="med" len="med"/>
-                    </a:lnT>
-                    <a:lnB w="12700" cap="flat" cmpd="sng" algn="ctr">
-                      <a:solidFill>
-                        <a:schemeClr val="tx1"/>
-                      </a:solidFill>
-                      <a:prstDash val="solid"/>
-                      <a:round/>
-                      <a:headEnd type="none" w="med" len="med"/>
-                      <a:tailEnd type="none" w="med" len="med"/>
-                    </a:lnB>
-                  </a:tcPr>
-                </a:tc>
-                <a:tc>
-                  <a:txBody>
-                    <a:bodyPr/>
-                    <a:lstStyle/>
-                    <a:p>
-                      <a:r>
-                        <a:rPr lang="en-US" sz="2800" dirty="0"/>
-                        <a:t>Title Spider</a:t>
-                      </a:r>
-                    </a:p>
-                  </a:txBody>
-                  <a:tcPr>
-                    <a:lnL w="12700" cap="flat" cmpd="sng" algn="ctr">
-                      <a:solidFill>
-                        <a:schemeClr val="tx1"/>
-                      </a:solidFill>
-                      <a:prstDash val="solid"/>
-                      <a:round/>
-                      <a:headEnd type="none" w="med" len="med"/>
-                      <a:tailEnd type="none" w="med" len="med"/>
-                    </a:lnL>
-                    <a:lnR w="12700" cap="flat" cmpd="sng" algn="ctr">
-                      <a:solidFill>
-                        <a:schemeClr val="tx1"/>
-                      </a:solidFill>
-                      <a:prstDash val="solid"/>
-                      <a:round/>
-                      <a:headEnd type="none" w="med" len="med"/>
-                      <a:tailEnd type="none" w="med" len="med"/>
-                    </a:lnR>
-                    <a:lnT w="12700" cap="flat" cmpd="sng" algn="ctr">
-                      <a:solidFill>
-                        <a:schemeClr val="tx1"/>
-                      </a:solidFill>
-                      <a:prstDash val="solid"/>
-                      <a:round/>
-                      <a:headEnd type="none" w="med" len="med"/>
-                      <a:tailEnd type="none" w="med" len="med"/>
-                    </a:lnT>
-                    <a:lnB w="12700" cap="flat" cmpd="sng" algn="ctr">
-                      <a:solidFill>
-                        <a:schemeClr val="tx1"/>
-                      </a:solidFill>
-                      <a:prstDash val="solid"/>
-                      <a:round/>
-                      <a:headEnd type="none" w="med" len="med"/>
-                      <a:tailEnd type="none" w="med" len="med"/>
-                    </a:lnB>
-                  </a:tcPr>
-                </a:tc>
-                <a:extLst>
-                  <a:ext uri="{0D108BD9-81ED-4DB2-BD59-A6C34878D82A}">
-                    <a16:rowId xmlns:a16="http://schemas.microsoft.com/office/drawing/2014/main" val="3172508867"/>
-                  </a:ext>
-                </a:extLst>
-              </a:tr>
-              <a:tr h="370840">
-                <a:tc>
-                  <a:txBody>
-                    <a:bodyPr/>
-                    <a:lstStyle/>
-                    <a:p>
-                      <a:r>
-                        <a:rPr lang="en-US" dirty="0"/>
-                        <a:t>Name &amp; URL</a:t>
-                      </a:r>
-                    </a:p>
-                  </a:txBody>
-                  <a:tcPr>
-                    <a:lnL w="12700" cap="flat" cmpd="sng" algn="ctr">
-                      <a:solidFill>
-                        <a:schemeClr val="tx1"/>
-                      </a:solidFill>
-                      <a:prstDash val="solid"/>
-                      <a:round/>
-                      <a:headEnd type="none" w="med" len="med"/>
-                      <a:tailEnd type="none" w="med" len="med"/>
-                    </a:lnL>
-                    <a:lnR w="12700" cap="flat" cmpd="sng" algn="ctr">
-                      <a:solidFill>
-                        <a:schemeClr val="tx1"/>
-                      </a:solidFill>
-                      <a:prstDash val="solid"/>
-                      <a:round/>
-                      <a:headEnd type="none" w="med" len="med"/>
-                      <a:tailEnd type="none" w="med" len="med"/>
-                    </a:lnR>
-                    <a:lnT w="12700" cap="flat" cmpd="sng" algn="ctr">
-                      <a:solidFill>
-                        <a:schemeClr val="tx1"/>
-                      </a:solidFill>
-                      <a:prstDash val="solid"/>
-                      <a:round/>
-                      <a:headEnd type="none" w="med" len="med"/>
-                      <a:tailEnd type="none" w="med" len="med"/>
-                    </a:lnT>
-                  </a:tcPr>
-                </a:tc>
-                <a:tc>
-                  <a:txBody>
-                    <a:bodyPr/>
-                    <a:lstStyle/>
-                    <a:p>
-                      <a:r>
-                        <a:rPr lang="en-US" dirty="0"/>
-                        <a:t>Title &amp; Subtitle</a:t>
-                      </a:r>
-                    </a:p>
-                  </a:txBody>
-                  <a:tcPr>
-                    <a:lnL w="12700" cap="flat" cmpd="sng" algn="ctr">
-                      <a:solidFill>
-                        <a:schemeClr val="tx1"/>
-                      </a:solidFill>
-                      <a:prstDash val="solid"/>
-                      <a:round/>
-                      <a:headEnd type="none" w="med" len="med"/>
-                      <a:tailEnd type="none" w="med" len="med"/>
-                    </a:lnL>
-                    <a:lnR w="12700" cap="flat" cmpd="sng" algn="ctr">
-                      <a:solidFill>
-                        <a:schemeClr val="tx1"/>
-                      </a:solidFill>
-                      <a:prstDash val="solid"/>
-                      <a:round/>
-                      <a:headEnd type="none" w="med" len="med"/>
-                      <a:tailEnd type="none" w="med" len="med"/>
-                    </a:lnR>
-                    <a:lnT w="12700" cap="flat" cmpd="sng" algn="ctr">
-                      <a:solidFill>
-                        <a:schemeClr val="tx1"/>
-                      </a:solidFill>
-                      <a:prstDash val="solid"/>
-                      <a:round/>
-                      <a:headEnd type="none" w="med" len="med"/>
-                      <a:tailEnd type="none" w="med" len="med"/>
-                    </a:lnT>
-                  </a:tcPr>
-                </a:tc>
-                <a:extLst>
-                  <a:ext uri="{0D108BD9-81ED-4DB2-BD59-A6C34878D82A}">
-                    <a16:rowId xmlns:a16="http://schemas.microsoft.com/office/drawing/2014/main" val="2383498637"/>
-                  </a:ext>
-                </a:extLst>
-              </a:tr>
-              <a:tr h="370840">
-                <a:tc>
-                  <a:txBody>
-                    <a:bodyPr/>
-                    <a:lstStyle/>
-                    <a:p>
-                      <a:r>
-                        <a:rPr lang="en-US" dirty="0"/>
-                        <a:t>Number of Titles</a:t>
-                      </a:r>
-                    </a:p>
-                  </a:txBody>
-                  <a:tcPr>
-                    <a:lnL w="12700" cap="flat" cmpd="sng" algn="ctr">
-                      <a:solidFill>
-                        <a:schemeClr val="tx1"/>
-                      </a:solidFill>
-                      <a:prstDash val="solid"/>
-                      <a:round/>
-                      <a:headEnd type="none" w="med" len="med"/>
-                      <a:tailEnd type="none" w="med" len="med"/>
-                    </a:lnL>
-                    <a:lnR w="12700" cap="flat" cmpd="sng" algn="ctr">
-                      <a:solidFill>
-                        <a:schemeClr val="tx1"/>
-                      </a:solidFill>
-                      <a:prstDash val="solid"/>
-                      <a:round/>
-                      <a:headEnd type="none" w="med" len="med"/>
-                      <a:tailEnd type="none" w="med" len="med"/>
-                    </a:lnR>
-                  </a:tcPr>
-                </a:tc>
-                <a:tc>
-                  <a:txBody>
-                    <a:bodyPr/>
-                    <a:lstStyle/>
-                    <a:p>
-                      <a:r>
-                        <a:rPr lang="en-US" dirty="0"/>
-                        <a:t>Author, Narrator, Language</a:t>
-                      </a:r>
-                    </a:p>
-                  </a:txBody>
-                  <a:tcPr>
-                    <a:lnL w="12700" cap="flat" cmpd="sng" algn="ctr">
-                      <a:solidFill>
-                        <a:schemeClr val="tx1"/>
-                      </a:solidFill>
-                      <a:prstDash val="solid"/>
-                      <a:round/>
-                      <a:headEnd type="none" w="med" len="med"/>
-                      <a:tailEnd type="none" w="med" len="med"/>
-                    </a:lnL>
-                    <a:lnR w="12700" cap="flat" cmpd="sng" algn="ctr">
-                      <a:solidFill>
-                        <a:schemeClr val="tx1"/>
-                      </a:solidFill>
-                      <a:prstDash val="solid"/>
-                      <a:round/>
-                      <a:headEnd type="none" w="med" len="med"/>
-                      <a:tailEnd type="none" w="med" len="med"/>
-                    </a:lnR>
-                  </a:tcPr>
-                </a:tc>
-                <a:extLst>
-                  <a:ext uri="{0D108BD9-81ED-4DB2-BD59-A6C34878D82A}">
-                    <a16:rowId xmlns:a16="http://schemas.microsoft.com/office/drawing/2014/main" val="965882516"/>
-                  </a:ext>
-                </a:extLst>
-              </a:tr>
-              <a:tr h="370840">
-                <a:tc>
-                  <a:txBody>
-                    <a:bodyPr/>
-                    <a:lstStyle/>
-                    <a:p>
-                      <a:r>
-                        <a:rPr lang="en-US" dirty="0"/>
-                        <a:t>Super-category: Name &amp; URL</a:t>
-                      </a:r>
-                    </a:p>
-                  </a:txBody>
-                  <a:tcPr>
-                    <a:lnL w="12700" cap="flat" cmpd="sng" algn="ctr">
-                      <a:solidFill>
-                        <a:schemeClr val="tx1"/>
-                      </a:solidFill>
-                      <a:prstDash val="solid"/>
-                      <a:round/>
-                      <a:headEnd type="none" w="med" len="med"/>
-                      <a:tailEnd type="none" w="med" len="med"/>
-                    </a:lnL>
-                    <a:lnR w="12700" cap="flat" cmpd="sng" algn="ctr">
-                      <a:solidFill>
-                        <a:schemeClr val="tx1"/>
-                      </a:solidFill>
-                      <a:prstDash val="solid"/>
-                      <a:round/>
-                      <a:headEnd type="none" w="med" len="med"/>
-                      <a:tailEnd type="none" w="med" len="med"/>
-                    </a:lnR>
-                  </a:tcPr>
-                </a:tc>
-                <a:tc>
-                  <a:txBody>
-                    <a:bodyPr/>
-                    <a:lstStyle/>
-                    <a:p>
-                      <a:r>
-                        <a:rPr lang="en-US" dirty="0"/>
-                        <a:t>Stars &amp; Number of Ratings</a:t>
-                      </a:r>
-                    </a:p>
-                  </a:txBody>
-                  <a:tcPr>
-                    <a:lnL w="12700" cap="flat" cmpd="sng" algn="ctr">
-                      <a:solidFill>
-                        <a:schemeClr val="tx1"/>
-                      </a:solidFill>
-                      <a:prstDash val="solid"/>
-                      <a:round/>
-                      <a:headEnd type="none" w="med" len="med"/>
-                      <a:tailEnd type="none" w="med" len="med"/>
-                    </a:lnL>
-                    <a:lnR w="12700" cap="flat" cmpd="sng" algn="ctr">
-                      <a:solidFill>
-                        <a:schemeClr val="tx1"/>
-                      </a:solidFill>
-                      <a:prstDash val="solid"/>
-                      <a:round/>
-                      <a:headEnd type="none" w="med" len="med"/>
-                      <a:tailEnd type="none" w="med" len="med"/>
-                    </a:lnR>
-                  </a:tcPr>
-                </a:tc>
-                <a:extLst>
-                  <a:ext uri="{0D108BD9-81ED-4DB2-BD59-A6C34878D82A}">
-                    <a16:rowId xmlns:a16="http://schemas.microsoft.com/office/drawing/2014/main" val="3645175027"/>
-                  </a:ext>
-                </a:extLst>
-              </a:tr>
-              <a:tr h="370840">
-                <a:tc>
-                  <a:txBody>
-                    <a:bodyPr/>
-                    <a:lstStyle/>
-                    <a:p>
-                      <a:r>
-                        <a:rPr lang="en-US" dirty="0"/>
-                        <a:t>Flag for bottom category</a:t>
-                      </a:r>
-                    </a:p>
-                  </a:txBody>
-                  <a:tcPr>
-                    <a:lnL w="12700" cap="flat" cmpd="sng" algn="ctr">
-                      <a:solidFill>
-                        <a:schemeClr val="tx1"/>
-                      </a:solidFill>
-                      <a:prstDash val="solid"/>
-                      <a:round/>
-                      <a:headEnd type="none" w="med" len="med"/>
-                      <a:tailEnd type="none" w="med" len="med"/>
-                    </a:lnL>
-                    <a:lnR w="12700" cap="flat" cmpd="sng" algn="ctr">
-                      <a:solidFill>
-                        <a:schemeClr val="tx1"/>
-                      </a:solidFill>
-                      <a:prstDash val="solid"/>
-                      <a:round/>
-                      <a:headEnd type="none" w="med" len="med"/>
-                      <a:tailEnd type="none" w="med" len="med"/>
-                    </a:lnR>
-                  </a:tcPr>
-                </a:tc>
-                <a:tc>
-                  <a:txBody>
-                    <a:bodyPr/>
-                    <a:lstStyle/>
-                    <a:p>
-                      <a:r>
-                        <a:rPr lang="en-US" dirty="0"/>
-                        <a:t>Book Length &amp; Release Date</a:t>
-                      </a:r>
-                    </a:p>
-                  </a:txBody>
-                  <a:tcPr>
-                    <a:lnL w="12700" cap="flat" cmpd="sng" algn="ctr">
-                      <a:solidFill>
-                        <a:schemeClr val="tx1"/>
-                      </a:solidFill>
-                      <a:prstDash val="solid"/>
-                      <a:round/>
-                      <a:headEnd type="none" w="med" len="med"/>
-                      <a:tailEnd type="none" w="med" len="med"/>
-                    </a:lnL>
-                    <a:lnR w="12700" cap="flat" cmpd="sng" algn="ctr">
-                      <a:solidFill>
-                        <a:schemeClr val="tx1"/>
-                      </a:solidFill>
-                      <a:prstDash val="solid"/>
-                      <a:round/>
-                      <a:headEnd type="none" w="med" len="med"/>
-                      <a:tailEnd type="none" w="med" len="med"/>
-                    </a:lnR>
-                  </a:tcPr>
-                </a:tc>
-                <a:extLst>
-                  <a:ext uri="{0D108BD9-81ED-4DB2-BD59-A6C34878D82A}">
-                    <a16:rowId xmlns:a16="http://schemas.microsoft.com/office/drawing/2014/main" val="4141642034"/>
-                  </a:ext>
-                </a:extLst>
-              </a:tr>
-              <a:tr h="370840">
-                <a:tc>
-                  <a:txBody>
-                    <a:bodyPr/>
-                    <a:lstStyle/>
-                    <a:p>
-                      <a:endParaRPr lang="en-US"/>
-                    </a:p>
-                  </a:txBody>
-                  <a:tcPr>
-                    <a:lnL w="12700" cap="flat" cmpd="sng" algn="ctr">
-                      <a:solidFill>
-                        <a:schemeClr val="tx1"/>
-                      </a:solidFill>
-                      <a:prstDash val="solid"/>
-                      <a:round/>
-                      <a:headEnd type="none" w="med" len="med"/>
-                      <a:tailEnd type="none" w="med" len="med"/>
-                    </a:lnL>
-                    <a:lnR w="12700" cap="flat" cmpd="sng" algn="ctr">
-                      <a:solidFill>
-                        <a:schemeClr val="tx1"/>
-                      </a:solidFill>
-                      <a:prstDash val="solid"/>
-                      <a:round/>
-                      <a:headEnd type="none" w="med" len="med"/>
-                      <a:tailEnd type="none" w="med" len="med"/>
-                    </a:lnR>
-                  </a:tcPr>
-                </a:tc>
-                <a:tc>
-                  <a:txBody>
-                    <a:bodyPr/>
-                    <a:lstStyle/>
-                    <a:p>
-                      <a:pPr marL="0" marR="0" lvl="0" indent="0" algn="l" defTabSz="914400" rtl="0" eaLnBrk="1" fontAlgn="auto" latinLnBrk="0" hangingPunct="1">
-                        <a:lnSpc>
-                          <a:spcPct val="100000"/>
-                        </a:lnSpc>
-                        <a:spcBef>
-                          <a:spcPts val="0"/>
-                        </a:spcBef>
-                        <a:spcAft>
-                          <a:spcPts val="0"/>
-                        </a:spcAft>
-                        <a:buClrTx/>
-                        <a:buSzTx/>
-                        <a:buFontTx/>
-                        <a:buNone/>
-                        <a:tabLst/>
-                        <a:defRPr/>
-                      </a:pPr>
-                      <a:r>
-                        <a:rPr lang="en-US" dirty="0"/>
-                        <a:t>Category name</a:t>
-                      </a:r>
-                    </a:p>
-                  </a:txBody>
-                  <a:tcPr>
-                    <a:lnL w="12700" cap="flat" cmpd="sng" algn="ctr">
-                      <a:solidFill>
-                        <a:schemeClr val="tx1"/>
-                      </a:solidFill>
-                      <a:prstDash val="solid"/>
-                      <a:round/>
-                      <a:headEnd type="none" w="med" len="med"/>
-                      <a:tailEnd type="none" w="med" len="med"/>
-                    </a:lnL>
-                    <a:lnR w="12700" cap="flat" cmpd="sng" algn="ctr">
-                      <a:solidFill>
-                        <a:schemeClr val="tx1"/>
-                      </a:solidFill>
-                      <a:prstDash val="solid"/>
-                      <a:round/>
-                      <a:headEnd type="none" w="med" len="med"/>
-                      <a:tailEnd type="none" w="med" len="med"/>
-                    </a:lnR>
-                  </a:tcPr>
-                </a:tc>
-                <a:extLst>
-                  <a:ext uri="{0D108BD9-81ED-4DB2-BD59-A6C34878D82A}">
-                    <a16:rowId xmlns:a16="http://schemas.microsoft.com/office/drawing/2014/main" val="2436925662"/>
-                  </a:ext>
-                </a:extLst>
-              </a:tr>
-              <a:tr h="370840">
-                <a:tc>
-                  <a:txBody>
-                    <a:bodyPr/>
-                    <a:lstStyle/>
-                    <a:p>
-                      <a:endParaRPr lang="en-US"/>
-                    </a:p>
-                  </a:txBody>
-                  <a:tcPr>
-                    <a:lnL w="12700" cap="flat" cmpd="sng" algn="ctr">
-                      <a:solidFill>
-                        <a:schemeClr val="tx1"/>
-                      </a:solidFill>
-                      <a:prstDash val="solid"/>
-                      <a:round/>
-                      <a:headEnd type="none" w="med" len="med"/>
-                      <a:tailEnd type="none" w="med" len="med"/>
-                    </a:lnL>
-                    <a:lnR w="12700" cap="flat" cmpd="sng" algn="ctr">
-                      <a:solidFill>
-                        <a:schemeClr val="tx1"/>
-                      </a:solidFill>
-                      <a:prstDash val="solid"/>
-                      <a:round/>
-                      <a:headEnd type="none" w="med" len="med"/>
-                      <a:tailEnd type="none" w="med" len="med"/>
-                    </a:lnR>
-                    <a:lnB w="12700" cap="flat" cmpd="sng" algn="ctr">
-                      <a:solidFill>
-                        <a:schemeClr val="tx1"/>
-                      </a:solidFill>
-                      <a:prstDash val="solid"/>
-                      <a:round/>
-                      <a:headEnd type="none" w="med" len="med"/>
-                      <a:tailEnd type="none" w="med" len="med"/>
-                    </a:lnB>
-                  </a:tcPr>
-                </a:tc>
-                <a:tc>
-                  <a:txBody>
-                    <a:bodyPr/>
-                    <a:lstStyle/>
-                    <a:p>
-                      <a:r>
-                        <a:rPr lang="en-US" dirty="0"/>
-                        <a:t>Flag for Podcasts</a:t>
-                      </a:r>
-                    </a:p>
-                  </a:txBody>
-                  <a:tcPr>
-                    <a:lnL w="12700" cap="flat" cmpd="sng" algn="ctr">
-                      <a:solidFill>
-                        <a:schemeClr val="tx1"/>
-                      </a:solidFill>
-                      <a:prstDash val="solid"/>
-                      <a:round/>
-                      <a:headEnd type="none" w="med" len="med"/>
-                      <a:tailEnd type="none" w="med" len="med"/>
-                    </a:lnL>
-                    <a:lnR w="12700" cap="flat" cmpd="sng" algn="ctr">
-                      <a:solidFill>
-                        <a:schemeClr val="tx1"/>
-                      </a:solidFill>
-                      <a:prstDash val="solid"/>
-                      <a:round/>
-                      <a:headEnd type="none" w="med" len="med"/>
-                      <a:tailEnd type="none" w="med" len="med"/>
-                    </a:lnR>
-                    <a:lnB w="12700" cap="flat" cmpd="sng" algn="ctr">
-                      <a:solidFill>
-                        <a:schemeClr val="tx1"/>
-                      </a:solidFill>
-                      <a:prstDash val="solid"/>
-                      <a:round/>
-                      <a:headEnd type="none" w="med" len="med"/>
-                      <a:tailEnd type="none" w="med" len="med"/>
-                    </a:lnB>
-                  </a:tcPr>
-                </a:tc>
-                <a:extLst>
-                  <a:ext uri="{0D108BD9-81ED-4DB2-BD59-A6C34878D82A}">
-                    <a16:rowId xmlns:a16="http://schemas.microsoft.com/office/drawing/2014/main" val="4075066826"/>
-                  </a:ext>
-                </a:extLst>
-              </a:tr>
-            </a:tbl>
-          </a:graphicData>
-        </a:graphic>
-      </p:graphicFrame>
-      <p:grpSp>
-        <p:nvGrpSpPr>
-          <p:cNvPr id="3" name="Group 2">
-            <a:extLst>
-              <a:ext uri="{FF2B5EF4-FFF2-40B4-BE49-F238E27FC236}">
-                <a16:creationId xmlns:a16="http://schemas.microsoft.com/office/drawing/2014/main" id="{36F267CD-5FC8-4CF9-A3B3-F99CA2B3C9B8}"/>
-              </a:ext>
-            </a:extLst>
-          </p:cNvPr>
-          <p:cNvGrpSpPr/>
-          <p:nvPr/>
-        </p:nvGrpSpPr>
-        <p:grpSpPr>
-          <a:xfrm>
-            <a:off x="1496854" y="4972050"/>
-            <a:ext cx="9167177" cy="914400"/>
-            <a:chOff x="1496854" y="4972050"/>
-            <a:chExt cx="9167177" cy="914400"/>
-          </a:xfrm>
-        </p:grpSpPr>
-        <p:sp>
-          <p:nvSpPr>
-            <p:cNvPr id="5" name="Rectangle: Rounded Corners 4">
-              <a:extLst>
-                <a:ext uri="{FF2B5EF4-FFF2-40B4-BE49-F238E27FC236}">
-                  <a16:creationId xmlns:a16="http://schemas.microsoft.com/office/drawing/2014/main" id="{249C3C62-32B3-4BBA-BC41-E6F536FFFE9C}"/>
-                </a:ext>
-              </a:extLst>
-            </p:cNvPr>
-            <p:cNvSpPr/>
-            <p:nvPr/>
-          </p:nvSpPr>
-          <p:spPr>
-            <a:xfrm>
-              <a:off x="1496854" y="4972050"/>
-              <a:ext cx="2309177" cy="914400"/>
-            </a:xfrm>
-            <a:prstGeom prst="roundRect">
-              <a:avLst/>
-            </a:prstGeom>
-            <a:ln w="28575">
-              <a:solidFill>
-                <a:schemeClr val="tx1"/>
-              </a:solidFill>
-            </a:ln>
-          </p:spPr>
-          <p:style>
-            <a:lnRef idx="2">
-              <a:schemeClr val="accent6"/>
-            </a:lnRef>
-            <a:fillRef idx="1">
-              <a:schemeClr val="lt1"/>
-            </a:fillRef>
-            <a:effectRef idx="0">
-              <a:schemeClr val="accent6"/>
-            </a:effectRef>
-            <a:fontRef idx="minor">
-              <a:schemeClr val="dk1"/>
-            </a:fontRef>
-          </p:style>
-          <p:txBody>
-            <a:bodyPr rtlCol="0" anchor="ctr"/>
-            <a:lstStyle/>
-            <a:p>
-              <a:pPr algn="ctr"/>
-              <a:r>
-                <a:rPr lang="en-US" dirty="0">
-                  <a:solidFill>
-                    <a:schemeClr val="tx1"/>
-                  </a:solidFill>
-                </a:rPr>
-                <a:t>Scrape Category Structure &amp; Information</a:t>
-              </a:r>
-            </a:p>
-          </p:txBody>
-        </p:sp>
-        <p:sp>
-          <p:nvSpPr>
-            <p:cNvPr id="6" name="Rectangle: Rounded Corners 5">
-              <a:extLst>
-                <a:ext uri="{FF2B5EF4-FFF2-40B4-BE49-F238E27FC236}">
-                  <a16:creationId xmlns:a16="http://schemas.microsoft.com/office/drawing/2014/main" id="{360544A7-6B9F-4C16-BB6D-4987005EAFE1}"/>
-                </a:ext>
-              </a:extLst>
-            </p:cNvPr>
-            <p:cNvSpPr/>
-            <p:nvPr/>
-          </p:nvSpPr>
-          <p:spPr>
-            <a:xfrm>
-              <a:off x="4925854" y="4972050"/>
-              <a:ext cx="2309177" cy="914400"/>
-            </a:xfrm>
-            <a:prstGeom prst="roundRect">
-              <a:avLst/>
-            </a:prstGeom>
-            <a:ln w="28575">
-              <a:solidFill>
-                <a:schemeClr val="tx1"/>
-              </a:solidFill>
-            </a:ln>
-          </p:spPr>
-          <p:style>
-            <a:lnRef idx="2">
-              <a:schemeClr val="accent6"/>
-            </a:lnRef>
-            <a:fillRef idx="1">
-              <a:schemeClr val="lt1"/>
-            </a:fillRef>
-            <a:effectRef idx="0">
-              <a:schemeClr val="accent6"/>
-            </a:effectRef>
-            <a:fontRef idx="minor">
-              <a:schemeClr val="dk1"/>
-            </a:fontRef>
-          </p:style>
-          <p:txBody>
-            <a:bodyPr rtlCol="0" anchor="ctr"/>
-            <a:lstStyle/>
-            <a:p>
-              <a:pPr algn="ctr"/>
-              <a:r>
-                <a:rPr lang="en-US" dirty="0">
-                  <a:solidFill>
-                    <a:schemeClr val="tx1"/>
-                  </a:solidFill>
-                </a:rPr>
-                <a:t>Link to Category Best Sellers</a:t>
-              </a:r>
-            </a:p>
-          </p:txBody>
-        </p:sp>
-        <p:sp>
-          <p:nvSpPr>
-            <p:cNvPr id="7" name="Rectangle: Rounded Corners 6">
-              <a:extLst>
-                <a:ext uri="{FF2B5EF4-FFF2-40B4-BE49-F238E27FC236}">
-                  <a16:creationId xmlns:a16="http://schemas.microsoft.com/office/drawing/2014/main" id="{BCC1126B-0CA1-4E0F-A8D1-C6E9714413FA}"/>
-                </a:ext>
-              </a:extLst>
-            </p:cNvPr>
-            <p:cNvSpPr/>
-            <p:nvPr/>
-          </p:nvSpPr>
-          <p:spPr>
-            <a:xfrm>
-              <a:off x="8354854" y="4972050"/>
-              <a:ext cx="2309177" cy="914400"/>
-            </a:xfrm>
-            <a:prstGeom prst="roundRect">
-              <a:avLst/>
-            </a:prstGeom>
-            <a:ln w="28575">
-              <a:solidFill>
-                <a:schemeClr val="tx1"/>
-              </a:solidFill>
-            </a:ln>
-          </p:spPr>
-          <p:style>
-            <a:lnRef idx="2">
-              <a:schemeClr val="accent6"/>
-            </a:lnRef>
-            <a:fillRef idx="1">
-              <a:schemeClr val="lt1"/>
-            </a:fillRef>
-            <a:effectRef idx="0">
-              <a:schemeClr val="accent6"/>
-            </a:effectRef>
-            <a:fontRef idx="minor">
-              <a:schemeClr val="dk1"/>
-            </a:fontRef>
-          </p:style>
-          <p:txBody>
-            <a:bodyPr rtlCol="0" anchor="ctr"/>
-            <a:lstStyle/>
-            <a:p>
-              <a:pPr algn="ctr"/>
-              <a:r>
-                <a:rPr lang="en-US" dirty="0">
-                  <a:solidFill>
-                    <a:schemeClr val="tx1"/>
-                  </a:solidFill>
-                </a:rPr>
-                <a:t>Scrape Title Information from Results Page</a:t>
-              </a:r>
-            </a:p>
-          </p:txBody>
-        </p:sp>
-        <p:cxnSp>
-          <p:nvCxnSpPr>
-            <p:cNvPr id="9" name="Straight Arrow Connector 8">
-              <a:extLst>
-                <a:ext uri="{FF2B5EF4-FFF2-40B4-BE49-F238E27FC236}">
-                  <a16:creationId xmlns:a16="http://schemas.microsoft.com/office/drawing/2014/main" id="{6FE12409-4B1B-4AFC-8795-79DB7BC79CD9}"/>
-                </a:ext>
-              </a:extLst>
-            </p:cNvPr>
-            <p:cNvCxnSpPr/>
-            <p:nvPr/>
-          </p:nvCxnSpPr>
-          <p:spPr>
-            <a:xfrm>
-              <a:off x="3977640" y="5429250"/>
-              <a:ext cx="800100" cy="0"/>
-            </a:xfrm>
-            <a:prstGeom prst="straightConnector1">
-              <a:avLst/>
-            </a:prstGeom>
-            <a:ln w="38100">
-              <a:tailEnd type="triangle"/>
-            </a:ln>
-          </p:spPr>
-          <p:style>
-            <a:lnRef idx="1">
-              <a:schemeClr val="accent1"/>
-            </a:lnRef>
-            <a:fillRef idx="0">
-              <a:schemeClr val="accent1"/>
-            </a:fillRef>
-            <a:effectRef idx="0">
-              <a:schemeClr val="accent1"/>
-            </a:effectRef>
-            <a:fontRef idx="minor">
-              <a:schemeClr val="tx1"/>
-            </a:fontRef>
-          </p:style>
-        </p:cxnSp>
-        <p:cxnSp>
-          <p:nvCxnSpPr>
-            <p:cNvPr id="10" name="Straight Arrow Connector 9">
-              <a:extLst>
-                <a:ext uri="{FF2B5EF4-FFF2-40B4-BE49-F238E27FC236}">
-                  <a16:creationId xmlns:a16="http://schemas.microsoft.com/office/drawing/2014/main" id="{1075A49C-5F1E-4515-8085-3D3DDE106313}"/>
-                </a:ext>
-              </a:extLst>
-            </p:cNvPr>
-            <p:cNvCxnSpPr/>
-            <p:nvPr/>
-          </p:nvCxnSpPr>
-          <p:spPr>
-            <a:xfrm>
-              <a:off x="7399020" y="5429250"/>
-              <a:ext cx="800100" cy="0"/>
-            </a:xfrm>
-            <a:prstGeom prst="straightConnector1">
-              <a:avLst/>
-            </a:prstGeom>
-            <a:ln w="38100">
-              <a:tailEnd type="triangle"/>
-            </a:ln>
-          </p:spPr>
-          <p:style>
-            <a:lnRef idx="1">
-              <a:schemeClr val="accent1"/>
-            </a:lnRef>
-            <a:fillRef idx="0">
-              <a:schemeClr val="accent1"/>
-            </a:fillRef>
-            <a:effectRef idx="0">
-              <a:schemeClr val="accent1"/>
-            </a:effectRef>
-            <a:fontRef idx="minor">
-              <a:schemeClr val="tx1"/>
-            </a:fontRef>
-          </p:style>
-        </p:cxnSp>
-      </p:grpSp>
-    </p:spTree>
-    <p:extLst>
-      <p:ext uri="{BB962C8B-B14F-4D97-AF65-F5344CB8AC3E}">
-        <p14:creationId xmlns:p14="http://schemas.microsoft.com/office/powerpoint/2010/main" val="603850621"/>
-      </p:ext>
-    </p:extLst>
-  </p:cSld>
-  <p:clrMapOvr>
-    <a:masterClrMapping/>
-  </p:clrMapOvr>
-</p:sld>
-</file>
-
-<file path=ppt/slides/slide4.xml><?xml version="1.0" encoding="utf-8"?>
 <p:sld xmlns:a="http://schemas.openxmlformats.org/drawingml/2006/main" xmlns:r="http://schemas.openxmlformats.org/officeDocument/2006/relationships" xmlns:p="http://schemas.openxmlformats.org/presentationml/2006/main">
   <p:cSld>
     <p:spTree>
@@ -6725,6 +6316,45 @@
           </p:txBody>
         </p:sp>
       </p:grpSp>
+      <p:cxnSp>
+        <p:nvCxnSpPr>
+          <p:cNvPr id="28" name="Straight Connector 27">
+            <a:extLst>
+              <a:ext uri="{FF2B5EF4-FFF2-40B4-BE49-F238E27FC236}">
+                <a16:creationId xmlns:a16="http://schemas.microsoft.com/office/drawing/2014/main" id="{F12FF36F-1B96-4F0D-9D70-29FBFFB2D7BB}"/>
+              </a:ext>
+            </a:extLst>
+          </p:cNvPr>
+          <p:cNvCxnSpPr>
+            <a:cxnSpLocks/>
+          </p:cNvCxnSpPr>
+          <p:nvPr/>
+        </p:nvCxnSpPr>
+        <p:spPr>
+          <a:xfrm>
+            <a:off x="1111306" y="995320"/>
+            <a:ext cx="9969388" cy="0"/>
+          </a:xfrm>
+          <a:prstGeom prst="line">
+            <a:avLst/>
+          </a:prstGeom>
+          <a:ln w="3175"/>
+        </p:spPr>
+        <p:style>
+          <a:lnRef idx="1">
+            <a:schemeClr val="dk1"/>
+          </a:lnRef>
+          <a:fillRef idx="0">
+            <a:schemeClr val="dk1"/>
+          </a:fillRef>
+          <a:effectRef idx="0">
+            <a:schemeClr val="dk1"/>
+          </a:effectRef>
+          <a:fontRef idx="minor">
+            <a:schemeClr val="tx1"/>
+          </a:fontRef>
+        </p:style>
+      </p:cxnSp>
     </p:spTree>
     <p:extLst>
       <p:ext uri="{BB962C8B-B14F-4D97-AF65-F5344CB8AC3E}">
@@ -6738,7 +6368,994 @@
 </p:sld>
 </file>
 
+<file path=ppt/slides/slide4.xml><?xml version="1.0" encoding="utf-8"?>
+<p:sld xmlns:a="http://schemas.openxmlformats.org/drawingml/2006/main" xmlns:r="http://schemas.openxmlformats.org/officeDocument/2006/relationships" xmlns:p="http://schemas.openxmlformats.org/presentationml/2006/main">
+  <p:cSld>
+    <p:spTree>
+      <p:nvGrpSpPr>
+        <p:cNvPr id="1" name=""/>
+        <p:cNvGrpSpPr/>
+        <p:nvPr/>
+      </p:nvGrpSpPr>
+      <p:grpSpPr>
+        <a:xfrm>
+          <a:off x="0" y="0"/>
+          <a:ext cx="0" cy="0"/>
+          <a:chOff x="0" y="0"/>
+          <a:chExt cx="0" cy="0"/>
+        </a:xfrm>
+      </p:grpSpPr>
+      <p:pic>
+        <p:nvPicPr>
+          <p:cNvPr id="2" name="Content Placeholder 12" descr="Shape, square&#10;&#10;Description automatically generated">
+            <a:extLst>
+              <a:ext uri="{FF2B5EF4-FFF2-40B4-BE49-F238E27FC236}">
+                <a16:creationId xmlns:a16="http://schemas.microsoft.com/office/drawing/2014/main" id="{05F950B4-F982-415D-859E-184022B6F602}"/>
+              </a:ext>
+            </a:extLst>
+          </p:cNvPr>
+          <p:cNvPicPr>
+            <a:picLocks noChangeAspect="1"/>
+          </p:cNvPicPr>
+          <p:nvPr/>
+        </p:nvPicPr>
+        <p:blipFill>
+          <a:blip r:embed="rId2">
+            <a:extLst>
+              <a:ext uri="{28A0092B-C50C-407E-A947-70E740481C1C}">
+                <a14:useLocalDpi xmlns:a14="http://schemas.microsoft.com/office/drawing/2010/main" val="0"/>
+              </a:ext>
+            </a:extLst>
+          </a:blip>
+          <a:stretch>
+            <a:fillRect/>
+          </a:stretch>
+        </p:blipFill>
+        <p:spPr>
+          <a:xfrm>
+            <a:off x="600536" y="1212664"/>
+            <a:ext cx="5134102" cy="5134102"/>
+          </a:xfrm>
+          <a:prstGeom prst="rect">
+            <a:avLst/>
+          </a:prstGeom>
+        </p:spPr>
+      </p:pic>
+      <p:sp>
+        <p:nvSpPr>
+          <p:cNvPr id="3" name="Left Brace 2">
+            <a:extLst>
+              <a:ext uri="{FF2B5EF4-FFF2-40B4-BE49-F238E27FC236}">
+                <a16:creationId xmlns:a16="http://schemas.microsoft.com/office/drawing/2014/main" id="{2B5F841B-6CDB-4794-A6FC-B4BCC9F895B8}"/>
+              </a:ext>
+            </a:extLst>
+          </p:cNvPr>
+          <p:cNvSpPr/>
+          <p:nvPr/>
+        </p:nvSpPr>
+        <p:spPr>
+          <a:xfrm rot="5400000">
+            <a:off x="3871940" y="3983617"/>
+            <a:ext cx="210502" cy="2695596"/>
+          </a:xfrm>
+          <a:prstGeom prst="leftBrace">
+            <a:avLst/>
+          </a:prstGeom>
+          <a:ln w="19050"/>
+        </p:spPr>
+        <p:style>
+          <a:lnRef idx="1">
+            <a:schemeClr val="accent1"/>
+          </a:lnRef>
+          <a:fillRef idx="0">
+            <a:schemeClr val="accent1"/>
+          </a:fillRef>
+          <a:effectRef idx="0">
+            <a:schemeClr val="accent1"/>
+          </a:effectRef>
+          <a:fontRef idx="minor">
+            <a:schemeClr val="tx1"/>
+          </a:fontRef>
+        </p:style>
+        <p:txBody>
+          <a:bodyPr rtlCol="0" anchor="ctr"/>
+          <a:lstStyle/>
+          <a:p>
+            <a:pPr algn="ctr"/>
+            <a:endParaRPr lang="en-US"/>
+          </a:p>
+        </p:txBody>
+      </p:sp>
+      <p:sp>
+        <p:nvSpPr>
+          <p:cNvPr id="4" name="TextBox 3">
+            <a:extLst>
+              <a:ext uri="{FF2B5EF4-FFF2-40B4-BE49-F238E27FC236}">
+                <a16:creationId xmlns:a16="http://schemas.microsoft.com/office/drawing/2014/main" id="{60A7586A-69F8-4219-A04F-93E29B774C5B}"/>
+              </a:ext>
+            </a:extLst>
+          </p:cNvPr>
+          <p:cNvSpPr txBox="1"/>
+          <p:nvPr/>
+        </p:nvSpPr>
+        <p:spPr>
+          <a:xfrm>
+            <a:off x="3066857" y="4902285"/>
+            <a:ext cx="1912119" cy="307777"/>
+          </a:xfrm>
+          <a:prstGeom prst="rect">
+            <a:avLst/>
+          </a:prstGeom>
+          <a:noFill/>
+        </p:spPr>
+        <p:txBody>
+          <a:bodyPr wrap="square" rtlCol="0">
+            <a:spAutoFit/>
+          </a:bodyPr>
+          <a:lstStyle/>
+          <a:p>
+            <a:r>
+              <a:rPr lang="en-US" sz="1400" b="1" dirty="0"/>
+              <a:t>Top-Level Categories</a:t>
+            </a:r>
+          </a:p>
+        </p:txBody>
+      </p:sp>
+      <p:sp>
+        <p:nvSpPr>
+          <p:cNvPr id="6" name="Title 1">
+            <a:extLst>
+              <a:ext uri="{FF2B5EF4-FFF2-40B4-BE49-F238E27FC236}">
+                <a16:creationId xmlns:a16="http://schemas.microsoft.com/office/drawing/2014/main" id="{6FD61A1A-D6F6-434B-96EE-082FD5821625}"/>
+              </a:ext>
+            </a:extLst>
+          </p:cNvPr>
+          <p:cNvSpPr txBox="1">
+            <a:spLocks/>
+          </p:cNvSpPr>
+          <p:nvPr/>
+        </p:nvSpPr>
+        <p:spPr>
+          <a:xfrm>
+            <a:off x="1097280" y="286604"/>
+            <a:ext cx="10058400" cy="712638"/>
+          </a:xfrm>
+          <a:prstGeom prst="rect">
+            <a:avLst/>
+          </a:prstGeom>
+        </p:spPr>
+        <p:txBody>
+          <a:bodyPr/>
+          <a:lstStyle>
+            <a:lvl1pPr algn="l" defTabSz="914400" rtl="0" eaLnBrk="1" latinLnBrk="0" hangingPunct="1">
+              <a:lnSpc>
+                <a:spcPct val="85000"/>
+              </a:lnSpc>
+              <a:spcBef>
+                <a:spcPct val="0"/>
+              </a:spcBef>
+              <a:buNone/>
+              <a:defRPr sz="4800" kern="1200" spc="-50" baseline="0">
+                <a:solidFill>
+                  <a:schemeClr val="tx1">
+                    <a:lumMod val="75000"/>
+                    <a:lumOff val="25000"/>
+                  </a:schemeClr>
+                </a:solidFill>
+                <a:latin typeface="+mj-lt"/>
+                <a:ea typeface="+mj-ea"/>
+                <a:cs typeface="+mj-cs"/>
+              </a:defRPr>
+            </a:lvl1pPr>
+          </a:lstStyle>
+          <a:p>
+            <a:r>
+              <a:rPr lang="en-US" dirty="0"/>
+              <a:t>Skewed Title Distribution</a:t>
+            </a:r>
+          </a:p>
+        </p:txBody>
+      </p:sp>
+      <p:cxnSp>
+        <p:nvCxnSpPr>
+          <p:cNvPr id="7" name="Straight Connector 6">
+            <a:extLst>
+              <a:ext uri="{FF2B5EF4-FFF2-40B4-BE49-F238E27FC236}">
+                <a16:creationId xmlns:a16="http://schemas.microsoft.com/office/drawing/2014/main" id="{407540D5-504B-4B29-8F5C-FD404F5AAB14}"/>
+              </a:ext>
+            </a:extLst>
+          </p:cNvPr>
+          <p:cNvCxnSpPr>
+            <a:cxnSpLocks/>
+          </p:cNvCxnSpPr>
+          <p:nvPr/>
+        </p:nvCxnSpPr>
+        <p:spPr>
+          <a:xfrm>
+            <a:off x="1111306" y="995320"/>
+            <a:ext cx="9969388" cy="0"/>
+          </a:xfrm>
+          <a:prstGeom prst="line">
+            <a:avLst/>
+          </a:prstGeom>
+          <a:ln w="3175"/>
+        </p:spPr>
+        <p:style>
+          <a:lnRef idx="1">
+            <a:schemeClr val="dk1"/>
+          </a:lnRef>
+          <a:fillRef idx="0">
+            <a:schemeClr val="dk1"/>
+          </a:fillRef>
+          <a:effectRef idx="0">
+            <a:schemeClr val="dk1"/>
+          </a:effectRef>
+          <a:fontRef idx="minor">
+            <a:schemeClr val="tx1"/>
+          </a:fontRef>
+        </p:style>
+      </p:cxnSp>
+      <p:pic>
+        <p:nvPicPr>
+          <p:cNvPr id="9" name="Picture 8" descr="Chart, histogram&#10;&#10;Description automatically generated">
+            <a:extLst>
+              <a:ext uri="{FF2B5EF4-FFF2-40B4-BE49-F238E27FC236}">
+                <a16:creationId xmlns:a16="http://schemas.microsoft.com/office/drawing/2014/main" id="{1B0E100D-ECC0-4F91-8A3E-DA9A025F9008}"/>
+              </a:ext>
+            </a:extLst>
+          </p:cNvPr>
+          <p:cNvPicPr>
+            <a:picLocks noChangeAspect="1"/>
+          </p:cNvPicPr>
+          <p:nvPr/>
+        </p:nvPicPr>
+        <p:blipFill>
+          <a:blip r:embed="rId3">
+            <a:extLst>
+              <a:ext uri="{28A0092B-C50C-407E-A947-70E740481C1C}">
+                <a14:useLocalDpi xmlns:a14="http://schemas.microsoft.com/office/drawing/2010/main" val="0"/>
+              </a:ext>
+            </a:extLst>
+          </a:blip>
+          <a:stretch>
+            <a:fillRect/>
+          </a:stretch>
+        </p:blipFill>
+        <p:spPr>
+          <a:xfrm>
+            <a:off x="5853104" y="1212664"/>
+            <a:ext cx="5420485" cy="5140356"/>
+          </a:xfrm>
+          <a:prstGeom prst="rect">
+            <a:avLst/>
+          </a:prstGeom>
+        </p:spPr>
+      </p:pic>
+    </p:spTree>
+    <p:extLst>
+      <p:ext uri="{BB962C8B-B14F-4D97-AF65-F5344CB8AC3E}">
+        <p14:creationId xmlns:p14="http://schemas.microsoft.com/office/powerpoint/2010/main" val="2166900309"/>
+      </p:ext>
+    </p:extLst>
+  </p:cSld>
+  <p:clrMapOvr>
+    <a:masterClrMapping/>
+  </p:clrMapOvr>
+</p:sld>
+</file>
+
 <file path=ppt/slides/slide5.xml><?xml version="1.0" encoding="utf-8"?>
+<p:sld xmlns:a="http://schemas.openxmlformats.org/drawingml/2006/main" xmlns:r="http://schemas.openxmlformats.org/officeDocument/2006/relationships" xmlns:p="http://schemas.openxmlformats.org/presentationml/2006/main">
+  <p:cSld>
+    <p:spTree>
+      <p:nvGrpSpPr>
+        <p:cNvPr id="1" name=""/>
+        <p:cNvGrpSpPr/>
+        <p:nvPr/>
+      </p:nvGrpSpPr>
+      <p:grpSpPr>
+        <a:xfrm>
+          <a:off x="0" y="0"/>
+          <a:ext cx="0" cy="0"/>
+          <a:chOff x="0" y="0"/>
+          <a:chExt cx="0" cy="0"/>
+        </a:xfrm>
+      </p:grpSpPr>
+      <p:pic>
+        <p:nvPicPr>
+          <p:cNvPr id="2" name="Content Placeholder 12" descr="Shape, square&#10;&#10;Description automatically generated">
+            <a:extLst>
+              <a:ext uri="{FF2B5EF4-FFF2-40B4-BE49-F238E27FC236}">
+                <a16:creationId xmlns:a16="http://schemas.microsoft.com/office/drawing/2014/main" id="{05F950B4-F982-415D-859E-184022B6F602}"/>
+              </a:ext>
+            </a:extLst>
+          </p:cNvPr>
+          <p:cNvPicPr>
+            <a:picLocks noChangeAspect="1"/>
+          </p:cNvPicPr>
+          <p:nvPr/>
+        </p:nvPicPr>
+        <p:blipFill>
+          <a:blip r:embed="rId2">
+            <a:extLst>
+              <a:ext uri="{28A0092B-C50C-407E-A947-70E740481C1C}">
+                <a14:useLocalDpi xmlns:a14="http://schemas.microsoft.com/office/drawing/2010/main" val="0"/>
+              </a:ext>
+            </a:extLst>
+          </a:blip>
+          <a:stretch>
+            <a:fillRect/>
+          </a:stretch>
+        </p:blipFill>
+        <p:spPr>
+          <a:xfrm>
+            <a:off x="600536" y="1212664"/>
+            <a:ext cx="5134102" cy="5134102"/>
+          </a:xfrm>
+          <a:prstGeom prst="rect">
+            <a:avLst/>
+          </a:prstGeom>
+        </p:spPr>
+      </p:pic>
+      <p:sp>
+        <p:nvSpPr>
+          <p:cNvPr id="3" name="Left Brace 2">
+            <a:extLst>
+              <a:ext uri="{FF2B5EF4-FFF2-40B4-BE49-F238E27FC236}">
+                <a16:creationId xmlns:a16="http://schemas.microsoft.com/office/drawing/2014/main" id="{2B5F841B-6CDB-4794-A6FC-B4BCC9F895B8}"/>
+              </a:ext>
+            </a:extLst>
+          </p:cNvPr>
+          <p:cNvSpPr/>
+          <p:nvPr/>
+        </p:nvSpPr>
+        <p:spPr>
+          <a:xfrm rot="5400000">
+            <a:off x="3871940" y="3983617"/>
+            <a:ext cx="210502" cy="2695596"/>
+          </a:xfrm>
+          <a:prstGeom prst="leftBrace">
+            <a:avLst/>
+          </a:prstGeom>
+          <a:ln w="19050"/>
+        </p:spPr>
+        <p:style>
+          <a:lnRef idx="1">
+            <a:schemeClr val="accent1"/>
+          </a:lnRef>
+          <a:fillRef idx="0">
+            <a:schemeClr val="accent1"/>
+          </a:fillRef>
+          <a:effectRef idx="0">
+            <a:schemeClr val="accent1"/>
+          </a:effectRef>
+          <a:fontRef idx="minor">
+            <a:schemeClr val="tx1"/>
+          </a:fontRef>
+        </p:style>
+        <p:txBody>
+          <a:bodyPr rtlCol="0" anchor="ctr"/>
+          <a:lstStyle/>
+          <a:p>
+            <a:pPr algn="ctr"/>
+            <a:endParaRPr lang="en-US"/>
+          </a:p>
+        </p:txBody>
+      </p:sp>
+      <p:sp>
+        <p:nvSpPr>
+          <p:cNvPr id="4" name="TextBox 3">
+            <a:extLst>
+              <a:ext uri="{FF2B5EF4-FFF2-40B4-BE49-F238E27FC236}">
+                <a16:creationId xmlns:a16="http://schemas.microsoft.com/office/drawing/2014/main" id="{60A7586A-69F8-4219-A04F-93E29B774C5B}"/>
+              </a:ext>
+            </a:extLst>
+          </p:cNvPr>
+          <p:cNvSpPr txBox="1"/>
+          <p:nvPr/>
+        </p:nvSpPr>
+        <p:spPr>
+          <a:xfrm>
+            <a:off x="3066857" y="4902285"/>
+            <a:ext cx="1912119" cy="307777"/>
+          </a:xfrm>
+          <a:prstGeom prst="rect">
+            <a:avLst/>
+          </a:prstGeom>
+          <a:noFill/>
+        </p:spPr>
+        <p:txBody>
+          <a:bodyPr wrap="square" rtlCol="0">
+            <a:spAutoFit/>
+          </a:bodyPr>
+          <a:lstStyle/>
+          <a:p>
+            <a:r>
+              <a:rPr lang="en-US" sz="1400" b="1" dirty="0"/>
+              <a:t>Top-Level Categories</a:t>
+            </a:r>
+          </a:p>
+        </p:txBody>
+      </p:sp>
+      <p:sp>
+        <p:nvSpPr>
+          <p:cNvPr id="6" name="Title 1">
+            <a:extLst>
+              <a:ext uri="{FF2B5EF4-FFF2-40B4-BE49-F238E27FC236}">
+                <a16:creationId xmlns:a16="http://schemas.microsoft.com/office/drawing/2014/main" id="{6FD61A1A-D6F6-434B-96EE-082FD5821625}"/>
+              </a:ext>
+            </a:extLst>
+          </p:cNvPr>
+          <p:cNvSpPr txBox="1">
+            <a:spLocks/>
+          </p:cNvSpPr>
+          <p:nvPr/>
+        </p:nvSpPr>
+        <p:spPr>
+          <a:xfrm>
+            <a:off x="1097280" y="286604"/>
+            <a:ext cx="10058400" cy="712638"/>
+          </a:xfrm>
+          <a:prstGeom prst="rect">
+            <a:avLst/>
+          </a:prstGeom>
+        </p:spPr>
+        <p:txBody>
+          <a:bodyPr/>
+          <a:lstStyle>
+            <a:lvl1pPr algn="l" defTabSz="914400" rtl="0" eaLnBrk="1" latinLnBrk="0" hangingPunct="1">
+              <a:lnSpc>
+                <a:spcPct val="85000"/>
+              </a:lnSpc>
+              <a:spcBef>
+                <a:spcPct val="0"/>
+              </a:spcBef>
+              <a:buNone/>
+              <a:defRPr sz="4800" kern="1200" spc="-50" baseline="0">
+                <a:solidFill>
+                  <a:schemeClr val="tx1">
+                    <a:lumMod val="75000"/>
+                    <a:lumOff val="25000"/>
+                  </a:schemeClr>
+                </a:solidFill>
+                <a:latin typeface="+mj-lt"/>
+                <a:ea typeface="+mj-ea"/>
+                <a:cs typeface="+mj-cs"/>
+              </a:defRPr>
+            </a:lvl1pPr>
+          </a:lstStyle>
+          <a:p>
+            <a:r>
+              <a:rPr lang="en-US" dirty="0"/>
+              <a:t>Skewed Title Distribution</a:t>
+            </a:r>
+          </a:p>
+        </p:txBody>
+      </p:sp>
+      <p:cxnSp>
+        <p:nvCxnSpPr>
+          <p:cNvPr id="7" name="Straight Connector 6">
+            <a:extLst>
+              <a:ext uri="{FF2B5EF4-FFF2-40B4-BE49-F238E27FC236}">
+                <a16:creationId xmlns:a16="http://schemas.microsoft.com/office/drawing/2014/main" id="{407540D5-504B-4B29-8F5C-FD404F5AAB14}"/>
+              </a:ext>
+            </a:extLst>
+          </p:cNvPr>
+          <p:cNvCxnSpPr>
+            <a:cxnSpLocks/>
+          </p:cNvCxnSpPr>
+          <p:nvPr/>
+        </p:nvCxnSpPr>
+        <p:spPr>
+          <a:xfrm>
+            <a:off x="1111306" y="995320"/>
+            <a:ext cx="9969388" cy="0"/>
+          </a:xfrm>
+          <a:prstGeom prst="line">
+            <a:avLst/>
+          </a:prstGeom>
+          <a:ln w="3175"/>
+        </p:spPr>
+        <p:style>
+          <a:lnRef idx="1">
+            <a:schemeClr val="dk1"/>
+          </a:lnRef>
+          <a:fillRef idx="0">
+            <a:schemeClr val="dk1"/>
+          </a:fillRef>
+          <a:effectRef idx="0">
+            <a:schemeClr val="dk1"/>
+          </a:effectRef>
+          <a:fontRef idx="minor">
+            <a:schemeClr val="tx1"/>
+          </a:fontRef>
+        </p:style>
+      </p:cxnSp>
+      <p:pic>
+        <p:nvPicPr>
+          <p:cNvPr id="8" name="Picture 7" descr="Text&#10;&#10;Description automatically generated with low confidence">
+            <a:extLst>
+              <a:ext uri="{FF2B5EF4-FFF2-40B4-BE49-F238E27FC236}">
+                <a16:creationId xmlns:a16="http://schemas.microsoft.com/office/drawing/2014/main" id="{96A81BC6-BB12-4834-85D4-E354554C3C55}"/>
+              </a:ext>
+            </a:extLst>
+          </p:cNvPr>
+          <p:cNvPicPr>
+            <a:picLocks noChangeAspect="1"/>
+          </p:cNvPicPr>
+          <p:nvPr/>
+        </p:nvPicPr>
+        <p:blipFill>
+          <a:blip r:embed="rId3">
+            <a:extLst>
+              <a:ext uri="{28A0092B-C50C-407E-A947-70E740481C1C}">
+                <a14:useLocalDpi xmlns:a14="http://schemas.microsoft.com/office/drawing/2010/main" val="0"/>
+              </a:ext>
+            </a:extLst>
+          </a:blip>
+          <a:stretch>
+            <a:fillRect/>
+          </a:stretch>
+        </p:blipFill>
+        <p:spPr>
+          <a:xfrm>
+            <a:off x="6096000" y="1212664"/>
+            <a:ext cx="5334000" cy="5045304"/>
+          </a:xfrm>
+          <a:prstGeom prst="rect">
+            <a:avLst/>
+          </a:prstGeom>
+        </p:spPr>
+      </p:pic>
+    </p:spTree>
+    <p:extLst>
+      <p:ext uri="{BB962C8B-B14F-4D97-AF65-F5344CB8AC3E}">
+        <p14:creationId xmlns:p14="http://schemas.microsoft.com/office/powerpoint/2010/main" val="3880965211"/>
+      </p:ext>
+    </p:extLst>
+  </p:cSld>
+  <p:clrMapOvr>
+    <a:masterClrMapping/>
+  </p:clrMapOvr>
+</p:sld>
+</file>
+
+<file path=ppt/slides/slide6.xml><?xml version="1.0" encoding="utf-8"?>
+<p:sld xmlns:a="http://schemas.openxmlformats.org/drawingml/2006/main" xmlns:r="http://schemas.openxmlformats.org/officeDocument/2006/relationships" xmlns:p="http://schemas.openxmlformats.org/presentationml/2006/main">
+  <p:cSld>
+    <p:spTree>
+      <p:nvGrpSpPr>
+        <p:cNvPr id="1" name=""/>
+        <p:cNvGrpSpPr/>
+        <p:nvPr/>
+      </p:nvGrpSpPr>
+      <p:grpSpPr>
+        <a:xfrm>
+          <a:off x="0" y="0"/>
+          <a:ext cx="0" cy="0"/>
+          <a:chOff x="0" y="0"/>
+          <a:chExt cx="0" cy="0"/>
+        </a:xfrm>
+      </p:grpSpPr>
+      <p:grpSp>
+        <p:nvGrpSpPr>
+          <p:cNvPr id="4" name="Group 3">
+            <a:extLst>
+              <a:ext uri="{FF2B5EF4-FFF2-40B4-BE49-F238E27FC236}">
+                <a16:creationId xmlns:a16="http://schemas.microsoft.com/office/drawing/2014/main" id="{794FFCAA-D045-46C2-BF26-C6AFC06B90C2}"/>
+              </a:ext>
+            </a:extLst>
+          </p:cNvPr>
+          <p:cNvGrpSpPr/>
+          <p:nvPr/>
+        </p:nvGrpSpPr>
+        <p:grpSpPr>
+          <a:xfrm>
+            <a:off x="1066798" y="209982"/>
+            <a:ext cx="10058400" cy="870094"/>
+            <a:chOff x="1066798" y="209982"/>
+            <a:chExt cx="10058400" cy="870094"/>
+          </a:xfrm>
+        </p:grpSpPr>
+        <p:sp>
+          <p:nvSpPr>
+            <p:cNvPr id="2" name="Title 1">
+              <a:extLst>
+                <a:ext uri="{FF2B5EF4-FFF2-40B4-BE49-F238E27FC236}">
+                  <a16:creationId xmlns:a16="http://schemas.microsoft.com/office/drawing/2014/main" id="{B898D37B-FC34-487E-97CA-D605BE85E50F}"/>
+                </a:ext>
+              </a:extLst>
+            </p:cNvPr>
+            <p:cNvSpPr txBox="1">
+              <a:spLocks/>
+            </p:cNvSpPr>
+            <p:nvPr/>
+          </p:nvSpPr>
+          <p:spPr>
+            <a:xfrm>
+              <a:off x="1066798" y="209982"/>
+              <a:ext cx="10058400" cy="870094"/>
+            </a:xfrm>
+            <a:prstGeom prst="rect">
+              <a:avLst/>
+            </a:prstGeom>
+          </p:spPr>
+          <p:txBody>
+            <a:bodyPr/>
+            <a:lstStyle>
+              <a:lvl1pPr algn="l" defTabSz="914400" rtl="0" eaLnBrk="1" latinLnBrk="0" hangingPunct="1">
+                <a:lnSpc>
+                  <a:spcPct val="85000"/>
+                </a:lnSpc>
+                <a:spcBef>
+                  <a:spcPct val="0"/>
+                </a:spcBef>
+                <a:buNone/>
+                <a:defRPr sz="4800" kern="1200" spc="-50" baseline="0">
+                  <a:solidFill>
+                    <a:schemeClr val="tx1">
+                      <a:lumMod val="75000"/>
+                      <a:lumOff val="25000"/>
+                    </a:schemeClr>
+                  </a:solidFill>
+                  <a:latin typeface="+mj-lt"/>
+                  <a:ea typeface="+mj-ea"/>
+                  <a:cs typeface="+mj-cs"/>
+                </a:defRPr>
+              </a:lvl1pPr>
+            </a:lstStyle>
+            <a:p>
+              <a:r>
+                <a:rPr lang="en-US" dirty="0"/>
+                <a:t>Network connectivity Histogram?</a:t>
+              </a:r>
+            </a:p>
+          </p:txBody>
+        </p:sp>
+        <p:cxnSp>
+          <p:nvCxnSpPr>
+            <p:cNvPr id="3" name="Straight Connector 2">
+              <a:extLst>
+                <a:ext uri="{FF2B5EF4-FFF2-40B4-BE49-F238E27FC236}">
+                  <a16:creationId xmlns:a16="http://schemas.microsoft.com/office/drawing/2014/main" id="{96E0E1CA-7566-4D27-8472-A7A41DCA9897}"/>
+                </a:ext>
+              </a:extLst>
+            </p:cNvPr>
+            <p:cNvCxnSpPr>
+              <a:cxnSpLocks/>
+            </p:cNvCxnSpPr>
+            <p:nvPr/>
+          </p:nvCxnSpPr>
+          <p:spPr>
+            <a:xfrm>
+              <a:off x="1111306" y="995320"/>
+              <a:ext cx="9969388" cy="0"/>
+            </a:xfrm>
+            <a:prstGeom prst="line">
+              <a:avLst/>
+            </a:prstGeom>
+            <a:ln w="3175"/>
+          </p:spPr>
+          <p:style>
+            <a:lnRef idx="1">
+              <a:schemeClr val="dk1"/>
+            </a:lnRef>
+            <a:fillRef idx="0">
+              <a:schemeClr val="dk1"/>
+            </a:fillRef>
+            <a:effectRef idx="0">
+              <a:schemeClr val="dk1"/>
+            </a:effectRef>
+            <a:fontRef idx="minor">
+              <a:schemeClr val="tx1"/>
+            </a:fontRef>
+          </p:style>
+        </p:cxnSp>
+      </p:grpSp>
+    </p:spTree>
+    <p:extLst>
+      <p:ext uri="{BB962C8B-B14F-4D97-AF65-F5344CB8AC3E}">
+        <p14:creationId xmlns:p14="http://schemas.microsoft.com/office/powerpoint/2010/main" val="1313986123"/>
+      </p:ext>
+    </p:extLst>
+  </p:cSld>
+  <p:clrMapOvr>
+    <a:masterClrMapping/>
+  </p:clrMapOvr>
+</p:sld>
+</file>
+
+<file path=ppt/slides/slide7.xml><?xml version="1.0" encoding="utf-8"?>
+<p:sld xmlns:a="http://schemas.openxmlformats.org/drawingml/2006/main" xmlns:r="http://schemas.openxmlformats.org/officeDocument/2006/relationships" xmlns:p="http://schemas.openxmlformats.org/presentationml/2006/main">
+  <p:cSld>
+    <p:spTree>
+      <p:nvGrpSpPr>
+        <p:cNvPr id="1" name=""/>
+        <p:cNvGrpSpPr/>
+        <p:nvPr/>
+      </p:nvGrpSpPr>
+      <p:grpSpPr>
+        <a:xfrm>
+          <a:off x="0" y="0"/>
+          <a:ext cx="0" cy="0"/>
+          <a:chOff x="0" y="0"/>
+          <a:chExt cx="0" cy="0"/>
+        </a:xfrm>
+      </p:grpSpPr>
+      <p:grpSp>
+        <p:nvGrpSpPr>
+          <p:cNvPr id="4" name="Group 3">
+            <a:extLst>
+              <a:ext uri="{FF2B5EF4-FFF2-40B4-BE49-F238E27FC236}">
+                <a16:creationId xmlns:a16="http://schemas.microsoft.com/office/drawing/2014/main" id="{794FFCAA-D045-46C2-BF26-C6AFC06B90C2}"/>
+              </a:ext>
+            </a:extLst>
+          </p:cNvPr>
+          <p:cNvGrpSpPr/>
+          <p:nvPr/>
+        </p:nvGrpSpPr>
+        <p:grpSpPr>
+          <a:xfrm>
+            <a:off x="1066798" y="209982"/>
+            <a:ext cx="10058400" cy="870094"/>
+            <a:chOff x="1066798" y="209982"/>
+            <a:chExt cx="10058400" cy="870094"/>
+          </a:xfrm>
+        </p:grpSpPr>
+        <p:sp>
+          <p:nvSpPr>
+            <p:cNvPr id="2" name="Title 1">
+              <a:extLst>
+                <a:ext uri="{FF2B5EF4-FFF2-40B4-BE49-F238E27FC236}">
+                  <a16:creationId xmlns:a16="http://schemas.microsoft.com/office/drawing/2014/main" id="{B898D37B-FC34-487E-97CA-D605BE85E50F}"/>
+                </a:ext>
+              </a:extLst>
+            </p:cNvPr>
+            <p:cNvSpPr txBox="1">
+              <a:spLocks/>
+            </p:cNvSpPr>
+            <p:nvPr/>
+          </p:nvSpPr>
+          <p:spPr>
+            <a:xfrm>
+              <a:off x="1066798" y="209982"/>
+              <a:ext cx="10058400" cy="870094"/>
+            </a:xfrm>
+            <a:prstGeom prst="rect">
+              <a:avLst/>
+            </a:prstGeom>
+          </p:spPr>
+          <p:txBody>
+            <a:bodyPr/>
+            <a:lstStyle>
+              <a:lvl1pPr algn="l" defTabSz="914400" rtl="0" eaLnBrk="1" latinLnBrk="0" hangingPunct="1">
+                <a:lnSpc>
+                  <a:spcPct val="85000"/>
+                </a:lnSpc>
+                <a:spcBef>
+                  <a:spcPct val="0"/>
+                </a:spcBef>
+                <a:buNone/>
+                <a:defRPr sz="4800" kern="1200" spc="-50" baseline="0">
+                  <a:solidFill>
+                    <a:schemeClr val="tx1">
+                      <a:lumMod val="75000"/>
+                      <a:lumOff val="25000"/>
+                    </a:schemeClr>
+                  </a:solidFill>
+                  <a:latin typeface="+mj-lt"/>
+                  <a:ea typeface="+mj-ea"/>
+                  <a:cs typeface="+mj-cs"/>
+                </a:defRPr>
+              </a:lvl1pPr>
+            </a:lstStyle>
+            <a:p>
+              <a:r>
+                <a:rPr lang="en-US" dirty="0"/>
+                <a:t>Network graph</a:t>
+              </a:r>
+            </a:p>
+          </p:txBody>
+        </p:sp>
+        <p:cxnSp>
+          <p:nvCxnSpPr>
+            <p:cNvPr id="3" name="Straight Connector 2">
+              <a:extLst>
+                <a:ext uri="{FF2B5EF4-FFF2-40B4-BE49-F238E27FC236}">
+                  <a16:creationId xmlns:a16="http://schemas.microsoft.com/office/drawing/2014/main" id="{96E0E1CA-7566-4D27-8472-A7A41DCA9897}"/>
+                </a:ext>
+              </a:extLst>
+            </p:cNvPr>
+            <p:cNvCxnSpPr>
+              <a:cxnSpLocks/>
+            </p:cNvCxnSpPr>
+            <p:nvPr/>
+          </p:nvCxnSpPr>
+          <p:spPr>
+            <a:xfrm>
+              <a:off x="1111306" y="995320"/>
+              <a:ext cx="9969388" cy="0"/>
+            </a:xfrm>
+            <a:prstGeom prst="line">
+              <a:avLst/>
+            </a:prstGeom>
+            <a:ln w="3175"/>
+          </p:spPr>
+          <p:style>
+            <a:lnRef idx="1">
+              <a:schemeClr val="dk1"/>
+            </a:lnRef>
+            <a:fillRef idx="0">
+              <a:schemeClr val="dk1"/>
+            </a:fillRef>
+            <a:effectRef idx="0">
+              <a:schemeClr val="dk1"/>
+            </a:effectRef>
+            <a:fontRef idx="minor">
+              <a:schemeClr val="tx1"/>
+            </a:fontRef>
+          </p:style>
+        </p:cxnSp>
+      </p:grpSp>
+    </p:spTree>
+    <p:extLst>
+      <p:ext uri="{BB962C8B-B14F-4D97-AF65-F5344CB8AC3E}">
+        <p14:creationId xmlns:p14="http://schemas.microsoft.com/office/powerpoint/2010/main" val="4022050196"/>
+      </p:ext>
+    </p:extLst>
+  </p:cSld>
+  <p:clrMapOvr>
+    <a:masterClrMapping/>
+  </p:clrMapOvr>
+</p:sld>
+</file>
+
+<file path=ppt/slides/slide8.xml><?xml version="1.0" encoding="utf-8"?>
+<p:sld xmlns:a="http://schemas.openxmlformats.org/drawingml/2006/main" xmlns:r="http://schemas.openxmlformats.org/officeDocument/2006/relationships" xmlns:p="http://schemas.openxmlformats.org/presentationml/2006/main">
+  <p:cSld>
+    <p:spTree>
+      <p:nvGrpSpPr>
+        <p:cNvPr id="1" name=""/>
+        <p:cNvGrpSpPr/>
+        <p:nvPr/>
+      </p:nvGrpSpPr>
+      <p:grpSpPr>
+        <a:xfrm>
+          <a:off x="0" y="0"/>
+          <a:ext cx="0" cy="0"/>
+          <a:chOff x="0" y="0"/>
+          <a:chExt cx="0" cy="0"/>
+        </a:xfrm>
+      </p:grpSpPr>
+      <p:grpSp>
+        <p:nvGrpSpPr>
+          <p:cNvPr id="4" name="Group 3">
+            <a:extLst>
+              <a:ext uri="{FF2B5EF4-FFF2-40B4-BE49-F238E27FC236}">
+                <a16:creationId xmlns:a16="http://schemas.microsoft.com/office/drawing/2014/main" id="{794FFCAA-D045-46C2-BF26-C6AFC06B90C2}"/>
+              </a:ext>
+            </a:extLst>
+          </p:cNvPr>
+          <p:cNvGrpSpPr/>
+          <p:nvPr/>
+        </p:nvGrpSpPr>
+        <p:grpSpPr>
+          <a:xfrm>
+            <a:off x="1066798" y="209982"/>
+            <a:ext cx="10058400" cy="870094"/>
+            <a:chOff x="1066798" y="209982"/>
+            <a:chExt cx="10058400" cy="870094"/>
+          </a:xfrm>
+        </p:grpSpPr>
+        <p:sp>
+          <p:nvSpPr>
+            <p:cNvPr id="2" name="Title 1">
+              <a:extLst>
+                <a:ext uri="{FF2B5EF4-FFF2-40B4-BE49-F238E27FC236}">
+                  <a16:creationId xmlns:a16="http://schemas.microsoft.com/office/drawing/2014/main" id="{B898D37B-FC34-487E-97CA-D605BE85E50F}"/>
+                </a:ext>
+              </a:extLst>
+            </p:cNvPr>
+            <p:cNvSpPr txBox="1">
+              <a:spLocks/>
+            </p:cNvSpPr>
+            <p:nvPr/>
+          </p:nvSpPr>
+          <p:spPr>
+            <a:xfrm>
+              <a:off x="1066798" y="209982"/>
+              <a:ext cx="10058400" cy="870094"/>
+            </a:xfrm>
+            <a:prstGeom prst="rect">
+              <a:avLst/>
+            </a:prstGeom>
+          </p:spPr>
+          <p:txBody>
+            <a:bodyPr/>
+            <a:lstStyle>
+              <a:lvl1pPr algn="l" defTabSz="914400" rtl="0" eaLnBrk="1" latinLnBrk="0" hangingPunct="1">
+                <a:lnSpc>
+                  <a:spcPct val="85000"/>
+                </a:lnSpc>
+                <a:spcBef>
+                  <a:spcPct val="0"/>
+                </a:spcBef>
+                <a:buNone/>
+                <a:defRPr sz="4800" kern="1200" spc="-50" baseline="0">
+                  <a:solidFill>
+                    <a:schemeClr val="tx1">
+                      <a:lumMod val="75000"/>
+                      <a:lumOff val="25000"/>
+                    </a:schemeClr>
+                  </a:solidFill>
+                  <a:latin typeface="+mj-lt"/>
+                  <a:ea typeface="+mj-ea"/>
+                  <a:cs typeface="+mj-cs"/>
+                </a:defRPr>
+              </a:lvl1pPr>
+            </a:lstStyle>
+            <a:p>
+              <a:r>
+                <a:rPr lang="en-US" dirty="0"/>
+                <a:t>Template</a:t>
+              </a:r>
+            </a:p>
+          </p:txBody>
+        </p:sp>
+        <p:cxnSp>
+          <p:nvCxnSpPr>
+            <p:cNvPr id="3" name="Straight Connector 2">
+              <a:extLst>
+                <a:ext uri="{FF2B5EF4-FFF2-40B4-BE49-F238E27FC236}">
+                  <a16:creationId xmlns:a16="http://schemas.microsoft.com/office/drawing/2014/main" id="{96E0E1CA-7566-4D27-8472-A7A41DCA9897}"/>
+                </a:ext>
+              </a:extLst>
+            </p:cNvPr>
+            <p:cNvCxnSpPr>
+              <a:cxnSpLocks/>
+            </p:cNvCxnSpPr>
+            <p:nvPr/>
+          </p:nvCxnSpPr>
+          <p:spPr>
+            <a:xfrm>
+              <a:off x="1111306" y="995320"/>
+              <a:ext cx="9969388" cy="0"/>
+            </a:xfrm>
+            <a:prstGeom prst="line">
+              <a:avLst/>
+            </a:prstGeom>
+            <a:ln w="3175"/>
+          </p:spPr>
+          <p:style>
+            <a:lnRef idx="1">
+              <a:schemeClr val="dk1"/>
+            </a:lnRef>
+            <a:fillRef idx="0">
+              <a:schemeClr val="dk1"/>
+            </a:fillRef>
+            <a:effectRef idx="0">
+              <a:schemeClr val="dk1"/>
+            </a:effectRef>
+            <a:fontRef idx="minor">
+              <a:schemeClr val="tx1"/>
+            </a:fontRef>
+          </p:style>
+        </p:cxnSp>
+      </p:grpSp>
+    </p:spTree>
+    <p:extLst>
+      <p:ext uri="{BB962C8B-B14F-4D97-AF65-F5344CB8AC3E}">
+        <p14:creationId xmlns:p14="http://schemas.microsoft.com/office/powerpoint/2010/main" val="3537599579"/>
+      </p:ext>
+    </p:extLst>
+  </p:cSld>
+  <p:clrMapOvr>
+    <a:masterClrMapping/>
+  </p:clrMapOvr>
+</p:sld>
+</file>
+
+<file path=ppt/slides/slide9.xml><?xml version="1.0" encoding="utf-8"?>
 <p:sld xmlns:a="http://schemas.openxmlformats.org/drawingml/2006/main" xmlns:r="http://schemas.openxmlformats.org/officeDocument/2006/relationships" xmlns:p="http://schemas.openxmlformats.org/presentationml/2006/main">
   <p:cSld>
     <p:spTree>
@@ -7045,7 +7662,7 @@
         </p:nvGrpSpPr>
         <p:grpSpPr>
           <a:xfrm>
-            <a:off x="1339088" y="1254290"/>
+            <a:off x="1066798" y="1080076"/>
             <a:ext cx="9513818" cy="3730352"/>
             <a:chOff x="1589801" y="1244863"/>
             <a:chExt cx="9513818" cy="3730352"/>
@@ -7804,619 +8421,49 @@
           </a:p>
         </p:txBody>
       </p:sp>
-    </p:spTree>
-    <p:extLst>
-      <p:ext uri="{BB962C8B-B14F-4D97-AF65-F5344CB8AC3E}">
-        <p14:creationId xmlns:p14="http://schemas.microsoft.com/office/powerpoint/2010/main" val="2647319182"/>
-      </p:ext>
-    </p:extLst>
-  </p:cSld>
-  <p:clrMapOvr>
-    <a:masterClrMapping/>
-  </p:clrMapOvr>
-</p:sld>
-</file>
-
-<file path=ppt/slides/slide6.xml><?xml version="1.0" encoding="utf-8"?>
-<p:sld xmlns:a="http://schemas.openxmlformats.org/drawingml/2006/main" xmlns:r="http://schemas.openxmlformats.org/officeDocument/2006/relationships" xmlns:p="http://schemas.openxmlformats.org/presentationml/2006/main">
-  <p:cSld>
-    <p:spTree>
-      <p:nvGrpSpPr>
-        <p:cNvPr id="1" name=""/>
-        <p:cNvGrpSpPr/>
-        <p:nvPr/>
-      </p:nvGrpSpPr>
-      <p:grpSpPr>
-        <a:xfrm>
-          <a:off x="0" y="0"/>
-          <a:ext cx="0" cy="0"/>
-          <a:chOff x="0" y="0"/>
-          <a:chExt cx="0" cy="0"/>
-        </a:xfrm>
-      </p:grpSpPr>
-      <p:sp>
-        <p:nvSpPr>
-          <p:cNvPr id="2" name="Title 1">
+      <p:cxnSp>
+        <p:nvCxnSpPr>
+          <p:cNvPr id="60" name="Straight Connector 59">
             <a:extLst>
               <a:ext uri="{FF2B5EF4-FFF2-40B4-BE49-F238E27FC236}">
-                <a16:creationId xmlns:a16="http://schemas.microsoft.com/office/drawing/2014/main" id="{8AB1FFBA-C49C-4D27-9F5C-8C91B59FBE93}"/>
+                <a16:creationId xmlns:a16="http://schemas.microsoft.com/office/drawing/2014/main" id="{431684B6-ACE2-416C-BA1C-3AF958FF30A6}"/>
               </a:ext>
             </a:extLst>
           </p:cNvPr>
-          <p:cNvSpPr>
-            <a:spLocks noGrp="1"/>
-          </p:cNvSpPr>
-          <p:nvPr>
-            <p:ph type="title"/>
-          </p:nvPr>
-        </p:nvSpPr>
-        <p:spPr/>
-        <p:txBody>
-          <a:bodyPr/>
-          <a:lstStyle/>
-          <a:p>
-            <a:r>
-              <a:rPr lang="en-US" dirty="0"/>
-              <a:t>Book Categories</a:t>
-            </a:r>
-          </a:p>
-        </p:txBody>
-      </p:sp>
-      <p:pic>
-        <p:nvPicPr>
-          <p:cNvPr id="13" name="Content Placeholder 12" descr="Shape, square&#10;&#10;Description automatically generated">
-            <a:extLst>
-              <a:ext uri="{FF2B5EF4-FFF2-40B4-BE49-F238E27FC236}">
-                <a16:creationId xmlns:a16="http://schemas.microsoft.com/office/drawing/2014/main" id="{6C56C88D-1072-4C2D-BB2E-81FC6E8177C4}"/>
-              </a:ext>
-            </a:extLst>
-          </p:cNvPr>
-          <p:cNvPicPr>
-            <a:picLocks noGrp="1" noChangeAspect="1"/>
-          </p:cNvPicPr>
-          <p:nvPr>
-            <p:ph idx="1"/>
-          </p:nvPr>
-        </p:nvPicPr>
-        <p:blipFill>
-          <a:blip r:embed="rId2">
-            <a:extLst>
-              <a:ext uri="{28A0092B-C50C-407E-A947-70E740481C1C}">
-                <a14:useLocalDpi xmlns:a14="http://schemas.microsoft.com/office/drawing/2010/main" val="0"/>
-              </a:ext>
-            </a:extLst>
-          </a:blip>
-          <a:stretch>
-            <a:fillRect/>
-          </a:stretch>
-        </p:blipFill>
+          <p:cNvCxnSpPr>
+            <a:cxnSpLocks/>
+          </p:cNvCxnSpPr>
+          <p:nvPr/>
+        </p:nvCxnSpPr>
         <p:spPr>
           <a:xfrm>
-            <a:off x="1097280" y="1783667"/>
-            <a:ext cx="4534817" cy="4534817"/>
+            <a:off x="1111306" y="995320"/>
+            <a:ext cx="9969388" cy="0"/>
           </a:xfrm>
-        </p:spPr>
-      </p:pic>
-      <p:sp>
-        <p:nvSpPr>
-          <p:cNvPr id="16" name="Left Brace 15">
-            <a:extLst>
-              <a:ext uri="{FF2B5EF4-FFF2-40B4-BE49-F238E27FC236}">
-                <a16:creationId xmlns:a16="http://schemas.microsoft.com/office/drawing/2014/main" id="{8CDCAC04-95D5-4439-ADA0-F8E5250381FC}"/>
-              </a:ext>
-            </a:extLst>
-          </p:cNvPr>
-          <p:cNvSpPr/>
-          <p:nvPr/>
-        </p:nvSpPr>
-        <p:spPr>
-          <a:xfrm rot="5400000">
-            <a:off x="3939009" y="4124944"/>
-            <a:ext cx="185931" cy="2380949"/>
-          </a:xfrm>
-          <a:prstGeom prst="leftBrace">
+          <a:prstGeom prst="line">
             <a:avLst/>
           </a:prstGeom>
-          <a:ln w="19050"/>
+          <a:ln w="3175"/>
         </p:spPr>
         <p:style>
           <a:lnRef idx="1">
-            <a:schemeClr val="accent1"/>
+            <a:schemeClr val="dk1"/>
           </a:lnRef>
           <a:fillRef idx="0">
-            <a:schemeClr val="accent1"/>
+            <a:schemeClr val="dk1"/>
           </a:fillRef>
           <a:effectRef idx="0">
-            <a:schemeClr val="accent1"/>
+            <a:schemeClr val="dk1"/>
           </a:effectRef>
           <a:fontRef idx="minor">
             <a:schemeClr val="tx1"/>
           </a:fontRef>
         </p:style>
-        <p:txBody>
-          <a:bodyPr rtlCol="0" anchor="ctr"/>
-          <a:lstStyle/>
-          <a:p>
-            <a:pPr algn="ctr"/>
-            <a:endParaRPr lang="en-US"/>
-          </a:p>
-        </p:txBody>
-      </p:sp>
-      <p:sp>
-        <p:nvSpPr>
-          <p:cNvPr id="17" name="TextBox 16">
-            <a:extLst>
-              <a:ext uri="{FF2B5EF4-FFF2-40B4-BE49-F238E27FC236}">
-                <a16:creationId xmlns:a16="http://schemas.microsoft.com/office/drawing/2014/main" id="{B123436B-D07E-423D-AFF2-A611B65B3BE2}"/>
-              </a:ext>
-            </a:extLst>
-          </p:cNvPr>
-          <p:cNvSpPr txBox="1"/>
-          <p:nvPr/>
-        </p:nvSpPr>
-        <p:spPr>
-          <a:xfrm>
-            <a:off x="3187512" y="4914676"/>
-            <a:ext cx="1688924" cy="307777"/>
-          </a:xfrm>
-          <a:prstGeom prst="rect">
-            <a:avLst/>
-          </a:prstGeom>
-          <a:noFill/>
-        </p:spPr>
-        <p:txBody>
-          <a:bodyPr wrap="none" rtlCol="0">
-            <a:spAutoFit/>
-          </a:bodyPr>
-          <a:lstStyle/>
-          <a:p>
-            <a:r>
-              <a:rPr lang="en-US" sz="1400" dirty="0"/>
-              <a:t>Top-Level Categories</a:t>
-            </a:r>
-          </a:p>
-        </p:txBody>
-      </p:sp>
-      <p:pic>
-        <p:nvPicPr>
-          <p:cNvPr id="19" name="Picture 18" descr="Chart, histogram&#10;&#10;Description automatically generated">
-            <a:extLst>
-              <a:ext uri="{FF2B5EF4-FFF2-40B4-BE49-F238E27FC236}">
-                <a16:creationId xmlns:a16="http://schemas.microsoft.com/office/drawing/2014/main" id="{74D7A5D7-724C-42B3-BFF1-A19206E61F3C}"/>
-              </a:ext>
-            </a:extLst>
-          </p:cNvPr>
-          <p:cNvPicPr>
-            <a:picLocks noChangeAspect="1"/>
-          </p:cNvPicPr>
-          <p:nvPr/>
-        </p:nvPicPr>
-        <p:blipFill>
-          <a:blip r:embed="rId3">
-            <a:extLst>
-              <a:ext uri="{28A0092B-C50C-407E-A947-70E740481C1C}">
-                <a14:useLocalDpi xmlns:a14="http://schemas.microsoft.com/office/drawing/2010/main" val="0"/>
-              </a:ext>
-            </a:extLst>
-          </a:blip>
-          <a:stretch>
-            <a:fillRect/>
-          </a:stretch>
-        </p:blipFill>
-        <p:spPr>
-          <a:xfrm>
-            <a:off x="6255368" y="1830802"/>
-            <a:ext cx="4534818" cy="4414531"/>
-          </a:xfrm>
-          <a:prstGeom prst="rect">
-            <a:avLst/>
-          </a:prstGeom>
-        </p:spPr>
-      </p:pic>
+      </p:cxnSp>
     </p:spTree>
     <p:extLst>
       <p:ext uri="{BB962C8B-B14F-4D97-AF65-F5344CB8AC3E}">
-        <p14:creationId xmlns:p14="http://schemas.microsoft.com/office/powerpoint/2010/main" val="2889578137"/>
-      </p:ext>
-    </p:extLst>
-  </p:cSld>
-  <p:clrMapOvr>
-    <a:masterClrMapping/>
-  </p:clrMapOvr>
-</p:sld>
-</file>
-
-<file path=ppt/slides/slide7.xml><?xml version="1.0" encoding="utf-8"?>
-<p:sld xmlns:a="http://schemas.openxmlformats.org/drawingml/2006/main" xmlns:r="http://schemas.openxmlformats.org/officeDocument/2006/relationships" xmlns:p="http://schemas.openxmlformats.org/presentationml/2006/main">
-  <p:cSld>
-    <p:spTree>
-      <p:nvGrpSpPr>
-        <p:cNvPr id="1" name=""/>
-        <p:cNvGrpSpPr/>
-        <p:nvPr/>
-      </p:nvGrpSpPr>
-      <p:grpSpPr>
-        <a:xfrm>
-          <a:off x="0" y="0"/>
-          <a:ext cx="0" cy="0"/>
-          <a:chOff x="0" y="0"/>
-          <a:chExt cx="0" cy="0"/>
-        </a:xfrm>
-      </p:grpSpPr>
-      <p:pic>
-        <p:nvPicPr>
-          <p:cNvPr id="2" name="Content Placeholder 12" descr="Shape, square&#10;&#10;Description automatically generated">
-            <a:extLst>
-              <a:ext uri="{FF2B5EF4-FFF2-40B4-BE49-F238E27FC236}">
-                <a16:creationId xmlns:a16="http://schemas.microsoft.com/office/drawing/2014/main" id="{05F950B4-F982-415D-859E-184022B6F602}"/>
-              </a:ext>
-            </a:extLst>
-          </p:cNvPr>
-          <p:cNvPicPr>
-            <a:picLocks noChangeAspect="1"/>
-          </p:cNvPicPr>
-          <p:nvPr/>
-        </p:nvPicPr>
-        <p:blipFill>
-          <a:blip r:embed="rId2">
-            <a:extLst>
-              <a:ext uri="{28A0092B-C50C-407E-A947-70E740481C1C}">
-                <a14:useLocalDpi xmlns:a14="http://schemas.microsoft.com/office/drawing/2010/main" val="0"/>
-              </a:ext>
-            </a:extLst>
-          </a:blip>
-          <a:stretch>
-            <a:fillRect/>
-          </a:stretch>
-        </p:blipFill>
-        <p:spPr>
-          <a:xfrm>
-            <a:off x="600536" y="1212664"/>
-            <a:ext cx="5134102" cy="5134102"/>
-          </a:xfrm>
-          <a:prstGeom prst="rect">
-            <a:avLst/>
-          </a:prstGeom>
-        </p:spPr>
-      </p:pic>
-      <p:sp>
-        <p:nvSpPr>
-          <p:cNvPr id="3" name="Left Brace 2">
-            <a:extLst>
-              <a:ext uri="{FF2B5EF4-FFF2-40B4-BE49-F238E27FC236}">
-                <a16:creationId xmlns:a16="http://schemas.microsoft.com/office/drawing/2014/main" id="{2B5F841B-6CDB-4794-A6FC-B4BCC9F895B8}"/>
-              </a:ext>
-            </a:extLst>
-          </p:cNvPr>
-          <p:cNvSpPr/>
-          <p:nvPr/>
-        </p:nvSpPr>
-        <p:spPr>
-          <a:xfrm rot="5400000">
-            <a:off x="3871940" y="3983617"/>
-            <a:ext cx="210502" cy="2695596"/>
-          </a:xfrm>
-          <a:prstGeom prst="leftBrace">
-            <a:avLst/>
-          </a:prstGeom>
-          <a:ln w="19050"/>
-        </p:spPr>
-        <p:style>
-          <a:lnRef idx="1">
-            <a:schemeClr val="accent1"/>
-          </a:lnRef>
-          <a:fillRef idx="0">
-            <a:schemeClr val="accent1"/>
-          </a:fillRef>
-          <a:effectRef idx="0">
-            <a:schemeClr val="accent1"/>
-          </a:effectRef>
-          <a:fontRef idx="minor">
-            <a:schemeClr val="tx1"/>
-          </a:fontRef>
-        </p:style>
-        <p:txBody>
-          <a:bodyPr rtlCol="0" anchor="ctr"/>
-          <a:lstStyle/>
-          <a:p>
-            <a:pPr algn="ctr"/>
-            <a:endParaRPr lang="en-US"/>
-          </a:p>
-        </p:txBody>
-      </p:sp>
-      <p:sp>
-        <p:nvSpPr>
-          <p:cNvPr id="4" name="TextBox 3">
-            <a:extLst>
-              <a:ext uri="{FF2B5EF4-FFF2-40B4-BE49-F238E27FC236}">
-                <a16:creationId xmlns:a16="http://schemas.microsoft.com/office/drawing/2014/main" id="{60A7586A-69F8-4219-A04F-93E29B774C5B}"/>
-              </a:ext>
-            </a:extLst>
-          </p:cNvPr>
-          <p:cNvSpPr txBox="1"/>
-          <p:nvPr/>
-        </p:nvSpPr>
-        <p:spPr>
-          <a:xfrm>
-            <a:off x="3066857" y="4902285"/>
-            <a:ext cx="1912119" cy="307777"/>
-          </a:xfrm>
-          <a:prstGeom prst="rect">
-            <a:avLst/>
-          </a:prstGeom>
-          <a:noFill/>
-        </p:spPr>
-        <p:txBody>
-          <a:bodyPr wrap="square" rtlCol="0">
-            <a:spAutoFit/>
-          </a:bodyPr>
-          <a:lstStyle/>
-          <a:p>
-            <a:r>
-              <a:rPr lang="en-US" sz="1400" dirty="0"/>
-              <a:t>Top-Level Categories</a:t>
-            </a:r>
-          </a:p>
-        </p:txBody>
-      </p:sp>
-      <p:pic>
-        <p:nvPicPr>
-          <p:cNvPr id="5" name="Picture 4" descr="Chart, histogram&#10;&#10;Description automatically generated">
-            <a:extLst>
-              <a:ext uri="{FF2B5EF4-FFF2-40B4-BE49-F238E27FC236}">
-                <a16:creationId xmlns:a16="http://schemas.microsoft.com/office/drawing/2014/main" id="{478FE251-5EC5-4920-A3FE-E1C997AB1C46}"/>
-              </a:ext>
-            </a:extLst>
-          </p:cNvPr>
-          <p:cNvPicPr>
-            <a:picLocks noChangeAspect="1"/>
-          </p:cNvPicPr>
-          <p:nvPr/>
-        </p:nvPicPr>
-        <p:blipFill>
-          <a:blip r:embed="rId3">
-            <a:extLst>
-              <a:ext uri="{28A0092B-C50C-407E-A947-70E740481C1C}">
-                <a14:useLocalDpi xmlns:a14="http://schemas.microsoft.com/office/drawing/2010/main" val="0"/>
-              </a:ext>
-            </a:extLst>
-          </a:blip>
-          <a:stretch>
-            <a:fillRect/>
-          </a:stretch>
-        </p:blipFill>
-        <p:spPr>
-          <a:xfrm>
-            <a:off x="6457364" y="1280755"/>
-            <a:ext cx="5134103" cy="4997920"/>
-          </a:xfrm>
-          <a:prstGeom prst="rect">
-            <a:avLst/>
-          </a:prstGeom>
-        </p:spPr>
-      </p:pic>
-      <p:sp>
-        <p:nvSpPr>
-          <p:cNvPr id="6" name="Title 1">
-            <a:extLst>
-              <a:ext uri="{FF2B5EF4-FFF2-40B4-BE49-F238E27FC236}">
-                <a16:creationId xmlns:a16="http://schemas.microsoft.com/office/drawing/2014/main" id="{6FD61A1A-D6F6-434B-96EE-082FD5821625}"/>
-              </a:ext>
-            </a:extLst>
-          </p:cNvPr>
-          <p:cNvSpPr txBox="1">
-            <a:spLocks/>
-          </p:cNvSpPr>
-          <p:nvPr/>
-        </p:nvSpPr>
-        <p:spPr>
-          <a:xfrm>
-            <a:off x="1097280" y="286604"/>
-            <a:ext cx="10058400" cy="712638"/>
-          </a:xfrm>
-          <a:prstGeom prst="rect">
-            <a:avLst/>
-          </a:prstGeom>
-        </p:spPr>
-        <p:txBody>
-          <a:bodyPr/>
-          <a:lstStyle>
-            <a:lvl1pPr algn="l" defTabSz="914400" rtl="0" eaLnBrk="1" latinLnBrk="0" hangingPunct="1">
-              <a:lnSpc>
-                <a:spcPct val="85000"/>
-              </a:lnSpc>
-              <a:spcBef>
-                <a:spcPct val="0"/>
-              </a:spcBef>
-              <a:buNone/>
-              <a:defRPr sz="4800" kern="1200" spc="-50" baseline="0">
-                <a:solidFill>
-                  <a:schemeClr val="tx1">
-                    <a:lumMod val="75000"/>
-                    <a:lumOff val="25000"/>
-                  </a:schemeClr>
-                </a:solidFill>
-                <a:latin typeface="+mj-lt"/>
-                <a:ea typeface="+mj-ea"/>
-                <a:cs typeface="+mj-cs"/>
-              </a:defRPr>
-            </a:lvl1pPr>
-          </a:lstStyle>
-          <a:p>
-            <a:r>
-              <a:rPr lang="en-US" dirty="0"/>
-              <a:t>Book Categories</a:t>
-            </a:r>
-          </a:p>
-        </p:txBody>
-      </p:sp>
-    </p:spTree>
-    <p:extLst>
-      <p:ext uri="{BB962C8B-B14F-4D97-AF65-F5344CB8AC3E}">
-        <p14:creationId xmlns:p14="http://schemas.microsoft.com/office/powerpoint/2010/main" val="2166900309"/>
-      </p:ext>
-    </p:extLst>
-  </p:cSld>
-  <p:clrMapOvr>
-    <a:masterClrMapping/>
-  </p:clrMapOvr>
-</p:sld>
-</file>
-
-<file path=ppt/slides/slide8.xml><?xml version="1.0" encoding="utf-8"?>
-<p:sld xmlns:a="http://schemas.openxmlformats.org/drawingml/2006/main" xmlns:r="http://schemas.openxmlformats.org/officeDocument/2006/relationships" xmlns:p="http://schemas.openxmlformats.org/presentationml/2006/main">
-  <p:cSld>
-    <p:spTree>
-      <p:nvGrpSpPr>
-        <p:cNvPr id="1" name=""/>
-        <p:cNvGrpSpPr/>
-        <p:nvPr/>
-      </p:nvGrpSpPr>
-      <p:grpSpPr>
-        <a:xfrm>
-          <a:off x="0" y="0"/>
-          <a:ext cx="0" cy="0"/>
-          <a:chOff x="0" y="0"/>
-          <a:chExt cx="0" cy="0"/>
-        </a:xfrm>
-      </p:grpSpPr>
-      <p:sp>
-        <p:nvSpPr>
-          <p:cNvPr id="2" name="Title 1">
-            <a:extLst>
-              <a:ext uri="{FF2B5EF4-FFF2-40B4-BE49-F238E27FC236}">
-                <a16:creationId xmlns:a16="http://schemas.microsoft.com/office/drawing/2014/main" id="{41DAA7FD-AF58-4737-A693-EB90A026BFD5}"/>
-              </a:ext>
-            </a:extLst>
-          </p:cNvPr>
-          <p:cNvSpPr>
-            <a:spLocks noGrp="1"/>
-          </p:cNvSpPr>
-          <p:nvPr>
-            <p:ph type="title"/>
-          </p:nvPr>
-        </p:nvSpPr>
-        <p:spPr/>
-        <p:txBody>
-          <a:bodyPr/>
-          <a:lstStyle/>
-          <a:p>
-            <a:endParaRPr lang="en-US"/>
-          </a:p>
-        </p:txBody>
-      </p:sp>
-      <p:sp>
-        <p:nvSpPr>
-          <p:cNvPr id="3" name="Content Placeholder 2">
-            <a:extLst>
-              <a:ext uri="{FF2B5EF4-FFF2-40B4-BE49-F238E27FC236}">
-                <a16:creationId xmlns:a16="http://schemas.microsoft.com/office/drawing/2014/main" id="{AED730E3-0416-4D99-BEC3-1A01DF3DB157}"/>
-              </a:ext>
-            </a:extLst>
-          </p:cNvPr>
-          <p:cNvSpPr>
-            <a:spLocks noGrp="1"/>
-          </p:cNvSpPr>
-          <p:nvPr>
-            <p:ph idx="1"/>
-          </p:nvPr>
-        </p:nvSpPr>
-        <p:spPr/>
-        <p:txBody>
-          <a:bodyPr/>
-          <a:lstStyle/>
-          <a:p>
-            <a:endParaRPr lang="en-US"/>
-          </a:p>
-        </p:txBody>
-      </p:sp>
-    </p:spTree>
-    <p:extLst>
-      <p:ext uri="{BB962C8B-B14F-4D97-AF65-F5344CB8AC3E}">
-        <p14:creationId xmlns:p14="http://schemas.microsoft.com/office/powerpoint/2010/main" val="3943919594"/>
-      </p:ext>
-    </p:extLst>
-  </p:cSld>
-  <p:clrMapOvr>
-    <a:masterClrMapping/>
-  </p:clrMapOvr>
-</p:sld>
-</file>
-
-<file path=ppt/slides/slide9.xml><?xml version="1.0" encoding="utf-8"?>
-<p:sld xmlns:a="http://schemas.openxmlformats.org/drawingml/2006/main" xmlns:r="http://schemas.openxmlformats.org/officeDocument/2006/relationships" xmlns:p="http://schemas.openxmlformats.org/presentationml/2006/main">
-  <p:cSld>
-    <p:spTree>
-      <p:nvGrpSpPr>
-        <p:cNvPr id="1" name=""/>
-        <p:cNvGrpSpPr/>
-        <p:nvPr/>
-      </p:nvGrpSpPr>
-      <p:grpSpPr>
-        <a:xfrm>
-          <a:off x="0" y="0"/>
-          <a:ext cx="0" cy="0"/>
-          <a:chOff x="0" y="0"/>
-          <a:chExt cx="0" cy="0"/>
-        </a:xfrm>
-      </p:grpSpPr>
-      <p:sp>
-        <p:nvSpPr>
-          <p:cNvPr id="2" name="Title 1">
-            <a:extLst>
-              <a:ext uri="{FF2B5EF4-FFF2-40B4-BE49-F238E27FC236}">
-                <a16:creationId xmlns:a16="http://schemas.microsoft.com/office/drawing/2014/main" id="{D702522F-EF60-40EB-A014-0415DF24B51B}"/>
-              </a:ext>
-            </a:extLst>
-          </p:cNvPr>
-          <p:cNvSpPr>
-            <a:spLocks noGrp="1"/>
-          </p:cNvSpPr>
-          <p:nvPr>
-            <p:ph type="title"/>
-          </p:nvPr>
-        </p:nvSpPr>
-        <p:spPr/>
-        <p:txBody>
-          <a:bodyPr/>
-          <a:lstStyle/>
-          <a:p>
-            <a:r>
-              <a:rPr lang="en-US" dirty="0"/>
-              <a:t>Network diagram</a:t>
-            </a:r>
-          </a:p>
-        </p:txBody>
-      </p:sp>
-      <p:sp>
-        <p:nvSpPr>
-          <p:cNvPr id="3" name="Content Placeholder 2">
-            <a:extLst>
-              <a:ext uri="{FF2B5EF4-FFF2-40B4-BE49-F238E27FC236}">
-                <a16:creationId xmlns:a16="http://schemas.microsoft.com/office/drawing/2014/main" id="{7C05DE40-337E-46AD-B4D9-FEF5B56377F6}"/>
-              </a:ext>
-            </a:extLst>
-          </p:cNvPr>
-          <p:cNvSpPr>
-            <a:spLocks noGrp="1"/>
-          </p:cNvSpPr>
-          <p:nvPr>
-            <p:ph idx="1"/>
-          </p:nvPr>
-        </p:nvSpPr>
-        <p:spPr/>
-        <p:txBody>
-          <a:bodyPr/>
-          <a:lstStyle/>
-          <a:p>
-            <a:endParaRPr lang="en-US"/>
-          </a:p>
-        </p:txBody>
-      </p:sp>
-    </p:spTree>
-    <p:extLst>
-      <p:ext uri="{BB962C8B-B14F-4D97-AF65-F5344CB8AC3E}">
-        <p14:creationId xmlns:p14="http://schemas.microsoft.com/office/powerpoint/2010/main" val="1775495912"/>
+        <p14:creationId xmlns:p14="http://schemas.microsoft.com/office/powerpoint/2010/main" val="2647319182"/>
       </p:ext>
     </p:extLst>
   </p:cSld>

</xml_diff>

<commit_message>
working on presentation and data analysis
</commit_message>
<xml_diff>
--- a/Presentation.pptx
+++ b/Presentation.pptx
@@ -12,15 +12,21 @@
     <p:sldId id="281" r:id="rId6"/>
     <p:sldId id="278" r:id="rId7"/>
     <p:sldId id="276" r:id="rId8"/>
-    <p:sldId id="277" r:id="rId9"/>
-    <p:sldId id="270" r:id="rId10"/>
-    <p:sldId id="279" r:id="rId11"/>
-    <p:sldId id="280" r:id="rId12"/>
-    <p:sldId id="263" r:id="rId13"/>
-    <p:sldId id="265" r:id="rId14"/>
-    <p:sldId id="260" r:id="rId15"/>
-    <p:sldId id="261" r:id="rId16"/>
-    <p:sldId id="262" r:id="rId17"/>
+    <p:sldId id="270" r:id="rId9"/>
+    <p:sldId id="279" r:id="rId10"/>
+    <p:sldId id="280" r:id="rId11"/>
+    <p:sldId id="284" r:id="rId12"/>
+    <p:sldId id="293" r:id="rId13"/>
+    <p:sldId id="285" r:id="rId14"/>
+    <p:sldId id="286" r:id="rId15"/>
+    <p:sldId id="282" r:id="rId16"/>
+    <p:sldId id="288" r:id="rId17"/>
+    <p:sldId id="291" r:id="rId18"/>
+    <p:sldId id="283" r:id="rId19"/>
+    <p:sldId id="289" r:id="rId20"/>
+    <p:sldId id="292" r:id="rId21"/>
+    <p:sldId id="261" r:id="rId22"/>
+    <p:sldId id="262" r:id="rId23"/>
   </p:sldIdLst>
   <p:sldSz cx="12192000" cy="6858000"/>
   <p:notesSz cx="6858000" cy="9144000"/>
@@ -353,7 +359,7 @@
           <a:p>
             <a:fld id="{39BB3832-C1DF-4199-80C5-191220E93956}" type="datetimeFigureOut">
               <a:rPr lang="en-US" smtClean="0"/>
-              <a:t>5/24/2021</a:t>
+              <a:t>6/17/2021</a:t>
             </a:fld>
             <a:endParaRPr lang="en-US"/>
           </a:p>
@@ -561,7 +567,7 @@
           <a:p>
             <a:fld id="{39BB3832-C1DF-4199-80C5-191220E93956}" type="datetimeFigureOut">
               <a:rPr lang="en-US" smtClean="0"/>
-              <a:t>5/24/2021</a:t>
+              <a:t>6/17/2021</a:t>
             </a:fld>
             <a:endParaRPr lang="en-US"/>
           </a:p>
@@ -817,7 +823,7 @@
           <a:p>
             <a:fld id="{39BB3832-C1DF-4199-80C5-191220E93956}" type="datetimeFigureOut">
               <a:rPr lang="en-US" smtClean="0"/>
-              <a:t>5/24/2021</a:t>
+              <a:t>6/17/2021</a:t>
             </a:fld>
             <a:endParaRPr lang="en-US"/>
           </a:p>
@@ -991,7 +997,7 @@
           <a:p>
             <a:fld id="{39BB3832-C1DF-4199-80C5-191220E93956}" type="datetimeFigureOut">
               <a:rPr lang="en-US" smtClean="0"/>
-              <a:t>5/24/2021</a:t>
+              <a:t>6/17/2021</a:t>
             </a:fld>
             <a:endParaRPr lang="en-US"/>
           </a:p>
@@ -1334,7 +1340,7 @@
           <a:p>
             <a:fld id="{39BB3832-C1DF-4199-80C5-191220E93956}" type="datetimeFigureOut">
               <a:rPr lang="en-US" smtClean="0"/>
-              <a:t>5/24/2021</a:t>
+              <a:t>6/17/2021</a:t>
             </a:fld>
             <a:endParaRPr lang="en-US"/>
           </a:p>
@@ -1609,7 +1615,7 @@
           <a:p>
             <a:fld id="{39BB3832-C1DF-4199-80C5-191220E93956}" type="datetimeFigureOut">
               <a:rPr lang="en-US" smtClean="0"/>
-              <a:t>5/24/2021</a:t>
+              <a:t>6/17/2021</a:t>
             </a:fld>
             <a:endParaRPr lang="en-US"/>
           </a:p>
@@ -1988,7 +1994,7 @@
           <a:p>
             <a:fld id="{39BB3832-C1DF-4199-80C5-191220E93956}" type="datetimeFigureOut">
               <a:rPr lang="en-US" smtClean="0"/>
-              <a:t>5/24/2021</a:t>
+              <a:t>6/17/2021</a:t>
             </a:fld>
             <a:endParaRPr lang="en-US"/>
           </a:p>
@@ -2106,7 +2112,7 @@
           <a:p>
             <a:fld id="{39BB3832-C1DF-4199-80C5-191220E93956}" type="datetimeFigureOut">
               <a:rPr lang="en-US" smtClean="0"/>
-              <a:t>5/24/2021</a:t>
+              <a:t>6/17/2021</a:t>
             </a:fld>
             <a:endParaRPr lang="en-US"/>
           </a:p>
@@ -2277,7 +2283,7 @@
           <a:p>
             <a:fld id="{39BB3832-C1DF-4199-80C5-191220E93956}" type="datetimeFigureOut">
               <a:rPr lang="en-US" smtClean="0"/>
-              <a:t>5/24/2021</a:t>
+              <a:t>6/17/2021</a:t>
             </a:fld>
             <a:endParaRPr lang="en-US"/>
           </a:p>
@@ -2631,7 +2637,7 @@
           <a:p>
             <a:fld id="{39BB3832-C1DF-4199-80C5-191220E93956}" type="datetimeFigureOut">
               <a:rPr lang="en-US" smtClean="0"/>
-              <a:t>5/24/2021</a:t>
+              <a:t>6/17/2021</a:t>
             </a:fld>
             <a:endParaRPr lang="en-US"/>
           </a:p>
@@ -3013,7 +3019,7 @@
           <a:p>
             <a:fld id="{39BB3832-C1DF-4199-80C5-191220E93956}" type="datetimeFigureOut">
               <a:rPr lang="en-US" smtClean="0"/>
-              <a:t>5/24/2021</a:t>
+              <a:t>6/17/2021</a:t>
             </a:fld>
             <a:endParaRPr lang="en-US"/>
           </a:p>
@@ -3300,7 +3306,7 @@
           <a:p>
             <a:fld id="{39BB3832-C1DF-4199-80C5-191220E93956}" type="datetimeFigureOut">
               <a:rPr lang="en-US" smtClean="0"/>
-              <a:t>5/24/2021</a:t>
+              <a:t>6/17/2021</a:t>
             </a:fld>
             <a:endParaRPr lang="en-US"/>
           </a:p>
@@ -4233,7 +4239,7 @@
             <a:p>
               <a:r>
                 <a:rPr lang="en-US" dirty="0"/>
-                <a:t>Collected Titles</a:t>
+                <a:t>Growth</a:t>
               </a:r>
             </a:p>
           </p:txBody>
@@ -4278,12 +4284,47 @@
           </p:style>
         </p:cxnSp>
       </p:grpSp>
+      <p:sp>
+        <p:nvSpPr>
+          <p:cNvPr id="10" name="TextBox 9">
+            <a:extLst>
+              <a:ext uri="{FF2B5EF4-FFF2-40B4-BE49-F238E27FC236}">
+                <a16:creationId xmlns:a16="http://schemas.microsoft.com/office/drawing/2014/main" id="{5D5C75DC-88E2-41C7-ADAD-4E6F21E83F83}"/>
+              </a:ext>
+            </a:extLst>
+          </p:cNvPr>
+          <p:cNvSpPr txBox="1"/>
+          <p:nvPr/>
+        </p:nvSpPr>
+        <p:spPr>
+          <a:xfrm>
+            <a:off x="790944" y="1608114"/>
+            <a:ext cx="3466178" cy="923330"/>
+          </a:xfrm>
+          <a:prstGeom prst="rect">
+            <a:avLst/>
+          </a:prstGeom>
+          <a:noFill/>
+        </p:spPr>
+        <p:txBody>
+          <a:bodyPr wrap="square" rtlCol="0">
+            <a:spAutoFit/>
+          </a:bodyPr>
+          <a:lstStyle/>
+          <a:p>
+            <a:r>
+              <a:rPr lang="en-US" dirty="0"/>
+              <a:t>Since 2002, the number of titles in audibles library has been increasing almost </a:t>
+            </a:r>
+          </a:p>
+        </p:txBody>
+      </p:sp>
       <p:pic>
         <p:nvPicPr>
-          <p:cNvPr id="6" name="Picture 5" descr="Shape, square&#10;&#10;Description automatically generated">
+          <p:cNvPr id="14" name="Picture 13" descr="Chart, histogram&#10;&#10;Description automatically generated">
             <a:extLst>
               <a:ext uri="{FF2B5EF4-FFF2-40B4-BE49-F238E27FC236}">
-                <a16:creationId xmlns:a16="http://schemas.microsoft.com/office/drawing/2014/main" id="{1D8409B1-BF7C-4735-8703-A1A0D1D218B9}"/>
+                <a16:creationId xmlns:a16="http://schemas.microsoft.com/office/drawing/2014/main" id="{556024E1-32AC-4474-9020-A2DA6E3A49F3}"/>
               </a:ext>
             </a:extLst>
           </p:cNvPr>
@@ -4306,107 +4347,18 @@
         </p:blipFill>
         <p:spPr>
           <a:xfrm>
-            <a:off x="4994745" y="1503934"/>
-            <a:ext cx="6695252" cy="4463502"/>
+            <a:off x="4290904" y="1234440"/>
+            <a:ext cx="7287952" cy="5013557"/>
           </a:xfrm>
           <a:prstGeom prst="rect">
             <a:avLst/>
           </a:prstGeom>
         </p:spPr>
       </p:pic>
-      <p:sp>
-        <p:nvSpPr>
-          <p:cNvPr id="7" name="TextBox 6">
-            <a:extLst>
-              <a:ext uri="{FF2B5EF4-FFF2-40B4-BE49-F238E27FC236}">
-                <a16:creationId xmlns:a16="http://schemas.microsoft.com/office/drawing/2014/main" id="{7AEF4CDD-583C-41BA-B527-BF6692ED5404}"/>
-              </a:ext>
-            </a:extLst>
-          </p:cNvPr>
-          <p:cNvSpPr txBox="1"/>
-          <p:nvPr/>
-        </p:nvSpPr>
-        <p:spPr>
-          <a:xfrm>
-            <a:off x="1066798" y="1780659"/>
-            <a:ext cx="3737420" cy="3693319"/>
-          </a:xfrm>
-          <a:prstGeom prst="rect">
-            <a:avLst/>
-          </a:prstGeom>
-          <a:noFill/>
-        </p:spPr>
-        <p:txBody>
-          <a:bodyPr wrap="square" rtlCol="0">
-            <a:spAutoFit/>
-          </a:bodyPr>
-          <a:lstStyle/>
-          <a:p>
-            <a:r>
-              <a:rPr lang="en-US" dirty="0"/>
-              <a:t>Over </a:t>
-            </a:r>
-            <a:r>
-              <a:rPr lang="en-US" u="sng" dirty="0"/>
-              <a:t>622,065</a:t>
-            </a:r>
-            <a:r>
-              <a:rPr lang="en-US" dirty="0"/>
-              <a:t> titles were scraped across all categories.</a:t>
-            </a:r>
-          </a:p>
-          <a:p>
-            <a:endParaRPr lang="en-US" dirty="0"/>
-          </a:p>
-          <a:p>
-            <a:r>
-              <a:rPr lang="en-US" dirty="0"/>
-              <a:t>Due to the layouts of the categories, many titles are present in more than one category, leading to duplicates in our data.</a:t>
-            </a:r>
-          </a:p>
-          <a:p>
-            <a:endParaRPr lang="en-US" dirty="0"/>
-          </a:p>
-          <a:p>
-            <a:r>
-              <a:rPr lang="en-US" dirty="0"/>
-              <a:t>After cleaning, </a:t>
-            </a:r>
-            <a:r>
-              <a:rPr lang="en-US" u="sng" dirty="0"/>
-              <a:t>279,241</a:t>
-            </a:r>
-            <a:r>
-              <a:rPr lang="en-US" dirty="0"/>
-              <a:t> unique audiobooks were found.</a:t>
-            </a:r>
-          </a:p>
-          <a:p>
-            <a:endParaRPr lang="en-US" dirty="0"/>
-          </a:p>
-          <a:p>
-            <a:r>
-              <a:rPr lang="en-US" dirty="0"/>
-              <a:t>As well as </a:t>
-            </a:r>
-            <a:r>
-              <a:rPr lang="en-US" u="sng" dirty="0"/>
-              <a:t>6,959</a:t>
-            </a:r>
-            <a:r>
-              <a:rPr lang="en-US" dirty="0"/>
-              <a:t> podcasts.</a:t>
-            </a:r>
-          </a:p>
-          <a:p>
-            <a:endParaRPr lang="en-US" dirty="0"/>
-          </a:p>
-        </p:txBody>
-      </p:sp>
     </p:spTree>
     <p:extLst>
       <p:ext uri="{BB962C8B-B14F-4D97-AF65-F5344CB8AC3E}">
-        <p14:creationId xmlns:p14="http://schemas.microsoft.com/office/powerpoint/2010/main" val="2967321171"/>
+        <p14:creationId xmlns:p14="http://schemas.microsoft.com/office/powerpoint/2010/main" val="3706210134"/>
       </p:ext>
     </p:extLst>
   </p:cSld>
@@ -4503,7 +4455,7 @@
             <a:p>
               <a:r>
                 <a:rPr lang="en-US" dirty="0"/>
-                <a:t>Template</a:t>
+                <a:t>Growth: GRAPH IS WRONG</a:t>
               </a:r>
             </a:p>
           </p:txBody>
@@ -4548,10 +4500,88 @@
           </p:style>
         </p:cxnSp>
       </p:grpSp>
+      <p:pic>
+        <p:nvPicPr>
+          <p:cNvPr id="9" name="Picture 8" descr="Chart, histogram&#10;&#10;Description automatically generated">
+            <a:extLst>
+              <a:ext uri="{FF2B5EF4-FFF2-40B4-BE49-F238E27FC236}">
+                <a16:creationId xmlns:a16="http://schemas.microsoft.com/office/drawing/2014/main" id="{4A976BA0-5C87-4F85-AA84-878765F81711}"/>
+              </a:ext>
+            </a:extLst>
+          </p:cNvPr>
+          <p:cNvPicPr>
+            <a:picLocks noChangeAspect="1"/>
+          </p:cNvPicPr>
+          <p:nvPr/>
+        </p:nvPicPr>
+        <p:blipFill>
+          <a:blip r:embed="rId2">
+            <a:extLst>
+              <a:ext uri="{28A0092B-C50C-407E-A947-70E740481C1C}">
+                <a14:useLocalDpi xmlns:a14="http://schemas.microsoft.com/office/drawing/2010/main" val="0"/>
+              </a:ext>
+            </a:extLst>
+          </a:blip>
+          <a:stretch>
+            <a:fillRect/>
+          </a:stretch>
+        </p:blipFill>
+        <p:spPr>
+          <a:xfrm>
+            <a:off x="4751965" y="1609725"/>
+            <a:ext cx="6373233" cy="4330306"/>
+          </a:xfrm>
+          <a:prstGeom prst="rect">
+            <a:avLst/>
+          </a:prstGeom>
+        </p:spPr>
+      </p:pic>
+      <p:sp>
+        <p:nvSpPr>
+          <p:cNvPr id="10" name="TextBox 9">
+            <a:extLst>
+              <a:ext uri="{FF2B5EF4-FFF2-40B4-BE49-F238E27FC236}">
+                <a16:creationId xmlns:a16="http://schemas.microsoft.com/office/drawing/2014/main" id="{77C1FA27-5BC0-4F69-9527-4508F8DB0FA9}"/>
+              </a:ext>
+            </a:extLst>
+          </p:cNvPr>
+          <p:cNvSpPr txBox="1"/>
+          <p:nvPr/>
+        </p:nvSpPr>
+        <p:spPr>
+          <a:xfrm>
+            <a:off x="1325880" y="2240280"/>
+            <a:ext cx="3120390" cy="2308324"/>
+          </a:xfrm>
+          <a:prstGeom prst="rect">
+            <a:avLst/>
+          </a:prstGeom>
+          <a:noFill/>
+        </p:spPr>
+        <p:txBody>
+          <a:bodyPr wrap="square" rtlCol="0">
+            <a:spAutoFit/>
+          </a:bodyPr>
+          <a:lstStyle/>
+          <a:p>
+            <a:r>
+              <a:rPr lang="en-US" b="0" i="0" dirty="0">
+                <a:solidFill>
+                  <a:srgbClr val="595959"/>
+                </a:solidFill>
+                <a:effectLst/>
+                <a:latin typeface="Helvetica Neue"/>
+              </a:rPr>
+              <a:t> present value - past value = total / present value = total x 100 = growth percentage. So, your final equation is 470 - 342 = 128 / 342 = 0.374 x 100 = 37.4. This would make your growth percentage 37.4%.</a:t>
+            </a:r>
+            <a:endParaRPr lang="en-US" dirty="0"/>
+          </a:p>
+        </p:txBody>
+      </p:sp>
     </p:spTree>
     <p:extLst>
       <p:ext uri="{BB962C8B-B14F-4D97-AF65-F5344CB8AC3E}">
-        <p14:creationId xmlns:p14="http://schemas.microsoft.com/office/powerpoint/2010/main" val="3706210134"/>
+        <p14:creationId xmlns:p14="http://schemas.microsoft.com/office/powerpoint/2010/main" val="3479204610"/>
       </p:ext>
     </p:extLst>
   </p:cSld>
@@ -4578,63 +4608,203 @@
           <a:chExt cx="0" cy="0"/>
         </a:xfrm>
       </p:grpSpPr>
-      <p:sp>
-        <p:nvSpPr>
-          <p:cNvPr id="2" name="Title 1">
+      <p:grpSp>
+        <p:nvGrpSpPr>
+          <p:cNvPr id="4" name="Group 3">
             <a:extLst>
               <a:ext uri="{FF2B5EF4-FFF2-40B4-BE49-F238E27FC236}">
-                <a16:creationId xmlns:a16="http://schemas.microsoft.com/office/drawing/2014/main" id="{D702522F-EF60-40EB-A014-0415DF24B51B}"/>
+                <a16:creationId xmlns:a16="http://schemas.microsoft.com/office/drawing/2014/main" id="{794FFCAA-D045-46C2-BF26-C6AFC06B90C2}"/>
               </a:ext>
             </a:extLst>
           </p:cNvPr>
-          <p:cNvSpPr>
-            <a:spLocks noGrp="1"/>
-          </p:cNvSpPr>
-          <p:nvPr>
-            <p:ph type="title"/>
-          </p:nvPr>
-        </p:nvSpPr>
-        <p:spPr/>
-        <p:txBody>
-          <a:bodyPr/>
-          <a:lstStyle/>
-          <a:p>
-            <a:r>
-              <a:rPr lang="en-US" dirty="0"/>
-              <a:t>Network diagram</a:t>
-            </a:r>
-          </a:p>
-        </p:txBody>
-      </p:sp>
-      <p:sp>
-        <p:nvSpPr>
-          <p:cNvPr id="3" name="Content Placeholder 2">
+          <p:cNvGrpSpPr/>
+          <p:nvPr/>
+        </p:nvGrpSpPr>
+        <p:grpSpPr>
+          <a:xfrm>
+            <a:off x="1066798" y="209982"/>
+            <a:ext cx="10058400" cy="870094"/>
+            <a:chOff x="1066798" y="209982"/>
+            <a:chExt cx="10058400" cy="870094"/>
+          </a:xfrm>
+        </p:grpSpPr>
+        <p:sp>
+          <p:nvSpPr>
+            <p:cNvPr id="2" name="Title 1">
+              <a:extLst>
+                <a:ext uri="{FF2B5EF4-FFF2-40B4-BE49-F238E27FC236}">
+                  <a16:creationId xmlns:a16="http://schemas.microsoft.com/office/drawing/2014/main" id="{B898D37B-FC34-487E-97CA-D605BE85E50F}"/>
+                </a:ext>
+              </a:extLst>
+            </p:cNvPr>
+            <p:cNvSpPr txBox="1">
+              <a:spLocks/>
+            </p:cNvSpPr>
+            <p:nvPr/>
+          </p:nvSpPr>
+          <p:spPr>
+            <a:xfrm>
+              <a:off x="1066798" y="209982"/>
+              <a:ext cx="10058400" cy="870094"/>
+            </a:xfrm>
+            <a:prstGeom prst="rect">
+              <a:avLst/>
+            </a:prstGeom>
+          </p:spPr>
+          <p:txBody>
+            <a:bodyPr/>
+            <a:lstStyle>
+              <a:lvl1pPr algn="l" defTabSz="914400" rtl="0" eaLnBrk="1" latinLnBrk="0" hangingPunct="1">
+                <a:lnSpc>
+                  <a:spcPct val="85000"/>
+                </a:lnSpc>
+                <a:spcBef>
+                  <a:spcPct val="0"/>
+                </a:spcBef>
+                <a:buNone/>
+                <a:defRPr sz="4800" kern="1200" spc="-50" baseline="0">
+                  <a:solidFill>
+                    <a:schemeClr val="tx1">
+                      <a:lumMod val="75000"/>
+                      <a:lumOff val="25000"/>
+                    </a:schemeClr>
+                  </a:solidFill>
+                  <a:latin typeface="+mj-lt"/>
+                  <a:ea typeface="+mj-ea"/>
+                  <a:cs typeface="+mj-cs"/>
+                </a:defRPr>
+              </a:lvl1pPr>
+            </a:lstStyle>
+            <a:p>
+              <a:r>
+                <a:rPr lang="en-US" dirty="0"/>
+                <a:t>Growth: What's up with 2013/2014</a:t>
+              </a:r>
+            </a:p>
+          </p:txBody>
+        </p:sp>
+        <p:cxnSp>
+          <p:nvCxnSpPr>
+            <p:cNvPr id="3" name="Straight Connector 2">
+              <a:extLst>
+                <a:ext uri="{FF2B5EF4-FFF2-40B4-BE49-F238E27FC236}">
+                  <a16:creationId xmlns:a16="http://schemas.microsoft.com/office/drawing/2014/main" id="{96E0E1CA-7566-4D27-8472-A7A41DCA9897}"/>
+                </a:ext>
+              </a:extLst>
+            </p:cNvPr>
+            <p:cNvCxnSpPr>
+              <a:cxnSpLocks/>
+            </p:cNvCxnSpPr>
+            <p:nvPr/>
+          </p:nvCxnSpPr>
+          <p:spPr>
+            <a:xfrm>
+              <a:off x="1111306" y="995320"/>
+              <a:ext cx="9969388" cy="0"/>
+            </a:xfrm>
+            <a:prstGeom prst="line">
+              <a:avLst/>
+            </a:prstGeom>
+            <a:ln w="3175"/>
+          </p:spPr>
+          <p:style>
+            <a:lnRef idx="1">
+              <a:schemeClr val="dk1"/>
+            </a:lnRef>
+            <a:fillRef idx="0">
+              <a:schemeClr val="dk1"/>
+            </a:fillRef>
+            <a:effectRef idx="0">
+              <a:schemeClr val="dk1"/>
+            </a:effectRef>
+            <a:fontRef idx="minor">
+              <a:schemeClr val="tx1"/>
+            </a:fontRef>
+          </p:style>
+        </p:cxnSp>
+      </p:grpSp>
+      <p:pic>
+        <p:nvPicPr>
+          <p:cNvPr id="9" name="Picture 8" descr="Chart, histogram&#10;&#10;Description automatically generated">
             <a:extLst>
               <a:ext uri="{FF2B5EF4-FFF2-40B4-BE49-F238E27FC236}">
-                <a16:creationId xmlns:a16="http://schemas.microsoft.com/office/drawing/2014/main" id="{7C05DE40-337E-46AD-B4D9-FEF5B56377F6}"/>
+                <a16:creationId xmlns:a16="http://schemas.microsoft.com/office/drawing/2014/main" id="{4A976BA0-5C87-4F85-AA84-878765F81711}"/>
               </a:ext>
             </a:extLst>
           </p:cNvPr>
-          <p:cNvSpPr>
-            <a:spLocks noGrp="1"/>
-          </p:cNvSpPr>
-          <p:nvPr>
-            <p:ph idx="1"/>
-          </p:nvPr>
+          <p:cNvPicPr>
+            <a:picLocks noChangeAspect="1"/>
+          </p:cNvPicPr>
+          <p:nvPr/>
+        </p:nvPicPr>
+        <p:blipFill>
+          <a:blip r:embed="rId2">
+            <a:extLst>
+              <a:ext uri="{28A0092B-C50C-407E-A947-70E740481C1C}">
+                <a14:useLocalDpi xmlns:a14="http://schemas.microsoft.com/office/drawing/2010/main" val="0"/>
+              </a:ext>
+            </a:extLst>
+          </a:blip>
+          <a:stretch>
+            <a:fillRect/>
+          </a:stretch>
+        </p:blipFill>
+        <p:spPr>
+          <a:xfrm>
+            <a:off x="4751965" y="1609725"/>
+            <a:ext cx="6373233" cy="4330306"/>
+          </a:xfrm>
+          <a:prstGeom prst="rect">
+            <a:avLst/>
+          </a:prstGeom>
+        </p:spPr>
+      </p:pic>
+      <p:sp>
+        <p:nvSpPr>
+          <p:cNvPr id="10" name="TextBox 9">
+            <a:extLst>
+              <a:ext uri="{FF2B5EF4-FFF2-40B4-BE49-F238E27FC236}">
+                <a16:creationId xmlns:a16="http://schemas.microsoft.com/office/drawing/2014/main" id="{77C1FA27-5BC0-4F69-9527-4508F8DB0FA9}"/>
+              </a:ext>
+            </a:extLst>
+          </p:cNvPr>
+          <p:cNvSpPr txBox="1"/>
+          <p:nvPr/>
         </p:nvSpPr>
-        <p:spPr/>
+        <p:spPr>
+          <a:xfrm>
+            <a:off x="1325880" y="2240280"/>
+            <a:ext cx="3120390" cy="2308324"/>
+          </a:xfrm>
+          <a:prstGeom prst="rect">
+            <a:avLst/>
+          </a:prstGeom>
+          <a:noFill/>
+        </p:spPr>
         <p:txBody>
-          <a:bodyPr/>
+          <a:bodyPr wrap="square" rtlCol="0">
+            <a:spAutoFit/>
+          </a:bodyPr>
           <a:lstStyle/>
           <a:p>
-            <a:endParaRPr lang="en-US"/>
+            <a:r>
+              <a:rPr lang="en-US" b="0" i="0" dirty="0">
+                <a:solidFill>
+                  <a:srgbClr val="595959"/>
+                </a:solidFill>
+                <a:effectLst/>
+                <a:latin typeface="Helvetica Neue"/>
+              </a:rPr>
+              <a:t> present value - past value = total / present value = total x 100 = growth percentage. So, your final equation is 470 - 342 = 128 / 342 = 0.374 x 100 = 37.4. This would make your growth percentage 37.4%.</a:t>
+            </a:r>
+            <a:endParaRPr lang="en-US" dirty="0"/>
           </a:p>
         </p:txBody>
       </p:sp>
     </p:spTree>
     <p:extLst>
       <p:ext uri="{BB962C8B-B14F-4D97-AF65-F5344CB8AC3E}">
-        <p14:creationId xmlns:p14="http://schemas.microsoft.com/office/powerpoint/2010/main" val="1775495912"/>
+        <p14:creationId xmlns:p14="http://schemas.microsoft.com/office/powerpoint/2010/main" val="1339988956"/>
       </p:ext>
     </p:extLst>
   </p:cSld>
@@ -4661,63 +4831,241 @@
           <a:chExt cx="0" cy="0"/>
         </a:xfrm>
       </p:grpSpPr>
-      <p:sp>
-        <p:nvSpPr>
-          <p:cNvPr id="2" name="Title 1">
+      <p:grpSp>
+        <p:nvGrpSpPr>
+          <p:cNvPr id="4" name="Group 3">
             <a:extLst>
               <a:ext uri="{FF2B5EF4-FFF2-40B4-BE49-F238E27FC236}">
-                <a16:creationId xmlns:a16="http://schemas.microsoft.com/office/drawing/2014/main" id="{37011FF3-5E9B-4667-BBA3-BB9DD8969BBA}"/>
+                <a16:creationId xmlns:a16="http://schemas.microsoft.com/office/drawing/2014/main" id="{794FFCAA-D045-46C2-BF26-C6AFC06B90C2}"/>
               </a:ext>
             </a:extLst>
           </p:cNvPr>
-          <p:cNvSpPr>
-            <a:spLocks noGrp="1"/>
-          </p:cNvSpPr>
-          <p:nvPr>
-            <p:ph type="title"/>
-          </p:nvPr>
-        </p:nvSpPr>
-        <p:spPr/>
-        <p:txBody>
-          <a:bodyPr/>
-          <a:lstStyle/>
-          <a:p>
-            <a:r>
-              <a:rPr lang="en-US" dirty="0"/>
-              <a:t>Timeseries</a:t>
-            </a:r>
-          </a:p>
-        </p:txBody>
-      </p:sp>
-      <p:sp>
-        <p:nvSpPr>
-          <p:cNvPr id="3" name="Content Placeholder 2">
+          <p:cNvGrpSpPr/>
+          <p:nvPr/>
+        </p:nvGrpSpPr>
+        <p:grpSpPr>
+          <a:xfrm>
+            <a:off x="1066798" y="209982"/>
+            <a:ext cx="10058400" cy="870094"/>
+            <a:chOff x="1066798" y="209982"/>
+            <a:chExt cx="10058400" cy="870094"/>
+          </a:xfrm>
+        </p:grpSpPr>
+        <p:sp>
+          <p:nvSpPr>
+            <p:cNvPr id="2" name="Title 1">
+              <a:extLst>
+                <a:ext uri="{FF2B5EF4-FFF2-40B4-BE49-F238E27FC236}">
+                  <a16:creationId xmlns:a16="http://schemas.microsoft.com/office/drawing/2014/main" id="{B898D37B-FC34-487E-97CA-D605BE85E50F}"/>
+                </a:ext>
+              </a:extLst>
+            </p:cNvPr>
+            <p:cNvSpPr txBox="1">
+              <a:spLocks/>
+            </p:cNvSpPr>
+            <p:nvPr/>
+          </p:nvSpPr>
+          <p:spPr>
+            <a:xfrm>
+              <a:off x="1066798" y="209982"/>
+              <a:ext cx="10058400" cy="870094"/>
+            </a:xfrm>
+            <a:prstGeom prst="rect">
+              <a:avLst/>
+            </a:prstGeom>
+          </p:spPr>
+          <p:txBody>
+            <a:bodyPr/>
+            <a:lstStyle>
+              <a:lvl1pPr algn="l" defTabSz="914400" rtl="0" eaLnBrk="1" latinLnBrk="0" hangingPunct="1">
+                <a:lnSpc>
+                  <a:spcPct val="85000"/>
+                </a:lnSpc>
+                <a:spcBef>
+                  <a:spcPct val="0"/>
+                </a:spcBef>
+                <a:buNone/>
+                <a:defRPr sz="4800" kern="1200" spc="-50" baseline="0">
+                  <a:solidFill>
+                    <a:schemeClr val="tx1">
+                      <a:lumMod val="75000"/>
+                      <a:lumOff val="25000"/>
+                    </a:schemeClr>
+                  </a:solidFill>
+                  <a:latin typeface="+mj-lt"/>
+                  <a:ea typeface="+mj-ea"/>
+                  <a:cs typeface="+mj-cs"/>
+                </a:defRPr>
+              </a:lvl1pPr>
+            </a:lstStyle>
+            <a:p>
+              <a:r>
+                <a:rPr lang="en-US" dirty="0"/>
+                <a:t>Language</a:t>
+              </a:r>
+            </a:p>
+          </p:txBody>
+        </p:sp>
+        <p:cxnSp>
+          <p:nvCxnSpPr>
+            <p:cNvPr id="3" name="Straight Connector 2">
+              <a:extLst>
+                <a:ext uri="{FF2B5EF4-FFF2-40B4-BE49-F238E27FC236}">
+                  <a16:creationId xmlns:a16="http://schemas.microsoft.com/office/drawing/2014/main" id="{96E0E1CA-7566-4D27-8472-A7A41DCA9897}"/>
+                </a:ext>
+              </a:extLst>
+            </p:cNvPr>
+            <p:cNvCxnSpPr>
+              <a:cxnSpLocks/>
+            </p:cNvCxnSpPr>
+            <p:nvPr/>
+          </p:nvCxnSpPr>
+          <p:spPr>
+            <a:xfrm>
+              <a:off x="1111306" y="995320"/>
+              <a:ext cx="9969388" cy="0"/>
+            </a:xfrm>
+            <a:prstGeom prst="line">
+              <a:avLst/>
+            </a:prstGeom>
+            <a:ln w="3175"/>
+          </p:spPr>
+          <p:style>
+            <a:lnRef idx="1">
+              <a:schemeClr val="dk1"/>
+            </a:lnRef>
+            <a:fillRef idx="0">
+              <a:schemeClr val="dk1"/>
+            </a:fillRef>
+            <a:effectRef idx="0">
+              <a:schemeClr val="dk1"/>
+            </a:effectRef>
+            <a:fontRef idx="minor">
+              <a:schemeClr val="tx1"/>
+            </a:fontRef>
+          </p:style>
+        </p:cxnSp>
+      </p:grpSp>
+      <p:pic>
+        <p:nvPicPr>
+          <p:cNvPr id="6" name="Picture 5" descr="A picture containing graphical user interface&#10;&#10;Description automatically generated">
             <a:extLst>
               <a:ext uri="{FF2B5EF4-FFF2-40B4-BE49-F238E27FC236}">
-                <a16:creationId xmlns:a16="http://schemas.microsoft.com/office/drawing/2014/main" id="{BEC3BD65-DE64-436E-BBCF-EE7212139200}"/>
+                <a16:creationId xmlns:a16="http://schemas.microsoft.com/office/drawing/2014/main" id="{C54DEF4B-5C2B-486F-9841-7D31319A8EB0}"/>
               </a:ext>
             </a:extLst>
           </p:cNvPr>
-          <p:cNvSpPr>
-            <a:spLocks noGrp="1"/>
-          </p:cNvSpPr>
-          <p:nvPr>
-            <p:ph idx="1"/>
-          </p:nvPr>
+          <p:cNvPicPr>
+            <a:picLocks noChangeAspect="1"/>
+          </p:cNvPicPr>
+          <p:nvPr/>
+        </p:nvPicPr>
+        <p:blipFill>
+          <a:blip r:embed="rId2">
+            <a:extLst>
+              <a:ext uri="{28A0092B-C50C-407E-A947-70E740481C1C}">
+                <a14:useLocalDpi xmlns:a14="http://schemas.microsoft.com/office/drawing/2010/main" val="0"/>
+              </a:ext>
+            </a:extLst>
+          </a:blip>
+          <a:stretch>
+            <a:fillRect/>
+          </a:stretch>
+        </p:blipFill>
+        <p:spPr>
+          <a:xfrm>
+            <a:off x="4525176" y="1470756"/>
+            <a:ext cx="7314569" cy="4563555"/>
+          </a:xfrm>
+          <a:prstGeom prst="rect">
+            <a:avLst/>
+          </a:prstGeom>
+        </p:spPr>
+      </p:pic>
+      <p:sp>
+        <p:nvSpPr>
+          <p:cNvPr id="5" name="TextBox 4">
+            <a:extLst>
+              <a:ext uri="{FF2B5EF4-FFF2-40B4-BE49-F238E27FC236}">
+                <a16:creationId xmlns:a16="http://schemas.microsoft.com/office/drawing/2014/main" id="{57647FCB-47DF-4E14-B58A-9EDCD8F6DCEA}"/>
+              </a:ext>
+            </a:extLst>
+          </p:cNvPr>
+          <p:cNvSpPr txBox="1"/>
+          <p:nvPr/>
         </p:nvSpPr>
-        <p:spPr/>
+        <p:spPr>
+          <a:xfrm>
+            <a:off x="790944" y="1608114"/>
+            <a:ext cx="3466178" cy="3693319"/>
+          </a:xfrm>
+          <a:prstGeom prst="rect">
+            <a:avLst/>
+          </a:prstGeom>
+          <a:noFill/>
+        </p:spPr>
         <p:txBody>
-          <a:bodyPr/>
+          <a:bodyPr wrap="square" rtlCol="0">
+            <a:spAutoFit/>
+          </a:bodyPr>
           <a:lstStyle/>
           <a:p>
-            <a:endParaRPr lang="en-US"/>
+            <a:r>
+              <a:rPr lang="en-US" dirty="0"/>
+              <a:t>44 languages are represented in </a:t>
+            </a:r>
+            <a:r>
+              <a:rPr lang="en-US" dirty="0" err="1"/>
+              <a:t>Audible’s</a:t>
+            </a:r>
+            <a:r>
+              <a:rPr lang="en-US" dirty="0"/>
+              <a:t> library.</a:t>
+            </a:r>
+          </a:p>
+          <a:p>
+            <a:endParaRPr lang="en-US" dirty="0"/>
+          </a:p>
+          <a:p>
+            <a:r>
+              <a:rPr lang="en-US" dirty="0"/>
+              <a:t>English being the most common language. </a:t>
+            </a:r>
+          </a:p>
+          <a:p>
+            <a:endParaRPr lang="en-US" dirty="0"/>
+          </a:p>
+          <a:p>
+            <a:r>
+              <a:rPr lang="en-US" dirty="0"/>
+              <a:t>Surprisingly, recent growth doesn’t seem to be reflected in other languages. </a:t>
+            </a:r>
+          </a:p>
+          <a:p>
+            <a:endParaRPr lang="en-US" dirty="0"/>
+          </a:p>
+          <a:p>
+            <a:r>
+              <a:rPr lang="en-US" dirty="0"/>
+              <a:t>Netflix has </a:t>
+            </a:r>
+            <a:r>
+              <a:rPr lang="en-US" dirty="0">
+                <a:hlinkClick r:id="rId3"/>
+              </a:rPr>
+              <a:t>recently partnered </a:t>
+            </a:r>
+            <a:r>
+              <a:rPr lang="en-US" dirty="0"/>
+              <a:t>with hundreds of dubbing studios to add alternate language options.</a:t>
+            </a:r>
           </a:p>
         </p:txBody>
       </p:sp>
     </p:spTree>
     <p:extLst>
       <p:ext uri="{BB962C8B-B14F-4D97-AF65-F5344CB8AC3E}">
-        <p14:creationId xmlns:p14="http://schemas.microsoft.com/office/powerpoint/2010/main" val="111741514"/>
+        <p14:creationId xmlns:p14="http://schemas.microsoft.com/office/powerpoint/2010/main" val="2363604610"/>
       </p:ext>
     </p:extLst>
   </p:cSld>
@@ -4744,63 +5092,241 @@
           <a:chExt cx="0" cy="0"/>
         </a:xfrm>
       </p:grpSpPr>
-      <p:sp>
-        <p:nvSpPr>
-          <p:cNvPr id="2" name="Title 1">
+      <p:grpSp>
+        <p:nvGrpSpPr>
+          <p:cNvPr id="4" name="Group 3">
             <a:extLst>
               <a:ext uri="{FF2B5EF4-FFF2-40B4-BE49-F238E27FC236}">
-                <a16:creationId xmlns:a16="http://schemas.microsoft.com/office/drawing/2014/main" id="{7C04B0B4-6287-4307-9B26-94B6842BFA16}"/>
+                <a16:creationId xmlns:a16="http://schemas.microsoft.com/office/drawing/2014/main" id="{794FFCAA-D045-46C2-BF26-C6AFC06B90C2}"/>
               </a:ext>
             </a:extLst>
           </p:cNvPr>
-          <p:cNvSpPr>
-            <a:spLocks noGrp="1"/>
-          </p:cNvSpPr>
-          <p:nvPr>
-            <p:ph type="title"/>
-          </p:nvPr>
-        </p:nvSpPr>
-        <p:spPr/>
-        <p:txBody>
-          <a:bodyPr/>
-          <a:lstStyle/>
-          <a:p>
-            <a:r>
-              <a:rPr lang="en-US" dirty="0"/>
-              <a:t>Conclusions</a:t>
-            </a:r>
-          </a:p>
-        </p:txBody>
-      </p:sp>
-      <p:sp>
-        <p:nvSpPr>
-          <p:cNvPr id="3" name="Content Placeholder 2">
+          <p:cNvGrpSpPr/>
+          <p:nvPr/>
+        </p:nvGrpSpPr>
+        <p:grpSpPr>
+          <a:xfrm>
+            <a:off x="1066798" y="209982"/>
+            <a:ext cx="10058400" cy="870094"/>
+            <a:chOff x="1066798" y="209982"/>
+            <a:chExt cx="10058400" cy="870094"/>
+          </a:xfrm>
+        </p:grpSpPr>
+        <p:sp>
+          <p:nvSpPr>
+            <p:cNvPr id="2" name="Title 1">
+              <a:extLst>
+                <a:ext uri="{FF2B5EF4-FFF2-40B4-BE49-F238E27FC236}">
+                  <a16:creationId xmlns:a16="http://schemas.microsoft.com/office/drawing/2014/main" id="{B898D37B-FC34-487E-97CA-D605BE85E50F}"/>
+                </a:ext>
+              </a:extLst>
+            </p:cNvPr>
+            <p:cNvSpPr txBox="1">
+              <a:spLocks/>
+            </p:cNvSpPr>
+            <p:nvPr/>
+          </p:nvSpPr>
+          <p:spPr>
+            <a:xfrm>
+              <a:off x="1066798" y="209982"/>
+              <a:ext cx="10058400" cy="870094"/>
+            </a:xfrm>
+            <a:prstGeom prst="rect">
+              <a:avLst/>
+            </a:prstGeom>
+          </p:spPr>
+          <p:txBody>
+            <a:bodyPr/>
+            <a:lstStyle>
+              <a:lvl1pPr algn="l" defTabSz="914400" rtl="0" eaLnBrk="1" latinLnBrk="0" hangingPunct="1">
+                <a:lnSpc>
+                  <a:spcPct val="85000"/>
+                </a:lnSpc>
+                <a:spcBef>
+                  <a:spcPct val="0"/>
+                </a:spcBef>
+                <a:buNone/>
+                <a:defRPr sz="4800" kern="1200" spc="-50" baseline="0">
+                  <a:solidFill>
+                    <a:schemeClr val="tx1">
+                      <a:lumMod val="75000"/>
+                      <a:lumOff val="25000"/>
+                    </a:schemeClr>
+                  </a:solidFill>
+                  <a:latin typeface="+mj-lt"/>
+                  <a:ea typeface="+mj-ea"/>
+                  <a:cs typeface="+mj-cs"/>
+                </a:defRPr>
+              </a:lvl1pPr>
+            </a:lstStyle>
+            <a:p>
+              <a:r>
+                <a:rPr lang="en-US" dirty="0"/>
+                <a:t>Language</a:t>
+              </a:r>
+            </a:p>
+          </p:txBody>
+        </p:sp>
+        <p:cxnSp>
+          <p:nvCxnSpPr>
+            <p:cNvPr id="3" name="Straight Connector 2">
+              <a:extLst>
+                <a:ext uri="{FF2B5EF4-FFF2-40B4-BE49-F238E27FC236}">
+                  <a16:creationId xmlns:a16="http://schemas.microsoft.com/office/drawing/2014/main" id="{96E0E1CA-7566-4D27-8472-A7A41DCA9897}"/>
+                </a:ext>
+              </a:extLst>
+            </p:cNvPr>
+            <p:cNvCxnSpPr>
+              <a:cxnSpLocks/>
+            </p:cNvCxnSpPr>
+            <p:nvPr/>
+          </p:nvCxnSpPr>
+          <p:spPr>
+            <a:xfrm>
+              <a:off x="1111306" y="995320"/>
+              <a:ext cx="9969388" cy="0"/>
+            </a:xfrm>
+            <a:prstGeom prst="line">
+              <a:avLst/>
+            </a:prstGeom>
+            <a:ln w="3175"/>
+          </p:spPr>
+          <p:style>
+            <a:lnRef idx="1">
+              <a:schemeClr val="dk1"/>
+            </a:lnRef>
+            <a:fillRef idx="0">
+              <a:schemeClr val="dk1"/>
+            </a:fillRef>
+            <a:effectRef idx="0">
+              <a:schemeClr val="dk1"/>
+            </a:effectRef>
+            <a:fontRef idx="minor">
+              <a:schemeClr val="tx1"/>
+            </a:fontRef>
+          </p:style>
+        </p:cxnSp>
+      </p:grpSp>
+      <p:pic>
+        <p:nvPicPr>
+          <p:cNvPr id="8" name="Picture 7" descr="Chart, histogram&#10;&#10;Description automatically generated">
             <a:extLst>
               <a:ext uri="{FF2B5EF4-FFF2-40B4-BE49-F238E27FC236}">
-                <a16:creationId xmlns:a16="http://schemas.microsoft.com/office/drawing/2014/main" id="{EC0D24B7-95BA-4E37-85D1-A6340AD334CF}"/>
+                <a16:creationId xmlns:a16="http://schemas.microsoft.com/office/drawing/2014/main" id="{7C1A1A38-8AC2-4763-8623-FD4E2D692C14}"/>
               </a:ext>
             </a:extLst>
           </p:cNvPr>
-          <p:cNvSpPr>
-            <a:spLocks noGrp="1"/>
-          </p:cNvSpPr>
-          <p:nvPr>
-            <p:ph idx="1"/>
-          </p:nvPr>
+          <p:cNvPicPr>
+            <a:picLocks noChangeAspect="1"/>
+          </p:cNvPicPr>
+          <p:nvPr/>
+        </p:nvPicPr>
+        <p:blipFill>
+          <a:blip r:embed="rId2">
+            <a:extLst>
+              <a:ext uri="{28A0092B-C50C-407E-A947-70E740481C1C}">
+                <a14:useLocalDpi xmlns:a14="http://schemas.microsoft.com/office/drawing/2010/main" val="0"/>
+              </a:ext>
+            </a:extLst>
+          </a:blip>
+          <a:stretch>
+            <a:fillRect/>
+          </a:stretch>
+        </p:blipFill>
+        <p:spPr>
+          <a:xfrm>
+            <a:off x="5005136" y="1328509"/>
+            <a:ext cx="6276183" cy="4914371"/>
+          </a:xfrm>
+          <a:prstGeom prst="rect">
+            <a:avLst/>
+          </a:prstGeom>
+        </p:spPr>
+      </p:pic>
+      <p:sp>
+        <p:nvSpPr>
+          <p:cNvPr id="9" name="TextBox 8">
+            <a:extLst>
+              <a:ext uri="{FF2B5EF4-FFF2-40B4-BE49-F238E27FC236}">
+                <a16:creationId xmlns:a16="http://schemas.microsoft.com/office/drawing/2014/main" id="{2700A6B0-12B2-476D-9190-A558AEFCEB7B}"/>
+              </a:ext>
+            </a:extLst>
+          </p:cNvPr>
+          <p:cNvSpPr txBox="1"/>
+          <p:nvPr/>
         </p:nvSpPr>
-        <p:spPr/>
+        <p:spPr>
+          <a:xfrm>
+            <a:off x="790944" y="1608114"/>
+            <a:ext cx="3466178" cy="3693319"/>
+          </a:xfrm>
+          <a:prstGeom prst="rect">
+            <a:avLst/>
+          </a:prstGeom>
+          <a:noFill/>
+        </p:spPr>
         <p:txBody>
-          <a:bodyPr/>
+          <a:bodyPr wrap="square" rtlCol="0">
+            <a:spAutoFit/>
+          </a:bodyPr>
           <a:lstStyle/>
           <a:p>
-            <a:endParaRPr lang="en-US"/>
+            <a:r>
+              <a:rPr lang="en-US" dirty="0"/>
+              <a:t>44 languages are represented in </a:t>
+            </a:r>
+            <a:r>
+              <a:rPr lang="en-US" dirty="0" err="1"/>
+              <a:t>Audible’s</a:t>
+            </a:r>
+            <a:r>
+              <a:rPr lang="en-US" dirty="0"/>
+              <a:t> library.</a:t>
+            </a:r>
+          </a:p>
+          <a:p>
+            <a:endParaRPr lang="en-US" dirty="0"/>
+          </a:p>
+          <a:p>
+            <a:r>
+              <a:rPr lang="en-US" dirty="0"/>
+              <a:t>English being the most common language. </a:t>
+            </a:r>
+          </a:p>
+          <a:p>
+            <a:endParaRPr lang="en-US" dirty="0"/>
+          </a:p>
+          <a:p>
+            <a:r>
+              <a:rPr lang="en-US" dirty="0"/>
+              <a:t>Surprisingly, recent growth doesn’t seem to be reflected in other languages. </a:t>
+            </a:r>
+          </a:p>
+          <a:p>
+            <a:endParaRPr lang="en-US" dirty="0"/>
+          </a:p>
+          <a:p>
+            <a:r>
+              <a:rPr lang="en-US" dirty="0"/>
+              <a:t>Netflix has </a:t>
+            </a:r>
+            <a:r>
+              <a:rPr lang="en-US" dirty="0">
+                <a:hlinkClick r:id="rId3"/>
+              </a:rPr>
+              <a:t>recently partnered </a:t>
+            </a:r>
+            <a:r>
+              <a:rPr lang="en-US" dirty="0"/>
+              <a:t>with hundreds of dubbing studios to add alternate language options.</a:t>
+            </a:r>
           </a:p>
         </p:txBody>
       </p:sp>
     </p:spTree>
     <p:extLst>
       <p:ext uri="{BB962C8B-B14F-4D97-AF65-F5344CB8AC3E}">
-        <p14:creationId xmlns:p14="http://schemas.microsoft.com/office/powerpoint/2010/main" val="1242177686"/>
+        <p14:creationId xmlns:p14="http://schemas.microsoft.com/office/powerpoint/2010/main" val="1767684488"/>
       </p:ext>
     </p:extLst>
   </p:cSld>
@@ -4827,142 +5353,233 @@
           <a:chExt cx="0" cy="0"/>
         </a:xfrm>
       </p:grpSpPr>
-      <p:sp>
-        <p:nvSpPr>
-          <p:cNvPr id="2" name="Title 1">
+      <p:grpSp>
+        <p:nvGrpSpPr>
+          <p:cNvPr id="4" name="Group 3">
             <a:extLst>
               <a:ext uri="{FF2B5EF4-FFF2-40B4-BE49-F238E27FC236}">
-                <a16:creationId xmlns:a16="http://schemas.microsoft.com/office/drawing/2014/main" id="{902EBB08-D194-4BFE-A14C-D6D9496A4381}"/>
+                <a16:creationId xmlns:a16="http://schemas.microsoft.com/office/drawing/2014/main" id="{794FFCAA-D045-46C2-BF26-C6AFC06B90C2}"/>
               </a:ext>
             </a:extLst>
           </p:cNvPr>
-          <p:cNvSpPr>
-            <a:spLocks noGrp="1"/>
-          </p:cNvSpPr>
-          <p:nvPr>
-            <p:ph type="title"/>
-          </p:nvPr>
-        </p:nvSpPr>
-        <p:spPr/>
-        <p:txBody>
-          <a:bodyPr/>
-          <a:lstStyle/>
-          <a:p>
-            <a:r>
-              <a:rPr lang="en-US" dirty="0"/>
-              <a:t>Future Work</a:t>
-            </a:r>
-          </a:p>
-        </p:txBody>
-      </p:sp>
-      <p:sp>
-        <p:nvSpPr>
-          <p:cNvPr id="3" name="Content Placeholder 2">
+          <p:cNvGrpSpPr/>
+          <p:nvPr/>
+        </p:nvGrpSpPr>
+        <p:grpSpPr>
+          <a:xfrm>
+            <a:off x="1066798" y="209982"/>
+            <a:ext cx="10058400" cy="870094"/>
+            <a:chOff x="1066798" y="209982"/>
+            <a:chExt cx="10058400" cy="870094"/>
+          </a:xfrm>
+        </p:grpSpPr>
+        <p:sp>
+          <p:nvSpPr>
+            <p:cNvPr id="2" name="Title 1">
+              <a:extLst>
+                <a:ext uri="{FF2B5EF4-FFF2-40B4-BE49-F238E27FC236}">
+                  <a16:creationId xmlns:a16="http://schemas.microsoft.com/office/drawing/2014/main" id="{B898D37B-FC34-487E-97CA-D605BE85E50F}"/>
+                </a:ext>
+              </a:extLst>
+            </p:cNvPr>
+            <p:cNvSpPr txBox="1">
+              <a:spLocks/>
+            </p:cNvSpPr>
+            <p:nvPr/>
+          </p:nvSpPr>
+          <p:spPr>
+            <a:xfrm>
+              <a:off x="1066798" y="209982"/>
+              <a:ext cx="10058400" cy="870094"/>
+            </a:xfrm>
+            <a:prstGeom prst="rect">
+              <a:avLst/>
+            </a:prstGeom>
+          </p:spPr>
+          <p:txBody>
+            <a:bodyPr/>
+            <a:lstStyle>
+              <a:lvl1pPr algn="l" defTabSz="914400" rtl="0" eaLnBrk="1" latinLnBrk="0" hangingPunct="1">
+                <a:lnSpc>
+                  <a:spcPct val="85000"/>
+                </a:lnSpc>
+                <a:spcBef>
+                  <a:spcPct val="0"/>
+                </a:spcBef>
+                <a:buNone/>
+                <a:defRPr sz="4800" kern="1200" spc="-50" baseline="0">
+                  <a:solidFill>
+                    <a:schemeClr val="tx1">
+                      <a:lumMod val="75000"/>
+                      <a:lumOff val="25000"/>
+                    </a:schemeClr>
+                  </a:solidFill>
+                  <a:latin typeface="+mj-lt"/>
+                  <a:ea typeface="+mj-ea"/>
+                  <a:cs typeface="+mj-cs"/>
+                </a:defRPr>
+              </a:lvl1pPr>
+            </a:lstStyle>
+            <a:p>
+              <a:r>
+                <a:rPr lang="en-US" dirty="0"/>
+                <a:t>Title and Subtitle</a:t>
+              </a:r>
+            </a:p>
+          </p:txBody>
+        </p:sp>
+        <p:cxnSp>
+          <p:nvCxnSpPr>
+            <p:cNvPr id="3" name="Straight Connector 2">
+              <a:extLst>
+                <a:ext uri="{FF2B5EF4-FFF2-40B4-BE49-F238E27FC236}">
+                  <a16:creationId xmlns:a16="http://schemas.microsoft.com/office/drawing/2014/main" id="{96E0E1CA-7566-4D27-8472-A7A41DCA9897}"/>
+                </a:ext>
+              </a:extLst>
+            </p:cNvPr>
+            <p:cNvCxnSpPr>
+              <a:cxnSpLocks/>
+            </p:cNvCxnSpPr>
+            <p:nvPr/>
+          </p:nvCxnSpPr>
+          <p:spPr>
+            <a:xfrm>
+              <a:off x="1111306" y="995320"/>
+              <a:ext cx="9969388" cy="0"/>
+            </a:xfrm>
+            <a:prstGeom prst="line">
+              <a:avLst/>
+            </a:prstGeom>
+            <a:ln w="3175"/>
+          </p:spPr>
+          <p:style>
+            <a:lnRef idx="1">
+              <a:schemeClr val="dk1"/>
+            </a:lnRef>
+            <a:fillRef idx="0">
+              <a:schemeClr val="dk1"/>
+            </a:fillRef>
+            <a:effectRef idx="0">
+              <a:schemeClr val="dk1"/>
+            </a:effectRef>
+            <a:fontRef idx="minor">
+              <a:schemeClr val="tx1"/>
+            </a:fontRef>
+          </p:style>
+        </p:cxnSp>
+      </p:grpSp>
+      <p:pic>
+        <p:nvPicPr>
+          <p:cNvPr id="6" name="Picture 5" descr="Shape, square&#10;&#10;Description automatically generated">
             <a:extLst>
               <a:ext uri="{FF2B5EF4-FFF2-40B4-BE49-F238E27FC236}">
-                <a16:creationId xmlns:a16="http://schemas.microsoft.com/office/drawing/2014/main" id="{575E0344-172A-44A7-9EDF-4632688E7728}"/>
+                <a16:creationId xmlns:a16="http://schemas.microsoft.com/office/drawing/2014/main" id="{D22589F6-624C-45E8-81A6-BD09882D8F45}"/>
               </a:ext>
             </a:extLst>
           </p:cNvPr>
-          <p:cNvSpPr>
-            <a:spLocks noGrp="1"/>
-          </p:cNvSpPr>
-          <p:nvPr>
-            <p:ph idx="1"/>
-          </p:nvPr>
-        </p:nvSpPr>
-        <p:spPr/>
-        <p:txBody>
-          <a:bodyPr>
-            <a:normAutofit fontScale="55000" lnSpcReduction="20000"/>
-          </a:bodyPr>
-          <a:lstStyle/>
-          <a:p>
-            <a:r>
-              <a:rPr lang="en-US" dirty="0"/>
-              <a:t>Audible data collection could be expanded by fine grain review data.</a:t>
-            </a:r>
-          </a:p>
-          <a:p>
-            <a:r>
-              <a:rPr lang="en-US" dirty="0"/>
-              <a:t>Capture plus vs premium plus titles?</a:t>
-            </a:r>
-          </a:p>
-          <a:p>
-            <a:r>
-              <a:rPr lang="en-US" dirty="0"/>
-              <a:t>Audible might have dynamic categories. Number of titles increased and decreased across categories. </a:t>
-            </a:r>
-          </a:p>
-          <a:p>
-            <a:endParaRPr lang="en-US" dirty="0"/>
-          </a:p>
-          <a:p>
-            <a:r>
-              <a:rPr lang="en-US" dirty="0"/>
-              <a:t>Attempted to scrape Amazon books</a:t>
-            </a:r>
-          </a:p>
-          <a:p>
-            <a:r>
-              <a:rPr lang="en-US" dirty="0"/>
-              <a:t>- Amazon displays a CAPTCHA page after ~500 site visits </a:t>
-            </a:r>
-          </a:p>
-          <a:p>
-            <a:r>
-              <a:rPr lang="en-US" dirty="0"/>
-              <a:t>- Page will be returned for several hours before </a:t>
-            </a:r>
-          </a:p>
-          <a:p>
-            <a:r>
-              <a:rPr lang="en-US" dirty="0"/>
-              <a:t>- Using proxy service (</a:t>
-            </a:r>
-            <a:r>
-              <a:rPr lang="en-US" dirty="0" err="1"/>
-              <a:t>ScraperAPI</a:t>
-            </a:r>
-            <a:r>
-              <a:rPr lang="en-US" dirty="0"/>
-              <a:t>) avoided bans but required payment.</a:t>
-            </a:r>
-          </a:p>
-          <a:p>
-            <a:endParaRPr lang="en-US" dirty="0"/>
-          </a:p>
-          <a:p>
-            <a:r>
-              <a:rPr lang="en-US" dirty="0"/>
-              <a:t>BookShop.org</a:t>
-            </a:r>
-          </a:p>
-          <a:p>
-            <a:r>
-              <a:rPr lang="en-US" dirty="0"/>
-              <a:t>- A new online book shop which shares income with local books stores.</a:t>
-            </a:r>
-          </a:p>
-          <a:p>
-            <a:r>
-              <a:rPr lang="en-US" dirty="0"/>
-              <a:t>- Similar data to Amazon but less reviews.</a:t>
-            </a:r>
-          </a:p>
-          <a:p>
-            <a:r>
-              <a:rPr lang="en-US" dirty="0"/>
-              <a:t>- Slightly elevated prices compared to Amazon.</a:t>
-            </a:r>
-          </a:p>
-        </p:txBody>
-      </p:sp>
+          <p:cNvPicPr>
+            <a:picLocks noChangeAspect="1"/>
+          </p:cNvPicPr>
+          <p:nvPr/>
+        </p:nvPicPr>
+        <p:blipFill>
+          <a:blip r:embed="rId2">
+            <a:extLst>
+              <a:ext uri="{28A0092B-C50C-407E-A947-70E740481C1C}">
+                <a14:useLocalDpi xmlns:a14="http://schemas.microsoft.com/office/drawing/2010/main" val="0"/>
+              </a:ext>
+            </a:extLst>
+          </a:blip>
+          <a:stretch>
+            <a:fillRect/>
+          </a:stretch>
+        </p:blipFill>
+        <p:spPr>
+          <a:xfrm>
+            <a:off x="2343150" y="1777556"/>
+            <a:ext cx="3907510" cy="4085124"/>
+          </a:xfrm>
+          <a:prstGeom prst="rect">
+            <a:avLst/>
+          </a:prstGeom>
+        </p:spPr>
+      </p:pic>
+      <p:pic>
+        <p:nvPicPr>
+          <p:cNvPr id="8" name="Picture 7">
+            <a:extLst>
+              <a:ext uri="{FF2B5EF4-FFF2-40B4-BE49-F238E27FC236}">
+                <a16:creationId xmlns:a16="http://schemas.microsoft.com/office/drawing/2014/main" id="{3CD74930-A5D1-4DDB-9BE4-98BDACADAA1D}"/>
+              </a:ext>
+            </a:extLst>
+          </p:cNvPr>
+          <p:cNvPicPr>
+            <a:picLocks noChangeAspect="1"/>
+          </p:cNvPicPr>
+          <p:nvPr/>
+        </p:nvPicPr>
+        <p:blipFill>
+          <a:blip r:embed="rId3">
+            <a:extLst>
+              <a:ext uri="{28A0092B-C50C-407E-A947-70E740481C1C}">
+                <a14:useLocalDpi xmlns:a14="http://schemas.microsoft.com/office/drawing/2010/main" val="0"/>
+              </a:ext>
+            </a:extLst>
+          </a:blip>
+          <a:stretch>
+            <a:fillRect/>
+          </a:stretch>
+        </p:blipFill>
+        <p:spPr>
+          <a:xfrm>
+            <a:off x="6769380" y="1777556"/>
+            <a:ext cx="4482540" cy="4673016"/>
+          </a:xfrm>
+          <a:prstGeom prst="rect">
+            <a:avLst/>
+          </a:prstGeom>
+        </p:spPr>
+      </p:pic>
+      <p:pic>
+        <p:nvPicPr>
+          <p:cNvPr id="10" name="Picture 9">
+            <a:extLst>
+              <a:ext uri="{FF2B5EF4-FFF2-40B4-BE49-F238E27FC236}">
+                <a16:creationId xmlns:a16="http://schemas.microsoft.com/office/drawing/2014/main" id="{04D44AD5-343B-411E-915A-334D19432A0A}"/>
+              </a:ext>
+            </a:extLst>
+          </p:cNvPr>
+          <p:cNvPicPr>
+            <a:picLocks noChangeAspect="1"/>
+          </p:cNvPicPr>
+          <p:nvPr/>
+        </p:nvPicPr>
+        <p:blipFill>
+          <a:blip r:embed="rId4">
+            <a:extLst>
+              <a:ext uri="{28A0092B-C50C-407E-A947-70E740481C1C}">
+                <a14:useLocalDpi xmlns:a14="http://schemas.microsoft.com/office/drawing/2010/main" val="0"/>
+              </a:ext>
+            </a:extLst>
+          </a:blip>
+          <a:stretch>
+            <a:fillRect/>
+          </a:stretch>
+        </p:blipFill>
+        <p:spPr>
+          <a:xfrm>
+            <a:off x="5292588" y="2122266"/>
+            <a:ext cx="5959332" cy="3983596"/>
+          </a:xfrm>
+          <a:prstGeom prst="rect">
+            <a:avLst/>
+          </a:prstGeom>
+        </p:spPr>
+      </p:pic>
     </p:spTree>
     <p:extLst>
       <p:ext uri="{BB962C8B-B14F-4D97-AF65-F5344CB8AC3E}">
-        <p14:creationId xmlns:p14="http://schemas.microsoft.com/office/powerpoint/2010/main" val="2222744620"/>
+        <p14:creationId xmlns:p14="http://schemas.microsoft.com/office/powerpoint/2010/main" val="1728991152"/>
       </p:ext>
     </p:extLst>
   </p:cSld>
@@ -4989,105 +5606,776 @@
           <a:chExt cx="0" cy="0"/>
         </a:xfrm>
       </p:grpSpPr>
-      <p:sp>
-        <p:nvSpPr>
-          <p:cNvPr id="2" name="Title 1">
+      <p:grpSp>
+        <p:nvGrpSpPr>
+          <p:cNvPr id="4" name="Group 3">
             <a:extLst>
               <a:ext uri="{FF2B5EF4-FFF2-40B4-BE49-F238E27FC236}">
-                <a16:creationId xmlns:a16="http://schemas.microsoft.com/office/drawing/2014/main" id="{00DF3A5E-1F79-4EEE-9577-F262AE1381A0}"/>
+                <a16:creationId xmlns:a16="http://schemas.microsoft.com/office/drawing/2014/main" id="{794FFCAA-D045-46C2-BF26-C6AFC06B90C2}"/>
               </a:ext>
             </a:extLst>
           </p:cNvPr>
-          <p:cNvSpPr>
-            <a:spLocks noGrp="1"/>
-          </p:cNvSpPr>
-          <p:nvPr>
-            <p:ph type="title"/>
-          </p:nvPr>
-        </p:nvSpPr>
-        <p:spPr/>
-        <p:txBody>
-          <a:bodyPr/>
-          <a:lstStyle/>
-          <a:p>
-            <a:r>
-              <a:rPr lang="en-US" dirty="0"/>
-              <a:t>Acknowledgements</a:t>
-            </a:r>
-          </a:p>
-        </p:txBody>
-      </p:sp>
-      <p:sp>
-        <p:nvSpPr>
-          <p:cNvPr id="3" name="Content Placeholder 2">
+          <p:cNvGrpSpPr/>
+          <p:nvPr/>
+        </p:nvGrpSpPr>
+        <p:grpSpPr>
+          <a:xfrm>
+            <a:off x="1066798" y="209982"/>
+            <a:ext cx="10058400" cy="870094"/>
+            <a:chOff x="1066798" y="209982"/>
+            <a:chExt cx="10058400" cy="870094"/>
+          </a:xfrm>
+        </p:grpSpPr>
+        <p:sp>
+          <p:nvSpPr>
+            <p:cNvPr id="2" name="Title 1">
+              <a:extLst>
+                <a:ext uri="{FF2B5EF4-FFF2-40B4-BE49-F238E27FC236}">
+                  <a16:creationId xmlns:a16="http://schemas.microsoft.com/office/drawing/2014/main" id="{B898D37B-FC34-487E-97CA-D605BE85E50F}"/>
+                </a:ext>
+              </a:extLst>
+            </p:cNvPr>
+            <p:cNvSpPr txBox="1">
+              <a:spLocks/>
+            </p:cNvSpPr>
+            <p:nvPr/>
+          </p:nvSpPr>
+          <p:spPr>
+            <a:xfrm>
+              <a:off x="1066798" y="209982"/>
+              <a:ext cx="10058400" cy="870094"/>
+            </a:xfrm>
+            <a:prstGeom prst="rect">
+              <a:avLst/>
+            </a:prstGeom>
+          </p:spPr>
+          <p:txBody>
+            <a:bodyPr/>
+            <a:lstStyle>
+              <a:lvl1pPr algn="l" defTabSz="914400" rtl="0" eaLnBrk="1" latinLnBrk="0" hangingPunct="1">
+                <a:lnSpc>
+                  <a:spcPct val="85000"/>
+                </a:lnSpc>
+                <a:spcBef>
+                  <a:spcPct val="0"/>
+                </a:spcBef>
+                <a:buNone/>
+                <a:defRPr sz="4800" kern="1200" spc="-50" baseline="0">
+                  <a:solidFill>
+                    <a:schemeClr val="tx1">
+                      <a:lumMod val="75000"/>
+                      <a:lumOff val="25000"/>
+                    </a:schemeClr>
+                  </a:solidFill>
+                  <a:latin typeface="+mj-lt"/>
+                  <a:ea typeface="+mj-ea"/>
+                  <a:cs typeface="+mj-cs"/>
+                </a:defRPr>
+              </a:lvl1pPr>
+            </a:lstStyle>
+            <a:p>
+              <a:r>
+                <a:rPr lang="en-US" dirty="0"/>
+                <a:t>Length</a:t>
+              </a:r>
+            </a:p>
+          </p:txBody>
+        </p:sp>
+        <p:cxnSp>
+          <p:nvCxnSpPr>
+            <p:cNvPr id="3" name="Straight Connector 2">
+              <a:extLst>
+                <a:ext uri="{FF2B5EF4-FFF2-40B4-BE49-F238E27FC236}">
+                  <a16:creationId xmlns:a16="http://schemas.microsoft.com/office/drawing/2014/main" id="{96E0E1CA-7566-4D27-8472-A7A41DCA9897}"/>
+                </a:ext>
+              </a:extLst>
+            </p:cNvPr>
+            <p:cNvCxnSpPr>
+              <a:cxnSpLocks/>
+            </p:cNvCxnSpPr>
+            <p:nvPr/>
+          </p:nvCxnSpPr>
+          <p:spPr>
+            <a:xfrm>
+              <a:off x="1111306" y="995320"/>
+              <a:ext cx="9969388" cy="0"/>
+            </a:xfrm>
+            <a:prstGeom prst="line">
+              <a:avLst/>
+            </a:prstGeom>
+            <a:ln w="3175"/>
+          </p:spPr>
+          <p:style>
+            <a:lnRef idx="1">
+              <a:schemeClr val="dk1"/>
+            </a:lnRef>
+            <a:fillRef idx="0">
+              <a:schemeClr val="dk1"/>
+            </a:fillRef>
+            <a:effectRef idx="0">
+              <a:schemeClr val="dk1"/>
+            </a:effectRef>
+            <a:fontRef idx="minor">
+              <a:schemeClr val="tx1"/>
+            </a:fontRef>
+          </p:style>
+        </p:cxnSp>
+      </p:grpSp>
+      <p:pic>
+        <p:nvPicPr>
+          <p:cNvPr id="8" name="Picture 7" descr="Chart, histogram&#10;&#10;Description automatically generated">
             <a:extLst>
               <a:ext uri="{FF2B5EF4-FFF2-40B4-BE49-F238E27FC236}">
-                <a16:creationId xmlns:a16="http://schemas.microsoft.com/office/drawing/2014/main" id="{170739A6-A97C-4340-BD59-02CCC55492BF}"/>
+                <a16:creationId xmlns:a16="http://schemas.microsoft.com/office/drawing/2014/main" id="{6FA1FD82-6A83-432B-915F-172765654E1B}"/>
               </a:ext>
             </a:extLst>
           </p:cNvPr>
-          <p:cNvSpPr>
-            <a:spLocks noGrp="1"/>
-          </p:cNvSpPr>
-          <p:nvPr>
-            <p:ph idx="1"/>
-          </p:nvPr>
-        </p:nvSpPr>
-        <p:spPr/>
-        <p:txBody>
-          <a:bodyPr/>
-          <a:lstStyle/>
-          <a:p>
-            <a:endParaRPr lang="en-US" dirty="0"/>
-          </a:p>
-          <a:p>
-            <a:r>
-              <a:rPr lang="en-US" dirty="0"/>
-              <a:t>Audible for not banning me.</a:t>
-            </a:r>
-          </a:p>
-          <a:p>
-            <a:endParaRPr lang="en-US" dirty="0"/>
-          </a:p>
-          <a:p>
-            <a:r>
-              <a:rPr lang="en-US" dirty="0" err="1"/>
-              <a:t>ScraperAPI</a:t>
-            </a:r>
-            <a:r>
-              <a:rPr lang="en-US" dirty="0"/>
-              <a:t> for help which I didn’t end up using in this project.</a:t>
-            </a:r>
-          </a:p>
-          <a:p>
-            <a:endParaRPr lang="en-US" dirty="0"/>
-          </a:p>
-          <a:p>
-            <a:r>
-              <a:rPr lang="en-US" dirty="0">
-                <a:hlinkClick r:id="rId2"/>
-              </a:rPr>
-              <a:t>Ed Robertson </a:t>
-            </a:r>
-            <a:r>
-              <a:rPr lang="en-US" dirty="0"/>
-              <a:t>&amp; </a:t>
-            </a:r>
-            <a:r>
-              <a:rPr lang="en-US" dirty="0" err="1"/>
-              <a:t>Unsplash</a:t>
-            </a:r>
-            <a:r>
-              <a:rPr lang="en-US" dirty="0"/>
-              <a:t> for the photo.</a:t>
-            </a:r>
-          </a:p>
-        </p:txBody>
-      </p:sp>
+          <p:cNvPicPr>
+            <a:picLocks noChangeAspect="1"/>
+          </p:cNvPicPr>
+          <p:nvPr/>
+        </p:nvPicPr>
+        <p:blipFill>
+          <a:blip r:embed="rId2">
+            <a:extLst>
+              <a:ext uri="{28A0092B-C50C-407E-A947-70E740481C1C}">
+                <a14:useLocalDpi xmlns:a14="http://schemas.microsoft.com/office/drawing/2010/main" val="0"/>
+              </a:ext>
+            </a:extLst>
+          </a:blip>
+          <a:stretch>
+            <a:fillRect/>
+          </a:stretch>
+        </p:blipFill>
+        <p:spPr>
+          <a:xfrm>
+            <a:off x="5651825" y="1080076"/>
+            <a:ext cx="5428869" cy="5188283"/>
+          </a:xfrm>
+          <a:prstGeom prst="rect">
+            <a:avLst/>
+          </a:prstGeom>
+        </p:spPr>
+      </p:pic>
     </p:spTree>
     <p:extLst>
       <p:ext uri="{BB962C8B-B14F-4D97-AF65-F5344CB8AC3E}">
-        <p14:creationId xmlns:p14="http://schemas.microsoft.com/office/powerpoint/2010/main" val="3808814931"/>
+        <p14:creationId xmlns:p14="http://schemas.microsoft.com/office/powerpoint/2010/main" val="3659763248"/>
+      </p:ext>
+    </p:extLst>
+  </p:cSld>
+  <p:clrMapOvr>
+    <a:masterClrMapping/>
+  </p:clrMapOvr>
+</p:sld>
+</file>
+
+<file path=ppt/slides/slide17.xml><?xml version="1.0" encoding="utf-8"?>
+<p:sld xmlns:a="http://schemas.openxmlformats.org/drawingml/2006/main" xmlns:r="http://schemas.openxmlformats.org/officeDocument/2006/relationships" xmlns:p="http://schemas.openxmlformats.org/presentationml/2006/main">
+  <p:cSld>
+    <p:spTree>
+      <p:nvGrpSpPr>
+        <p:cNvPr id="1" name=""/>
+        <p:cNvGrpSpPr/>
+        <p:nvPr/>
+      </p:nvGrpSpPr>
+      <p:grpSpPr>
+        <a:xfrm>
+          <a:off x="0" y="0"/>
+          <a:ext cx="0" cy="0"/>
+          <a:chOff x="0" y="0"/>
+          <a:chExt cx="0" cy="0"/>
+        </a:xfrm>
+      </p:grpSpPr>
+      <p:grpSp>
+        <p:nvGrpSpPr>
+          <p:cNvPr id="4" name="Group 3">
+            <a:extLst>
+              <a:ext uri="{FF2B5EF4-FFF2-40B4-BE49-F238E27FC236}">
+                <a16:creationId xmlns:a16="http://schemas.microsoft.com/office/drawing/2014/main" id="{794FFCAA-D045-46C2-BF26-C6AFC06B90C2}"/>
+              </a:ext>
+            </a:extLst>
+          </p:cNvPr>
+          <p:cNvGrpSpPr/>
+          <p:nvPr/>
+        </p:nvGrpSpPr>
+        <p:grpSpPr>
+          <a:xfrm>
+            <a:off x="1066798" y="209982"/>
+            <a:ext cx="10058400" cy="870094"/>
+            <a:chOff x="1066798" y="209982"/>
+            <a:chExt cx="10058400" cy="870094"/>
+          </a:xfrm>
+        </p:grpSpPr>
+        <p:sp>
+          <p:nvSpPr>
+            <p:cNvPr id="2" name="Title 1">
+              <a:extLst>
+                <a:ext uri="{FF2B5EF4-FFF2-40B4-BE49-F238E27FC236}">
+                  <a16:creationId xmlns:a16="http://schemas.microsoft.com/office/drawing/2014/main" id="{B898D37B-FC34-487E-97CA-D605BE85E50F}"/>
+                </a:ext>
+              </a:extLst>
+            </p:cNvPr>
+            <p:cNvSpPr txBox="1">
+              <a:spLocks/>
+            </p:cNvSpPr>
+            <p:nvPr/>
+          </p:nvSpPr>
+          <p:spPr>
+            <a:xfrm>
+              <a:off x="1066798" y="209982"/>
+              <a:ext cx="10058400" cy="870094"/>
+            </a:xfrm>
+            <a:prstGeom prst="rect">
+              <a:avLst/>
+            </a:prstGeom>
+          </p:spPr>
+          <p:txBody>
+            <a:bodyPr/>
+            <a:lstStyle>
+              <a:lvl1pPr algn="l" defTabSz="914400" rtl="0" eaLnBrk="1" latinLnBrk="0" hangingPunct="1">
+                <a:lnSpc>
+                  <a:spcPct val="85000"/>
+                </a:lnSpc>
+                <a:spcBef>
+                  <a:spcPct val="0"/>
+                </a:spcBef>
+                <a:buNone/>
+                <a:defRPr sz="4800" kern="1200" spc="-50" baseline="0">
+                  <a:solidFill>
+                    <a:schemeClr val="tx1">
+                      <a:lumMod val="75000"/>
+                      <a:lumOff val="25000"/>
+                    </a:schemeClr>
+                  </a:solidFill>
+                  <a:latin typeface="+mj-lt"/>
+                  <a:ea typeface="+mj-ea"/>
+                  <a:cs typeface="+mj-cs"/>
+                </a:defRPr>
+              </a:lvl1pPr>
+            </a:lstStyle>
+            <a:p>
+              <a:r>
+                <a:rPr lang="en-US" dirty="0"/>
+                <a:t>Price</a:t>
+              </a:r>
+            </a:p>
+          </p:txBody>
+        </p:sp>
+        <p:cxnSp>
+          <p:nvCxnSpPr>
+            <p:cNvPr id="3" name="Straight Connector 2">
+              <a:extLst>
+                <a:ext uri="{FF2B5EF4-FFF2-40B4-BE49-F238E27FC236}">
+                  <a16:creationId xmlns:a16="http://schemas.microsoft.com/office/drawing/2014/main" id="{96E0E1CA-7566-4D27-8472-A7A41DCA9897}"/>
+                </a:ext>
+              </a:extLst>
+            </p:cNvPr>
+            <p:cNvCxnSpPr>
+              <a:cxnSpLocks/>
+            </p:cNvCxnSpPr>
+            <p:nvPr/>
+          </p:nvCxnSpPr>
+          <p:spPr>
+            <a:xfrm>
+              <a:off x="1111306" y="995320"/>
+              <a:ext cx="9969388" cy="0"/>
+            </a:xfrm>
+            <a:prstGeom prst="line">
+              <a:avLst/>
+            </a:prstGeom>
+            <a:ln w="3175"/>
+          </p:spPr>
+          <p:style>
+            <a:lnRef idx="1">
+              <a:schemeClr val="dk1"/>
+            </a:lnRef>
+            <a:fillRef idx="0">
+              <a:schemeClr val="dk1"/>
+            </a:fillRef>
+            <a:effectRef idx="0">
+              <a:schemeClr val="dk1"/>
+            </a:effectRef>
+            <a:fontRef idx="minor">
+              <a:schemeClr val="tx1"/>
+            </a:fontRef>
+          </p:style>
+        </p:cxnSp>
+      </p:grpSp>
+      <p:pic>
+        <p:nvPicPr>
+          <p:cNvPr id="6" name="Picture 5" descr="Chart, histogram&#10;&#10;Description automatically generated">
+            <a:extLst>
+              <a:ext uri="{FF2B5EF4-FFF2-40B4-BE49-F238E27FC236}">
+                <a16:creationId xmlns:a16="http://schemas.microsoft.com/office/drawing/2014/main" id="{0DCF1D09-1F0D-4328-9A76-D24BF035ECF4}"/>
+              </a:ext>
+            </a:extLst>
+          </p:cNvPr>
+          <p:cNvPicPr>
+            <a:picLocks noChangeAspect="1"/>
+          </p:cNvPicPr>
+          <p:nvPr/>
+        </p:nvPicPr>
+        <p:blipFill>
+          <a:blip r:embed="rId2">
+            <a:extLst>
+              <a:ext uri="{28A0092B-C50C-407E-A947-70E740481C1C}">
+                <a14:useLocalDpi xmlns:a14="http://schemas.microsoft.com/office/drawing/2010/main" val="0"/>
+              </a:ext>
+            </a:extLst>
+          </a:blip>
+          <a:stretch>
+            <a:fillRect/>
+          </a:stretch>
+        </p:blipFill>
+        <p:spPr>
+          <a:xfrm>
+            <a:off x="2091973" y="1487461"/>
+            <a:ext cx="4533333" cy="4660317"/>
+          </a:xfrm>
+          <a:prstGeom prst="rect">
+            <a:avLst/>
+          </a:prstGeom>
+        </p:spPr>
+      </p:pic>
+      <p:pic>
+        <p:nvPicPr>
+          <p:cNvPr id="7" name="Picture 6" descr="Bar chart&#10;&#10;Description automatically generated">
+            <a:extLst>
+              <a:ext uri="{FF2B5EF4-FFF2-40B4-BE49-F238E27FC236}">
+                <a16:creationId xmlns:a16="http://schemas.microsoft.com/office/drawing/2014/main" id="{DD1E0A19-231D-4B7B-9E77-447F03D67164}"/>
+              </a:ext>
+            </a:extLst>
+          </p:cNvPr>
+          <p:cNvPicPr>
+            <a:picLocks noChangeAspect="1"/>
+          </p:cNvPicPr>
+          <p:nvPr/>
+        </p:nvPicPr>
+        <p:blipFill>
+          <a:blip r:embed="rId3">
+            <a:extLst>
+              <a:ext uri="{28A0092B-C50C-407E-A947-70E740481C1C}">
+                <a14:useLocalDpi xmlns:a14="http://schemas.microsoft.com/office/drawing/2010/main" val="0"/>
+              </a:ext>
+            </a:extLst>
+          </a:blip>
+          <a:stretch>
+            <a:fillRect/>
+          </a:stretch>
+        </p:blipFill>
+        <p:spPr>
+          <a:xfrm>
+            <a:off x="7137266" y="1487461"/>
+            <a:ext cx="4868643" cy="4660317"/>
+          </a:xfrm>
+          <a:prstGeom prst="rect">
+            <a:avLst/>
+          </a:prstGeom>
+        </p:spPr>
+      </p:pic>
+    </p:spTree>
+    <p:extLst>
+      <p:ext uri="{BB962C8B-B14F-4D97-AF65-F5344CB8AC3E}">
+        <p14:creationId xmlns:p14="http://schemas.microsoft.com/office/powerpoint/2010/main" val="4148035990"/>
+      </p:ext>
+    </p:extLst>
+  </p:cSld>
+  <p:clrMapOvr>
+    <a:masterClrMapping/>
+  </p:clrMapOvr>
+</p:sld>
+</file>
+
+<file path=ppt/slides/slide18.xml><?xml version="1.0" encoding="utf-8"?>
+<p:sld xmlns:a="http://schemas.openxmlformats.org/drawingml/2006/main" xmlns:r="http://schemas.openxmlformats.org/officeDocument/2006/relationships" xmlns:p="http://schemas.openxmlformats.org/presentationml/2006/main">
+  <p:cSld>
+    <p:spTree>
+      <p:nvGrpSpPr>
+        <p:cNvPr id="1" name=""/>
+        <p:cNvGrpSpPr/>
+        <p:nvPr/>
+      </p:nvGrpSpPr>
+      <p:grpSpPr>
+        <a:xfrm>
+          <a:off x="0" y="0"/>
+          <a:ext cx="0" cy="0"/>
+          <a:chOff x="0" y="0"/>
+          <a:chExt cx="0" cy="0"/>
+        </a:xfrm>
+      </p:grpSpPr>
+      <p:grpSp>
+        <p:nvGrpSpPr>
+          <p:cNvPr id="4" name="Group 3">
+            <a:extLst>
+              <a:ext uri="{FF2B5EF4-FFF2-40B4-BE49-F238E27FC236}">
+                <a16:creationId xmlns:a16="http://schemas.microsoft.com/office/drawing/2014/main" id="{794FFCAA-D045-46C2-BF26-C6AFC06B90C2}"/>
+              </a:ext>
+            </a:extLst>
+          </p:cNvPr>
+          <p:cNvGrpSpPr/>
+          <p:nvPr/>
+        </p:nvGrpSpPr>
+        <p:grpSpPr>
+          <a:xfrm>
+            <a:off x="1066798" y="209982"/>
+            <a:ext cx="10058400" cy="870094"/>
+            <a:chOff x="1066798" y="209982"/>
+            <a:chExt cx="10058400" cy="870094"/>
+          </a:xfrm>
+        </p:grpSpPr>
+        <p:sp>
+          <p:nvSpPr>
+            <p:cNvPr id="2" name="Title 1">
+              <a:extLst>
+                <a:ext uri="{FF2B5EF4-FFF2-40B4-BE49-F238E27FC236}">
+                  <a16:creationId xmlns:a16="http://schemas.microsoft.com/office/drawing/2014/main" id="{B898D37B-FC34-487E-97CA-D605BE85E50F}"/>
+                </a:ext>
+              </a:extLst>
+            </p:cNvPr>
+            <p:cNvSpPr txBox="1">
+              <a:spLocks/>
+            </p:cNvSpPr>
+            <p:nvPr/>
+          </p:nvSpPr>
+          <p:spPr>
+            <a:xfrm>
+              <a:off x="1066798" y="209982"/>
+              <a:ext cx="10058400" cy="870094"/>
+            </a:xfrm>
+            <a:prstGeom prst="rect">
+              <a:avLst/>
+            </a:prstGeom>
+          </p:spPr>
+          <p:txBody>
+            <a:bodyPr/>
+            <a:lstStyle>
+              <a:lvl1pPr algn="l" defTabSz="914400" rtl="0" eaLnBrk="1" latinLnBrk="0" hangingPunct="1">
+                <a:lnSpc>
+                  <a:spcPct val="85000"/>
+                </a:lnSpc>
+                <a:spcBef>
+                  <a:spcPct val="0"/>
+                </a:spcBef>
+                <a:buNone/>
+                <a:defRPr sz="4800" kern="1200" spc="-50" baseline="0">
+                  <a:solidFill>
+                    <a:schemeClr val="tx1">
+                      <a:lumMod val="75000"/>
+                      <a:lumOff val="25000"/>
+                    </a:schemeClr>
+                  </a:solidFill>
+                  <a:latin typeface="+mj-lt"/>
+                  <a:ea typeface="+mj-ea"/>
+                  <a:cs typeface="+mj-cs"/>
+                </a:defRPr>
+              </a:lvl1pPr>
+            </a:lstStyle>
+            <a:p>
+              <a:r>
+                <a:rPr lang="en-US" dirty="0"/>
+                <a:t>Reviews</a:t>
+              </a:r>
+            </a:p>
+          </p:txBody>
+        </p:sp>
+        <p:cxnSp>
+          <p:nvCxnSpPr>
+            <p:cNvPr id="3" name="Straight Connector 2">
+              <a:extLst>
+                <a:ext uri="{FF2B5EF4-FFF2-40B4-BE49-F238E27FC236}">
+                  <a16:creationId xmlns:a16="http://schemas.microsoft.com/office/drawing/2014/main" id="{96E0E1CA-7566-4D27-8472-A7A41DCA9897}"/>
+                </a:ext>
+              </a:extLst>
+            </p:cNvPr>
+            <p:cNvCxnSpPr>
+              <a:cxnSpLocks/>
+            </p:cNvCxnSpPr>
+            <p:nvPr/>
+          </p:nvCxnSpPr>
+          <p:spPr>
+            <a:xfrm>
+              <a:off x="1111306" y="995320"/>
+              <a:ext cx="9969388" cy="0"/>
+            </a:xfrm>
+            <a:prstGeom prst="line">
+              <a:avLst/>
+            </a:prstGeom>
+            <a:ln w="3175"/>
+          </p:spPr>
+          <p:style>
+            <a:lnRef idx="1">
+              <a:schemeClr val="dk1"/>
+            </a:lnRef>
+            <a:fillRef idx="0">
+              <a:schemeClr val="dk1"/>
+            </a:fillRef>
+            <a:effectRef idx="0">
+              <a:schemeClr val="dk1"/>
+            </a:effectRef>
+            <a:fontRef idx="minor">
+              <a:schemeClr val="tx1"/>
+            </a:fontRef>
+          </p:style>
+        </p:cxnSp>
+      </p:grpSp>
+      <p:pic>
+        <p:nvPicPr>
+          <p:cNvPr id="6" name="Picture 5" descr="Chart, histogram&#10;&#10;Description automatically generated">
+            <a:extLst>
+              <a:ext uri="{FF2B5EF4-FFF2-40B4-BE49-F238E27FC236}">
+                <a16:creationId xmlns:a16="http://schemas.microsoft.com/office/drawing/2014/main" id="{5D07D040-3C20-4C0E-9E21-995DBE78C1B1}"/>
+              </a:ext>
+            </a:extLst>
+          </p:cNvPr>
+          <p:cNvPicPr>
+            <a:picLocks noChangeAspect="1"/>
+          </p:cNvPicPr>
+          <p:nvPr/>
+        </p:nvPicPr>
+        <p:blipFill>
+          <a:blip r:embed="rId2">
+            <a:extLst>
+              <a:ext uri="{28A0092B-C50C-407E-A947-70E740481C1C}">
+                <a14:useLocalDpi xmlns:a14="http://schemas.microsoft.com/office/drawing/2010/main" val="0"/>
+              </a:ext>
+            </a:extLst>
+          </a:blip>
+          <a:stretch>
+            <a:fillRect/>
+          </a:stretch>
+        </p:blipFill>
+        <p:spPr>
+          <a:xfrm>
+            <a:off x="648958" y="1518776"/>
+            <a:ext cx="4652540" cy="4503420"/>
+          </a:xfrm>
+          <a:prstGeom prst="rect">
+            <a:avLst/>
+          </a:prstGeom>
+        </p:spPr>
+      </p:pic>
+      <p:pic>
+        <p:nvPicPr>
+          <p:cNvPr id="8" name="Picture 7" descr="A picture containing chart&#10;&#10;Description automatically generated">
+            <a:extLst>
+              <a:ext uri="{FF2B5EF4-FFF2-40B4-BE49-F238E27FC236}">
+                <a16:creationId xmlns:a16="http://schemas.microsoft.com/office/drawing/2014/main" id="{FF6D0A6A-FBA8-419B-A502-C0F7A60E17A3}"/>
+              </a:ext>
+            </a:extLst>
+          </p:cNvPr>
+          <p:cNvPicPr>
+            <a:picLocks noChangeAspect="1"/>
+          </p:cNvPicPr>
+          <p:nvPr/>
+        </p:nvPicPr>
+        <p:blipFill>
+          <a:blip r:embed="rId3">
+            <a:extLst>
+              <a:ext uri="{28A0092B-C50C-407E-A947-70E740481C1C}">
+                <a14:useLocalDpi xmlns:a14="http://schemas.microsoft.com/office/drawing/2010/main" val="0"/>
+              </a:ext>
+            </a:extLst>
+          </a:blip>
+          <a:stretch>
+            <a:fillRect/>
+          </a:stretch>
+        </p:blipFill>
+        <p:spPr>
+          <a:xfrm>
+            <a:off x="6430232" y="1518776"/>
+            <a:ext cx="4779292" cy="4503420"/>
+          </a:xfrm>
+          <a:prstGeom prst="rect">
+            <a:avLst/>
+          </a:prstGeom>
+        </p:spPr>
+      </p:pic>
+    </p:spTree>
+    <p:extLst>
+      <p:ext uri="{BB962C8B-B14F-4D97-AF65-F5344CB8AC3E}">
+        <p14:creationId xmlns:p14="http://schemas.microsoft.com/office/powerpoint/2010/main" val="1141319981"/>
+      </p:ext>
+    </p:extLst>
+  </p:cSld>
+  <p:clrMapOvr>
+    <a:masterClrMapping/>
+  </p:clrMapOvr>
+</p:sld>
+</file>
+
+<file path=ppt/slides/slide19.xml><?xml version="1.0" encoding="utf-8"?>
+<p:sld xmlns:a="http://schemas.openxmlformats.org/drawingml/2006/main" xmlns:r="http://schemas.openxmlformats.org/officeDocument/2006/relationships" xmlns:p="http://schemas.openxmlformats.org/presentationml/2006/main">
+  <p:cSld>
+    <p:spTree>
+      <p:nvGrpSpPr>
+        <p:cNvPr id="1" name=""/>
+        <p:cNvGrpSpPr/>
+        <p:nvPr/>
+      </p:nvGrpSpPr>
+      <p:grpSpPr>
+        <a:xfrm>
+          <a:off x="0" y="0"/>
+          <a:ext cx="0" cy="0"/>
+          <a:chOff x="0" y="0"/>
+          <a:chExt cx="0" cy="0"/>
+        </a:xfrm>
+      </p:grpSpPr>
+      <p:grpSp>
+        <p:nvGrpSpPr>
+          <p:cNvPr id="4" name="Group 3">
+            <a:extLst>
+              <a:ext uri="{FF2B5EF4-FFF2-40B4-BE49-F238E27FC236}">
+                <a16:creationId xmlns:a16="http://schemas.microsoft.com/office/drawing/2014/main" id="{794FFCAA-D045-46C2-BF26-C6AFC06B90C2}"/>
+              </a:ext>
+            </a:extLst>
+          </p:cNvPr>
+          <p:cNvGrpSpPr/>
+          <p:nvPr/>
+        </p:nvGrpSpPr>
+        <p:grpSpPr>
+          <a:xfrm>
+            <a:off x="1066798" y="209982"/>
+            <a:ext cx="10058400" cy="870094"/>
+            <a:chOff x="1066798" y="209982"/>
+            <a:chExt cx="10058400" cy="870094"/>
+          </a:xfrm>
+        </p:grpSpPr>
+        <p:sp>
+          <p:nvSpPr>
+            <p:cNvPr id="2" name="Title 1">
+              <a:extLst>
+                <a:ext uri="{FF2B5EF4-FFF2-40B4-BE49-F238E27FC236}">
+                  <a16:creationId xmlns:a16="http://schemas.microsoft.com/office/drawing/2014/main" id="{B898D37B-FC34-487E-97CA-D605BE85E50F}"/>
+                </a:ext>
+              </a:extLst>
+            </p:cNvPr>
+            <p:cNvSpPr txBox="1">
+              <a:spLocks/>
+            </p:cNvSpPr>
+            <p:nvPr/>
+          </p:nvSpPr>
+          <p:spPr>
+            <a:xfrm>
+              <a:off x="1066798" y="209982"/>
+              <a:ext cx="10058400" cy="870094"/>
+            </a:xfrm>
+            <a:prstGeom prst="rect">
+              <a:avLst/>
+            </a:prstGeom>
+          </p:spPr>
+          <p:txBody>
+            <a:bodyPr/>
+            <a:lstStyle>
+              <a:lvl1pPr algn="l" defTabSz="914400" rtl="0" eaLnBrk="1" latinLnBrk="0" hangingPunct="1">
+                <a:lnSpc>
+                  <a:spcPct val="85000"/>
+                </a:lnSpc>
+                <a:spcBef>
+                  <a:spcPct val="0"/>
+                </a:spcBef>
+                <a:buNone/>
+                <a:defRPr sz="4800" kern="1200" spc="-50" baseline="0">
+                  <a:solidFill>
+                    <a:schemeClr val="tx1">
+                      <a:lumMod val="75000"/>
+                      <a:lumOff val="25000"/>
+                    </a:schemeClr>
+                  </a:solidFill>
+                  <a:latin typeface="+mj-lt"/>
+                  <a:ea typeface="+mj-ea"/>
+                  <a:cs typeface="+mj-cs"/>
+                </a:defRPr>
+              </a:lvl1pPr>
+            </a:lstStyle>
+            <a:p>
+              <a:r>
+                <a:rPr lang="en-US" dirty="0"/>
+                <a:t>Author as Narrator</a:t>
+              </a:r>
+            </a:p>
+          </p:txBody>
+        </p:sp>
+        <p:cxnSp>
+          <p:nvCxnSpPr>
+            <p:cNvPr id="3" name="Straight Connector 2">
+              <a:extLst>
+                <a:ext uri="{FF2B5EF4-FFF2-40B4-BE49-F238E27FC236}">
+                  <a16:creationId xmlns:a16="http://schemas.microsoft.com/office/drawing/2014/main" id="{96E0E1CA-7566-4D27-8472-A7A41DCA9897}"/>
+                </a:ext>
+              </a:extLst>
+            </p:cNvPr>
+            <p:cNvCxnSpPr>
+              <a:cxnSpLocks/>
+            </p:cNvCxnSpPr>
+            <p:nvPr/>
+          </p:nvCxnSpPr>
+          <p:spPr>
+            <a:xfrm>
+              <a:off x="1111306" y="995320"/>
+              <a:ext cx="9969388" cy="0"/>
+            </a:xfrm>
+            <a:prstGeom prst="line">
+              <a:avLst/>
+            </a:prstGeom>
+            <a:ln w="3175"/>
+          </p:spPr>
+          <p:style>
+            <a:lnRef idx="1">
+              <a:schemeClr val="dk1"/>
+            </a:lnRef>
+            <a:fillRef idx="0">
+              <a:schemeClr val="dk1"/>
+            </a:fillRef>
+            <a:effectRef idx="0">
+              <a:schemeClr val="dk1"/>
+            </a:effectRef>
+            <a:fontRef idx="minor">
+              <a:schemeClr val="tx1"/>
+            </a:fontRef>
+          </p:style>
+        </p:cxnSp>
+      </p:grpSp>
+      <p:pic>
+        <p:nvPicPr>
+          <p:cNvPr id="6" name="Picture 5" descr="A picture containing chart&#10;&#10;Description automatically generated">
+            <a:extLst>
+              <a:ext uri="{FF2B5EF4-FFF2-40B4-BE49-F238E27FC236}">
+                <a16:creationId xmlns:a16="http://schemas.microsoft.com/office/drawing/2014/main" id="{9B981ED3-292D-44A9-84C8-28A1AE4C3A02}"/>
+              </a:ext>
+            </a:extLst>
+          </p:cNvPr>
+          <p:cNvPicPr>
+            <a:picLocks noChangeAspect="1"/>
+          </p:cNvPicPr>
+          <p:nvPr/>
+        </p:nvPicPr>
+        <p:blipFill>
+          <a:blip r:embed="rId2">
+            <a:extLst>
+              <a:ext uri="{28A0092B-C50C-407E-A947-70E740481C1C}">
+                <a14:useLocalDpi xmlns:a14="http://schemas.microsoft.com/office/drawing/2010/main" val="0"/>
+              </a:ext>
+            </a:extLst>
+          </a:blip>
+          <a:stretch>
+            <a:fillRect/>
+          </a:stretch>
+        </p:blipFill>
+        <p:spPr>
+          <a:xfrm>
+            <a:off x="4526281" y="1243944"/>
+            <a:ext cx="6909480" cy="4618736"/>
+          </a:xfrm>
+          <a:prstGeom prst="rect">
+            <a:avLst/>
+          </a:prstGeom>
+        </p:spPr>
+      </p:pic>
+    </p:spTree>
+    <p:extLst>
+      <p:ext uri="{BB962C8B-B14F-4D97-AF65-F5344CB8AC3E}">
+        <p14:creationId xmlns:p14="http://schemas.microsoft.com/office/powerpoint/2010/main" val="1282853437"/>
       </p:ext>
     </p:extLst>
   </p:cSld>
@@ -5307,6 +6595,442 @@
     <p:extLst>
       <p:ext uri="{BB962C8B-B14F-4D97-AF65-F5344CB8AC3E}">
         <p14:creationId xmlns:p14="http://schemas.microsoft.com/office/powerpoint/2010/main" val="3818557035"/>
+      </p:ext>
+    </p:extLst>
+  </p:cSld>
+  <p:clrMapOvr>
+    <a:masterClrMapping/>
+  </p:clrMapOvr>
+</p:sld>
+</file>
+
+<file path=ppt/slides/slide20.xml><?xml version="1.0" encoding="utf-8"?>
+<p:sld xmlns:a="http://schemas.openxmlformats.org/drawingml/2006/main" xmlns:r="http://schemas.openxmlformats.org/officeDocument/2006/relationships" xmlns:p="http://schemas.openxmlformats.org/presentationml/2006/main">
+  <p:cSld>
+    <p:spTree>
+      <p:nvGrpSpPr>
+        <p:cNvPr id="1" name=""/>
+        <p:cNvGrpSpPr/>
+        <p:nvPr/>
+      </p:nvGrpSpPr>
+      <p:grpSpPr>
+        <a:xfrm>
+          <a:off x="0" y="0"/>
+          <a:ext cx="0" cy="0"/>
+          <a:chOff x="0" y="0"/>
+          <a:chExt cx="0" cy="0"/>
+        </a:xfrm>
+      </p:grpSpPr>
+      <p:grpSp>
+        <p:nvGrpSpPr>
+          <p:cNvPr id="4" name="Group 3">
+            <a:extLst>
+              <a:ext uri="{FF2B5EF4-FFF2-40B4-BE49-F238E27FC236}">
+                <a16:creationId xmlns:a16="http://schemas.microsoft.com/office/drawing/2014/main" id="{794FFCAA-D045-46C2-BF26-C6AFC06B90C2}"/>
+              </a:ext>
+            </a:extLst>
+          </p:cNvPr>
+          <p:cNvGrpSpPr/>
+          <p:nvPr/>
+        </p:nvGrpSpPr>
+        <p:grpSpPr>
+          <a:xfrm>
+            <a:off x="1066798" y="209982"/>
+            <a:ext cx="10058400" cy="870094"/>
+            <a:chOff x="1066798" y="209982"/>
+            <a:chExt cx="10058400" cy="870094"/>
+          </a:xfrm>
+        </p:grpSpPr>
+        <p:sp>
+          <p:nvSpPr>
+            <p:cNvPr id="2" name="Title 1">
+              <a:extLst>
+                <a:ext uri="{FF2B5EF4-FFF2-40B4-BE49-F238E27FC236}">
+                  <a16:creationId xmlns:a16="http://schemas.microsoft.com/office/drawing/2014/main" id="{B898D37B-FC34-487E-97CA-D605BE85E50F}"/>
+                </a:ext>
+              </a:extLst>
+            </p:cNvPr>
+            <p:cNvSpPr txBox="1">
+              <a:spLocks/>
+            </p:cNvSpPr>
+            <p:nvPr/>
+          </p:nvSpPr>
+          <p:spPr>
+            <a:xfrm>
+              <a:off x="1066798" y="209982"/>
+              <a:ext cx="10058400" cy="870094"/>
+            </a:xfrm>
+            <a:prstGeom prst="rect">
+              <a:avLst/>
+            </a:prstGeom>
+          </p:spPr>
+          <p:txBody>
+            <a:bodyPr/>
+            <a:lstStyle>
+              <a:lvl1pPr algn="l" defTabSz="914400" rtl="0" eaLnBrk="1" latinLnBrk="0" hangingPunct="1">
+                <a:lnSpc>
+                  <a:spcPct val="85000"/>
+                </a:lnSpc>
+                <a:spcBef>
+                  <a:spcPct val="0"/>
+                </a:spcBef>
+                <a:buNone/>
+                <a:defRPr sz="4800" kern="1200" spc="-50" baseline="0">
+                  <a:solidFill>
+                    <a:schemeClr val="tx1">
+                      <a:lumMod val="75000"/>
+                      <a:lumOff val="25000"/>
+                    </a:schemeClr>
+                  </a:solidFill>
+                  <a:latin typeface="+mj-lt"/>
+                  <a:ea typeface="+mj-ea"/>
+                  <a:cs typeface="+mj-cs"/>
+                </a:defRPr>
+              </a:lvl1pPr>
+            </a:lstStyle>
+            <a:p>
+              <a:r>
+                <a:rPr lang="en-US" dirty="0"/>
+                <a:t>Conclusion</a:t>
+              </a:r>
+            </a:p>
+          </p:txBody>
+        </p:sp>
+        <p:cxnSp>
+          <p:nvCxnSpPr>
+            <p:cNvPr id="3" name="Straight Connector 2">
+              <a:extLst>
+                <a:ext uri="{FF2B5EF4-FFF2-40B4-BE49-F238E27FC236}">
+                  <a16:creationId xmlns:a16="http://schemas.microsoft.com/office/drawing/2014/main" id="{96E0E1CA-7566-4D27-8472-A7A41DCA9897}"/>
+                </a:ext>
+              </a:extLst>
+            </p:cNvPr>
+            <p:cNvCxnSpPr>
+              <a:cxnSpLocks/>
+            </p:cNvCxnSpPr>
+            <p:nvPr/>
+          </p:nvCxnSpPr>
+          <p:spPr>
+            <a:xfrm>
+              <a:off x="1111306" y="995320"/>
+              <a:ext cx="9969388" cy="0"/>
+            </a:xfrm>
+            <a:prstGeom prst="line">
+              <a:avLst/>
+            </a:prstGeom>
+            <a:ln w="3175"/>
+          </p:spPr>
+          <p:style>
+            <a:lnRef idx="1">
+              <a:schemeClr val="dk1"/>
+            </a:lnRef>
+            <a:fillRef idx="0">
+              <a:schemeClr val="dk1"/>
+            </a:fillRef>
+            <a:effectRef idx="0">
+              <a:schemeClr val="dk1"/>
+            </a:effectRef>
+            <a:fontRef idx="minor">
+              <a:schemeClr val="tx1"/>
+            </a:fontRef>
+          </p:style>
+        </p:cxnSp>
+      </p:grpSp>
+    </p:spTree>
+    <p:extLst>
+      <p:ext uri="{BB962C8B-B14F-4D97-AF65-F5344CB8AC3E}">
+        <p14:creationId xmlns:p14="http://schemas.microsoft.com/office/powerpoint/2010/main" val="2001251935"/>
+      </p:ext>
+    </p:extLst>
+  </p:cSld>
+  <p:clrMapOvr>
+    <a:masterClrMapping/>
+  </p:clrMapOvr>
+</p:sld>
+</file>
+
+<file path=ppt/slides/slide21.xml><?xml version="1.0" encoding="utf-8"?>
+<p:sld xmlns:a="http://schemas.openxmlformats.org/drawingml/2006/main" xmlns:r="http://schemas.openxmlformats.org/officeDocument/2006/relationships" xmlns:p="http://schemas.openxmlformats.org/presentationml/2006/main">
+  <p:cSld>
+    <p:spTree>
+      <p:nvGrpSpPr>
+        <p:cNvPr id="1" name=""/>
+        <p:cNvGrpSpPr/>
+        <p:nvPr/>
+      </p:nvGrpSpPr>
+      <p:grpSpPr>
+        <a:xfrm>
+          <a:off x="0" y="0"/>
+          <a:ext cx="0" cy="0"/>
+          <a:chOff x="0" y="0"/>
+          <a:chExt cx="0" cy="0"/>
+        </a:xfrm>
+      </p:grpSpPr>
+      <p:sp>
+        <p:nvSpPr>
+          <p:cNvPr id="2" name="Title 1">
+            <a:extLst>
+              <a:ext uri="{FF2B5EF4-FFF2-40B4-BE49-F238E27FC236}">
+                <a16:creationId xmlns:a16="http://schemas.microsoft.com/office/drawing/2014/main" id="{902EBB08-D194-4BFE-A14C-D6D9496A4381}"/>
+              </a:ext>
+            </a:extLst>
+          </p:cNvPr>
+          <p:cNvSpPr>
+            <a:spLocks noGrp="1"/>
+          </p:cNvSpPr>
+          <p:nvPr>
+            <p:ph type="title"/>
+          </p:nvPr>
+        </p:nvSpPr>
+        <p:spPr/>
+        <p:txBody>
+          <a:bodyPr/>
+          <a:lstStyle/>
+          <a:p>
+            <a:r>
+              <a:rPr lang="en-US" dirty="0"/>
+              <a:t>Future Work</a:t>
+            </a:r>
+          </a:p>
+        </p:txBody>
+      </p:sp>
+      <p:sp>
+        <p:nvSpPr>
+          <p:cNvPr id="3" name="Content Placeholder 2">
+            <a:extLst>
+              <a:ext uri="{FF2B5EF4-FFF2-40B4-BE49-F238E27FC236}">
+                <a16:creationId xmlns:a16="http://schemas.microsoft.com/office/drawing/2014/main" id="{575E0344-172A-44A7-9EDF-4632688E7728}"/>
+              </a:ext>
+            </a:extLst>
+          </p:cNvPr>
+          <p:cNvSpPr>
+            <a:spLocks noGrp="1"/>
+          </p:cNvSpPr>
+          <p:nvPr>
+            <p:ph idx="1"/>
+          </p:nvPr>
+        </p:nvSpPr>
+        <p:spPr/>
+        <p:txBody>
+          <a:bodyPr>
+            <a:normAutofit fontScale="55000" lnSpcReduction="20000"/>
+          </a:bodyPr>
+          <a:lstStyle/>
+          <a:p>
+            <a:r>
+              <a:rPr lang="en-US" dirty="0"/>
+              <a:t>Audible data collection could be expanded by fine grain review data.</a:t>
+            </a:r>
+          </a:p>
+          <a:p>
+            <a:r>
+              <a:rPr lang="en-US" dirty="0"/>
+              <a:t>Capture plus vs premium plus titles?</a:t>
+            </a:r>
+          </a:p>
+          <a:p>
+            <a:r>
+              <a:rPr lang="en-US" dirty="0"/>
+              <a:t>Audible might have dynamic categories. Number of titles increased and decreased across categories. </a:t>
+            </a:r>
+          </a:p>
+          <a:p>
+            <a:endParaRPr lang="en-US" dirty="0"/>
+          </a:p>
+          <a:p>
+            <a:r>
+              <a:rPr lang="en-US" dirty="0"/>
+              <a:t>Attempted to scrape Amazon books</a:t>
+            </a:r>
+          </a:p>
+          <a:p>
+            <a:r>
+              <a:rPr lang="en-US" dirty="0"/>
+              <a:t>- Amazon displays a CAPTCHA page after ~500 site visits </a:t>
+            </a:r>
+          </a:p>
+          <a:p>
+            <a:r>
+              <a:rPr lang="en-US" dirty="0"/>
+              <a:t>- Page will be returned for several hours before </a:t>
+            </a:r>
+          </a:p>
+          <a:p>
+            <a:r>
+              <a:rPr lang="en-US" dirty="0"/>
+              <a:t>- Using proxy service (</a:t>
+            </a:r>
+            <a:r>
+              <a:rPr lang="en-US" dirty="0" err="1"/>
+              <a:t>ScraperAPI</a:t>
+            </a:r>
+            <a:r>
+              <a:rPr lang="en-US" dirty="0"/>
+              <a:t>) avoided bans but required payment.</a:t>
+            </a:r>
+          </a:p>
+          <a:p>
+            <a:endParaRPr lang="en-US" dirty="0"/>
+          </a:p>
+          <a:p>
+            <a:r>
+              <a:rPr lang="en-US" dirty="0"/>
+              <a:t>BookShop.org</a:t>
+            </a:r>
+          </a:p>
+          <a:p>
+            <a:r>
+              <a:rPr lang="en-US" dirty="0"/>
+              <a:t>- A new online book shop which shares income with local books stores.</a:t>
+            </a:r>
+          </a:p>
+          <a:p>
+            <a:r>
+              <a:rPr lang="en-US" dirty="0"/>
+              <a:t>- Similar data to Amazon but less reviews.</a:t>
+            </a:r>
+          </a:p>
+          <a:p>
+            <a:r>
+              <a:rPr lang="en-US" dirty="0"/>
+              <a:t>- Slightly elevated prices compared to Amazon.</a:t>
+            </a:r>
+          </a:p>
+        </p:txBody>
+      </p:sp>
+    </p:spTree>
+    <p:extLst>
+      <p:ext uri="{BB962C8B-B14F-4D97-AF65-F5344CB8AC3E}">
+        <p14:creationId xmlns:p14="http://schemas.microsoft.com/office/powerpoint/2010/main" val="2222744620"/>
+      </p:ext>
+    </p:extLst>
+  </p:cSld>
+  <p:clrMapOvr>
+    <a:masterClrMapping/>
+  </p:clrMapOvr>
+</p:sld>
+</file>
+
+<file path=ppt/slides/slide22.xml><?xml version="1.0" encoding="utf-8"?>
+<p:sld xmlns:a="http://schemas.openxmlformats.org/drawingml/2006/main" xmlns:r="http://schemas.openxmlformats.org/officeDocument/2006/relationships" xmlns:p="http://schemas.openxmlformats.org/presentationml/2006/main">
+  <p:cSld>
+    <p:spTree>
+      <p:nvGrpSpPr>
+        <p:cNvPr id="1" name=""/>
+        <p:cNvGrpSpPr/>
+        <p:nvPr/>
+      </p:nvGrpSpPr>
+      <p:grpSpPr>
+        <a:xfrm>
+          <a:off x="0" y="0"/>
+          <a:ext cx="0" cy="0"/>
+          <a:chOff x="0" y="0"/>
+          <a:chExt cx="0" cy="0"/>
+        </a:xfrm>
+      </p:grpSpPr>
+      <p:sp>
+        <p:nvSpPr>
+          <p:cNvPr id="2" name="Title 1">
+            <a:extLst>
+              <a:ext uri="{FF2B5EF4-FFF2-40B4-BE49-F238E27FC236}">
+                <a16:creationId xmlns:a16="http://schemas.microsoft.com/office/drawing/2014/main" id="{00DF3A5E-1F79-4EEE-9577-F262AE1381A0}"/>
+              </a:ext>
+            </a:extLst>
+          </p:cNvPr>
+          <p:cNvSpPr>
+            <a:spLocks noGrp="1"/>
+          </p:cNvSpPr>
+          <p:nvPr>
+            <p:ph type="title"/>
+          </p:nvPr>
+        </p:nvSpPr>
+        <p:spPr/>
+        <p:txBody>
+          <a:bodyPr/>
+          <a:lstStyle/>
+          <a:p>
+            <a:r>
+              <a:rPr lang="en-US" dirty="0"/>
+              <a:t>Acknowledgements</a:t>
+            </a:r>
+          </a:p>
+        </p:txBody>
+      </p:sp>
+      <p:sp>
+        <p:nvSpPr>
+          <p:cNvPr id="3" name="Content Placeholder 2">
+            <a:extLst>
+              <a:ext uri="{FF2B5EF4-FFF2-40B4-BE49-F238E27FC236}">
+                <a16:creationId xmlns:a16="http://schemas.microsoft.com/office/drawing/2014/main" id="{170739A6-A97C-4340-BD59-02CCC55492BF}"/>
+              </a:ext>
+            </a:extLst>
+          </p:cNvPr>
+          <p:cNvSpPr>
+            <a:spLocks noGrp="1"/>
+          </p:cNvSpPr>
+          <p:nvPr>
+            <p:ph idx="1"/>
+          </p:nvPr>
+        </p:nvSpPr>
+        <p:spPr/>
+        <p:txBody>
+          <a:bodyPr/>
+          <a:lstStyle/>
+          <a:p>
+            <a:endParaRPr lang="en-US" dirty="0"/>
+          </a:p>
+          <a:p>
+            <a:r>
+              <a:rPr lang="en-US" b="1" dirty="0"/>
+              <a:t>Audible</a:t>
+            </a:r>
+            <a:r>
+              <a:rPr lang="en-US" dirty="0"/>
+              <a:t> for not banning me.</a:t>
+            </a:r>
+          </a:p>
+          <a:p>
+            <a:endParaRPr lang="en-US" dirty="0"/>
+          </a:p>
+          <a:p>
+            <a:r>
+              <a:rPr lang="en-US" b="1" dirty="0" err="1"/>
+              <a:t>ScraperAPI</a:t>
+            </a:r>
+            <a:r>
+              <a:rPr lang="en-US" dirty="0"/>
+              <a:t> for help which I didn’t end up using in this project.</a:t>
+            </a:r>
+          </a:p>
+          <a:p>
+            <a:endParaRPr lang="en-US" dirty="0"/>
+          </a:p>
+          <a:p>
+            <a:r>
+              <a:rPr lang="en-US" dirty="0">
+                <a:hlinkClick r:id="rId2"/>
+              </a:rPr>
+              <a:t>Ed Robertson </a:t>
+            </a:r>
+            <a:r>
+              <a:rPr lang="en-US" dirty="0"/>
+              <a:t>&amp; </a:t>
+            </a:r>
+            <a:r>
+              <a:rPr lang="en-US" dirty="0" err="1"/>
+              <a:t>Unsplash</a:t>
+            </a:r>
+            <a:r>
+              <a:rPr lang="en-US" dirty="0"/>
+              <a:t> for the photo.</a:t>
+            </a:r>
+          </a:p>
+        </p:txBody>
+      </p:sp>
+    </p:spTree>
+    <p:extLst>
+      <p:ext uri="{BB962C8B-B14F-4D97-AF65-F5344CB8AC3E}">
+        <p14:creationId xmlns:p14="http://schemas.microsoft.com/office/powerpoint/2010/main" val="3808814931"/>
       </p:ext>
     </p:extLst>
   </p:cSld>
@@ -7211,151 +8935,6 @@
 </file>
 
 <file path=ppt/slides/slide8.xml><?xml version="1.0" encoding="utf-8"?>
-<p:sld xmlns:a="http://schemas.openxmlformats.org/drawingml/2006/main" xmlns:r="http://schemas.openxmlformats.org/officeDocument/2006/relationships" xmlns:p="http://schemas.openxmlformats.org/presentationml/2006/main">
-  <p:cSld>
-    <p:spTree>
-      <p:nvGrpSpPr>
-        <p:cNvPr id="1" name=""/>
-        <p:cNvGrpSpPr/>
-        <p:nvPr/>
-      </p:nvGrpSpPr>
-      <p:grpSpPr>
-        <a:xfrm>
-          <a:off x="0" y="0"/>
-          <a:ext cx="0" cy="0"/>
-          <a:chOff x="0" y="0"/>
-          <a:chExt cx="0" cy="0"/>
-        </a:xfrm>
-      </p:grpSpPr>
-      <p:grpSp>
-        <p:nvGrpSpPr>
-          <p:cNvPr id="4" name="Group 3">
-            <a:extLst>
-              <a:ext uri="{FF2B5EF4-FFF2-40B4-BE49-F238E27FC236}">
-                <a16:creationId xmlns:a16="http://schemas.microsoft.com/office/drawing/2014/main" id="{794FFCAA-D045-46C2-BF26-C6AFC06B90C2}"/>
-              </a:ext>
-            </a:extLst>
-          </p:cNvPr>
-          <p:cNvGrpSpPr/>
-          <p:nvPr/>
-        </p:nvGrpSpPr>
-        <p:grpSpPr>
-          <a:xfrm>
-            <a:off x="1066798" y="209982"/>
-            <a:ext cx="10058400" cy="870094"/>
-            <a:chOff x="1066798" y="209982"/>
-            <a:chExt cx="10058400" cy="870094"/>
-          </a:xfrm>
-        </p:grpSpPr>
-        <p:sp>
-          <p:nvSpPr>
-            <p:cNvPr id="2" name="Title 1">
-              <a:extLst>
-                <a:ext uri="{FF2B5EF4-FFF2-40B4-BE49-F238E27FC236}">
-                  <a16:creationId xmlns:a16="http://schemas.microsoft.com/office/drawing/2014/main" id="{B898D37B-FC34-487E-97CA-D605BE85E50F}"/>
-                </a:ext>
-              </a:extLst>
-            </p:cNvPr>
-            <p:cNvSpPr txBox="1">
-              <a:spLocks/>
-            </p:cNvSpPr>
-            <p:nvPr/>
-          </p:nvSpPr>
-          <p:spPr>
-            <a:xfrm>
-              <a:off x="1066798" y="209982"/>
-              <a:ext cx="10058400" cy="870094"/>
-            </a:xfrm>
-            <a:prstGeom prst="rect">
-              <a:avLst/>
-            </a:prstGeom>
-          </p:spPr>
-          <p:txBody>
-            <a:bodyPr/>
-            <a:lstStyle>
-              <a:lvl1pPr algn="l" defTabSz="914400" rtl="0" eaLnBrk="1" latinLnBrk="0" hangingPunct="1">
-                <a:lnSpc>
-                  <a:spcPct val="85000"/>
-                </a:lnSpc>
-                <a:spcBef>
-                  <a:spcPct val="0"/>
-                </a:spcBef>
-                <a:buNone/>
-                <a:defRPr sz="4800" kern="1200" spc="-50" baseline="0">
-                  <a:solidFill>
-                    <a:schemeClr val="tx1">
-                      <a:lumMod val="75000"/>
-                      <a:lumOff val="25000"/>
-                    </a:schemeClr>
-                  </a:solidFill>
-                  <a:latin typeface="+mj-lt"/>
-                  <a:ea typeface="+mj-ea"/>
-                  <a:cs typeface="+mj-cs"/>
-                </a:defRPr>
-              </a:lvl1pPr>
-            </a:lstStyle>
-            <a:p>
-              <a:r>
-                <a:rPr lang="en-US" dirty="0"/>
-                <a:t>Template</a:t>
-              </a:r>
-            </a:p>
-          </p:txBody>
-        </p:sp>
-        <p:cxnSp>
-          <p:nvCxnSpPr>
-            <p:cNvPr id="3" name="Straight Connector 2">
-              <a:extLst>
-                <a:ext uri="{FF2B5EF4-FFF2-40B4-BE49-F238E27FC236}">
-                  <a16:creationId xmlns:a16="http://schemas.microsoft.com/office/drawing/2014/main" id="{96E0E1CA-7566-4D27-8472-A7A41DCA9897}"/>
-                </a:ext>
-              </a:extLst>
-            </p:cNvPr>
-            <p:cNvCxnSpPr>
-              <a:cxnSpLocks/>
-            </p:cNvCxnSpPr>
-            <p:nvPr/>
-          </p:nvCxnSpPr>
-          <p:spPr>
-            <a:xfrm>
-              <a:off x="1111306" y="995320"/>
-              <a:ext cx="9969388" cy="0"/>
-            </a:xfrm>
-            <a:prstGeom prst="line">
-              <a:avLst/>
-            </a:prstGeom>
-            <a:ln w="3175"/>
-          </p:spPr>
-          <p:style>
-            <a:lnRef idx="1">
-              <a:schemeClr val="dk1"/>
-            </a:lnRef>
-            <a:fillRef idx="0">
-              <a:schemeClr val="dk1"/>
-            </a:fillRef>
-            <a:effectRef idx="0">
-              <a:schemeClr val="dk1"/>
-            </a:effectRef>
-            <a:fontRef idx="minor">
-              <a:schemeClr val="tx1"/>
-            </a:fontRef>
-          </p:style>
-        </p:cxnSp>
-      </p:grpSp>
-    </p:spTree>
-    <p:extLst>
-      <p:ext uri="{BB962C8B-B14F-4D97-AF65-F5344CB8AC3E}">
-        <p14:creationId xmlns:p14="http://schemas.microsoft.com/office/powerpoint/2010/main" val="3537599579"/>
-      </p:ext>
-    </p:extLst>
-  </p:cSld>
-  <p:clrMapOvr>
-    <a:masterClrMapping/>
-  </p:clrMapOvr>
-</p:sld>
-</file>
-
-<file path=ppt/slides/slide9.xml><?xml version="1.0" encoding="utf-8"?>
 <p:sld xmlns:a="http://schemas.openxmlformats.org/drawingml/2006/main" xmlns:r="http://schemas.openxmlformats.org/officeDocument/2006/relationships" xmlns:p="http://schemas.openxmlformats.org/presentationml/2006/main">
   <p:cSld>
     <p:spTree>
@@ -8473,6 +10052,276 @@
 </p:sld>
 </file>
 
+<file path=ppt/slides/slide9.xml><?xml version="1.0" encoding="utf-8"?>
+<p:sld xmlns:a="http://schemas.openxmlformats.org/drawingml/2006/main" xmlns:r="http://schemas.openxmlformats.org/officeDocument/2006/relationships" xmlns:p="http://schemas.openxmlformats.org/presentationml/2006/main">
+  <p:cSld>
+    <p:spTree>
+      <p:nvGrpSpPr>
+        <p:cNvPr id="1" name=""/>
+        <p:cNvGrpSpPr/>
+        <p:nvPr/>
+      </p:nvGrpSpPr>
+      <p:grpSpPr>
+        <a:xfrm>
+          <a:off x="0" y="0"/>
+          <a:ext cx="0" cy="0"/>
+          <a:chOff x="0" y="0"/>
+          <a:chExt cx="0" cy="0"/>
+        </a:xfrm>
+      </p:grpSpPr>
+      <p:grpSp>
+        <p:nvGrpSpPr>
+          <p:cNvPr id="4" name="Group 3">
+            <a:extLst>
+              <a:ext uri="{FF2B5EF4-FFF2-40B4-BE49-F238E27FC236}">
+                <a16:creationId xmlns:a16="http://schemas.microsoft.com/office/drawing/2014/main" id="{794FFCAA-D045-46C2-BF26-C6AFC06B90C2}"/>
+              </a:ext>
+            </a:extLst>
+          </p:cNvPr>
+          <p:cNvGrpSpPr/>
+          <p:nvPr/>
+        </p:nvGrpSpPr>
+        <p:grpSpPr>
+          <a:xfrm>
+            <a:off x="1066798" y="209982"/>
+            <a:ext cx="10058400" cy="870094"/>
+            <a:chOff x="1066798" y="209982"/>
+            <a:chExt cx="10058400" cy="870094"/>
+          </a:xfrm>
+        </p:grpSpPr>
+        <p:sp>
+          <p:nvSpPr>
+            <p:cNvPr id="2" name="Title 1">
+              <a:extLst>
+                <a:ext uri="{FF2B5EF4-FFF2-40B4-BE49-F238E27FC236}">
+                  <a16:creationId xmlns:a16="http://schemas.microsoft.com/office/drawing/2014/main" id="{B898D37B-FC34-487E-97CA-D605BE85E50F}"/>
+                </a:ext>
+              </a:extLst>
+            </p:cNvPr>
+            <p:cNvSpPr txBox="1">
+              <a:spLocks/>
+            </p:cNvSpPr>
+            <p:nvPr/>
+          </p:nvSpPr>
+          <p:spPr>
+            <a:xfrm>
+              <a:off x="1066798" y="209982"/>
+              <a:ext cx="10058400" cy="870094"/>
+            </a:xfrm>
+            <a:prstGeom prst="rect">
+              <a:avLst/>
+            </a:prstGeom>
+          </p:spPr>
+          <p:txBody>
+            <a:bodyPr/>
+            <a:lstStyle>
+              <a:lvl1pPr algn="l" defTabSz="914400" rtl="0" eaLnBrk="1" latinLnBrk="0" hangingPunct="1">
+                <a:lnSpc>
+                  <a:spcPct val="85000"/>
+                </a:lnSpc>
+                <a:spcBef>
+                  <a:spcPct val="0"/>
+                </a:spcBef>
+                <a:buNone/>
+                <a:defRPr sz="4800" kern="1200" spc="-50" baseline="0">
+                  <a:solidFill>
+                    <a:schemeClr val="tx1">
+                      <a:lumMod val="75000"/>
+                      <a:lumOff val="25000"/>
+                    </a:schemeClr>
+                  </a:solidFill>
+                  <a:latin typeface="+mj-lt"/>
+                  <a:ea typeface="+mj-ea"/>
+                  <a:cs typeface="+mj-cs"/>
+                </a:defRPr>
+              </a:lvl1pPr>
+            </a:lstStyle>
+            <a:p>
+              <a:r>
+                <a:rPr lang="en-US" dirty="0"/>
+                <a:t>Collected Titles</a:t>
+              </a:r>
+            </a:p>
+          </p:txBody>
+        </p:sp>
+        <p:cxnSp>
+          <p:nvCxnSpPr>
+            <p:cNvPr id="3" name="Straight Connector 2">
+              <a:extLst>
+                <a:ext uri="{FF2B5EF4-FFF2-40B4-BE49-F238E27FC236}">
+                  <a16:creationId xmlns:a16="http://schemas.microsoft.com/office/drawing/2014/main" id="{96E0E1CA-7566-4D27-8472-A7A41DCA9897}"/>
+                </a:ext>
+              </a:extLst>
+            </p:cNvPr>
+            <p:cNvCxnSpPr>
+              <a:cxnSpLocks/>
+            </p:cNvCxnSpPr>
+            <p:nvPr/>
+          </p:nvCxnSpPr>
+          <p:spPr>
+            <a:xfrm>
+              <a:off x="1111306" y="995320"/>
+              <a:ext cx="9969388" cy="0"/>
+            </a:xfrm>
+            <a:prstGeom prst="line">
+              <a:avLst/>
+            </a:prstGeom>
+            <a:ln w="3175"/>
+          </p:spPr>
+          <p:style>
+            <a:lnRef idx="1">
+              <a:schemeClr val="dk1"/>
+            </a:lnRef>
+            <a:fillRef idx="0">
+              <a:schemeClr val="dk1"/>
+            </a:fillRef>
+            <a:effectRef idx="0">
+              <a:schemeClr val="dk1"/>
+            </a:effectRef>
+            <a:fontRef idx="minor">
+              <a:schemeClr val="tx1"/>
+            </a:fontRef>
+          </p:style>
+        </p:cxnSp>
+      </p:grpSp>
+      <p:pic>
+        <p:nvPicPr>
+          <p:cNvPr id="6" name="Picture 5" descr="Shape, square&#10;&#10;Description automatically generated">
+            <a:extLst>
+              <a:ext uri="{FF2B5EF4-FFF2-40B4-BE49-F238E27FC236}">
+                <a16:creationId xmlns:a16="http://schemas.microsoft.com/office/drawing/2014/main" id="{1D8409B1-BF7C-4735-8703-A1A0D1D218B9}"/>
+              </a:ext>
+            </a:extLst>
+          </p:cNvPr>
+          <p:cNvPicPr>
+            <a:picLocks noChangeAspect="1"/>
+          </p:cNvPicPr>
+          <p:nvPr/>
+        </p:nvPicPr>
+        <p:blipFill>
+          <a:blip r:embed="rId2">
+            <a:extLst>
+              <a:ext uri="{28A0092B-C50C-407E-A947-70E740481C1C}">
+                <a14:useLocalDpi xmlns:a14="http://schemas.microsoft.com/office/drawing/2010/main" val="0"/>
+              </a:ext>
+            </a:extLst>
+          </a:blip>
+          <a:stretch>
+            <a:fillRect/>
+          </a:stretch>
+        </p:blipFill>
+        <p:spPr>
+          <a:xfrm>
+            <a:off x="4994745" y="1503934"/>
+            <a:ext cx="6695252" cy="4463502"/>
+          </a:xfrm>
+          <a:prstGeom prst="rect">
+            <a:avLst/>
+          </a:prstGeom>
+        </p:spPr>
+      </p:pic>
+      <p:sp>
+        <p:nvSpPr>
+          <p:cNvPr id="7" name="TextBox 6">
+            <a:extLst>
+              <a:ext uri="{FF2B5EF4-FFF2-40B4-BE49-F238E27FC236}">
+                <a16:creationId xmlns:a16="http://schemas.microsoft.com/office/drawing/2014/main" id="{7AEF4CDD-583C-41BA-B527-BF6692ED5404}"/>
+              </a:ext>
+            </a:extLst>
+          </p:cNvPr>
+          <p:cNvSpPr txBox="1"/>
+          <p:nvPr/>
+        </p:nvSpPr>
+        <p:spPr>
+          <a:xfrm>
+            <a:off x="1066798" y="1780659"/>
+            <a:ext cx="3737420" cy="3693319"/>
+          </a:xfrm>
+          <a:prstGeom prst="rect">
+            <a:avLst/>
+          </a:prstGeom>
+          <a:noFill/>
+        </p:spPr>
+        <p:txBody>
+          <a:bodyPr wrap="square" rtlCol="0">
+            <a:spAutoFit/>
+          </a:bodyPr>
+          <a:lstStyle/>
+          <a:p>
+            <a:r>
+              <a:rPr lang="en-US" dirty="0"/>
+              <a:t>Over </a:t>
+            </a:r>
+            <a:r>
+              <a:rPr lang="en-US" u="sng" dirty="0"/>
+              <a:t>622,065</a:t>
+            </a:r>
+            <a:r>
+              <a:rPr lang="en-US" dirty="0"/>
+              <a:t> titles were scraped across all categories.</a:t>
+            </a:r>
+          </a:p>
+          <a:p>
+            <a:endParaRPr lang="en-US" dirty="0"/>
+          </a:p>
+          <a:p>
+            <a:r>
+              <a:rPr lang="en-US" dirty="0"/>
+              <a:t>Due to the layouts of the categories, many titles are present in more than one category, leading to duplicates in our data.</a:t>
+            </a:r>
+          </a:p>
+          <a:p>
+            <a:endParaRPr lang="en-US" dirty="0"/>
+          </a:p>
+          <a:p>
+            <a:r>
+              <a:rPr lang="en-US" dirty="0"/>
+              <a:t>After cleaning, </a:t>
+            </a:r>
+            <a:r>
+              <a:rPr lang="en-US" u="sng" dirty="0"/>
+              <a:t>279,241</a:t>
+            </a:r>
+            <a:r>
+              <a:rPr lang="en-US" dirty="0"/>
+              <a:t> unique audiobooks were found.</a:t>
+            </a:r>
+          </a:p>
+          <a:p>
+            <a:endParaRPr lang="en-US" dirty="0"/>
+          </a:p>
+          <a:p>
+            <a:r>
+              <a:rPr lang="en-US" dirty="0"/>
+              <a:t>As well as </a:t>
+            </a:r>
+            <a:r>
+              <a:rPr lang="en-US" u="sng" dirty="0"/>
+              <a:t>6,959</a:t>
+            </a:r>
+            <a:r>
+              <a:rPr lang="en-US" dirty="0"/>
+              <a:t> podcasts.</a:t>
+            </a:r>
+          </a:p>
+          <a:p>
+            <a:endParaRPr lang="en-US" dirty="0"/>
+          </a:p>
+        </p:txBody>
+      </p:sp>
+    </p:spTree>
+    <p:extLst>
+      <p:ext uri="{BB962C8B-B14F-4D97-AF65-F5344CB8AC3E}">
+        <p14:creationId xmlns:p14="http://schemas.microsoft.com/office/powerpoint/2010/main" val="2967321171"/>
+      </p:ext>
+    </p:extLst>
+  </p:cSld>
+  <p:clrMapOvr>
+    <a:masterClrMapping/>
+  </p:clrMapOvr>
+</p:sld>
+</file>
+
 <file path=ppt/theme/theme1.xml><?xml version="1.0" encoding="utf-8"?>
 <a:theme xmlns:a="http://schemas.openxmlformats.org/drawingml/2006/main" name="Retrospect">
   <a:themeElements>

</xml_diff>

<commit_message>
finished polishign notebook, submitting project and finalizing presentation
</commit_message>
<xml_diff>
--- a/Presentation.pptx
+++ b/Presentation.pptx
@@ -5,35 +5,37 @@
     <p:sldMasterId id="2147483660" r:id="rId1"/>
   </p:sldMasterIdLst>
   <p:notesMasterIdLst>
-    <p:notesMasterId r:id="rId28"/>
+    <p:notesMasterId r:id="rId30"/>
   </p:notesMasterIdLst>
   <p:sldIdLst>
     <p:sldId id="256" r:id="rId2"/>
     <p:sldId id="275" r:id="rId3"/>
     <p:sldId id="303" r:id="rId4"/>
-    <p:sldId id="269" r:id="rId5"/>
-    <p:sldId id="270" r:id="rId6"/>
-    <p:sldId id="279" r:id="rId7"/>
-    <p:sldId id="280" r:id="rId8"/>
-    <p:sldId id="300" r:id="rId9"/>
-    <p:sldId id="284" r:id="rId10"/>
-    <p:sldId id="282" r:id="rId11"/>
-    <p:sldId id="291" r:id="rId12"/>
-    <p:sldId id="295" r:id="rId13"/>
-    <p:sldId id="296" r:id="rId14"/>
-    <p:sldId id="288" r:id="rId15"/>
-    <p:sldId id="305" r:id="rId16"/>
-    <p:sldId id="294" r:id="rId17"/>
-    <p:sldId id="304" r:id="rId18"/>
-    <p:sldId id="283" r:id="rId19"/>
-    <p:sldId id="308" r:id="rId20"/>
-    <p:sldId id="289" r:id="rId21"/>
-    <p:sldId id="285" r:id="rId22"/>
-    <p:sldId id="306" r:id="rId23"/>
-    <p:sldId id="292" r:id="rId24"/>
-    <p:sldId id="298" r:id="rId25"/>
-    <p:sldId id="299" r:id="rId26"/>
-    <p:sldId id="262" r:id="rId27"/>
+    <p:sldId id="310" r:id="rId5"/>
+    <p:sldId id="269" r:id="rId6"/>
+    <p:sldId id="270" r:id="rId7"/>
+    <p:sldId id="279" r:id="rId8"/>
+    <p:sldId id="280" r:id="rId9"/>
+    <p:sldId id="300" r:id="rId10"/>
+    <p:sldId id="284" r:id="rId11"/>
+    <p:sldId id="282" r:id="rId12"/>
+    <p:sldId id="291" r:id="rId13"/>
+    <p:sldId id="295" r:id="rId14"/>
+    <p:sldId id="296" r:id="rId15"/>
+    <p:sldId id="288" r:id="rId16"/>
+    <p:sldId id="305" r:id="rId17"/>
+    <p:sldId id="294" r:id="rId18"/>
+    <p:sldId id="304" r:id="rId19"/>
+    <p:sldId id="283" r:id="rId20"/>
+    <p:sldId id="308" r:id="rId21"/>
+    <p:sldId id="289" r:id="rId22"/>
+    <p:sldId id="285" r:id="rId23"/>
+    <p:sldId id="306" r:id="rId24"/>
+    <p:sldId id="292" r:id="rId25"/>
+    <p:sldId id="298" r:id="rId26"/>
+    <p:sldId id="299" r:id="rId27"/>
+    <p:sldId id="262" r:id="rId28"/>
+    <p:sldId id="309" r:id="rId29"/>
   </p:sldIdLst>
   <p:sldSz cx="12192000" cy="6858000"/>
   <p:notesSz cx="6858000" cy="9144000"/>
@@ -2861,7 +2863,7 @@
           <a:p>
             <a:fld id="{7EE27787-1A83-4356-B0F7-0A72CFDE88B6}" type="datetimeFigureOut">
               <a:rPr lang="en-US" smtClean="0"/>
-              <a:t>6/25/2021</a:t>
+              <a:t>6/28/2021</a:t>
             </a:fld>
             <a:endParaRPr lang="en-US"/>
           </a:p>
@@ -3193,7 +3195,7 @@
           <a:p>
             <a:fld id="{B78D0B63-67A9-4053-92A9-D158E931BAB6}" type="slidenum">
               <a:rPr lang="en-US" smtClean="0"/>
-              <a:t>13</a:t>
+              <a:t>14</a:t>
             </a:fld>
             <a:endParaRPr lang="en-US"/>
           </a:p>
@@ -3277,7 +3279,7 @@
           <a:p>
             <a:fld id="{B78D0B63-67A9-4053-92A9-D158E931BAB6}" type="slidenum">
               <a:rPr lang="en-US" smtClean="0"/>
-              <a:t>18</a:t>
+              <a:t>19</a:t>
             </a:fld>
             <a:endParaRPr lang="en-US"/>
           </a:p>
@@ -3361,7 +3363,7 @@
           <a:p>
             <a:fld id="{B78D0B63-67A9-4053-92A9-D158E931BAB6}" type="slidenum">
               <a:rPr lang="en-US" smtClean="0"/>
-              <a:t>19</a:t>
+              <a:t>20</a:t>
             </a:fld>
             <a:endParaRPr lang="en-US"/>
           </a:p>
@@ -3445,7 +3447,7 @@
           <a:p>
             <a:fld id="{B78D0B63-67A9-4053-92A9-D158E931BAB6}" type="slidenum">
               <a:rPr lang="en-US" smtClean="0"/>
-              <a:t>21</a:t>
+              <a:t>22</a:t>
             </a:fld>
             <a:endParaRPr lang="en-US"/>
           </a:p>
@@ -3529,7 +3531,7 @@
           <a:p>
             <a:fld id="{B78D0B63-67A9-4053-92A9-D158E931BAB6}" type="slidenum">
               <a:rPr lang="en-US" smtClean="0"/>
-              <a:t>22</a:t>
+              <a:t>23</a:t>
             </a:fld>
             <a:endParaRPr lang="en-US"/>
           </a:p>
@@ -3612,13 +3614,20 @@
           <a:p>
             <a:r>
               <a:rPr lang="en-US" dirty="0"/>
-              <a:t>Felt like I couldn’t find </a:t>
-            </a:r>
-            <a:r>
-              <a:rPr lang="en-US"/>
-              <a:t>a through line</a:t>
-            </a:r>
-            <a:endParaRPr lang="en-US" dirty="0"/>
+              <a:t>More creative graphs</a:t>
+            </a:r>
+          </a:p>
+          <a:p>
+            <a:r>
+              <a:rPr lang="en-US" dirty="0"/>
+              <a:t>Better formatting in the notebook</a:t>
+            </a:r>
+          </a:p>
+          <a:p>
+            <a:r>
+              <a:rPr lang="en-US" dirty="0"/>
+              <a:t>Felt like I couldn’t find a through line</a:t>
+            </a:r>
           </a:p>
           <a:p>
             <a:r>
@@ -3654,7 +3663,7 @@
           <a:p>
             <a:fld id="{B78D0B63-67A9-4053-92A9-D158E931BAB6}" type="slidenum">
               <a:rPr lang="en-US" smtClean="0"/>
-              <a:t>24</a:t>
+              <a:t>25</a:t>
             </a:fld>
             <a:endParaRPr lang="en-US"/>
           </a:p>
@@ -3899,7 +3908,7 @@
           <a:p>
             <a:fld id="{39BB3832-C1DF-4199-80C5-191220E93956}" type="datetimeFigureOut">
               <a:rPr lang="en-US" smtClean="0"/>
-              <a:t>6/25/2021</a:t>
+              <a:t>6/28/2021</a:t>
             </a:fld>
             <a:endParaRPr lang="en-US"/>
           </a:p>
@@ -4107,7 +4116,7 @@
           <a:p>
             <a:fld id="{39BB3832-C1DF-4199-80C5-191220E93956}" type="datetimeFigureOut">
               <a:rPr lang="en-US" smtClean="0"/>
-              <a:t>6/25/2021</a:t>
+              <a:t>6/28/2021</a:t>
             </a:fld>
             <a:endParaRPr lang="en-US"/>
           </a:p>
@@ -4363,7 +4372,7 @@
           <a:p>
             <a:fld id="{39BB3832-C1DF-4199-80C5-191220E93956}" type="datetimeFigureOut">
               <a:rPr lang="en-US" smtClean="0"/>
-              <a:t>6/25/2021</a:t>
+              <a:t>6/28/2021</a:t>
             </a:fld>
             <a:endParaRPr lang="en-US"/>
           </a:p>
@@ -4537,7 +4546,7 @@
           <a:p>
             <a:fld id="{39BB3832-C1DF-4199-80C5-191220E93956}" type="datetimeFigureOut">
               <a:rPr lang="en-US" smtClean="0"/>
-              <a:t>6/25/2021</a:t>
+              <a:t>6/28/2021</a:t>
             </a:fld>
             <a:endParaRPr lang="en-US"/>
           </a:p>
@@ -4880,7 +4889,7 @@
           <a:p>
             <a:fld id="{39BB3832-C1DF-4199-80C5-191220E93956}" type="datetimeFigureOut">
               <a:rPr lang="en-US" smtClean="0"/>
-              <a:t>6/25/2021</a:t>
+              <a:t>6/28/2021</a:t>
             </a:fld>
             <a:endParaRPr lang="en-US"/>
           </a:p>
@@ -5155,7 +5164,7 @@
           <a:p>
             <a:fld id="{39BB3832-C1DF-4199-80C5-191220E93956}" type="datetimeFigureOut">
               <a:rPr lang="en-US" smtClean="0"/>
-              <a:t>6/25/2021</a:t>
+              <a:t>6/28/2021</a:t>
             </a:fld>
             <a:endParaRPr lang="en-US"/>
           </a:p>
@@ -5534,7 +5543,7 @@
           <a:p>
             <a:fld id="{39BB3832-C1DF-4199-80C5-191220E93956}" type="datetimeFigureOut">
               <a:rPr lang="en-US" smtClean="0"/>
-              <a:t>6/25/2021</a:t>
+              <a:t>6/28/2021</a:t>
             </a:fld>
             <a:endParaRPr lang="en-US"/>
           </a:p>
@@ -5652,7 +5661,7 @@
           <a:p>
             <a:fld id="{39BB3832-C1DF-4199-80C5-191220E93956}" type="datetimeFigureOut">
               <a:rPr lang="en-US" smtClean="0"/>
-              <a:t>6/25/2021</a:t>
+              <a:t>6/28/2021</a:t>
             </a:fld>
             <a:endParaRPr lang="en-US"/>
           </a:p>
@@ -5823,7 +5832,7 @@
           <a:p>
             <a:fld id="{39BB3832-C1DF-4199-80C5-191220E93956}" type="datetimeFigureOut">
               <a:rPr lang="en-US" smtClean="0"/>
-              <a:t>6/25/2021</a:t>
+              <a:t>6/28/2021</a:t>
             </a:fld>
             <a:endParaRPr lang="en-US"/>
           </a:p>
@@ -6177,7 +6186,7 @@
           <a:p>
             <a:fld id="{39BB3832-C1DF-4199-80C5-191220E93956}" type="datetimeFigureOut">
               <a:rPr lang="en-US" smtClean="0"/>
-              <a:t>6/25/2021</a:t>
+              <a:t>6/28/2021</a:t>
             </a:fld>
             <a:endParaRPr lang="en-US"/>
           </a:p>
@@ -6559,7 +6568,7 @@
           <a:p>
             <a:fld id="{39BB3832-C1DF-4199-80C5-191220E93956}" type="datetimeFigureOut">
               <a:rPr lang="en-US" smtClean="0"/>
-              <a:t>6/25/2021</a:t>
+              <a:t>6/28/2021</a:t>
             </a:fld>
             <a:endParaRPr lang="en-US"/>
           </a:p>
@@ -6846,7 +6855,7 @@
           <a:p>
             <a:fld id="{39BB3832-C1DF-4199-80C5-191220E93956}" type="datetimeFigureOut">
               <a:rPr lang="en-US" smtClean="0"/>
-              <a:t>6/25/2021</a:t>
+              <a:t>6/28/2021</a:t>
             </a:fld>
             <a:endParaRPr lang="en-US"/>
           </a:p>
@@ -7779,6 +7788,362 @@
             <a:p>
               <a:r>
                 <a:rPr lang="en-US" dirty="0"/>
+                <a:t>Consistent Yearly Growth</a:t>
+              </a:r>
+            </a:p>
+          </p:txBody>
+        </p:sp>
+        <p:cxnSp>
+          <p:nvCxnSpPr>
+            <p:cNvPr id="3" name="Straight Connector 2">
+              <a:extLst>
+                <a:ext uri="{FF2B5EF4-FFF2-40B4-BE49-F238E27FC236}">
+                  <a16:creationId xmlns:a16="http://schemas.microsoft.com/office/drawing/2014/main" id="{96E0E1CA-7566-4D27-8472-A7A41DCA9897}"/>
+                </a:ext>
+              </a:extLst>
+            </p:cNvPr>
+            <p:cNvCxnSpPr>
+              <a:cxnSpLocks/>
+            </p:cNvCxnSpPr>
+            <p:nvPr/>
+          </p:nvCxnSpPr>
+          <p:spPr>
+            <a:xfrm>
+              <a:off x="1111306" y="995320"/>
+              <a:ext cx="9969388" cy="0"/>
+            </a:xfrm>
+            <a:prstGeom prst="line">
+              <a:avLst/>
+            </a:prstGeom>
+            <a:ln w="3175"/>
+          </p:spPr>
+          <p:style>
+            <a:lnRef idx="1">
+              <a:schemeClr val="dk1"/>
+            </a:lnRef>
+            <a:fillRef idx="0">
+              <a:schemeClr val="dk1"/>
+            </a:fillRef>
+            <a:effectRef idx="0">
+              <a:schemeClr val="dk1"/>
+            </a:effectRef>
+            <a:fontRef idx="minor">
+              <a:schemeClr val="tx1"/>
+            </a:fontRef>
+          </p:style>
+        </p:cxnSp>
+      </p:grpSp>
+      <p:sp>
+        <p:nvSpPr>
+          <p:cNvPr id="10" name="TextBox 9">
+            <a:extLst>
+              <a:ext uri="{FF2B5EF4-FFF2-40B4-BE49-F238E27FC236}">
+                <a16:creationId xmlns:a16="http://schemas.microsoft.com/office/drawing/2014/main" id="{77C1FA27-5BC0-4F69-9527-4508F8DB0FA9}"/>
+              </a:ext>
+            </a:extLst>
+          </p:cNvPr>
+          <p:cNvSpPr txBox="1"/>
+          <p:nvPr/>
+        </p:nvSpPr>
+        <p:spPr>
+          <a:xfrm>
+            <a:off x="876993" y="1865414"/>
+            <a:ext cx="3120390" cy="3139321"/>
+          </a:xfrm>
+          <a:prstGeom prst="rect">
+            <a:avLst/>
+          </a:prstGeom>
+          <a:noFill/>
+        </p:spPr>
+        <p:txBody>
+          <a:bodyPr wrap="square" rtlCol="0">
+            <a:spAutoFit/>
+          </a:bodyPr>
+          <a:lstStyle/>
+          <a:p>
+            <a:r>
+              <a:rPr lang="en-US" b="0" i="0" dirty="0">
+                <a:solidFill>
+                  <a:srgbClr val="595959"/>
+                </a:solidFill>
+                <a:effectLst/>
+                <a:latin typeface="Helvetica Neue"/>
+              </a:rPr>
+              <a:t>A</a:t>
+            </a:r>
+          </a:p>
+          <a:p>
+            <a:endParaRPr lang="en-US" dirty="0">
+              <a:solidFill>
+                <a:srgbClr val="595959"/>
+              </a:solidFill>
+              <a:latin typeface="Helvetica Neue"/>
+            </a:endParaRPr>
+          </a:p>
+          <a:p>
+            <a:endParaRPr lang="en-US" b="0" i="0" dirty="0">
+              <a:solidFill>
+                <a:srgbClr val="595959"/>
+              </a:solidFill>
+              <a:effectLst/>
+              <a:latin typeface="Helvetica Neue"/>
+            </a:endParaRPr>
+          </a:p>
+          <a:p>
+            <a:endParaRPr lang="en-US" dirty="0">
+              <a:solidFill>
+                <a:srgbClr val="595959"/>
+              </a:solidFill>
+              <a:latin typeface="Helvetica Neue"/>
+            </a:endParaRPr>
+          </a:p>
+          <a:p>
+            <a:endParaRPr lang="en-US" b="0" i="0" dirty="0">
+              <a:solidFill>
+                <a:srgbClr val="595959"/>
+              </a:solidFill>
+              <a:effectLst/>
+              <a:latin typeface="Helvetica Neue"/>
+            </a:endParaRPr>
+          </a:p>
+          <a:p>
+            <a:r>
+              <a:rPr lang="en-US" dirty="0">
+                <a:solidFill>
+                  <a:srgbClr val="595959"/>
+                </a:solidFill>
+                <a:latin typeface="Helvetica Neue"/>
+                <a:hlinkClick r:id="rId2"/>
+              </a:rPr>
+              <a:t>2013 disjuncture: ACX </a:t>
+            </a:r>
+            <a:endParaRPr lang="en-US" b="0" i="0" dirty="0">
+              <a:solidFill>
+                <a:srgbClr val="595959"/>
+              </a:solidFill>
+              <a:effectLst/>
+              <a:latin typeface="Helvetica Neue"/>
+            </a:endParaRPr>
+          </a:p>
+          <a:p>
+            <a:endParaRPr lang="en-US" dirty="0">
+              <a:solidFill>
+                <a:srgbClr val="595959"/>
+              </a:solidFill>
+              <a:latin typeface="Helvetica Neue"/>
+            </a:endParaRPr>
+          </a:p>
+          <a:p>
+            <a:endParaRPr lang="en-US" dirty="0">
+              <a:solidFill>
+                <a:srgbClr val="595959"/>
+              </a:solidFill>
+              <a:latin typeface="Helvetica Neue"/>
+            </a:endParaRPr>
+          </a:p>
+          <a:p>
+            <a:endParaRPr lang="en-US" dirty="0">
+              <a:solidFill>
+                <a:srgbClr val="595959"/>
+              </a:solidFill>
+              <a:latin typeface="Helvetica Neue"/>
+            </a:endParaRPr>
+          </a:p>
+          <a:p>
+            <a:endParaRPr lang="en-US" dirty="0">
+              <a:solidFill>
+                <a:srgbClr val="595959"/>
+              </a:solidFill>
+              <a:latin typeface="Helvetica Neue"/>
+            </a:endParaRPr>
+          </a:p>
+          <a:p>
+            <a:endParaRPr lang="en-US" dirty="0">
+              <a:solidFill>
+                <a:srgbClr val="595959"/>
+              </a:solidFill>
+              <a:latin typeface="Helvetica Neue"/>
+            </a:endParaRPr>
+          </a:p>
+        </p:txBody>
+      </p:sp>
+      <p:pic>
+        <p:nvPicPr>
+          <p:cNvPr id="6" name="Picture 5" descr="Chart, bar chart, histogram&#10;&#10;Description automatically generated">
+            <a:extLst>
+              <a:ext uri="{FF2B5EF4-FFF2-40B4-BE49-F238E27FC236}">
+                <a16:creationId xmlns:a16="http://schemas.microsoft.com/office/drawing/2014/main" id="{60503A49-C64B-4450-921B-50F2F3B103FD}"/>
+              </a:ext>
+            </a:extLst>
+          </p:cNvPr>
+          <p:cNvPicPr>
+            <a:picLocks noChangeAspect="1"/>
+          </p:cNvPicPr>
+          <p:nvPr/>
+        </p:nvPicPr>
+        <p:blipFill>
+          <a:blip r:embed="rId3">
+            <a:extLst>
+              <a:ext uri="{28A0092B-C50C-407E-A947-70E740481C1C}">
+                <a14:useLocalDpi xmlns:a14="http://schemas.microsoft.com/office/drawing/2010/main" val="0"/>
+              </a:ext>
+            </a:extLst>
+          </a:blip>
+          <a:stretch>
+            <a:fillRect/>
+          </a:stretch>
+        </p:blipFill>
+        <p:spPr>
+          <a:xfrm>
+            <a:off x="4786100" y="1163422"/>
+            <a:ext cx="7054272" cy="4812818"/>
+          </a:xfrm>
+          <a:prstGeom prst="rect">
+            <a:avLst/>
+          </a:prstGeom>
+        </p:spPr>
+      </p:pic>
+      <p:sp>
+        <p:nvSpPr>
+          <p:cNvPr id="7" name="TextBox 6">
+            <a:extLst>
+              <a:ext uri="{FF2B5EF4-FFF2-40B4-BE49-F238E27FC236}">
+                <a16:creationId xmlns:a16="http://schemas.microsoft.com/office/drawing/2014/main" id="{C941840D-87EC-4DC0-A0F1-3CD06B801533}"/>
+              </a:ext>
+            </a:extLst>
+          </p:cNvPr>
+          <p:cNvSpPr txBox="1"/>
+          <p:nvPr/>
+        </p:nvSpPr>
+        <p:spPr>
+          <a:xfrm>
+            <a:off x="88275" y="5699241"/>
+            <a:ext cx="4697825" cy="276999"/>
+          </a:xfrm>
+          <a:prstGeom prst="rect">
+            <a:avLst/>
+          </a:prstGeom>
+          <a:noFill/>
+        </p:spPr>
+        <p:txBody>
+          <a:bodyPr wrap="none" rtlCol="0">
+            <a:spAutoFit/>
+          </a:bodyPr>
+          <a:lstStyle/>
+          <a:p>
+            <a:r>
+              <a:rPr lang="en-US" sz="1200" dirty="0">
+                <a:solidFill>
+                  <a:srgbClr val="595959"/>
+                </a:solidFill>
+                <a:latin typeface="Helvetica Neue"/>
+              </a:rPr>
+              <a:t>((Current Year – Previous Year ) / Previous Year) * 100 = % Growth</a:t>
+            </a:r>
+            <a:endParaRPr lang="en-US" sz="1200" dirty="0"/>
+          </a:p>
+        </p:txBody>
+      </p:sp>
+    </p:spTree>
+    <p:extLst>
+      <p:ext uri="{BB962C8B-B14F-4D97-AF65-F5344CB8AC3E}">
+        <p14:creationId xmlns:p14="http://schemas.microsoft.com/office/powerpoint/2010/main" val="3479204610"/>
+      </p:ext>
+    </p:extLst>
+  </p:cSld>
+  <p:clrMapOvr>
+    <a:masterClrMapping/>
+  </p:clrMapOvr>
+</p:sld>
+</file>
+
+<file path=ppt/slides/slide11.xml><?xml version="1.0" encoding="utf-8"?>
+<p:sld xmlns:a="http://schemas.openxmlformats.org/drawingml/2006/main" xmlns:r="http://schemas.openxmlformats.org/officeDocument/2006/relationships" xmlns:p="http://schemas.openxmlformats.org/presentationml/2006/main">
+  <p:cSld>
+    <p:spTree>
+      <p:nvGrpSpPr>
+        <p:cNvPr id="1" name=""/>
+        <p:cNvGrpSpPr/>
+        <p:nvPr/>
+      </p:nvGrpSpPr>
+      <p:grpSpPr>
+        <a:xfrm>
+          <a:off x="0" y="0"/>
+          <a:ext cx="0" cy="0"/>
+          <a:chOff x="0" y="0"/>
+          <a:chExt cx="0" cy="0"/>
+        </a:xfrm>
+      </p:grpSpPr>
+      <p:grpSp>
+        <p:nvGrpSpPr>
+          <p:cNvPr id="4" name="Group 3">
+            <a:extLst>
+              <a:ext uri="{FF2B5EF4-FFF2-40B4-BE49-F238E27FC236}">
+                <a16:creationId xmlns:a16="http://schemas.microsoft.com/office/drawing/2014/main" id="{794FFCAA-D045-46C2-BF26-C6AFC06B90C2}"/>
+              </a:ext>
+            </a:extLst>
+          </p:cNvPr>
+          <p:cNvGrpSpPr/>
+          <p:nvPr/>
+        </p:nvGrpSpPr>
+        <p:grpSpPr>
+          <a:xfrm>
+            <a:off x="1066798" y="209982"/>
+            <a:ext cx="10058400" cy="870094"/>
+            <a:chOff x="1066798" y="209982"/>
+            <a:chExt cx="10058400" cy="870094"/>
+          </a:xfrm>
+        </p:grpSpPr>
+        <p:sp>
+          <p:nvSpPr>
+            <p:cNvPr id="2" name="Title 1">
+              <a:extLst>
+                <a:ext uri="{FF2B5EF4-FFF2-40B4-BE49-F238E27FC236}">
+                  <a16:creationId xmlns:a16="http://schemas.microsoft.com/office/drawing/2014/main" id="{B898D37B-FC34-487E-97CA-D605BE85E50F}"/>
+                </a:ext>
+              </a:extLst>
+            </p:cNvPr>
+            <p:cNvSpPr txBox="1">
+              <a:spLocks/>
+            </p:cNvSpPr>
+            <p:nvPr/>
+          </p:nvSpPr>
+          <p:spPr>
+            <a:xfrm>
+              <a:off x="1066798" y="209982"/>
+              <a:ext cx="10058400" cy="870094"/>
+            </a:xfrm>
+            <a:prstGeom prst="rect">
+              <a:avLst/>
+            </a:prstGeom>
+          </p:spPr>
+          <p:txBody>
+            <a:bodyPr/>
+            <a:lstStyle>
+              <a:lvl1pPr algn="l" defTabSz="914400" rtl="0" eaLnBrk="1" latinLnBrk="0" hangingPunct="1">
+                <a:lnSpc>
+                  <a:spcPct val="85000"/>
+                </a:lnSpc>
+                <a:spcBef>
+                  <a:spcPct val="0"/>
+                </a:spcBef>
+                <a:buNone/>
+                <a:defRPr sz="4800" kern="1200" spc="-50" baseline="0">
+                  <a:solidFill>
+                    <a:schemeClr val="tx1">
+                      <a:lumMod val="75000"/>
+                      <a:lumOff val="25000"/>
+                    </a:schemeClr>
+                  </a:solidFill>
+                  <a:latin typeface="+mj-lt"/>
+                  <a:ea typeface="+mj-ea"/>
+                  <a:cs typeface="+mj-cs"/>
+                </a:defRPr>
+              </a:lvl1pPr>
+            </a:lstStyle>
+            <a:p>
+              <a:r>
+                <a:rPr lang="en-US" dirty="0"/>
                 <a:t>Title and Subtitle</a:t>
               </a:r>
             </a:p>
@@ -7926,7 +8291,7 @@
 </p:sld>
 </file>
 
-<file path=ppt/slides/slide11.xml><?xml version="1.0" encoding="utf-8"?>
+<file path=ppt/slides/slide12.xml><?xml version="1.0" encoding="utf-8"?>
 <p:sld xmlns:a="http://schemas.openxmlformats.org/drawingml/2006/main" xmlns:r="http://schemas.openxmlformats.org/officeDocument/2006/relationships" xmlns:p="http://schemas.openxmlformats.org/presentationml/2006/main">
   <p:cSld>
     <p:spTree>
@@ -8157,7 +8522,7 @@
 </p:sld>
 </file>
 
-<file path=ppt/slides/slide12.xml><?xml version="1.0" encoding="utf-8"?>
+<file path=ppt/slides/slide13.xml><?xml version="1.0" encoding="utf-8"?>
 <p:sld xmlns:a="http://schemas.openxmlformats.org/drawingml/2006/main" xmlns:r="http://schemas.openxmlformats.org/officeDocument/2006/relationships" xmlns:p="http://schemas.openxmlformats.org/presentationml/2006/main">
   <p:cSld>
     <p:spTree>
@@ -8438,7 +8803,7 @@
 </p:sld>
 </file>
 
-<file path=ppt/slides/slide13.xml><?xml version="1.0" encoding="utf-8"?>
+<file path=ppt/slides/slide14.xml><?xml version="1.0" encoding="utf-8"?>
 <p:sld xmlns:a="http://schemas.openxmlformats.org/drawingml/2006/main" xmlns:r="http://schemas.openxmlformats.org/officeDocument/2006/relationships" xmlns:p="http://schemas.openxmlformats.org/presentationml/2006/main">
   <p:cSld>
     <p:spTree>
@@ -8650,13 +9015,13 @@
           <p:nvPr>
             <p:extLst>
               <p:ext uri="{D42A27DB-BD31-4B8C-83A1-F6EECF244321}">
-                <p14:modId xmlns:p14="http://schemas.microsoft.com/office/powerpoint/2010/main" val="4054693732"/>
+                <p14:modId xmlns:p14="http://schemas.microsoft.com/office/powerpoint/2010/main" val="548127270"/>
               </p:ext>
             </p:extLst>
           </p:nvPr>
         </p:nvGraphicFramePr>
         <p:xfrm>
-          <a:off x="2382192" y="2572489"/>
+          <a:off x="2018399" y="2631483"/>
           <a:ext cx="4359290" cy="3530221"/>
         </p:xfrm>
         <a:graphic>
@@ -9063,7 +9428,7 @@
 </p:sld>
 </file>
 
-<file path=ppt/slides/slide14.xml><?xml version="1.0" encoding="utf-8"?>
+<file path=ppt/slides/slide15.xml><?xml version="1.0" encoding="utf-8"?>
 <p:sld xmlns:a="http://schemas.openxmlformats.org/drawingml/2006/main" xmlns:r="http://schemas.openxmlformats.org/officeDocument/2006/relationships" xmlns:p="http://schemas.openxmlformats.org/presentationml/2006/main">
   <p:cSld>
     <p:spTree>
@@ -9325,7 +9690,7 @@
 </p:sld>
 </file>
 
-<file path=ppt/slides/slide15.xml><?xml version="1.0" encoding="utf-8"?>
+<file path=ppt/slides/slide16.xml><?xml version="1.0" encoding="utf-8"?>
 <p:sld xmlns:a="http://schemas.openxmlformats.org/drawingml/2006/main" xmlns:r="http://schemas.openxmlformats.org/officeDocument/2006/relationships" xmlns:p="http://schemas.openxmlformats.org/presentationml/2006/main">
   <p:cSld>
     <p:spTree>
@@ -9630,7 +9995,7 @@
 </p:sld>
 </file>
 
-<file path=ppt/slides/slide16.xml><?xml version="1.0" encoding="utf-8"?>
+<file path=ppt/slides/slide17.xml><?xml version="1.0" encoding="utf-8"?>
 <p:sld xmlns:a="http://schemas.openxmlformats.org/drawingml/2006/main" xmlns:r="http://schemas.openxmlformats.org/officeDocument/2006/relationships" xmlns:p="http://schemas.openxmlformats.org/presentationml/2006/main">
   <p:cSld>
     <p:spTree>
@@ -9775,7 +10140,7 @@
 </p:sld>
 </file>
 
-<file path=ppt/slides/slide17.xml><?xml version="1.0" encoding="utf-8"?>
+<file path=ppt/slides/slide18.xml><?xml version="1.0" encoding="utf-8"?>
 <p:sld xmlns:a="http://schemas.openxmlformats.org/drawingml/2006/main" xmlns:r="http://schemas.openxmlformats.org/officeDocument/2006/relationships" xmlns:p="http://schemas.openxmlformats.org/presentationml/2006/main">
   <p:cSld>
     <p:spTree>
@@ -9956,7 +10321,7 @@
 </p:sld>
 </file>
 
-<file path=ppt/slides/slide18.xml><?xml version="1.0" encoding="utf-8"?>
+<file path=ppt/slides/slide19.xml><?xml version="1.0" encoding="utf-8"?>
 <p:sld xmlns:a="http://schemas.openxmlformats.org/drawingml/2006/main" xmlns:r="http://schemas.openxmlformats.org/officeDocument/2006/relationships" xmlns:p="http://schemas.openxmlformats.org/presentationml/2006/main">
   <p:cSld>
     <p:spTree>
@@ -10499,7 +10864,226 @@
 </p:sld>
 </file>
 
-<file path=ppt/slides/slide19.xml><?xml version="1.0" encoding="utf-8"?>
+<file path=ppt/slides/slide2.xml><?xml version="1.0" encoding="utf-8"?>
+<p:sld xmlns:a="http://schemas.openxmlformats.org/drawingml/2006/main" xmlns:r="http://schemas.openxmlformats.org/officeDocument/2006/relationships" xmlns:p="http://schemas.openxmlformats.org/presentationml/2006/main">
+  <p:cSld>
+    <p:spTree>
+      <p:nvGrpSpPr>
+        <p:cNvPr id="1" name=""/>
+        <p:cNvGrpSpPr/>
+        <p:nvPr/>
+      </p:nvGrpSpPr>
+      <p:grpSpPr>
+        <a:xfrm>
+          <a:off x="0" y="0"/>
+          <a:ext cx="0" cy="0"/>
+          <a:chOff x="0" y="0"/>
+          <a:chExt cx="0" cy="0"/>
+        </a:xfrm>
+      </p:grpSpPr>
+      <p:grpSp>
+        <p:nvGrpSpPr>
+          <p:cNvPr id="4" name="Group 3">
+            <a:extLst>
+              <a:ext uri="{FF2B5EF4-FFF2-40B4-BE49-F238E27FC236}">
+                <a16:creationId xmlns:a16="http://schemas.microsoft.com/office/drawing/2014/main" id="{794FFCAA-D045-46C2-BF26-C6AFC06B90C2}"/>
+              </a:ext>
+            </a:extLst>
+          </p:cNvPr>
+          <p:cNvGrpSpPr/>
+          <p:nvPr/>
+        </p:nvGrpSpPr>
+        <p:grpSpPr>
+          <a:xfrm>
+            <a:off x="1066798" y="209982"/>
+            <a:ext cx="10058400" cy="870094"/>
+            <a:chOff x="1066798" y="209982"/>
+            <a:chExt cx="10058400" cy="870094"/>
+          </a:xfrm>
+        </p:grpSpPr>
+        <p:sp>
+          <p:nvSpPr>
+            <p:cNvPr id="2" name="Title 1">
+              <a:extLst>
+                <a:ext uri="{FF2B5EF4-FFF2-40B4-BE49-F238E27FC236}">
+                  <a16:creationId xmlns:a16="http://schemas.microsoft.com/office/drawing/2014/main" id="{B898D37B-FC34-487E-97CA-D605BE85E50F}"/>
+                </a:ext>
+              </a:extLst>
+            </p:cNvPr>
+            <p:cNvSpPr txBox="1">
+              <a:spLocks/>
+            </p:cNvSpPr>
+            <p:nvPr/>
+          </p:nvSpPr>
+          <p:spPr>
+            <a:xfrm>
+              <a:off x="1066798" y="209982"/>
+              <a:ext cx="10058400" cy="870094"/>
+            </a:xfrm>
+            <a:prstGeom prst="rect">
+              <a:avLst/>
+            </a:prstGeom>
+          </p:spPr>
+          <p:txBody>
+            <a:bodyPr/>
+            <a:lstStyle>
+              <a:lvl1pPr algn="l" defTabSz="914400" rtl="0" eaLnBrk="1" latinLnBrk="0" hangingPunct="1">
+                <a:lnSpc>
+                  <a:spcPct val="85000"/>
+                </a:lnSpc>
+                <a:spcBef>
+                  <a:spcPct val="0"/>
+                </a:spcBef>
+                <a:buNone/>
+                <a:defRPr sz="4800" kern="1200" spc="-50" baseline="0">
+                  <a:solidFill>
+                    <a:schemeClr val="tx1">
+                      <a:lumMod val="75000"/>
+                      <a:lumOff val="25000"/>
+                    </a:schemeClr>
+                  </a:solidFill>
+                  <a:latin typeface="+mj-lt"/>
+                  <a:ea typeface="+mj-ea"/>
+                  <a:cs typeface="+mj-cs"/>
+                </a:defRPr>
+              </a:lvl1pPr>
+            </a:lstStyle>
+            <a:p>
+              <a:r>
+                <a:rPr lang="en-US" dirty="0"/>
+                <a:t>Background</a:t>
+              </a:r>
+            </a:p>
+          </p:txBody>
+        </p:sp>
+        <p:cxnSp>
+          <p:nvCxnSpPr>
+            <p:cNvPr id="3" name="Straight Connector 2">
+              <a:extLst>
+                <a:ext uri="{FF2B5EF4-FFF2-40B4-BE49-F238E27FC236}">
+                  <a16:creationId xmlns:a16="http://schemas.microsoft.com/office/drawing/2014/main" id="{96E0E1CA-7566-4D27-8472-A7A41DCA9897}"/>
+                </a:ext>
+              </a:extLst>
+            </p:cNvPr>
+            <p:cNvCxnSpPr>
+              <a:cxnSpLocks/>
+            </p:cNvCxnSpPr>
+            <p:nvPr/>
+          </p:nvCxnSpPr>
+          <p:spPr>
+            <a:xfrm>
+              <a:off x="1111306" y="995320"/>
+              <a:ext cx="9969388" cy="0"/>
+            </a:xfrm>
+            <a:prstGeom prst="line">
+              <a:avLst/>
+            </a:prstGeom>
+            <a:ln w="3175"/>
+          </p:spPr>
+          <p:style>
+            <a:lnRef idx="1">
+              <a:schemeClr val="dk1"/>
+            </a:lnRef>
+            <a:fillRef idx="0">
+              <a:schemeClr val="dk1"/>
+            </a:fillRef>
+            <a:effectRef idx="0">
+              <a:schemeClr val="dk1"/>
+            </a:effectRef>
+            <a:fontRef idx="minor">
+              <a:schemeClr val="tx1"/>
+            </a:fontRef>
+          </p:style>
+        </p:cxnSp>
+      </p:grpSp>
+      <p:sp>
+        <p:nvSpPr>
+          <p:cNvPr id="7" name="TextBox 6">
+            <a:extLst>
+              <a:ext uri="{FF2B5EF4-FFF2-40B4-BE49-F238E27FC236}">
+                <a16:creationId xmlns:a16="http://schemas.microsoft.com/office/drawing/2014/main" id="{5BE7034B-18AD-4E08-A767-2F249A983784}"/>
+              </a:ext>
+            </a:extLst>
+          </p:cNvPr>
+          <p:cNvSpPr txBox="1"/>
+          <p:nvPr/>
+        </p:nvSpPr>
+        <p:spPr>
+          <a:xfrm>
+            <a:off x="1111306" y="1521303"/>
+            <a:ext cx="9969388" cy="2862322"/>
+          </a:xfrm>
+          <a:prstGeom prst="rect">
+            <a:avLst/>
+          </a:prstGeom>
+          <a:noFill/>
+        </p:spPr>
+        <p:txBody>
+          <a:bodyPr wrap="square" rtlCol="0">
+            <a:spAutoFit/>
+          </a:bodyPr>
+          <a:lstStyle/>
+          <a:p>
+            <a:r>
+              <a:rPr lang="en-US" dirty="0"/>
+              <a:t>Audible is a publisher and distributor of audiobooks and podcasts.</a:t>
+            </a:r>
+          </a:p>
+          <a:p>
+            <a:endParaRPr lang="en-US" dirty="0"/>
+          </a:p>
+          <a:p>
+            <a:r>
+              <a:rPr lang="en-US" dirty="0"/>
+              <a:t>The company was founded in 1995 and acquired by Amazon in 2008.</a:t>
+            </a:r>
+          </a:p>
+          <a:p>
+            <a:endParaRPr lang="en-US" dirty="0"/>
+          </a:p>
+          <a:p>
+            <a:r>
+              <a:rPr lang="en-US" dirty="0"/>
+              <a:t>Audible reports 200,000 audio programs and over a billion hours listened a year.</a:t>
+            </a:r>
+          </a:p>
+          <a:p>
+            <a:endParaRPr lang="en-US" dirty="0"/>
+          </a:p>
+          <a:p>
+            <a:r>
+              <a:rPr lang="en-US" dirty="0"/>
+              <a:t>Currently Audible provides two pricing tiers at $7.95 and $14.95 per month.</a:t>
+            </a:r>
+          </a:p>
+          <a:p>
+            <a:endParaRPr lang="en-US" dirty="0"/>
+          </a:p>
+          <a:p>
+            <a:r>
+              <a:rPr lang="en-US" dirty="0"/>
+              <a:t>Both tiers provide a monthly credit which can be exchanged for a book. </a:t>
+            </a:r>
+          </a:p>
+          <a:p>
+            <a:endParaRPr lang="en-US" dirty="0"/>
+          </a:p>
+        </p:txBody>
+      </p:sp>
+    </p:spTree>
+    <p:extLst>
+      <p:ext uri="{BB962C8B-B14F-4D97-AF65-F5344CB8AC3E}">
+        <p14:creationId xmlns:p14="http://schemas.microsoft.com/office/powerpoint/2010/main" val="3818557035"/>
+      </p:ext>
+    </p:extLst>
+  </p:cSld>
+  <p:clrMapOvr>
+    <a:masterClrMapping/>
+  </p:clrMapOvr>
+</p:sld>
+</file>
+
+<file path=ppt/slides/slide20.xml><?xml version="1.0" encoding="utf-8"?>
 <p:sld xmlns:a="http://schemas.openxmlformats.org/drawingml/2006/main" xmlns:r="http://schemas.openxmlformats.org/officeDocument/2006/relationships" xmlns:p="http://schemas.openxmlformats.org/presentationml/2006/main">
   <p:cSld>
     <p:spTree>
@@ -10969,226 +11553,7 @@
 </p:sld>
 </file>
 
-<file path=ppt/slides/slide2.xml><?xml version="1.0" encoding="utf-8"?>
-<p:sld xmlns:a="http://schemas.openxmlformats.org/drawingml/2006/main" xmlns:r="http://schemas.openxmlformats.org/officeDocument/2006/relationships" xmlns:p="http://schemas.openxmlformats.org/presentationml/2006/main">
-  <p:cSld>
-    <p:spTree>
-      <p:nvGrpSpPr>
-        <p:cNvPr id="1" name=""/>
-        <p:cNvGrpSpPr/>
-        <p:nvPr/>
-      </p:nvGrpSpPr>
-      <p:grpSpPr>
-        <a:xfrm>
-          <a:off x="0" y="0"/>
-          <a:ext cx="0" cy="0"/>
-          <a:chOff x="0" y="0"/>
-          <a:chExt cx="0" cy="0"/>
-        </a:xfrm>
-      </p:grpSpPr>
-      <p:grpSp>
-        <p:nvGrpSpPr>
-          <p:cNvPr id="4" name="Group 3">
-            <a:extLst>
-              <a:ext uri="{FF2B5EF4-FFF2-40B4-BE49-F238E27FC236}">
-                <a16:creationId xmlns:a16="http://schemas.microsoft.com/office/drawing/2014/main" id="{794FFCAA-D045-46C2-BF26-C6AFC06B90C2}"/>
-              </a:ext>
-            </a:extLst>
-          </p:cNvPr>
-          <p:cNvGrpSpPr/>
-          <p:nvPr/>
-        </p:nvGrpSpPr>
-        <p:grpSpPr>
-          <a:xfrm>
-            <a:off x="1066798" y="209982"/>
-            <a:ext cx="10058400" cy="870094"/>
-            <a:chOff x="1066798" y="209982"/>
-            <a:chExt cx="10058400" cy="870094"/>
-          </a:xfrm>
-        </p:grpSpPr>
-        <p:sp>
-          <p:nvSpPr>
-            <p:cNvPr id="2" name="Title 1">
-              <a:extLst>
-                <a:ext uri="{FF2B5EF4-FFF2-40B4-BE49-F238E27FC236}">
-                  <a16:creationId xmlns:a16="http://schemas.microsoft.com/office/drawing/2014/main" id="{B898D37B-FC34-487E-97CA-D605BE85E50F}"/>
-                </a:ext>
-              </a:extLst>
-            </p:cNvPr>
-            <p:cNvSpPr txBox="1">
-              <a:spLocks/>
-            </p:cNvSpPr>
-            <p:nvPr/>
-          </p:nvSpPr>
-          <p:spPr>
-            <a:xfrm>
-              <a:off x="1066798" y="209982"/>
-              <a:ext cx="10058400" cy="870094"/>
-            </a:xfrm>
-            <a:prstGeom prst="rect">
-              <a:avLst/>
-            </a:prstGeom>
-          </p:spPr>
-          <p:txBody>
-            <a:bodyPr/>
-            <a:lstStyle>
-              <a:lvl1pPr algn="l" defTabSz="914400" rtl="0" eaLnBrk="1" latinLnBrk="0" hangingPunct="1">
-                <a:lnSpc>
-                  <a:spcPct val="85000"/>
-                </a:lnSpc>
-                <a:spcBef>
-                  <a:spcPct val="0"/>
-                </a:spcBef>
-                <a:buNone/>
-                <a:defRPr sz="4800" kern="1200" spc="-50" baseline="0">
-                  <a:solidFill>
-                    <a:schemeClr val="tx1">
-                      <a:lumMod val="75000"/>
-                      <a:lumOff val="25000"/>
-                    </a:schemeClr>
-                  </a:solidFill>
-                  <a:latin typeface="+mj-lt"/>
-                  <a:ea typeface="+mj-ea"/>
-                  <a:cs typeface="+mj-cs"/>
-                </a:defRPr>
-              </a:lvl1pPr>
-            </a:lstStyle>
-            <a:p>
-              <a:r>
-                <a:rPr lang="en-US" dirty="0"/>
-                <a:t>Background</a:t>
-              </a:r>
-            </a:p>
-          </p:txBody>
-        </p:sp>
-        <p:cxnSp>
-          <p:nvCxnSpPr>
-            <p:cNvPr id="3" name="Straight Connector 2">
-              <a:extLst>
-                <a:ext uri="{FF2B5EF4-FFF2-40B4-BE49-F238E27FC236}">
-                  <a16:creationId xmlns:a16="http://schemas.microsoft.com/office/drawing/2014/main" id="{96E0E1CA-7566-4D27-8472-A7A41DCA9897}"/>
-                </a:ext>
-              </a:extLst>
-            </p:cNvPr>
-            <p:cNvCxnSpPr>
-              <a:cxnSpLocks/>
-            </p:cNvCxnSpPr>
-            <p:nvPr/>
-          </p:nvCxnSpPr>
-          <p:spPr>
-            <a:xfrm>
-              <a:off x="1111306" y="995320"/>
-              <a:ext cx="9969388" cy="0"/>
-            </a:xfrm>
-            <a:prstGeom prst="line">
-              <a:avLst/>
-            </a:prstGeom>
-            <a:ln w="3175"/>
-          </p:spPr>
-          <p:style>
-            <a:lnRef idx="1">
-              <a:schemeClr val="dk1"/>
-            </a:lnRef>
-            <a:fillRef idx="0">
-              <a:schemeClr val="dk1"/>
-            </a:fillRef>
-            <a:effectRef idx="0">
-              <a:schemeClr val="dk1"/>
-            </a:effectRef>
-            <a:fontRef idx="minor">
-              <a:schemeClr val="tx1"/>
-            </a:fontRef>
-          </p:style>
-        </p:cxnSp>
-      </p:grpSp>
-      <p:sp>
-        <p:nvSpPr>
-          <p:cNvPr id="7" name="TextBox 6">
-            <a:extLst>
-              <a:ext uri="{FF2B5EF4-FFF2-40B4-BE49-F238E27FC236}">
-                <a16:creationId xmlns:a16="http://schemas.microsoft.com/office/drawing/2014/main" id="{5BE7034B-18AD-4E08-A767-2F249A983784}"/>
-              </a:ext>
-            </a:extLst>
-          </p:cNvPr>
-          <p:cNvSpPr txBox="1"/>
-          <p:nvPr/>
-        </p:nvSpPr>
-        <p:spPr>
-          <a:xfrm>
-            <a:off x="1111306" y="1521303"/>
-            <a:ext cx="9969388" cy="2862322"/>
-          </a:xfrm>
-          <a:prstGeom prst="rect">
-            <a:avLst/>
-          </a:prstGeom>
-          <a:noFill/>
-        </p:spPr>
-        <p:txBody>
-          <a:bodyPr wrap="square" rtlCol="0">
-            <a:spAutoFit/>
-          </a:bodyPr>
-          <a:lstStyle/>
-          <a:p>
-            <a:r>
-              <a:rPr lang="en-US" dirty="0"/>
-              <a:t>Audible is a publisher and distributor of audiobooks and podcasts.</a:t>
-            </a:r>
-          </a:p>
-          <a:p>
-            <a:endParaRPr lang="en-US" dirty="0"/>
-          </a:p>
-          <a:p>
-            <a:r>
-              <a:rPr lang="en-US" dirty="0"/>
-              <a:t>The company was founded in 1995 and acquired by Amazon in 2008.</a:t>
-            </a:r>
-          </a:p>
-          <a:p>
-            <a:endParaRPr lang="en-US" dirty="0"/>
-          </a:p>
-          <a:p>
-            <a:r>
-              <a:rPr lang="en-US" dirty="0"/>
-              <a:t>Audible reports 200,000 audio programs and over a billion hours listened a year.</a:t>
-            </a:r>
-          </a:p>
-          <a:p>
-            <a:endParaRPr lang="en-US" dirty="0"/>
-          </a:p>
-          <a:p>
-            <a:r>
-              <a:rPr lang="en-US" dirty="0"/>
-              <a:t>Currently Audible provides two pricing tiers at $7.95 and $14.95 per month.</a:t>
-            </a:r>
-          </a:p>
-          <a:p>
-            <a:endParaRPr lang="en-US" dirty="0"/>
-          </a:p>
-          <a:p>
-            <a:r>
-              <a:rPr lang="en-US" dirty="0"/>
-              <a:t>Both tiers provide a monthly credit which can be exchanged for a book. </a:t>
-            </a:r>
-          </a:p>
-          <a:p>
-            <a:endParaRPr lang="en-US" dirty="0"/>
-          </a:p>
-        </p:txBody>
-      </p:sp>
-    </p:spTree>
-    <p:extLst>
-      <p:ext uri="{BB962C8B-B14F-4D97-AF65-F5344CB8AC3E}">
-        <p14:creationId xmlns:p14="http://schemas.microsoft.com/office/powerpoint/2010/main" val="3818557035"/>
-      </p:ext>
-    </p:extLst>
-  </p:cSld>
-  <p:clrMapOvr>
-    <a:masterClrMapping/>
-  </p:clrMapOvr>
-</p:sld>
-</file>
-
-<file path=ppt/slides/slide20.xml><?xml version="1.0" encoding="utf-8"?>
+<file path=ppt/slides/slide21.xml><?xml version="1.0" encoding="utf-8"?>
 <p:sld xmlns:a="http://schemas.openxmlformats.org/drawingml/2006/main" xmlns:r="http://schemas.openxmlformats.org/officeDocument/2006/relationships" xmlns:p="http://schemas.openxmlformats.org/presentationml/2006/main">
   <p:cSld>
     <p:spTree>
@@ -11416,7 +11781,7 @@
 </p:sld>
 </file>
 
-<file path=ppt/slides/slide21.xml><?xml version="1.0" encoding="utf-8"?>
+<file path=ppt/slides/slide22.xml><?xml version="1.0" encoding="utf-8"?>
 <p:sld xmlns:a="http://schemas.openxmlformats.org/drawingml/2006/main" xmlns:r="http://schemas.openxmlformats.org/officeDocument/2006/relationships" xmlns:p="http://schemas.openxmlformats.org/presentationml/2006/main">
   <p:cSld>
     <p:spTree>
@@ -11677,7 +12042,7 @@
 </p:sld>
 </file>
 
-<file path=ppt/slides/slide22.xml><?xml version="1.0" encoding="utf-8"?>
+<file path=ppt/slides/slide23.xml><?xml version="1.0" encoding="utf-8"?>
 <p:sld xmlns:a="http://schemas.openxmlformats.org/drawingml/2006/main" xmlns:r="http://schemas.openxmlformats.org/officeDocument/2006/relationships" xmlns:p="http://schemas.openxmlformats.org/presentationml/2006/main">
   <p:cSld>
     <p:spTree>
@@ -11925,7 +12290,7 @@
 </p:sld>
 </file>
 
-<file path=ppt/slides/slide23.xml><?xml version="1.0" encoding="utf-8"?>
+<file path=ppt/slides/slide24.xml><?xml version="1.0" encoding="utf-8"?>
 <p:sld xmlns:a="http://schemas.openxmlformats.org/drawingml/2006/main" xmlns:r="http://schemas.openxmlformats.org/officeDocument/2006/relationships" xmlns:p="http://schemas.openxmlformats.org/presentationml/2006/main">
   <p:cSld>
     <p:spTree>
@@ -12132,7 +12497,7 @@
 </p:sld>
 </file>
 
-<file path=ppt/slides/slide24.xml><?xml version="1.0" encoding="utf-8"?>
+<file path=ppt/slides/slide25.xml><?xml version="1.0" encoding="utf-8"?>
 <p:sld xmlns:a="http://schemas.openxmlformats.org/drawingml/2006/main" xmlns:r="http://schemas.openxmlformats.org/officeDocument/2006/relationships" xmlns:p="http://schemas.openxmlformats.org/presentationml/2006/main">
   <p:cSld>
     <p:spTree>
@@ -12305,7 +12670,7 @@
 </p:sld>
 </file>
 
-<file path=ppt/slides/slide25.xml><?xml version="1.0" encoding="utf-8"?>
+<file path=ppt/slides/slide26.xml><?xml version="1.0" encoding="utf-8"?>
 <p:sld xmlns:a="http://schemas.openxmlformats.org/drawingml/2006/main" xmlns:r="http://schemas.openxmlformats.org/officeDocument/2006/relationships" xmlns:p="http://schemas.openxmlformats.org/presentationml/2006/main">
   <p:cSld>
     <p:spTree>
@@ -12851,7 +13216,7 @@
 </p:sld>
 </file>
 
-<file path=ppt/slides/slide26.xml><?xml version="1.0" encoding="utf-8"?>
+<file path=ppt/slides/slide27.xml><?xml version="1.0" encoding="utf-8"?>
 <p:sld xmlns:a="http://schemas.openxmlformats.org/drawingml/2006/main" xmlns:r="http://schemas.openxmlformats.org/officeDocument/2006/relationships" xmlns:p="http://schemas.openxmlformats.org/presentationml/2006/main">
   <p:cSld>
     <p:spTree>
@@ -12971,6 +13336,116 @@
     <p:extLst>
       <p:ext uri="{BB962C8B-B14F-4D97-AF65-F5344CB8AC3E}">
         <p14:creationId xmlns:p14="http://schemas.microsoft.com/office/powerpoint/2010/main" val="3808814931"/>
+      </p:ext>
+    </p:extLst>
+  </p:cSld>
+  <p:clrMapOvr>
+    <a:masterClrMapping/>
+  </p:clrMapOvr>
+</p:sld>
+</file>
+
+<file path=ppt/slides/slide28.xml><?xml version="1.0" encoding="utf-8"?>
+<p:sld xmlns:a="http://schemas.openxmlformats.org/drawingml/2006/main" xmlns:r="http://schemas.openxmlformats.org/officeDocument/2006/relationships" xmlns:p="http://schemas.openxmlformats.org/presentationml/2006/main">
+  <p:cSld>
+    <p:spTree>
+      <p:nvGrpSpPr>
+        <p:cNvPr id="1" name=""/>
+        <p:cNvGrpSpPr/>
+        <p:nvPr/>
+      </p:nvGrpSpPr>
+      <p:grpSpPr>
+        <a:xfrm>
+          <a:off x="0" y="0"/>
+          <a:ext cx="0" cy="0"/>
+          <a:chOff x="0" y="0"/>
+          <a:chExt cx="0" cy="0"/>
+        </a:xfrm>
+      </p:grpSpPr>
+      <p:sp>
+        <p:nvSpPr>
+          <p:cNvPr id="2" name="Title 1">
+            <a:extLst>
+              <a:ext uri="{FF2B5EF4-FFF2-40B4-BE49-F238E27FC236}">
+                <a16:creationId xmlns:a16="http://schemas.microsoft.com/office/drawing/2014/main" id="{820B8150-BC82-4B55-AF8D-3F3BC09634BF}"/>
+              </a:ext>
+            </a:extLst>
+          </p:cNvPr>
+          <p:cNvSpPr>
+            <a:spLocks noGrp="1"/>
+          </p:cNvSpPr>
+          <p:nvPr>
+            <p:ph type="title"/>
+          </p:nvPr>
+        </p:nvSpPr>
+        <p:spPr/>
+        <p:txBody>
+          <a:bodyPr/>
+          <a:lstStyle/>
+          <a:p>
+            <a:endParaRPr lang="en-US"/>
+          </a:p>
+        </p:txBody>
+      </p:sp>
+      <p:sp>
+        <p:nvSpPr>
+          <p:cNvPr id="3" name="Content Placeholder 2">
+            <a:extLst>
+              <a:ext uri="{FF2B5EF4-FFF2-40B4-BE49-F238E27FC236}">
+                <a16:creationId xmlns:a16="http://schemas.microsoft.com/office/drawing/2014/main" id="{FCFD8A2D-922C-41F8-BD70-7F62FBC0C189}"/>
+              </a:ext>
+            </a:extLst>
+          </p:cNvPr>
+          <p:cNvSpPr>
+            <a:spLocks noGrp="1"/>
+          </p:cNvSpPr>
+          <p:nvPr>
+            <p:ph idx="1"/>
+          </p:nvPr>
+        </p:nvSpPr>
+        <p:spPr/>
+        <p:txBody>
+          <a:bodyPr/>
+          <a:lstStyle/>
+          <a:p>
+            <a:endParaRPr lang="en-US"/>
+          </a:p>
+        </p:txBody>
+      </p:sp>
+      <p:pic>
+        <p:nvPicPr>
+          <p:cNvPr id="5" name="Picture 4">
+            <a:extLst>
+              <a:ext uri="{FF2B5EF4-FFF2-40B4-BE49-F238E27FC236}">
+                <a16:creationId xmlns:a16="http://schemas.microsoft.com/office/drawing/2014/main" id="{FBE5964E-5156-49F5-B64F-CC2A12648CCB}"/>
+              </a:ext>
+            </a:extLst>
+          </p:cNvPr>
+          <p:cNvPicPr>
+            <a:picLocks noChangeAspect="1"/>
+          </p:cNvPicPr>
+          <p:nvPr/>
+        </p:nvPicPr>
+        <p:blipFill>
+          <a:blip r:embed="rId2"/>
+          <a:stretch>
+            <a:fillRect/>
+          </a:stretch>
+        </p:blipFill>
+        <p:spPr>
+          <a:xfrm>
+            <a:off x="6707820" y="1183879"/>
+            <a:ext cx="4163006" cy="4839375"/>
+          </a:xfrm>
+          <a:prstGeom prst="rect">
+            <a:avLst/>
+          </a:prstGeom>
+        </p:spPr>
+      </p:pic>
+    </p:spTree>
+    <p:extLst>
+      <p:ext uri="{BB962C8B-B14F-4D97-AF65-F5344CB8AC3E}">
+        <p14:creationId xmlns:p14="http://schemas.microsoft.com/office/powerpoint/2010/main" val="2514458394"/>
       </p:ext>
     </p:extLst>
   </p:cSld>
@@ -14364,6 +14839,1053 @@
       </p:grpSpPr>
       <p:grpSp>
         <p:nvGrpSpPr>
+          <p:cNvPr id="4" name="Group 3">
+            <a:extLst>
+              <a:ext uri="{FF2B5EF4-FFF2-40B4-BE49-F238E27FC236}">
+                <a16:creationId xmlns:a16="http://schemas.microsoft.com/office/drawing/2014/main" id="{794FFCAA-D045-46C2-BF26-C6AFC06B90C2}"/>
+              </a:ext>
+            </a:extLst>
+          </p:cNvPr>
+          <p:cNvGrpSpPr/>
+          <p:nvPr/>
+        </p:nvGrpSpPr>
+        <p:grpSpPr>
+          <a:xfrm>
+            <a:off x="1066798" y="209982"/>
+            <a:ext cx="10058400" cy="870094"/>
+            <a:chOff x="1066798" y="209982"/>
+            <a:chExt cx="10058400" cy="870094"/>
+          </a:xfrm>
+        </p:grpSpPr>
+        <p:sp>
+          <p:nvSpPr>
+            <p:cNvPr id="2" name="Title 1">
+              <a:extLst>
+                <a:ext uri="{FF2B5EF4-FFF2-40B4-BE49-F238E27FC236}">
+                  <a16:creationId xmlns:a16="http://schemas.microsoft.com/office/drawing/2014/main" id="{B898D37B-FC34-487E-97CA-D605BE85E50F}"/>
+                </a:ext>
+              </a:extLst>
+            </p:cNvPr>
+            <p:cNvSpPr txBox="1">
+              <a:spLocks/>
+            </p:cNvSpPr>
+            <p:nvPr/>
+          </p:nvSpPr>
+          <p:spPr>
+            <a:xfrm>
+              <a:off x="1066798" y="209982"/>
+              <a:ext cx="10058400" cy="870094"/>
+            </a:xfrm>
+            <a:prstGeom prst="rect">
+              <a:avLst/>
+            </a:prstGeom>
+          </p:spPr>
+          <p:txBody>
+            <a:bodyPr/>
+            <a:lstStyle>
+              <a:lvl1pPr algn="l" defTabSz="914400" rtl="0" eaLnBrk="1" latinLnBrk="0" hangingPunct="1">
+                <a:lnSpc>
+                  <a:spcPct val="85000"/>
+                </a:lnSpc>
+                <a:spcBef>
+                  <a:spcPct val="0"/>
+                </a:spcBef>
+                <a:buNone/>
+                <a:defRPr sz="4800" kern="1200" spc="-50" baseline="0">
+                  <a:solidFill>
+                    <a:schemeClr val="tx1">
+                      <a:lumMod val="75000"/>
+                      <a:lumOff val="25000"/>
+                    </a:schemeClr>
+                  </a:solidFill>
+                  <a:latin typeface="+mj-lt"/>
+                  <a:ea typeface="+mj-ea"/>
+                  <a:cs typeface="+mj-cs"/>
+                </a:defRPr>
+              </a:lvl1pPr>
+            </a:lstStyle>
+            <a:p>
+              <a:r>
+                <a:rPr lang="en-US" dirty="0"/>
+                <a:t>Amazon &amp; Books</a:t>
+              </a:r>
+            </a:p>
+          </p:txBody>
+        </p:sp>
+        <p:cxnSp>
+          <p:nvCxnSpPr>
+            <p:cNvPr id="3" name="Straight Connector 2">
+              <a:extLst>
+                <a:ext uri="{FF2B5EF4-FFF2-40B4-BE49-F238E27FC236}">
+                  <a16:creationId xmlns:a16="http://schemas.microsoft.com/office/drawing/2014/main" id="{96E0E1CA-7566-4D27-8472-A7A41DCA9897}"/>
+                </a:ext>
+              </a:extLst>
+            </p:cNvPr>
+            <p:cNvCxnSpPr>
+              <a:cxnSpLocks/>
+            </p:cNvCxnSpPr>
+            <p:nvPr/>
+          </p:nvCxnSpPr>
+          <p:spPr>
+            <a:xfrm>
+              <a:off x="1111306" y="995320"/>
+              <a:ext cx="9969388" cy="0"/>
+            </a:xfrm>
+            <a:prstGeom prst="line">
+              <a:avLst/>
+            </a:prstGeom>
+            <a:ln w="3175"/>
+          </p:spPr>
+          <p:style>
+            <a:lnRef idx="1">
+              <a:schemeClr val="dk1"/>
+            </a:lnRef>
+            <a:fillRef idx="0">
+              <a:schemeClr val="dk1"/>
+            </a:fillRef>
+            <a:effectRef idx="0">
+              <a:schemeClr val="dk1"/>
+            </a:effectRef>
+            <a:fontRef idx="minor">
+              <a:schemeClr val="tx1"/>
+            </a:fontRef>
+          </p:style>
+        </p:cxnSp>
+      </p:grpSp>
+      <p:sp>
+        <p:nvSpPr>
+          <p:cNvPr id="6" name="Oval 5">
+            <a:extLst>
+              <a:ext uri="{FF2B5EF4-FFF2-40B4-BE49-F238E27FC236}">
+                <a16:creationId xmlns:a16="http://schemas.microsoft.com/office/drawing/2014/main" id="{773F19C9-793B-4D47-9FE6-AD3E5931E74E}"/>
+              </a:ext>
+            </a:extLst>
+          </p:cNvPr>
+          <p:cNvSpPr/>
+          <p:nvPr/>
+        </p:nvSpPr>
+        <p:spPr>
+          <a:xfrm>
+            <a:off x="2716222" y="2958089"/>
+            <a:ext cx="2130828" cy="1260762"/>
+          </a:xfrm>
+          <a:prstGeom prst="ellipse">
+            <a:avLst/>
+          </a:prstGeom>
+        </p:spPr>
+        <p:style>
+          <a:lnRef idx="2">
+            <a:schemeClr val="accent1">
+              <a:shade val="50000"/>
+            </a:schemeClr>
+          </a:lnRef>
+          <a:fillRef idx="1">
+            <a:schemeClr val="accent1"/>
+          </a:fillRef>
+          <a:effectRef idx="0">
+            <a:schemeClr val="accent1"/>
+          </a:effectRef>
+          <a:fontRef idx="minor">
+            <a:schemeClr val="lt1"/>
+          </a:fontRef>
+        </p:style>
+        <p:txBody>
+          <a:bodyPr rtlCol="0" anchor="ctr"/>
+          <a:lstStyle/>
+          <a:p>
+            <a:pPr algn="ctr"/>
+            <a:r>
+              <a:rPr lang="en-US" dirty="0"/>
+              <a:t>Amazon Books</a:t>
+            </a:r>
+          </a:p>
+        </p:txBody>
+      </p:sp>
+      <p:sp>
+        <p:nvSpPr>
+          <p:cNvPr id="37" name="Oval 36">
+            <a:extLst>
+              <a:ext uri="{FF2B5EF4-FFF2-40B4-BE49-F238E27FC236}">
+                <a16:creationId xmlns:a16="http://schemas.microsoft.com/office/drawing/2014/main" id="{6242065D-C389-474C-922E-6135172E0F8B}"/>
+              </a:ext>
+            </a:extLst>
+          </p:cNvPr>
+          <p:cNvSpPr/>
+          <p:nvPr/>
+        </p:nvSpPr>
+        <p:spPr>
+          <a:xfrm>
+            <a:off x="6216864" y="4143221"/>
+            <a:ext cx="2130828" cy="1260762"/>
+          </a:xfrm>
+          <a:prstGeom prst="ellipse">
+            <a:avLst/>
+          </a:prstGeom>
+        </p:spPr>
+        <p:style>
+          <a:lnRef idx="2">
+            <a:schemeClr val="accent1">
+              <a:shade val="50000"/>
+            </a:schemeClr>
+          </a:lnRef>
+          <a:fillRef idx="1">
+            <a:schemeClr val="accent1"/>
+          </a:fillRef>
+          <a:effectRef idx="0">
+            <a:schemeClr val="accent1"/>
+          </a:effectRef>
+          <a:fontRef idx="minor">
+            <a:schemeClr val="lt1"/>
+          </a:fontRef>
+        </p:style>
+        <p:txBody>
+          <a:bodyPr rtlCol="0" anchor="ctr"/>
+          <a:lstStyle/>
+          <a:p>
+            <a:pPr algn="ctr"/>
+            <a:r>
+              <a:rPr lang="en-US" dirty="0"/>
+              <a:t>Audible</a:t>
+            </a:r>
+          </a:p>
+        </p:txBody>
+      </p:sp>
+      <p:sp>
+        <p:nvSpPr>
+          <p:cNvPr id="38" name="Oval 37">
+            <a:extLst>
+              <a:ext uri="{FF2B5EF4-FFF2-40B4-BE49-F238E27FC236}">
+                <a16:creationId xmlns:a16="http://schemas.microsoft.com/office/drawing/2014/main" id="{25D1DD47-8265-4625-AA2F-802330807C30}"/>
+              </a:ext>
+            </a:extLst>
+          </p:cNvPr>
+          <p:cNvSpPr/>
+          <p:nvPr/>
+        </p:nvSpPr>
+        <p:spPr>
+          <a:xfrm>
+            <a:off x="2625436" y="4838330"/>
+            <a:ext cx="2130828" cy="1260762"/>
+          </a:xfrm>
+          <a:prstGeom prst="ellipse">
+            <a:avLst/>
+          </a:prstGeom>
+        </p:spPr>
+        <p:style>
+          <a:lnRef idx="2">
+            <a:schemeClr val="accent1">
+              <a:shade val="50000"/>
+            </a:schemeClr>
+          </a:lnRef>
+          <a:fillRef idx="1">
+            <a:schemeClr val="accent1"/>
+          </a:fillRef>
+          <a:effectRef idx="0">
+            <a:schemeClr val="accent1"/>
+          </a:effectRef>
+          <a:fontRef idx="minor">
+            <a:schemeClr val="lt1"/>
+          </a:fontRef>
+        </p:style>
+        <p:txBody>
+          <a:bodyPr rtlCol="0" anchor="ctr"/>
+          <a:lstStyle/>
+          <a:p>
+            <a:pPr algn="ctr"/>
+            <a:r>
+              <a:rPr lang="en-US" dirty="0"/>
+              <a:t>Goodreads</a:t>
+            </a:r>
+          </a:p>
+        </p:txBody>
+      </p:sp>
+      <p:sp>
+        <p:nvSpPr>
+          <p:cNvPr id="39" name="Oval 38">
+            <a:extLst>
+              <a:ext uri="{FF2B5EF4-FFF2-40B4-BE49-F238E27FC236}">
+                <a16:creationId xmlns:a16="http://schemas.microsoft.com/office/drawing/2014/main" id="{8B15B0BE-C69D-4683-B920-5117F917CE88}"/>
+              </a:ext>
+            </a:extLst>
+          </p:cNvPr>
+          <p:cNvSpPr/>
+          <p:nvPr/>
+        </p:nvSpPr>
+        <p:spPr>
+          <a:xfrm>
+            <a:off x="7604765" y="2493705"/>
+            <a:ext cx="2130828" cy="1260762"/>
+          </a:xfrm>
+          <a:prstGeom prst="ellipse">
+            <a:avLst/>
+          </a:prstGeom>
+        </p:spPr>
+        <p:style>
+          <a:lnRef idx="2">
+            <a:schemeClr val="accent1">
+              <a:shade val="50000"/>
+            </a:schemeClr>
+          </a:lnRef>
+          <a:fillRef idx="1">
+            <a:schemeClr val="accent1"/>
+          </a:fillRef>
+          <a:effectRef idx="0">
+            <a:schemeClr val="accent1"/>
+          </a:effectRef>
+          <a:fontRef idx="minor">
+            <a:schemeClr val="lt1"/>
+          </a:fontRef>
+        </p:style>
+        <p:txBody>
+          <a:bodyPr rtlCol="0" anchor="ctr"/>
+          <a:lstStyle/>
+          <a:p>
+            <a:pPr algn="ctr"/>
+            <a:r>
+              <a:rPr lang="en-US" dirty="0"/>
+              <a:t>Audio Creation Exchange</a:t>
+            </a:r>
+          </a:p>
+        </p:txBody>
+      </p:sp>
+      <p:sp>
+        <p:nvSpPr>
+          <p:cNvPr id="7" name="Rectangle: Rounded Corners 6">
+            <a:extLst>
+              <a:ext uri="{FF2B5EF4-FFF2-40B4-BE49-F238E27FC236}">
+                <a16:creationId xmlns:a16="http://schemas.microsoft.com/office/drawing/2014/main" id="{D8F1F36B-F401-4872-B978-842813BCFFE7}"/>
+              </a:ext>
+            </a:extLst>
+          </p:cNvPr>
+          <p:cNvSpPr/>
+          <p:nvPr/>
+        </p:nvSpPr>
+        <p:spPr>
+          <a:xfrm>
+            <a:off x="3572686" y="1500790"/>
+            <a:ext cx="1537854" cy="603138"/>
+          </a:xfrm>
+          <a:prstGeom prst="roundRect">
+            <a:avLst/>
+          </a:prstGeom>
+        </p:spPr>
+        <p:style>
+          <a:lnRef idx="2">
+            <a:schemeClr val="accent1">
+              <a:shade val="50000"/>
+            </a:schemeClr>
+          </a:lnRef>
+          <a:fillRef idx="1">
+            <a:schemeClr val="accent1"/>
+          </a:fillRef>
+          <a:effectRef idx="0">
+            <a:schemeClr val="accent1"/>
+          </a:effectRef>
+          <a:fontRef idx="minor">
+            <a:schemeClr val="lt1"/>
+          </a:fontRef>
+        </p:style>
+        <p:txBody>
+          <a:bodyPr rtlCol="0" anchor="ctr"/>
+          <a:lstStyle/>
+          <a:p>
+            <a:pPr algn="ctr"/>
+            <a:r>
+              <a:rPr lang="en-US" dirty="0"/>
+              <a:t>Search</a:t>
+            </a:r>
+          </a:p>
+        </p:txBody>
+      </p:sp>
+      <p:sp>
+        <p:nvSpPr>
+          <p:cNvPr id="40" name="Rectangle: Rounded Corners 39">
+            <a:extLst>
+              <a:ext uri="{FF2B5EF4-FFF2-40B4-BE49-F238E27FC236}">
+                <a16:creationId xmlns:a16="http://schemas.microsoft.com/office/drawing/2014/main" id="{E629014D-1AB6-4211-9687-7176FB3783CF}"/>
+              </a:ext>
+            </a:extLst>
+          </p:cNvPr>
+          <p:cNvSpPr/>
+          <p:nvPr/>
+        </p:nvSpPr>
+        <p:spPr>
+          <a:xfrm>
+            <a:off x="5720146" y="1500790"/>
+            <a:ext cx="1537854" cy="603138"/>
+          </a:xfrm>
+          <a:prstGeom prst="roundRect">
+            <a:avLst/>
+          </a:prstGeom>
+        </p:spPr>
+        <p:style>
+          <a:lnRef idx="2">
+            <a:schemeClr val="accent1">
+              <a:shade val="50000"/>
+            </a:schemeClr>
+          </a:lnRef>
+          <a:fillRef idx="1">
+            <a:schemeClr val="accent1"/>
+          </a:fillRef>
+          <a:effectRef idx="0">
+            <a:schemeClr val="accent1"/>
+          </a:effectRef>
+          <a:fontRef idx="minor">
+            <a:schemeClr val="lt1"/>
+          </a:fontRef>
+        </p:style>
+        <p:txBody>
+          <a:bodyPr rtlCol="0" anchor="ctr"/>
+          <a:lstStyle/>
+          <a:p>
+            <a:pPr algn="ctr"/>
+            <a:r>
+              <a:rPr lang="en-US" dirty="0"/>
+              <a:t>New Books</a:t>
+            </a:r>
+          </a:p>
+        </p:txBody>
+      </p:sp>
+      <p:cxnSp>
+        <p:nvCxnSpPr>
+          <p:cNvPr id="41" name="Straight Arrow Connector 40">
+            <a:extLst>
+              <a:ext uri="{FF2B5EF4-FFF2-40B4-BE49-F238E27FC236}">
+                <a16:creationId xmlns:a16="http://schemas.microsoft.com/office/drawing/2014/main" id="{138E6046-7BE0-46E8-89F8-7E1D885C67A4}"/>
+              </a:ext>
+            </a:extLst>
+          </p:cNvPr>
+          <p:cNvCxnSpPr>
+            <a:cxnSpLocks/>
+            <a:stCxn id="40" idx="2"/>
+            <a:endCxn id="39" idx="1"/>
+          </p:cNvCxnSpPr>
+          <p:nvPr/>
+        </p:nvCxnSpPr>
+        <p:spPr>
+          <a:xfrm>
+            <a:off x="6489073" y="2103928"/>
+            <a:ext cx="1427745" cy="574411"/>
+          </a:xfrm>
+          <a:prstGeom prst="straightConnector1">
+            <a:avLst/>
+          </a:prstGeom>
+          <a:ln>
+            <a:tailEnd type="triangle"/>
+          </a:ln>
+        </p:spPr>
+        <p:style>
+          <a:lnRef idx="1">
+            <a:schemeClr val="accent1"/>
+          </a:lnRef>
+          <a:fillRef idx="0">
+            <a:schemeClr val="accent1"/>
+          </a:fillRef>
+          <a:effectRef idx="0">
+            <a:schemeClr val="accent1"/>
+          </a:effectRef>
+          <a:fontRef idx="minor">
+            <a:schemeClr val="tx1"/>
+          </a:fontRef>
+        </p:style>
+      </p:cxnSp>
+      <p:cxnSp>
+        <p:nvCxnSpPr>
+          <p:cNvPr id="43" name="Straight Arrow Connector 42">
+            <a:extLst>
+              <a:ext uri="{FF2B5EF4-FFF2-40B4-BE49-F238E27FC236}">
+                <a16:creationId xmlns:a16="http://schemas.microsoft.com/office/drawing/2014/main" id="{891E5E0E-8DF7-4B99-A24B-09682189FEB9}"/>
+              </a:ext>
+            </a:extLst>
+          </p:cNvPr>
+          <p:cNvCxnSpPr>
+            <a:cxnSpLocks/>
+            <a:stCxn id="40" idx="2"/>
+            <a:endCxn id="6" idx="7"/>
+          </p:cNvCxnSpPr>
+          <p:nvPr/>
+        </p:nvCxnSpPr>
+        <p:spPr>
+          <a:xfrm flipH="1">
+            <a:off x="4534997" y="2103928"/>
+            <a:ext cx="1954076" cy="1038795"/>
+          </a:xfrm>
+          <a:prstGeom prst="straightConnector1">
+            <a:avLst/>
+          </a:prstGeom>
+          <a:ln>
+            <a:tailEnd type="triangle"/>
+          </a:ln>
+        </p:spPr>
+        <p:style>
+          <a:lnRef idx="1">
+            <a:schemeClr val="accent1"/>
+          </a:lnRef>
+          <a:fillRef idx="0">
+            <a:schemeClr val="accent1"/>
+          </a:fillRef>
+          <a:effectRef idx="0">
+            <a:schemeClr val="accent1"/>
+          </a:effectRef>
+          <a:fontRef idx="minor">
+            <a:schemeClr val="tx1"/>
+          </a:fontRef>
+        </p:style>
+      </p:cxnSp>
+      <p:cxnSp>
+        <p:nvCxnSpPr>
+          <p:cNvPr id="45" name="Straight Arrow Connector 44">
+            <a:extLst>
+              <a:ext uri="{FF2B5EF4-FFF2-40B4-BE49-F238E27FC236}">
+                <a16:creationId xmlns:a16="http://schemas.microsoft.com/office/drawing/2014/main" id="{5784F96C-F690-45E2-82B6-237A5C8EC41D}"/>
+              </a:ext>
+            </a:extLst>
+          </p:cNvPr>
+          <p:cNvCxnSpPr>
+            <a:cxnSpLocks/>
+            <a:stCxn id="7" idx="2"/>
+            <a:endCxn id="6" idx="0"/>
+          </p:cNvCxnSpPr>
+          <p:nvPr/>
+        </p:nvCxnSpPr>
+        <p:spPr>
+          <a:xfrm flipH="1">
+            <a:off x="3781636" y="2103928"/>
+            <a:ext cx="559977" cy="854161"/>
+          </a:xfrm>
+          <a:prstGeom prst="straightConnector1">
+            <a:avLst/>
+          </a:prstGeom>
+          <a:ln>
+            <a:tailEnd type="triangle"/>
+          </a:ln>
+        </p:spPr>
+        <p:style>
+          <a:lnRef idx="1">
+            <a:schemeClr val="accent1"/>
+          </a:lnRef>
+          <a:fillRef idx="0">
+            <a:schemeClr val="accent1"/>
+          </a:fillRef>
+          <a:effectRef idx="0">
+            <a:schemeClr val="accent1"/>
+          </a:effectRef>
+          <a:fontRef idx="minor">
+            <a:schemeClr val="tx1"/>
+          </a:fontRef>
+        </p:style>
+      </p:cxnSp>
+      <p:cxnSp>
+        <p:nvCxnSpPr>
+          <p:cNvPr id="47" name="Straight Arrow Connector 46">
+            <a:extLst>
+              <a:ext uri="{FF2B5EF4-FFF2-40B4-BE49-F238E27FC236}">
+                <a16:creationId xmlns:a16="http://schemas.microsoft.com/office/drawing/2014/main" id="{CC5BB6FD-9D56-49DA-97B7-F41F98CB20C0}"/>
+              </a:ext>
+            </a:extLst>
+          </p:cNvPr>
+          <p:cNvCxnSpPr>
+            <a:stCxn id="7" idx="2"/>
+            <a:endCxn id="37" idx="0"/>
+          </p:cNvCxnSpPr>
+          <p:nvPr/>
+        </p:nvCxnSpPr>
+        <p:spPr>
+          <a:xfrm>
+            <a:off x="4341613" y="2103928"/>
+            <a:ext cx="2940665" cy="2039293"/>
+          </a:xfrm>
+          <a:prstGeom prst="straightConnector1">
+            <a:avLst/>
+          </a:prstGeom>
+          <a:ln>
+            <a:tailEnd type="triangle"/>
+          </a:ln>
+        </p:spPr>
+        <p:style>
+          <a:lnRef idx="1">
+            <a:schemeClr val="accent1"/>
+          </a:lnRef>
+          <a:fillRef idx="0">
+            <a:schemeClr val="accent1"/>
+          </a:fillRef>
+          <a:effectRef idx="0">
+            <a:schemeClr val="accent1"/>
+          </a:effectRef>
+          <a:fontRef idx="minor">
+            <a:schemeClr val="tx1"/>
+          </a:fontRef>
+        </p:style>
+      </p:cxnSp>
+      <p:cxnSp>
+        <p:nvCxnSpPr>
+          <p:cNvPr id="52" name="Straight Arrow Connector 51">
+            <a:extLst>
+              <a:ext uri="{FF2B5EF4-FFF2-40B4-BE49-F238E27FC236}">
+                <a16:creationId xmlns:a16="http://schemas.microsoft.com/office/drawing/2014/main" id="{2F45CC8D-9C8E-48B0-AF51-CB242FBD93A0}"/>
+              </a:ext>
+            </a:extLst>
+          </p:cNvPr>
+          <p:cNvCxnSpPr>
+            <a:cxnSpLocks/>
+            <a:stCxn id="37" idx="3"/>
+          </p:cNvCxnSpPr>
+          <p:nvPr/>
+        </p:nvCxnSpPr>
+        <p:spPr>
+          <a:xfrm flipH="1" flipV="1">
+            <a:off x="4600238" y="5110345"/>
+            <a:ext cx="1928679" cy="109004"/>
+          </a:xfrm>
+          <a:prstGeom prst="straightConnector1">
+            <a:avLst/>
+          </a:prstGeom>
+          <a:ln>
+            <a:tailEnd type="triangle"/>
+          </a:ln>
+        </p:spPr>
+        <p:style>
+          <a:lnRef idx="1">
+            <a:schemeClr val="accent1"/>
+          </a:lnRef>
+          <a:fillRef idx="0">
+            <a:schemeClr val="accent1"/>
+          </a:fillRef>
+          <a:effectRef idx="0">
+            <a:schemeClr val="accent1"/>
+          </a:effectRef>
+          <a:fontRef idx="minor">
+            <a:schemeClr val="tx1"/>
+          </a:fontRef>
+        </p:style>
+      </p:cxnSp>
+      <p:cxnSp>
+        <p:nvCxnSpPr>
+          <p:cNvPr id="54" name="Straight Arrow Connector 53">
+            <a:extLst>
+              <a:ext uri="{FF2B5EF4-FFF2-40B4-BE49-F238E27FC236}">
+                <a16:creationId xmlns:a16="http://schemas.microsoft.com/office/drawing/2014/main" id="{BB790B48-6283-421F-88A8-CFE19A5B0B37}"/>
+              </a:ext>
+            </a:extLst>
+          </p:cNvPr>
+          <p:cNvCxnSpPr>
+            <a:cxnSpLocks/>
+          </p:cNvCxnSpPr>
+          <p:nvPr/>
+        </p:nvCxnSpPr>
+        <p:spPr>
+          <a:xfrm flipH="1">
+            <a:off x="4123478" y="4181036"/>
+            <a:ext cx="116049" cy="688316"/>
+          </a:xfrm>
+          <a:prstGeom prst="straightConnector1">
+            <a:avLst/>
+          </a:prstGeom>
+          <a:ln>
+            <a:tailEnd type="triangle"/>
+          </a:ln>
+        </p:spPr>
+        <p:style>
+          <a:lnRef idx="1">
+            <a:schemeClr val="accent1"/>
+          </a:lnRef>
+          <a:fillRef idx="0">
+            <a:schemeClr val="accent1"/>
+          </a:fillRef>
+          <a:effectRef idx="0">
+            <a:schemeClr val="accent1"/>
+          </a:effectRef>
+          <a:fontRef idx="minor">
+            <a:schemeClr val="tx1"/>
+          </a:fontRef>
+        </p:style>
+      </p:cxnSp>
+      <p:cxnSp>
+        <p:nvCxnSpPr>
+          <p:cNvPr id="56" name="Straight Arrow Connector 55">
+            <a:extLst>
+              <a:ext uri="{FF2B5EF4-FFF2-40B4-BE49-F238E27FC236}">
+                <a16:creationId xmlns:a16="http://schemas.microsoft.com/office/drawing/2014/main" id="{9C4D4388-7D0A-4A78-926E-11C51A0D55DE}"/>
+              </a:ext>
+            </a:extLst>
+          </p:cNvPr>
+          <p:cNvCxnSpPr>
+            <a:stCxn id="6" idx="5"/>
+            <a:endCxn id="37" idx="1"/>
+          </p:cNvCxnSpPr>
+          <p:nvPr/>
+        </p:nvCxnSpPr>
+        <p:spPr>
+          <a:xfrm>
+            <a:off x="4534997" y="4034217"/>
+            <a:ext cx="1993920" cy="293638"/>
+          </a:xfrm>
+          <a:prstGeom prst="straightConnector1">
+            <a:avLst/>
+          </a:prstGeom>
+          <a:ln>
+            <a:tailEnd type="triangle"/>
+          </a:ln>
+        </p:spPr>
+        <p:style>
+          <a:lnRef idx="1">
+            <a:schemeClr val="accent1"/>
+          </a:lnRef>
+          <a:fillRef idx="0">
+            <a:schemeClr val="accent1"/>
+          </a:fillRef>
+          <a:effectRef idx="0">
+            <a:schemeClr val="accent1"/>
+          </a:effectRef>
+          <a:fontRef idx="minor">
+            <a:schemeClr val="tx1"/>
+          </a:fontRef>
+        </p:style>
+      </p:cxnSp>
+      <p:cxnSp>
+        <p:nvCxnSpPr>
+          <p:cNvPr id="58" name="Straight Arrow Connector 57">
+            <a:extLst>
+              <a:ext uri="{FF2B5EF4-FFF2-40B4-BE49-F238E27FC236}">
+                <a16:creationId xmlns:a16="http://schemas.microsoft.com/office/drawing/2014/main" id="{369DECC9-C74B-4F87-86A0-2CAFF13132F6}"/>
+              </a:ext>
+            </a:extLst>
+          </p:cNvPr>
+          <p:cNvCxnSpPr>
+            <a:cxnSpLocks/>
+            <a:stCxn id="39" idx="4"/>
+            <a:endCxn id="37" idx="7"/>
+          </p:cNvCxnSpPr>
+          <p:nvPr/>
+        </p:nvCxnSpPr>
+        <p:spPr>
+          <a:xfrm flipH="1">
+            <a:off x="8035639" y="3754467"/>
+            <a:ext cx="634540" cy="573388"/>
+          </a:xfrm>
+          <a:prstGeom prst="straightConnector1">
+            <a:avLst/>
+          </a:prstGeom>
+          <a:ln>
+            <a:tailEnd type="triangle"/>
+          </a:ln>
+        </p:spPr>
+        <p:style>
+          <a:lnRef idx="1">
+            <a:schemeClr val="accent1"/>
+          </a:lnRef>
+          <a:fillRef idx="0">
+            <a:schemeClr val="accent1"/>
+          </a:fillRef>
+          <a:effectRef idx="0">
+            <a:schemeClr val="accent1"/>
+          </a:effectRef>
+          <a:fontRef idx="minor">
+            <a:schemeClr val="tx1"/>
+          </a:fontRef>
+        </p:style>
+      </p:cxnSp>
+      <p:sp>
+        <p:nvSpPr>
+          <p:cNvPr id="111" name="Freeform: Shape 110">
+            <a:extLst>
+              <a:ext uri="{FF2B5EF4-FFF2-40B4-BE49-F238E27FC236}">
+                <a16:creationId xmlns:a16="http://schemas.microsoft.com/office/drawing/2014/main" id="{DF62BB7F-00D1-473D-B4E5-248A71D529DB}"/>
+              </a:ext>
+            </a:extLst>
+          </p:cNvPr>
+          <p:cNvSpPr/>
+          <p:nvPr/>
+        </p:nvSpPr>
+        <p:spPr>
+          <a:xfrm rot="523232">
+            <a:off x="2488815" y="1665633"/>
+            <a:ext cx="816278" cy="3697843"/>
+          </a:xfrm>
+          <a:custGeom>
+            <a:avLst/>
+            <a:gdLst>
+              <a:gd name="connsiteX0" fmla="*/ 1101235 w 1949133"/>
+              <a:gd name="connsiteY0" fmla="*/ 3424843 h 3424843"/>
+              <a:gd name="connsiteX1" fmla="*/ 20580 w 1949133"/>
+              <a:gd name="connsiteY1" fmla="*/ 1330036 h 3424843"/>
+              <a:gd name="connsiteX2" fmla="*/ 1949133 w 1949133"/>
+              <a:gd name="connsiteY2" fmla="*/ 0 h 3424843"/>
+              <a:gd name="connsiteX3" fmla="*/ 1949133 w 1949133"/>
+              <a:gd name="connsiteY3" fmla="*/ 0 h 3424843"/>
+            </a:gdLst>
+            <a:ahLst/>
+            <a:cxnLst>
+              <a:cxn ang="0">
+                <a:pos x="connsiteX0" y="connsiteY0"/>
+              </a:cxn>
+              <a:cxn ang="0">
+                <a:pos x="connsiteX1" y="connsiteY1"/>
+              </a:cxn>
+              <a:cxn ang="0">
+                <a:pos x="connsiteX2" y="connsiteY2"/>
+              </a:cxn>
+              <a:cxn ang="0">
+                <a:pos x="connsiteX3" y="connsiteY3"/>
+              </a:cxn>
+            </a:cxnLst>
+            <a:rect l="l" t="t" r="r" b="b"/>
+            <a:pathLst>
+              <a:path w="1949133" h="3424843">
+                <a:moveTo>
+                  <a:pt x="1101235" y="3424843"/>
+                </a:moveTo>
+                <a:cubicBezTo>
+                  <a:pt x="490249" y="2662843"/>
+                  <a:pt x="-120736" y="1900843"/>
+                  <a:pt x="20580" y="1330036"/>
+                </a:cubicBezTo>
+                <a:cubicBezTo>
+                  <a:pt x="161896" y="759229"/>
+                  <a:pt x="1949133" y="0"/>
+                  <a:pt x="1949133" y="0"/>
+                </a:cubicBezTo>
+                <a:lnTo>
+                  <a:pt x="1949133" y="0"/>
+                </a:lnTo>
+              </a:path>
+            </a:pathLst>
+          </a:custGeom>
+          <a:ln>
+            <a:headEnd type="none" w="med" len="med"/>
+            <a:tailEnd type="triangle" w="med" len="med"/>
+          </a:ln>
+        </p:spPr>
+        <p:style>
+          <a:lnRef idx="1">
+            <a:schemeClr val="accent1"/>
+          </a:lnRef>
+          <a:fillRef idx="0">
+            <a:schemeClr val="accent1"/>
+          </a:fillRef>
+          <a:effectRef idx="0">
+            <a:schemeClr val="accent1"/>
+          </a:effectRef>
+          <a:fontRef idx="minor">
+            <a:schemeClr val="tx1"/>
+          </a:fontRef>
+        </p:style>
+        <p:txBody>
+          <a:bodyPr rtlCol="0" anchor="ctr"/>
+          <a:lstStyle/>
+          <a:p>
+            <a:pPr algn="ctr"/>
+            <a:endParaRPr lang="en-US"/>
+          </a:p>
+        </p:txBody>
+      </p:sp>
+      <p:sp>
+        <p:nvSpPr>
+          <p:cNvPr id="114" name="TextBox 113">
+            <a:extLst>
+              <a:ext uri="{FF2B5EF4-FFF2-40B4-BE49-F238E27FC236}">
+                <a16:creationId xmlns:a16="http://schemas.microsoft.com/office/drawing/2014/main" id="{81BFFDD8-97B3-449A-B142-8A50924DF9DB}"/>
+              </a:ext>
+            </a:extLst>
+          </p:cNvPr>
+          <p:cNvSpPr txBox="1"/>
+          <p:nvPr/>
+        </p:nvSpPr>
+        <p:spPr>
+          <a:xfrm>
+            <a:off x="5949747" y="2300281"/>
+            <a:ext cx="1385783" cy="369332"/>
+          </a:xfrm>
+          <a:prstGeom prst="rect">
+            <a:avLst/>
+          </a:prstGeom>
+          <a:noFill/>
+        </p:spPr>
+        <p:txBody>
+          <a:bodyPr wrap="square" rtlCol="0">
+            <a:spAutoFit/>
+          </a:bodyPr>
+          <a:lstStyle/>
+          <a:p>
+            <a:r>
+              <a:rPr lang="en-US" dirty="0"/>
+              <a:t>Distribution</a:t>
+            </a:r>
+          </a:p>
+        </p:txBody>
+      </p:sp>
+      <p:sp>
+        <p:nvSpPr>
+          <p:cNvPr id="115" name="TextBox 114">
+            <a:extLst>
+              <a:ext uri="{FF2B5EF4-FFF2-40B4-BE49-F238E27FC236}">
+                <a16:creationId xmlns:a16="http://schemas.microsoft.com/office/drawing/2014/main" id="{69A3796A-3587-4E67-AF76-169EAFAE1765}"/>
+              </a:ext>
+            </a:extLst>
+          </p:cNvPr>
+          <p:cNvSpPr txBox="1"/>
+          <p:nvPr/>
+        </p:nvSpPr>
+        <p:spPr>
+          <a:xfrm>
+            <a:off x="8539817" y="3856495"/>
+            <a:ext cx="1385783" cy="369332"/>
+          </a:xfrm>
+          <a:prstGeom prst="rect">
+            <a:avLst/>
+          </a:prstGeom>
+          <a:noFill/>
+        </p:spPr>
+        <p:txBody>
+          <a:bodyPr wrap="square" rtlCol="0">
+            <a:spAutoFit/>
+          </a:bodyPr>
+          <a:lstStyle/>
+          <a:p>
+            <a:r>
+              <a:rPr lang="en-US" dirty="0"/>
+              <a:t>Dubbing</a:t>
+            </a:r>
+          </a:p>
+        </p:txBody>
+      </p:sp>
+      <p:sp>
+        <p:nvSpPr>
+          <p:cNvPr id="116" name="TextBox 115">
+            <a:extLst>
+              <a:ext uri="{FF2B5EF4-FFF2-40B4-BE49-F238E27FC236}">
+                <a16:creationId xmlns:a16="http://schemas.microsoft.com/office/drawing/2014/main" id="{63034675-DCCA-4C66-AA55-3558E12A079F}"/>
+              </a:ext>
+            </a:extLst>
+          </p:cNvPr>
+          <p:cNvSpPr txBox="1"/>
+          <p:nvPr/>
+        </p:nvSpPr>
+        <p:spPr>
+          <a:xfrm>
+            <a:off x="4239527" y="4654696"/>
+            <a:ext cx="1385783" cy="369332"/>
+          </a:xfrm>
+          <a:prstGeom prst="rect">
+            <a:avLst/>
+          </a:prstGeom>
+          <a:noFill/>
+        </p:spPr>
+        <p:txBody>
+          <a:bodyPr wrap="square" rtlCol="0">
+            <a:spAutoFit/>
+          </a:bodyPr>
+          <a:lstStyle/>
+          <a:p>
+            <a:r>
+              <a:rPr lang="en-US" dirty="0"/>
+              <a:t>Reviews</a:t>
+            </a:r>
+          </a:p>
+        </p:txBody>
+      </p:sp>
+      <p:sp>
+        <p:nvSpPr>
+          <p:cNvPr id="117" name="TextBox 116">
+            <a:extLst>
+              <a:ext uri="{FF2B5EF4-FFF2-40B4-BE49-F238E27FC236}">
+                <a16:creationId xmlns:a16="http://schemas.microsoft.com/office/drawing/2014/main" id="{B667FD3F-B4D0-49DE-8518-479AA7DA7B97}"/>
+              </a:ext>
+            </a:extLst>
+          </p:cNvPr>
+          <p:cNvSpPr txBox="1"/>
+          <p:nvPr/>
+        </p:nvSpPr>
+        <p:spPr>
+          <a:xfrm rot="447664">
+            <a:off x="5042097" y="3838546"/>
+            <a:ext cx="1200988" cy="369332"/>
+          </a:xfrm>
+          <a:prstGeom prst="rect">
+            <a:avLst/>
+          </a:prstGeom>
+          <a:noFill/>
+        </p:spPr>
+        <p:txBody>
+          <a:bodyPr wrap="square" rtlCol="0">
+            <a:spAutoFit/>
+          </a:bodyPr>
+          <a:lstStyle/>
+          <a:p>
+            <a:r>
+              <a:rPr lang="en-US" dirty="0"/>
+              <a:t>Redirect</a:t>
+            </a:r>
+          </a:p>
+        </p:txBody>
+      </p:sp>
+      <p:sp>
+        <p:nvSpPr>
+          <p:cNvPr id="121" name="TextBox 120">
+            <a:extLst>
+              <a:ext uri="{FF2B5EF4-FFF2-40B4-BE49-F238E27FC236}">
+                <a16:creationId xmlns:a16="http://schemas.microsoft.com/office/drawing/2014/main" id="{D47B631E-88A3-40D9-9A75-3032639BA47B}"/>
+              </a:ext>
+            </a:extLst>
+          </p:cNvPr>
+          <p:cNvSpPr txBox="1"/>
+          <p:nvPr/>
+        </p:nvSpPr>
+        <p:spPr>
+          <a:xfrm>
+            <a:off x="1502177" y="2338610"/>
+            <a:ext cx="1385783" cy="646331"/>
+          </a:xfrm>
+          <a:prstGeom prst="rect">
+            <a:avLst/>
+          </a:prstGeom>
+          <a:noFill/>
+        </p:spPr>
+        <p:txBody>
+          <a:bodyPr wrap="square" rtlCol="0">
+            <a:spAutoFit/>
+          </a:bodyPr>
+          <a:lstStyle/>
+          <a:p>
+            <a:r>
+              <a:rPr lang="en-US" dirty="0"/>
+              <a:t>Organic Discovery</a:t>
+            </a:r>
+          </a:p>
+        </p:txBody>
+      </p:sp>
+    </p:spTree>
+    <p:extLst>
+      <p:ext uri="{BB962C8B-B14F-4D97-AF65-F5344CB8AC3E}">
+        <p14:creationId xmlns:p14="http://schemas.microsoft.com/office/powerpoint/2010/main" val="4240107946"/>
+      </p:ext>
+    </p:extLst>
+  </p:cSld>
+  <p:clrMapOvr>
+    <a:masterClrMapping/>
+  </p:clrMapOvr>
+</p:sld>
+</file>
+
+<file path=ppt/slides/slide5.xml><?xml version="1.0" encoding="utf-8"?>
+<p:sld xmlns:a="http://schemas.openxmlformats.org/drawingml/2006/main" xmlns:r="http://schemas.openxmlformats.org/officeDocument/2006/relationships" xmlns:p="http://schemas.openxmlformats.org/presentationml/2006/main">
+  <p:cSld>
+    <p:spTree>
+      <p:nvGrpSpPr>
+        <p:cNvPr id="1" name=""/>
+        <p:cNvGrpSpPr/>
+        <p:nvPr/>
+      </p:nvGrpSpPr>
+      <p:grpSpPr>
+        <a:xfrm>
+          <a:off x="0" y="0"/>
+          <a:ext cx="0" cy="0"/>
+          <a:chOff x="0" y="0"/>
+          <a:chExt cx="0" cy="0"/>
+        </a:xfrm>
+      </p:grpSpPr>
+      <p:grpSp>
+        <p:nvGrpSpPr>
           <p:cNvPr id="11" name="Group 10">
             <a:extLst>
               <a:ext uri="{FF2B5EF4-FFF2-40B4-BE49-F238E27FC236}">
@@ -15397,7 +16919,7 @@
 </p:sld>
 </file>
 
-<file path=ppt/slides/slide5.xml><?xml version="1.0" encoding="utf-8"?>
+<file path=ppt/slides/slide6.xml><?xml version="1.0" encoding="utf-8"?>
 <p:sld xmlns:a="http://schemas.openxmlformats.org/drawingml/2006/main" xmlns:r="http://schemas.openxmlformats.org/officeDocument/2006/relationships" xmlns:p="http://schemas.openxmlformats.org/presentationml/2006/main">
   <p:cSld>
     <p:spTree>
@@ -16515,7 +18037,7 @@
 </p:sld>
 </file>
 
-<file path=ppt/slides/slide6.xml><?xml version="1.0" encoding="utf-8"?>
+<file path=ppt/slides/slide7.xml><?xml version="1.0" encoding="utf-8"?>
 <p:sld xmlns:a="http://schemas.openxmlformats.org/drawingml/2006/main" xmlns:r="http://schemas.openxmlformats.org/officeDocument/2006/relationships" xmlns:p="http://schemas.openxmlformats.org/presentationml/2006/main">
   <p:cSld>
     <p:spTree>
@@ -16785,7 +18307,7 @@
 </p:sld>
 </file>
 
-<file path=ppt/slides/slide7.xml><?xml version="1.0" encoding="utf-8"?>
+<file path=ppt/slides/slide8.xml><?xml version="1.0" encoding="utf-8"?>
 <p:sld xmlns:a="http://schemas.openxmlformats.org/drawingml/2006/main" xmlns:r="http://schemas.openxmlformats.org/officeDocument/2006/relationships" xmlns:p="http://schemas.openxmlformats.org/presentationml/2006/main">
   <p:cSld>
     <p:spTree>
@@ -17001,7 +18523,7 @@
 </p:sld>
 </file>
 
-<file path=ppt/slides/slide8.xml><?xml version="1.0" encoding="utf-8"?>
+<file path=ppt/slides/slide9.xml><?xml version="1.0" encoding="utf-8"?>
 <p:sld xmlns:a="http://schemas.openxmlformats.org/drawingml/2006/main" xmlns:r="http://schemas.openxmlformats.org/officeDocument/2006/relationships" xmlns:p="http://schemas.openxmlformats.org/presentationml/2006/main">
   <p:cSld>
     <p:spTree>
@@ -17217,362 +18739,6 @@
     <p:extLst>
       <p:ext uri="{BB962C8B-B14F-4D97-AF65-F5344CB8AC3E}">
         <p14:creationId xmlns:p14="http://schemas.microsoft.com/office/powerpoint/2010/main" val="1374779554"/>
-      </p:ext>
-    </p:extLst>
-  </p:cSld>
-  <p:clrMapOvr>
-    <a:masterClrMapping/>
-  </p:clrMapOvr>
-</p:sld>
-</file>
-
-<file path=ppt/slides/slide9.xml><?xml version="1.0" encoding="utf-8"?>
-<p:sld xmlns:a="http://schemas.openxmlformats.org/drawingml/2006/main" xmlns:r="http://schemas.openxmlformats.org/officeDocument/2006/relationships" xmlns:p="http://schemas.openxmlformats.org/presentationml/2006/main">
-  <p:cSld>
-    <p:spTree>
-      <p:nvGrpSpPr>
-        <p:cNvPr id="1" name=""/>
-        <p:cNvGrpSpPr/>
-        <p:nvPr/>
-      </p:nvGrpSpPr>
-      <p:grpSpPr>
-        <a:xfrm>
-          <a:off x="0" y="0"/>
-          <a:ext cx="0" cy="0"/>
-          <a:chOff x="0" y="0"/>
-          <a:chExt cx="0" cy="0"/>
-        </a:xfrm>
-      </p:grpSpPr>
-      <p:grpSp>
-        <p:nvGrpSpPr>
-          <p:cNvPr id="4" name="Group 3">
-            <a:extLst>
-              <a:ext uri="{FF2B5EF4-FFF2-40B4-BE49-F238E27FC236}">
-                <a16:creationId xmlns:a16="http://schemas.microsoft.com/office/drawing/2014/main" id="{794FFCAA-D045-46C2-BF26-C6AFC06B90C2}"/>
-              </a:ext>
-            </a:extLst>
-          </p:cNvPr>
-          <p:cNvGrpSpPr/>
-          <p:nvPr/>
-        </p:nvGrpSpPr>
-        <p:grpSpPr>
-          <a:xfrm>
-            <a:off x="1066798" y="209982"/>
-            <a:ext cx="10058400" cy="870094"/>
-            <a:chOff x="1066798" y="209982"/>
-            <a:chExt cx="10058400" cy="870094"/>
-          </a:xfrm>
-        </p:grpSpPr>
-        <p:sp>
-          <p:nvSpPr>
-            <p:cNvPr id="2" name="Title 1">
-              <a:extLst>
-                <a:ext uri="{FF2B5EF4-FFF2-40B4-BE49-F238E27FC236}">
-                  <a16:creationId xmlns:a16="http://schemas.microsoft.com/office/drawing/2014/main" id="{B898D37B-FC34-487E-97CA-D605BE85E50F}"/>
-                </a:ext>
-              </a:extLst>
-            </p:cNvPr>
-            <p:cNvSpPr txBox="1">
-              <a:spLocks/>
-            </p:cNvSpPr>
-            <p:nvPr/>
-          </p:nvSpPr>
-          <p:spPr>
-            <a:xfrm>
-              <a:off x="1066798" y="209982"/>
-              <a:ext cx="10058400" cy="870094"/>
-            </a:xfrm>
-            <a:prstGeom prst="rect">
-              <a:avLst/>
-            </a:prstGeom>
-          </p:spPr>
-          <p:txBody>
-            <a:bodyPr/>
-            <a:lstStyle>
-              <a:lvl1pPr algn="l" defTabSz="914400" rtl="0" eaLnBrk="1" latinLnBrk="0" hangingPunct="1">
-                <a:lnSpc>
-                  <a:spcPct val="85000"/>
-                </a:lnSpc>
-                <a:spcBef>
-                  <a:spcPct val="0"/>
-                </a:spcBef>
-                <a:buNone/>
-                <a:defRPr sz="4800" kern="1200" spc="-50" baseline="0">
-                  <a:solidFill>
-                    <a:schemeClr val="tx1">
-                      <a:lumMod val="75000"/>
-                      <a:lumOff val="25000"/>
-                    </a:schemeClr>
-                  </a:solidFill>
-                  <a:latin typeface="+mj-lt"/>
-                  <a:ea typeface="+mj-ea"/>
-                  <a:cs typeface="+mj-cs"/>
-                </a:defRPr>
-              </a:lvl1pPr>
-            </a:lstStyle>
-            <a:p>
-              <a:r>
-                <a:rPr lang="en-US" dirty="0"/>
-                <a:t>Consistent Yearly Growth</a:t>
-              </a:r>
-            </a:p>
-          </p:txBody>
-        </p:sp>
-        <p:cxnSp>
-          <p:nvCxnSpPr>
-            <p:cNvPr id="3" name="Straight Connector 2">
-              <a:extLst>
-                <a:ext uri="{FF2B5EF4-FFF2-40B4-BE49-F238E27FC236}">
-                  <a16:creationId xmlns:a16="http://schemas.microsoft.com/office/drawing/2014/main" id="{96E0E1CA-7566-4D27-8472-A7A41DCA9897}"/>
-                </a:ext>
-              </a:extLst>
-            </p:cNvPr>
-            <p:cNvCxnSpPr>
-              <a:cxnSpLocks/>
-            </p:cNvCxnSpPr>
-            <p:nvPr/>
-          </p:nvCxnSpPr>
-          <p:spPr>
-            <a:xfrm>
-              <a:off x="1111306" y="995320"/>
-              <a:ext cx="9969388" cy="0"/>
-            </a:xfrm>
-            <a:prstGeom prst="line">
-              <a:avLst/>
-            </a:prstGeom>
-            <a:ln w="3175"/>
-          </p:spPr>
-          <p:style>
-            <a:lnRef idx="1">
-              <a:schemeClr val="dk1"/>
-            </a:lnRef>
-            <a:fillRef idx="0">
-              <a:schemeClr val="dk1"/>
-            </a:fillRef>
-            <a:effectRef idx="0">
-              <a:schemeClr val="dk1"/>
-            </a:effectRef>
-            <a:fontRef idx="minor">
-              <a:schemeClr val="tx1"/>
-            </a:fontRef>
-          </p:style>
-        </p:cxnSp>
-      </p:grpSp>
-      <p:sp>
-        <p:nvSpPr>
-          <p:cNvPr id="10" name="TextBox 9">
-            <a:extLst>
-              <a:ext uri="{FF2B5EF4-FFF2-40B4-BE49-F238E27FC236}">
-                <a16:creationId xmlns:a16="http://schemas.microsoft.com/office/drawing/2014/main" id="{77C1FA27-5BC0-4F69-9527-4508F8DB0FA9}"/>
-              </a:ext>
-            </a:extLst>
-          </p:cNvPr>
-          <p:cNvSpPr txBox="1"/>
-          <p:nvPr/>
-        </p:nvSpPr>
-        <p:spPr>
-          <a:xfrm>
-            <a:off x="876993" y="1865414"/>
-            <a:ext cx="3120390" cy="3139321"/>
-          </a:xfrm>
-          <a:prstGeom prst="rect">
-            <a:avLst/>
-          </a:prstGeom>
-          <a:noFill/>
-        </p:spPr>
-        <p:txBody>
-          <a:bodyPr wrap="square" rtlCol="0">
-            <a:spAutoFit/>
-          </a:bodyPr>
-          <a:lstStyle/>
-          <a:p>
-            <a:r>
-              <a:rPr lang="en-US" b="0" i="0" dirty="0">
-                <a:solidFill>
-                  <a:srgbClr val="595959"/>
-                </a:solidFill>
-                <a:effectLst/>
-                <a:latin typeface="Helvetica Neue"/>
-              </a:rPr>
-              <a:t>A</a:t>
-            </a:r>
-          </a:p>
-          <a:p>
-            <a:endParaRPr lang="en-US" dirty="0">
-              <a:solidFill>
-                <a:srgbClr val="595959"/>
-              </a:solidFill>
-              <a:latin typeface="Helvetica Neue"/>
-            </a:endParaRPr>
-          </a:p>
-          <a:p>
-            <a:endParaRPr lang="en-US" b="0" i="0" dirty="0">
-              <a:solidFill>
-                <a:srgbClr val="595959"/>
-              </a:solidFill>
-              <a:effectLst/>
-              <a:latin typeface="Helvetica Neue"/>
-            </a:endParaRPr>
-          </a:p>
-          <a:p>
-            <a:endParaRPr lang="en-US" dirty="0">
-              <a:solidFill>
-                <a:srgbClr val="595959"/>
-              </a:solidFill>
-              <a:latin typeface="Helvetica Neue"/>
-            </a:endParaRPr>
-          </a:p>
-          <a:p>
-            <a:endParaRPr lang="en-US" b="0" i="0" dirty="0">
-              <a:solidFill>
-                <a:srgbClr val="595959"/>
-              </a:solidFill>
-              <a:effectLst/>
-              <a:latin typeface="Helvetica Neue"/>
-            </a:endParaRPr>
-          </a:p>
-          <a:p>
-            <a:r>
-              <a:rPr lang="en-US" dirty="0">
-                <a:solidFill>
-                  <a:srgbClr val="595959"/>
-                </a:solidFill>
-                <a:latin typeface="Helvetica Neue"/>
-                <a:hlinkClick r:id="rId2"/>
-              </a:rPr>
-              <a:t>2013 disjuncture: ACX </a:t>
-            </a:r>
-            <a:endParaRPr lang="en-US" b="0" i="0" dirty="0">
-              <a:solidFill>
-                <a:srgbClr val="595959"/>
-              </a:solidFill>
-              <a:effectLst/>
-              <a:latin typeface="Helvetica Neue"/>
-            </a:endParaRPr>
-          </a:p>
-          <a:p>
-            <a:endParaRPr lang="en-US" dirty="0">
-              <a:solidFill>
-                <a:srgbClr val="595959"/>
-              </a:solidFill>
-              <a:latin typeface="Helvetica Neue"/>
-            </a:endParaRPr>
-          </a:p>
-          <a:p>
-            <a:endParaRPr lang="en-US" dirty="0">
-              <a:solidFill>
-                <a:srgbClr val="595959"/>
-              </a:solidFill>
-              <a:latin typeface="Helvetica Neue"/>
-            </a:endParaRPr>
-          </a:p>
-          <a:p>
-            <a:endParaRPr lang="en-US" dirty="0">
-              <a:solidFill>
-                <a:srgbClr val="595959"/>
-              </a:solidFill>
-              <a:latin typeface="Helvetica Neue"/>
-            </a:endParaRPr>
-          </a:p>
-          <a:p>
-            <a:endParaRPr lang="en-US" dirty="0">
-              <a:solidFill>
-                <a:srgbClr val="595959"/>
-              </a:solidFill>
-              <a:latin typeface="Helvetica Neue"/>
-            </a:endParaRPr>
-          </a:p>
-          <a:p>
-            <a:endParaRPr lang="en-US" dirty="0">
-              <a:solidFill>
-                <a:srgbClr val="595959"/>
-              </a:solidFill>
-              <a:latin typeface="Helvetica Neue"/>
-            </a:endParaRPr>
-          </a:p>
-        </p:txBody>
-      </p:sp>
-      <p:pic>
-        <p:nvPicPr>
-          <p:cNvPr id="6" name="Picture 5" descr="Chart, bar chart, histogram&#10;&#10;Description automatically generated">
-            <a:extLst>
-              <a:ext uri="{FF2B5EF4-FFF2-40B4-BE49-F238E27FC236}">
-                <a16:creationId xmlns:a16="http://schemas.microsoft.com/office/drawing/2014/main" id="{60503A49-C64B-4450-921B-50F2F3B103FD}"/>
-              </a:ext>
-            </a:extLst>
-          </p:cNvPr>
-          <p:cNvPicPr>
-            <a:picLocks noChangeAspect="1"/>
-          </p:cNvPicPr>
-          <p:nvPr/>
-        </p:nvPicPr>
-        <p:blipFill>
-          <a:blip r:embed="rId3">
-            <a:extLst>
-              <a:ext uri="{28A0092B-C50C-407E-A947-70E740481C1C}">
-                <a14:useLocalDpi xmlns:a14="http://schemas.microsoft.com/office/drawing/2010/main" val="0"/>
-              </a:ext>
-            </a:extLst>
-          </a:blip>
-          <a:stretch>
-            <a:fillRect/>
-          </a:stretch>
-        </p:blipFill>
-        <p:spPr>
-          <a:xfrm>
-            <a:off x="4786100" y="1163422"/>
-            <a:ext cx="7054272" cy="4812818"/>
-          </a:xfrm>
-          <a:prstGeom prst="rect">
-            <a:avLst/>
-          </a:prstGeom>
-        </p:spPr>
-      </p:pic>
-      <p:sp>
-        <p:nvSpPr>
-          <p:cNvPr id="7" name="TextBox 6">
-            <a:extLst>
-              <a:ext uri="{FF2B5EF4-FFF2-40B4-BE49-F238E27FC236}">
-                <a16:creationId xmlns:a16="http://schemas.microsoft.com/office/drawing/2014/main" id="{C941840D-87EC-4DC0-A0F1-3CD06B801533}"/>
-              </a:ext>
-            </a:extLst>
-          </p:cNvPr>
-          <p:cNvSpPr txBox="1"/>
-          <p:nvPr/>
-        </p:nvSpPr>
-        <p:spPr>
-          <a:xfrm>
-            <a:off x="88275" y="5699241"/>
-            <a:ext cx="4697825" cy="276999"/>
-          </a:xfrm>
-          <a:prstGeom prst="rect">
-            <a:avLst/>
-          </a:prstGeom>
-          <a:noFill/>
-        </p:spPr>
-        <p:txBody>
-          <a:bodyPr wrap="none" rtlCol="0">
-            <a:spAutoFit/>
-          </a:bodyPr>
-          <a:lstStyle/>
-          <a:p>
-            <a:r>
-              <a:rPr lang="en-US" sz="1200" dirty="0">
-                <a:solidFill>
-                  <a:srgbClr val="595959"/>
-                </a:solidFill>
-                <a:latin typeface="Helvetica Neue"/>
-              </a:rPr>
-              <a:t>((Current Year – Previous Year ) / Previous Year) * 100 = % Growth</a:t>
-            </a:r>
-            <a:endParaRPr lang="en-US" sz="1200" dirty="0"/>
-          </a:p>
-        </p:txBody>
-      </p:sp>
-    </p:spTree>
-    <p:extLst>
-      <p:ext uri="{BB962C8B-B14F-4D97-AF65-F5344CB8AC3E}">
-        <p14:creationId xmlns:p14="http://schemas.microsoft.com/office/powerpoint/2010/main" val="3479204610"/>
       </p:ext>
     </p:extLst>
   </p:cSld>

</xml_diff>